<commit_message>
Force field template creator
</commit_message>
<xml_diff>
--- a/Jose/minimization_design.pptx
+++ b/Jose/minimization_design.pptx
@@ -5,23 +5,22 @@
     <p:sldMasterId id="2147483648" r:id="rId1"/>
   </p:sldMasterIdLst>
   <p:sldIdLst>
-    <p:sldId id="277" r:id="rId2"/>
-    <p:sldId id="278" r:id="rId3"/>
-    <p:sldId id="279" r:id="rId4"/>
-    <p:sldId id="280" r:id="rId5"/>
-    <p:sldId id="281" r:id="rId6"/>
-    <p:sldId id="282" r:id="rId7"/>
-    <p:sldId id="283" r:id="rId8"/>
-    <p:sldId id="284" r:id="rId9"/>
-    <p:sldId id="285" r:id="rId10"/>
-    <p:sldId id="263" r:id="rId11"/>
-    <p:sldId id="265" r:id="rId12"/>
-    <p:sldId id="266" r:id="rId13"/>
-    <p:sldId id="267" r:id="rId14"/>
-    <p:sldId id="268" r:id="rId15"/>
-    <p:sldId id="269" r:id="rId16"/>
-    <p:sldId id="271" r:id="rId17"/>
-    <p:sldId id="276" r:id="rId18"/>
+    <p:sldId id="282" r:id="rId2"/>
+    <p:sldId id="286" r:id="rId3"/>
+    <p:sldId id="287" r:id="rId4"/>
+    <p:sldId id="277" r:id="rId5"/>
+    <p:sldId id="278" r:id="rId6"/>
+    <p:sldId id="279" r:id="rId7"/>
+    <p:sldId id="280" r:id="rId8"/>
+    <p:sldId id="285" r:id="rId9"/>
+    <p:sldId id="263" r:id="rId10"/>
+    <p:sldId id="265" r:id="rId11"/>
+    <p:sldId id="266" r:id="rId12"/>
+    <p:sldId id="267" r:id="rId13"/>
+    <p:sldId id="268" r:id="rId14"/>
+    <p:sldId id="269" r:id="rId15"/>
+    <p:sldId id="271" r:id="rId16"/>
+    <p:sldId id="276" r:id="rId17"/>
   </p:sldIdLst>
   <p:sldSz cx="9144000" cy="6858000" type="screen4x3"/>
   <p:notesSz cx="6858000" cy="9144000"/>
@@ -304,7 +303,7 @@
           <a:p>
             <a:fld id="{07BBF333-9989-4654-BFDE-F9E26C4E79EF}" type="datetimeFigureOut">
               <a:rPr lang="en-US" smtClean="0"/>
-              <a:t>12/2/2012</a:t>
+              <a:t>12/19/2012</a:t>
             </a:fld>
             <a:endParaRPr lang="en-US"/>
           </a:p>
@@ -469,7 +468,7 @@
           <a:p>
             <a:fld id="{07BBF333-9989-4654-BFDE-F9E26C4E79EF}" type="datetimeFigureOut">
               <a:rPr lang="en-US" smtClean="0"/>
-              <a:t>12/2/2012</a:t>
+              <a:t>12/19/2012</a:t>
             </a:fld>
             <a:endParaRPr lang="en-US"/>
           </a:p>
@@ -644,7 +643,7 @@
           <a:p>
             <a:fld id="{07BBF333-9989-4654-BFDE-F9E26C4E79EF}" type="datetimeFigureOut">
               <a:rPr lang="en-US" smtClean="0"/>
-              <a:t>12/2/2012</a:t>
+              <a:t>12/19/2012</a:t>
             </a:fld>
             <a:endParaRPr lang="en-US"/>
           </a:p>
@@ -809,7 +808,7 @@
           <a:p>
             <a:fld id="{07BBF333-9989-4654-BFDE-F9E26C4E79EF}" type="datetimeFigureOut">
               <a:rPr lang="en-US" smtClean="0"/>
-              <a:t>12/2/2012</a:t>
+              <a:t>12/19/2012</a:t>
             </a:fld>
             <a:endParaRPr lang="en-US"/>
           </a:p>
@@ -1050,7 +1049,7 @@
           <a:p>
             <a:fld id="{07BBF333-9989-4654-BFDE-F9E26C4E79EF}" type="datetimeFigureOut">
               <a:rPr lang="en-US" smtClean="0"/>
-              <a:t>12/2/2012</a:t>
+              <a:t>12/19/2012</a:t>
             </a:fld>
             <a:endParaRPr lang="en-US"/>
           </a:p>
@@ -1333,7 +1332,7 @@
           <a:p>
             <a:fld id="{07BBF333-9989-4654-BFDE-F9E26C4E79EF}" type="datetimeFigureOut">
               <a:rPr lang="en-US" smtClean="0"/>
-              <a:t>12/2/2012</a:t>
+              <a:t>12/19/2012</a:t>
             </a:fld>
             <a:endParaRPr lang="en-US"/>
           </a:p>
@@ -1750,7 +1749,7 @@
           <a:p>
             <a:fld id="{07BBF333-9989-4654-BFDE-F9E26C4E79EF}" type="datetimeFigureOut">
               <a:rPr lang="en-US" smtClean="0"/>
-              <a:t>12/2/2012</a:t>
+              <a:t>12/19/2012</a:t>
             </a:fld>
             <a:endParaRPr lang="en-US"/>
           </a:p>
@@ -1863,7 +1862,7 @@
           <a:p>
             <a:fld id="{07BBF333-9989-4654-BFDE-F9E26C4E79EF}" type="datetimeFigureOut">
               <a:rPr lang="en-US" smtClean="0"/>
-              <a:t>12/2/2012</a:t>
+              <a:t>12/19/2012</a:t>
             </a:fld>
             <a:endParaRPr lang="en-US"/>
           </a:p>
@@ -1953,7 +1952,7 @@
           <a:p>
             <a:fld id="{07BBF333-9989-4654-BFDE-F9E26C4E79EF}" type="datetimeFigureOut">
               <a:rPr lang="en-US" smtClean="0"/>
-              <a:t>12/2/2012</a:t>
+              <a:t>12/19/2012</a:t>
             </a:fld>
             <a:endParaRPr lang="en-US"/>
           </a:p>
@@ -2225,7 +2224,7 @@
           <a:p>
             <a:fld id="{07BBF333-9989-4654-BFDE-F9E26C4E79EF}" type="datetimeFigureOut">
               <a:rPr lang="en-US" smtClean="0"/>
-              <a:t>12/2/2012</a:t>
+              <a:t>12/19/2012</a:t>
             </a:fld>
             <a:endParaRPr lang="en-US"/>
           </a:p>
@@ -2473,7 +2472,7 @@
           <a:p>
             <a:fld id="{07BBF333-9989-4654-BFDE-F9E26C4E79EF}" type="datetimeFigureOut">
               <a:rPr lang="en-US" smtClean="0"/>
-              <a:t>12/2/2012</a:t>
+              <a:t>12/19/2012</a:t>
             </a:fld>
             <a:endParaRPr lang="en-US"/>
           </a:p>
@@ -2681,7 +2680,7 @@
           <a:p>
             <a:fld id="{07BBF333-9989-4654-BFDE-F9E26C4E79EF}" type="datetimeFigureOut">
               <a:rPr lang="en-US" smtClean="0"/>
-              <a:t>12/2/2012</a:t>
+              <a:t>12/19/2012</a:t>
             </a:fld>
             <a:endParaRPr lang="en-US"/>
           </a:p>
@@ -3081,74 +3080,68 @@
                 </a:solidFill>
                 <a:latin typeface="Arial Black" pitchFamily="34" charset="0"/>
               </a:rPr>
-              <a:t>Minimization </a:t>
-            </a:r>
-            <a:r>
-              <a:rPr lang="en-US" sz="2800" dirty="0" smtClean="0">
-                <a:solidFill>
-                  <a:srgbClr val="005400"/>
-                </a:solidFill>
-                <a:latin typeface="Arial Black" pitchFamily="34" charset="0"/>
-              </a:rPr>
-              <a:t>Workflow</a:t>
+              <a:t>Force Field Template Creator</a:t>
             </a:r>
             <a:endParaRPr lang="en-US" sz="2800" dirty="0">
               <a:solidFill>
-                <a:srgbClr val="007000"/>
+                <a:srgbClr val="005400"/>
               </a:solidFill>
               <a:latin typeface="Arial Black" pitchFamily="34" charset="0"/>
             </a:endParaRPr>
           </a:p>
         </p:txBody>
       </p:sp>
-      <p:sp>
-        <p:nvSpPr>
-          <p:cNvPr id="7" name="Right Brace 6"/>
-          <p:cNvSpPr/>
+      <p:pic>
+        <p:nvPicPr>
+          <p:cNvPr id="2050" name="Picture 2" descr="C:\Documents and Settings\Jose Borreguero\My Documents\projects\development\CAMM\github\documents\Jose\force-file template creator.png"/>
+          <p:cNvPicPr>
+            <a:picLocks noChangeAspect="1" noChangeArrowheads="1"/>
+          </p:cNvPicPr>
           <p:nvPr/>
-        </p:nvSpPr>
-        <p:spPr>
-          <a:xfrm>
-            <a:off x="5105400" y="2057400"/>
-            <a:ext cx="426719" cy="1828800"/>
-          </a:xfrm>
-          <a:prstGeom prst="rightBrace">
+        </p:nvPicPr>
+        <p:blipFill>
+          <a:blip r:embed="rId2">
+            <a:extLst>
+              <a:ext uri="{28A0092B-C50C-407E-A947-70E740481C1C}">
+                <a14:useLocalDpi xmlns:a14="http://schemas.microsoft.com/office/drawing/2010/main" val="0"/>
+              </a:ext>
+            </a:extLst>
+          </a:blip>
+          <a:srcRect/>
+          <a:stretch>
+            <a:fillRect/>
+          </a:stretch>
+        </p:blipFill>
+        <p:spPr bwMode="auto">
+          <a:xfrm>
+            <a:off x="381001" y="1408331"/>
+            <a:ext cx="8058150" cy="4648200"/>
+          </a:xfrm>
+          <a:prstGeom prst="rect">
             <a:avLst/>
           </a:prstGeom>
+          <a:noFill/>
+          <a:extLst>
+            <a:ext uri="{909E8E84-426E-40DD-AFC4-6F175D3DCCD1}">
+              <a14:hiddenFill xmlns:a14="http://schemas.microsoft.com/office/drawing/2010/main">
+                <a:solidFill>
+                  <a:srgbClr val="FFFFFF"/>
+                </a:solidFill>
+              </a14:hiddenFill>
+            </a:ext>
+          </a:extLst>
         </p:spPr>
-        <p:style>
-          <a:lnRef idx="1">
-            <a:schemeClr val="accent2"/>
-          </a:lnRef>
-          <a:fillRef idx="0">
-            <a:schemeClr val="accent2"/>
-          </a:fillRef>
-          <a:effectRef idx="0">
-            <a:schemeClr val="accent2"/>
-          </a:effectRef>
-          <a:fontRef idx="minor">
-            <a:schemeClr val="tx1"/>
-          </a:fontRef>
-        </p:style>
-        <p:txBody>
-          <a:bodyPr rtlCol="0" anchor="ctr"/>
-          <a:lstStyle/>
-          <a:p>
-            <a:pPr algn="ctr"/>
-            <a:endParaRPr lang="en-US"/>
-          </a:p>
-        </p:txBody>
-      </p:sp>
-      <p:sp>
-        <p:nvSpPr>
-          <p:cNvPr id="8" name="TextBox 7"/>
+      </p:pic>
+      <p:sp>
+        <p:nvSpPr>
+          <p:cNvPr id="2" name="TextBox 1"/>
           <p:cNvSpPr txBox="1"/>
           <p:nvPr/>
         </p:nvSpPr>
         <p:spPr>
           <a:xfrm>
-            <a:off x="5486400" y="2667000"/>
-            <a:ext cx="719043" cy="646331"/>
+            <a:off x="381001" y="609600"/>
+            <a:ext cx="8305800" cy="646331"/>
           </a:xfrm>
           <a:prstGeom prst="rect">
             <a:avLst/>
@@ -3156,22 +3149,18 @@
           <a:noFill/>
         </p:spPr>
         <p:txBody>
-          <a:bodyPr wrap="none" rtlCol="0">
+          <a:bodyPr wrap="square" rtlCol="0">
             <a:spAutoFit/>
           </a:bodyPr>
           <a:lstStyle/>
           <a:p>
-            <a:pPr algn="ctr"/>
+            <a:pPr marL="120650" indent="-120650">
+              <a:buFont typeface="Arial" pitchFamily="34" charset="0"/>
+              <a:buChar char="•"/>
+            </a:pPr>
             <a:r>
               <a:rPr lang="en-US" dirty="0" smtClean="0"/>
-              <a:t>Intel </a:t>
-            </a:r>
-          </a:p>
-          <a:p>
-            <a:pPr algn="ctr"/>
-            <a:r>
-              <a:rPr lang="en-US" dirty="0" smtClean="0"/>
-              <a:t>Script</a:t>
+              <a:t>Simple GUI to select and configure parameters to fit partial charges from a PSF CHARMM or NAMD topology file</a:t>
             </a:r>
             <a:endParaRPr lang="en-US" dirty="0"/>
           </a:p>
@@ -3179,153 +3168,113 @@
       </p:sp>
       <p:sp>
         <p:nvSpPr>
-          <p:cNvPr id="10" name="Right Brace 9"/>
+          <p:cNvPr id="7" name="Oval 6"/>
           <p:cNvSpPr/>
           <p:nvPr/>
         </p:nvSpPr>
         <p:spPr>
-          <a:xfrm flipH="1">
-            <a:off x="2133600" y="838200"/>
-            <a:ext cx="640081" cy="5614811"/>
-          </a:xfrm>
-          <a:prstGeom prst="rightBrace">
-            <a:avLst/>
-          </a:prstGeom>
-        </p:spPr>
-        <p:style>
-          <a:lnRef idx="1">
-            <a:schemeClr val="accent2"/>
-          </a:lnRef>
-          <a:fillRef idx="0">
-            <a:schemeClr val="accent2"/>
-          </a:fillRef>
-          <a:effectRef idx="0">
-            <a:schemeClr val="accent2"/>
-          </a:effectRef>
-          <a:fontRef idx="minor">
-            <a:schemeClr val="tx1"/>
-          </a:fontRef>
-        </p:style>
-        <p:txBody>
-          <a:bodyPr rtlCol="0" anchor="ctr"/>
-          <a:lstStyle/>
-          <a:p>
-            <a:pPr algn="ctr"/>
-            <a:endParaRPr lang="en-US"/>
-          </a:p>
-        </p:txBody>
-      </p:sp>
-      <p:sp>
-        <p:nvSpPr>
-          <p:cNvPr id="11" name="TextBox 10"/>
-          <p:cNvSpPr txBox="1"/>
-          <p:nvPr/>
-        </p:nvSpPr>
-        <p:spPr>
-          <a:xfrm>
-            <a:off x="1255436" y="3276600"/>
-            <a:ext cx="954364" cy="646331"/>
-          </a:xfrm>
-          <a:prstGeom prst="rect">
+          <a:xfrm>
+            <a:off x="457200" y="2786424"/>
+            <a:ext cx="2514600" cy="2667000"/>
+          </a:xfrm>
+          <a:prstGeom prst="ellipse">
             <a:avLst/>
           </a:prstGeom>
           <a:noFill/>
+          <a:ln>
+            <a:solidFill>
+              <a:srgbClr val="FF0000"/>
+            </a:solidFill>
+            <a:prstDash val="sysDot"/>
+          </a:ln>
         </p:spPr>
-        <p:txBody>
-          <a:bodyPr wrap="none" rtlCol="0">
-            <a:spAutoFit/>
-          </a:bodyPr>
+        <p:style>
+          <a:lnRef idx="2">
+            <a:schemeClr val="accent1">
+              <a:shade val="50000"/>
+            </a:schemeClr>
+          </a:lnRef>
+          <a:fillRef idx="1">
+            <a:schemeClr val="accent1"/>
+          </a:fillRef>
+          <a:effectRef idx="0">
+            <a:schemeClr val="accent1"/>
+          </a:effectRef>
+          <a:fontRef idx="minor">
+            <a:schemeClr val="lt1"/>
+          </a:fontRef>
+        </p:style>
+        <p:txBody>
+          <a:bodyPr rtlCol="0" anchor="ctr"/>
           <a:lstStyle/>
           <a:p>
             <a:pPr algn="ctr"/>
-            <a:r>
-              <a:rPr lang="en-US" dirty="0" smtClean="0"/>
-              <a:t>Strategy</a:t>
-            </a:r>
-          </a:p>
-          <a:p>
-            <a:pPr algn="ctr"/>
-            <a:r>
-              <a:rPr lang="en-US" dirty="0" smtClean="0"/>
-              <a:t>Script</a:t>
-            </a:r>
-            <a:endParaRPr lang="en-US" dirty="0"/>
+            <a:endParaRPr lang="en-US"/>
           </a:p>
         </p:txBody>
       </p:sp>
       <p:grpSp>
         <p:nvGrpSpPr>
-          <p:cNvPr id="12" name="Group 11"/>
+          <p:cNvPr id="24" name="Group 23"/>
           <p:cNvGrpSpPr/>
           <p:nvPr/>
         </p:nvGrpSpPr>
         <p:grpSpPr>
           <a:xfrm>
-            <a:off x="2895600" y="523220"/>
-            <a:ext cx="3072809" cy="6049925"/>
-            <a:chOff x="2895600" y="523220"/>
-            <a:chExt cx="3072809" cy="6049925"/>
+            <a:off x="5486400" y="4191000"/>
+            <a:ext cx="2895600" cy="1477328"/>
+            <a:chOff x="5715000" y="3811377"/>
+            <a:chExt cx="2895600" cy="1477328"/>
           </a:xfrm>
         </p:grpSpPr>
-        <p:pic>
-          <p:nvPicPr>
-            <p:cNvPr id="6" name="Picture 2" descr="C:\Documents and Settings\Jose Borreguero\My Documents\projects\development\CAMM\github\documents\Jose\MinimizationWorkflow.jpeg"/>
-            <p:cNvPicPr>
-              <a:picLocks noChangeAspect="1" noChangeArrowheads="1"/>
-            </p:cNvPicPr>
+        <p:sp>
+          <p:nvSpPr>
+            <p:cNvPr id="6" name="TextBox 5"/>
+            <p:cNvSpPr txBox="1"/>
             <p:nvPr/>
-          </p:nvPicPr>
-          <p:blipFill rotWithShape="1">
-            <a:blip r:embed="rId2" cstate="print">
-              <a:extLst>
-                <a:ext uri="{28A0092B-C50C-407E-A947-70E740481C1C}">
-                  <a14:useLocalDpi xmlns:a14="http://schemas.microsoft.com/office/drawing/2010/main" val="0"/>
-                </a:ext>
-              </a:extLst>
-            </a:blip>
-            <a:srcRect l="12429" t="7421" r="31563" b="7669"/>
-            <a:stretch/>
-          </p:blipFill>
-          <p:spPr bwMode="auto">
+          </p:nvSpPr>
+          <p:spPr>
             <a:xfrm>
-              <a:off x="2895600" y="544485"/>
-              <a:ext cx="3072809" cy="6028660"/>
+              <a:off x="5715000" y="3811377"/>
+              <a:ext cx="2895600" cy="1477328"/>
             </a:xfrm>
             <a:prstGeom prst="rect">
               <a:avLst/>
             </a:prstGeom>
             <a:noFill/>
-            <a:extLst>
-              <a:ext uri="{909E8E84-426E-40DD-AFC4-6F175D3DCCD1}">
-                <a14:hiddenFill xmlns:a14="http://schemas.microsoft.com/office/drawing/2010/main">
-                  <a:solidFill>
-                    <a:srgbClr val="FFFFFF"/>
-                  </a:solidFill>
-                </a14:hiddenFill>
-              </a:ext>
-            </a:extLst>
           </p:spPr>
-        </p:pic>
+          <p:txBody>
+            <a:bodyPr wrap="square" rtlCol="0">
+              <a:spAutoFit/>
+            </a:bodyPr>
+            <a:lstStyle/>
+            <a:p>
+              <a:r>
+                <a:rPr lang="en-US" dirty="0" smtClean="0"/>
+                <a:t>A force-field template file is saved to disk. It will be used by the script that generates force-field files to be used by NADM or CHARMM</a:t>
+              </a:r>
+              <a:endParaRPr lang="en-US" dirty="0"/>
+            </a:p>
+          </p:txBody>
+        </p:sp>
         <p:sp>
           <p:nvSpPr>
-            <p:cNvPr id="9" name="Rectangle 8"/>
+            <p:cNvPr id="8" name="Rectangle 7"/>
             <p:cNvSpPr/>
             <p:nvPr/>
           </p:nvSpPr>
           <p:spPr>
             <a:xfrm>
-              <a:off x="3581400" y="523220"/>
-              <a:ext cx="1219200" cy="314980"/>
+              <a:off x="5715000" y="3859191"/>
+              <a:ext cx="2895600" cy="1429514"/>
             </a:xfrm>
             <a:prstGeom prst="rect">
               <a:avLst/>
             </a:prstGeom>
-            <a:solidFill>
-              <a:schemeClr val="bg1"/>
-            </a:solidFill>
+            <a:noFill/>
             <a:ln>
               <a:solidFill>
-                <a:schemeClr val="bg1"/>
+                <a:schemeClr val="tx1"/>
               </a:solidFill>
             </a:ln>
           </p:spPr>
@@ -3355,10 +3304,381 @@
           </p:txBody>
         </p:sp>
       </p:grpSp>
+      <p:cxnSp>
+        <p:nvCxnSpPr>
+          <p:cNvPr id="12" name="Straight Arrow Connector 11"/>
+          <p:cNvCxnSpPr/>
+          <p:nvPr/>
+        </p:nvCxnSpPr>
+        <p:spPr>
+          <a:xfrm flipH="1" flipV="1">
+            <a:off x="2667000" y="4953000"/>
+            <a:ext cx="2362200" cy="990600"/>
+          </a:xfrm>
+          <a:prstGeom prst="straightConnector1">
+            <a:avLst/>
+          </a:prstGeom>
+          <a:ln w="19050">
+            <a:solidFill>
+              <a:srgbClr val="FF0000"/>
+            </a:solidFill>
+            <a:tailEnd type="arrow"/>
+          </a:ln>
+        </p:spPr>
+        <p:style>
+          <a:lnRef idx="1">
+            <a:schemeClr val="accent1"/>
+          </a:lnRef>
+          <a:fillRef idx="0">
+            <a:schemeClr val="accent1"/>
+          </a:fillRef>
+          <a:effectRef idx="0">
+            <a:schemeClr val="accent1"/>
+          </a:effectRef>
+          <a:fontRef idx="minor">
+            <a:schemeClr val="tx1"/>
+          </a:fontRef>
+        </p:style>
+      </p:cxnSp>
+      <p:grpSp>
+        <p:nvGrpSpPr>
+          <p:cNvPr id="16" name="Group 15"/>
+          <p:cNvGrpSpPr/>
+          <p:nvPr/>
+        </p:nvGrpSpPr>
+        <p:grpSpPr>
+          <a:xfrm>
+            <a:off x="5029200" y="5791200"/>
+            <a:ext cx="2366032" cy="369332"/>
+            <a:chOff x="5486400" y="5791200"/>
+            <a:chExt cx="2366032" cy="369332"/>
+          </a:xfrm>
+        </p:grpSpPr>
+        <p:sp>
+          <p:nvSpPr>
+            <p:cNvPr id="13" name="TextBox 12"/>
+            <p:cNvSpPr txBox="1"/>
+            <p:nvPr/>
+          </p:nvSpPr>
+          <p:spPr>
+            <a:xfrm>
+              <a:off x="5486400" y="5791200"/>
+              <a:ext cx="2366032" cy="369332"/>
+            </a:xfrm>
+            <a:prstGeom prst="rect">
+              <a:avLst/>
+            </a:prstGeom>
+            <a:noFill/>
+          </p:spPr>
+          <p:txBody>
+            <a:bodyPr wrap="none" rtlCol="0">
+              <a:spAutoFit/>
+            </a:bodyPr>
+            <a:lstStyle/>
+            <a:p>
+              <a:r>
+                <a:rPr lang="en-US" dirty="0" smtClean="0"/>
+                <a:t>Contents of the PSF file</a:t>
+              </a:r>
+              <a:endParaRPr lang="en-US" dirty="0"/>
+            </a:p>
+          </p:txBody>
+        </p:sp>
+        <p:sp>
+          <p:nvSpPr>
+            <p:cNvPr id="15" name="Rectangle 14"/>
+            <p:cNvSpPr/>
+            <p:nvPr/>
+          </p:nvSpPr>
+          <p:spPr>
+            <a:xfrm>
+              <a:off x="5486400" y="5791200"/>
+              <a:ext cx="2366032" cy="369332"/>
+            </a:xfrm>
+            <a:prstGeom prst="rect">
+              <a:avLst/>
+            </a:prstGeom>
+            <a:noFill/>
+            <a:ln>
+              <a:solidFill>
+                <a:srgbClr val="FF0000"/>
+              </a:solidFill>
+            </a:ln>
+          </p:spPr>
+          <p:style>
+            <a:lnRef idx="2">
+              <a:schemeClr val="accent1">
+                <a:shade val="50000"/>
+              </a:schemeClr>
+            </a:lnRef>
+            <a:fillRef idx="1">
+              <a:schemeClr val="accent1"/>
+            </a:fillRef>
+            <a:effectRef idx="0">
+              <a:schemeClr val="accent1"/>
+            </a:effectRef>
+            <a:fontRef idx="minor">
+              <a:schemeClr val="lt1"/>
+            </a:fontRef>
+          </p:style>
+          <p:txBody>
+            <a:bodyPr rtlCol="0" anchor="ctr"/>
+            <a:lstStyle/>
+            <a:p>
+              <a:pPr algn="ctr"/>
+              <a:endParaRPr lang="en-US"/>
+            </a:p>
+          </p:txBody>
+        </p:sp>
+      </p:grpSp>
+      <p:cxnSp>
+        <p:nvCxnSpPr>
+          <p:cNvPr id="26" name="Straight Arrow Connector 25"/>
+          <p:cNvCxnSpPr/>
+          <p:nvPr/>
+        </p:nvCxnSpPr>
+        <p:spPr>
+          <a:xfrm flipH="1">
+            <a:off x="3390900" y="3904565"/>
+            <a:ext cx="1562100" cy="0"/>
+          </a:xfrm>
+          <a:prstGeom prst="straightConnector1">
+            <a:avLst/>
+          </a:prstGeom>
+          <a:ln w="19050">
+            <a:solidFill>
+              <a:srgbClr val="FF0000"/>
+            </a:solidFill>
+            <a:tailEnd type="arrow"/>
+          </a:ln>
+        </p:spPr>
+        <p:style>
+          <a:lnRef idx="1">
+            <a:schemeClr val="accent1"/>
+          </a:lnRef>
+          <a:fillRef idx="0">
+            <a:schemeClr val="accent1"/>
+          </a:fillRef>
+          <a:effectRef idx="0">
+            <a:schemeClr val="accent1"/>
+          </a:effectRef>
+          <a:fontRef idx="minor">
+            <a:schemeClr val="tx1"/>
+          </a:fontRef>
+        </p:style>
+      </p:cxnSp>
+      <p:grpSp>
+        <p:nvGrpSpPr>
+          <p:cNvPr id="28" name="Group 27"/>
+          <p:cNvGrpSpPr/>
+          <p:nvPr/>
+        </p:nvGrpSpPr>
+        <p:grpSpPr>
+          <a:xfrm>
+            <a:off x="4800600" y="3124200"/>
+            <a:ext cx="2209799" cy="923331"/>
+            <a:chOff x="5486400" y="5791199"/>
+            <a:chExt cx="2209799" cy="923331"/>
+          </a:xfrm>
+        </p:grpSpPr>
+        <p:sp>
+          <p:nvSpPr>
+            <p:cNvPr id="29" name="TextBox 28"/>
+            <p:cNvSpPr txBox="1"/>
+            <p:nvPr/>
+          </p:nvSpPr>
+          <p:spPr>
+            <a:xfrm>
+              <a:off x="5486400" y="5791200"/>
+              <a:ext cx="2209799" cy="923330"/>
+            </a:xfrm>
+            <a:prstGeom prst="rect">
+              <a:avLst/>
+            </a:prstGeom>
+            <a:noFill/>
+          </p:spPr>
+          <p:txBody>
+            <a:bodyPr wrap="square" rtlCol="0">
+              <a:spAutoFit/>
+            </a:bodyPr>
+            <a:lstStyle/>
+            <a:p>
+              <a:pPr algn="ctr"/>
+              <a:r>
+                <a:rPr lang="en-US" dirty="0"/>
+                <a:t>Ability to input simple constraints among parameters</a:t>
+              </a:r>
+              <a:endParaRPr lang="en-US" dirty="0"/>
+            </a:p>
+          </p:txBody>
+        </p:sp>
+        <p:sp>
+          <p:nvSpPr>
+            <p:cNvPr id="30" name="Rectangle 29"/>
+            <p:cNvSpPr/>
+            <p:nvPr/>
+          </p:nvSpPr>
+          <p:spPr>
+            <a:xfrm>
+              <a:off x="5638799" y="5791199"/>
+              <a:ext cx="1905000" cy="923331"/>
+            </a:xfrm>
+            <a:prstGeom prst="rect">
+              <a:avLst/>
+            </a:prstGeom>
+            <a:noFill/>
+            <a:ln>
+              <a:solidFill>
+                <a:srgbClr val="FF0000"/>
+              </a:solidFill>
+            </a:ln>
+          </p:spPr>
+          <p:style>
+            <a:lnRef idx="2">
+              <a:schemeClr val="accent1">
+                <a:shade val="50000"/>
+              </a:schemeClr>
+            </a:lnRef>
+            <a:fillRef idx="1">
+              <a:schemeClr val="accent1"/>
+            </a:fillRef>
+            <a:effectRef idx="0">
+              <a:schemeClr val="accent1"/>
+            </a:effectRef>
+            <a:fontRef idx="minor">
+              <a:schemeClr val="lt1"/>
+            </a:fontRef>
+          </p:style>
+          <p:txBody>
+            <a:bodyPr rtlCol="0" anchor="ctr"/>
+            <a:lstStyle/>
+            <a:p>
+              <a:pPr algn="ctr"/>
+              <a:endParaRPr lang="en-US"/>
+            </a:p>
+          </p:txBody>
+        </p:sp>
+      </p:grpSp>
+      <p:sp>
+        <p:nvSpPr>
+          <p:cNvPr id="31" name="Freeform 30"/>
+          <p:cNvSpPr/>
+          <p:nvPr/>
+        </p:nvSpPr>
+        <p:spPr>
+          <a:xfrm>
+            <a:off x="8153400" y="2667001"/>
+            <a:ext cx="805512" cy="2319670"/>
+          </a:xfrm>
+          <a:custGeom>
+            <a:avLst/>
+            <a:gdLst>
+              <a:gd name="connsiteX0" fmla="*/ 138223 w 545014"/>
+              <a:gd name="connsiteY0" fmla="*/ 1924493 h 1924493"/>
+              <a:gd name="connsiteX1" fmla="*/ 340242 w 545014"/>
+              <a:gd name="connsiteY1" fmla="*/ 1839432 h 1924493"/>
+              <a:gd name="connsiteX2" fmla="*/ 520995 w 545014"/>
+              <a:gd name="connsiteY2" fmla="*/ 1594883 h 1924493"/>
+              <a:gd name="connsiteX3" fmla="*/ 531628 w 545014"/>
+              <a:gd name="connsiteY3" fmla="*/ 1222744 h 1924493"/>
+              <a:gd name="connsiteX4" fmla="*/ 414669 w 545014"/>
+              <a:gd name="connsiteY4" fmla="*/ 808074 h 1924493"/>
+              <a:gd name="connsiteX5" fmla="*/ 0 w 545014"/>
+              <a:gd name="connsiteY5" fmla="*/ 0 h 1924493"/>
+            </a:gdLst>
+            <a:ahLst/>
+            <a:cxnLst>
+              <a:cxn ang="0">
+                <a:pos x="connsiteX0" y="connsiteY0"/>
+              </a:cxn>
+              <a:cxn ang="0">
+                <a:pos x="connsiteX1" y="connsiteY1"/>
+              </a:cxn>
+              <a:cxn ang="0">
+                <a:pos x="connsiteX2" y="connsiteY2"/>
+              </a:cxn>
+              <a:cxn ang="0">
+                <a:pos x="connsiteX3" y="connsiteY3"/>
+              </a:cxn>
+              <a:cxn ang="0">
+                <a:pos x="connsiteX4" y="connsiteY4"/>
+              </a:cxn>
+              <a:cxn ang="0">
+                <a:pos x="connsiteX5" y="connsiteY5"/>
+              </a:cxn>
+            </a:cxnLst>
+            <a:rect l="l" t="t" r="r" b="b"/>
+            <a:pathLst>
+              <a:path w="545014" h="1924493">
+                <a:moveTo>
+                  <a:pt x="138223" y="1924493"/>
+                </a:moveTo>
+                <a:cubicBezTo>
+                  <a:pt x="207335" y="1909430"/>
+                  <a:pt x="276447" y="1894367"/>
+                  <a:pt x="340242" y="1839432"/>
+                </a:cubicBezTo>
+                <a:cubicBezTo>
+                  <a:pt x="404037" y="1784497"/>
+                  <a:pt x="489097" y="1697664"/>
+                  <a:pt x="520995" y="1594883"/>
+                </a:cubicBezTo>
+                <a:cubicBezTo>
+                  <a:pt x="552893" y="1492102"/>
+                  <a:pt x="549349" y="1353879"/>
+                  <a:pt x="531628" y="1222744"/>
+                </a:cubicBezTo>
+                <a:cubicBezTo>
+                  <a:pt x="513907" y="1091609"/>
+                  <a:pt x="503274" y="1011865"/>
+                  <a:pt x="414669" y="808074"/>
+                </a:cubicBezTo>
+                <a:cubicBezTo>
+                  <a:pt x="326064" y="604283"/>
+                  <a:pt x="163032" y="302141"/>
+                  <a:pt x="0" y="0"/>
+                </a:cubicBezTo>
+              </a:path>
+            </a:pathLst>
+          </a:custGeom>
+          <a:noFill/>
+          <a:ln>
+            <a:solidFill>
+              <a:schemeClr val="tx1"/>
+            </a:solidFill>
+            <a:headEnd type="none"/>
+            <a:tailEnd type="triangle" w="lg" len="lg"/>
+          </a:ln>
+        </p:spPr>
+        <p:style>
+          <a:lnRef idx="2">
+            <a:schemeClr val="accent1">
+              <a:shade val="50000"/>
+            </a:schemeClr>
+          </a:lnRef>
+          <a:fillRef idx="1">
+            <a:schemeClr val="accent1"/>
+          </a:fillRef>
+          <a:effectRef idx="0">
+            <a:schemeClr val="accent1"/>
+          </a:effectRef>
+          <a:fontRef idx="minor">
+            <a:schemeClr val="lt1"/>
+          </a:fontRef>
+        </p:style>
+        <p:txBody>
+          <a:bodyPr rtlCol="0" anchor="ctr"/>
+          <a:lstStyle/>
+          <a:p>
+            <a:pPr algn="ctr"/>
+            <a:endParaRPr lang="en-US"/>
+          </a:p>
+        </p:txBody>
+      </p:sp>
     </p:spTree>
     <p:extLst>
       <p:ext uri="{BB962C8B-B14F-4D97-AF65-F5344CB8AC3E}">
-        <p14:creationId xmlns:p14="http://schemas.microsoft.com/office/powerpoint/2010/main" val="2545757735"/>
+        <p14:creationId xmlns:p14="http://schemas.microsoft.com/office/powerpoint/2010/main" val="3312729281"/>
       </p:ext>
     </p:extLst>
   </p:cSld>
@@ -3376,906 +3696,6 @@
 </file>
 
 <file path=ppt/slides/slide10.xml><?xml version="1.0" encoding="utf-8"?>
-<p:sld xmlns:a="http://schemas.openxmlformats.org/drawingml/2006/main" xmlns:r="http://schemas.openxmlformats.org/officeDocument/2006/relationships" xmlns:p="http://schemas.openxmlformats.org/presentationml/2006/main">
-  <p:cSld>
-    <p:spTree>
-      <p:nvGrpSpPr>
-        <p:cNvPr id="1" name=""/>
-        <p:cNvGrpSpPr/>
-        <p:nvPr/>
-      </p:nvGrpSpPr>
-      <p:grpSpPr>
-        <a:xfrm>
-          <a:off x="0" y="0"/>
-          <a:ext cx="0" cy="0"/>
-          <a:chOff x="0" y="0"/>
-          <a:chExt cx="0" cy="0"/>
-        </a:xfrm>
-      </p:grpSpPr>
-      <p:sp>
-        <p:nvSpPr>
-          <p:cNvPr id="4" name="TextBox 3"/>
-          <p:cNvSpPr txBox="1"/>
-          <p:nvPr/>
-        </p:nvSpPr>
-        <p:spPr>
-          <a:xfrm>
-            <a:off x="0" y="0"/>
-            <a:ext cx="9144000" cy="523220"/>
-          </a:xfrm>
-          <a:prstGeom prst="rect">
-            <a:avLst/>
-          </a:prstGeom>
-          <a:noFill/>
-        </p:spPr>
-        <p:txBody>
-          <a:bodyPr wrap="square" rtlCol="0">
-            <a:spAutoFit/>
-          </a:bodyPr>
-          <a:lstStyle/>
-          <a:p>
-            <a:pPr algn="ctr"/>
-            <a:r>
-              <a:rPr lang="en-US" sz="2800" dirty="0" smtClean="0">
-                <a:solidFill>
-                  <a:srgbClr val="005400"/>
-                </a:solidFill>
-                <a:latin typeface="Arial Black" pitchFamily="34" charset="0"/>
-              </a:rPr>
-              <a:t>Minimization Components</a:t>
-            </a:r>
-            <a:endParaRPr lang="en-US" sz="2800" dirty="0">
-              <a:solidFill>
-                <a:srgbClr val="005400"/>
-              </a:solidFill>
-              <a:latin typeface="Arial Black" pitchFamily="34" charset="0"/>
-            </a:endParaRPr>
-          </a:p>
-        </p:txBody>
-      </p:sp>
-      <p:graphicFrame>
-        <p:nvGraphicFramePr>
-          <p:cNvPr id="10" name="Table 9"/>
-          <p:cNvGraphicFramePr>
-            <a:graphicFrameLocks noGrp="1"/>
-          </p:cNvGraphicFramePr>
-          <p:nvPr>
-            <p:extLst>
-              <p:ext uri="{D42A27DB-BD31-4B8C-83A1-F6EECF244321}">
-                <p14:modId xmlns:p14="http://schemas.microsoft.com/office/powerpoint/2010/main" val="3170678568"/>
-              </p:ext>
-            </p:extLst>
-          </p:nvPr>
-        </p:nvGraphicFramePr>
-        <p:xfrm>
-          <a:off x="304800" y="762000"/>
-          <a:ext cx="3327400" cy="1828800"/>
-        </p:xfrm>
-        <a:graphic>
-          <a:graphicData uri="http://schemas.openxmlformats.org/drawingml/2006/table">
-            <a:tbl>
-              <a:tblPr firstRow="1" bandRow="1">
-                <a:tableStyleId>{5940675A-B579-460E-94D1-54222C63F5DA}</a:tableStyleId>
-              </a:tblPr>
-              <a:tblGrid>
-                <a:gridCol w="3327400"/>
-              </a:tblGrid>
-              <a:tr h="370840">
-                <a:tc>
-                  <a:txBody>
-                    <a:bodyPr/>
-                    <a:lstStyle/>
-                    <a:p>
-                      <a:pPr algn="ctr"/>
-                      <a:r>
-                        <a:rPr lang="en-US" sz="2400" dirty="0" smtClean="0"/>
-                        <a:t>Minimizer Algorithm</a:t>
-                      </a:r>
-                      <a:endParaRPr lang="en-US" sz="2400" dirty="0"/>
-                    </a:p>
-                  </a:txBody>
-                  <a:tcPr>
-                    <a:lnL w="12700" cmpd="sng">
-                      <a:noFill/>
-                    </a:lnL>
-                    <a:lnR w="12700" cmpd="sng">
-                      <a:noFill/>
-                    </a:lnR>
-                    <a:lnT w="12700" cmpd="sng">
-                      <a:noFill/>
-                    </a:lnT>
-                    <a:lnB w="12700" cmpd="sng">
-                      <a:noFill/>
-                    </a:lnB>
-                    <a:lnTlToBr w="12700" cmpd="sng">
-                      <a:noFill/>
-                      <a:prstDash val="solid"/>
-                    </a:lnTlToBr>
-                    <a:lnBlToTr w="12700" cmpd="sng">
-                      <a:noFill/>
-                      <a:prstDash val="solid"/>
-                    </a:lnBlToTr>
-                  </a:tcPr>
-                </a:tc>
-              </a:tr>
-              <a:tr h="370840">
-                <a:tc>
-                  <a:txBody>
-                    <a:bodyPr/>
-                    <a:lstStyle/>
-                    <a:p>
-                      <a:pPr algn="ctr"/>
-                      <a:r>
-                        <a:rPr lang="en-US" sz="2400" dirty="0" smtClean="0"/>
-                        <a:t>Cost Function</a:t>
-                      </a:r>
-                      <a:endParaRPr lang="en-US" sz="2400" dirty="0"/>
-                    </a:p>
-                  </a:txBody>
-                  <a:tcPr>
-                    <a:lnL w="12700" cmpd="sng">
-                      <a:noFill/>
-                    </a:lnL>
-                    <a:lnR w="12700" cmpd="sng">
-                      <a:noFill/>
-                    </a:lnR>
-                    <a:lnT w="12700" cmpd="sng">
-                      <a:noFill/>
-                    </a:lnT>
-                    <a:lnB w="12700" cmpd="sng">
-                      <a:noFill/>
-                    </a:lnB>
-                    <a:lnTlToBr w="12700" cmpd="sng">
-                      <a:noFill/>
-                      <a:prstDash val="solid"/>
-                    </a:lnTlToBr>
-                    <a:lnBlToTr w="12700" cmpd="sng">
-                      <a:noFill/>
-                      <a:prstDash val="solid"/>
-                    </a:lnBlToTr>
-                  </a:tcPr>
-                </a:tc>
-              </a:tr>
-              <a:tr h="375920">
-                <a:tc>
-                  <a:txBody>
-                    <a:bodyPr/>
-                    <a:lstStyle/>
-                    <a:p>
-                      <a:pPr algn="ctr"/>
-                      <a:r>
-                        <a:rPr lang="en-US" sz="2400" dirty="0" smtClean="0"/>
-                        <a:t>Fit Model</a:t>
-                      </a:r>
-                      <a:endParaRPr lang="en-US" sz="2400" dirty="0"/>
-                    </a:p>
-                  </a:txBody>
-                  <a:tcPr>
-                    <a:lnL w="12700" cmpd="sng">
-                      <a:noFill/>
-                    </a:lnL>
-                    <a:lnR w="12700" cmpd="sng">
-                      <a:noFill/>
-                    </a:lnR>
-                    <a:lnT w="12700" cmpd="sng">
-                      <a:noFill/>
-                    </a:lnT>
-                    <a:lnB w="12700" cmpd="sng">
-                      <a:noFill/>
-                    </a:lnB>
-                    <a:lnTlToBr w="12700" cmpd="sng">
-                      <a:noFill/>
-                      <a:prstDash val="solid"/>
-                    </a:lnTlToBr>
-                    <a:lnBlToTr w="12700" cmpd="sng">
-                      <a:noFill/>
-                      <a:prstDash val="solid"/>
-                    </a:lnBlToTr>
-                  </a:tcPr>
-                </a:tc>
-              </a:tr>
-              <a:tr h="375920">
-                <a:tc>
-                  <a:txBody>
-                    <a:bodyPr/>
-                    <a:lstStyle/>
-                    <a:p>
-                      <a:pPr algn="ctr"/>
-                      <a:r>
-                        <a:rPr lang="en-US" sz="2400" dirty="0" smtClean="0"/>
-                        <a:t>Experimental Data</a:t>
-                      </a:r>
-                      <a:endParaRPr lang="en-US" sz="2400" dirty="0"/>
-                    </a:p>
-                  </a:txBody>
-                  <a:tcPr>
-                    <a:lnL w="12700" cmpd="sng">
-                      <a:noFill/>
-                    </a:lnL>
-                    <a:lnR w="12700" cmpd="sng">
-                      <a:noFill/>
-                    </a:lnR>
-                    <a:lnT w="12700" cmpd="sng">
-                      <a:noFill/>
-                    </a:lnT>
-                    <a:lnB w="12700" cmpd="sng">
-                      <a:noFill/>
-                    </a:lnB>
-                    <a:lnTlToBr w="12700" cmpd="sng">
-                      <a:noFill/>
-                      <a:prstDash val="solid"/>
-                    </a:lnTlToBr>
-                    <a:lnBlToTr w="12700" cmpd="sng">
-                      <a:noFill/>
-                      <a:prstDash val="solid"/>
-                    </a:lnBlToTr>
-                  </a:tcPr>
-                </a:tc>
-              </a:tr>
-            </a:tbl>
-          </a:graphicData>
-        </a:graphic>
-      </p:graphicFrame>
-      <p:graphicFrame>
-        <p:nvGraphicFramePr>
-          <p:cNvPr id="11" name="Table 10"/>
-          <p:cNvGraphicFramePr>
-            <a:graphicFrameLocks noGrp="1"/>
-          </p:cNvGraphicFramePr>
-          <p:nvPr>
-            <p:extLst>
-              <p:ext uri="{D42A27DB-BD31-4B8C-83A1-F6EECF244321}">
-                <p14:modId xmlns:p14="http://schemas.microsoft.com/office/powerpoint/2010/main" val="2843984528"/>
-              </p:ext>
-            </p:extLst>
-          </p:nvPr>
-        </p:nvGraphicFramePr>
-        <p:xfrm>
-          <a:off x="4800600" y="760412"/>
-          <a:ext cx="4191000" cy="1828800"/>
-        </p:xfrm>
-        <a:graphic>
-          <a:graphicData uri="http://schemas.openxmlformats.org/drawingml/2006/table">
-            <a:tbl>
-              <a:tblPr firstRow="1" bandRow="1">
-                <a:tableStyleId>{5940675A-B579-460E-94D1-54222C63F5DA}</a:tableStyleId>
-              </a:tblPr>
-              <a:tblGrid>
-                <a:gridCol w="4191000"/>
-              </a:tblGrid>
-              <a:tr h="370840">
-                <a:tc>
-                  <a:txBody>
-                    <a:bodyPr/>
-                    <a:lstStyle/>
-                    <a:p>
-                      <a:pPr algn="ctr"/>
-                      <a:r>
-                        <a:rPr lang="en-US" sz="2400" dirty="0" smtClean="0"/>
-                        <a:t>Dakota Minimizer</a:t>
-                      </a:r>
-                      <a:endParaRPr lang="en-US" sz="2400" dirty="0"/>
-                    </a:p>
-                  </a:txBody>
-                  <a:tcPr>
-                    <a:lnL w="12700" cmpd="sng">
-                      <a:noFill/>
-                    </a:lnL>
-                    <a:lnR w="12700" cmpd="sng">
-                      <a:noFill/>
-                    </a:lnR>
-                    <a:lnT w="12700" cmpd="sng">
-                      <a:noFill/>
-                    </a:lnT>
-                    <a:lnB w="12700" cmpd="sng">
-                      <a:noFill/>
-                    </a:lnB>
-                    <a:lnTlToBr w="12700" cmpd="sng">
-                      <a:noFill/>
-                      <a:prstDash val="solid"/>
-                    </a:lnTlToBr>
-                    <a:lnBlToTr w="12700" cmpd="sng">
-                      <a:noFill/>
-                      <a:prstDash val="solid"/>
-                    </a:lnBlToTr>
-                  </a:tcPr>
-                </a:tc>
-              </a:tr>
-              <a:tr h="370840">
-                <a:tc>
-                  <a:txBody>
-                    <a:bodyPr/>
-                    <a:lstStyle/>
-                    <a:p>
-                      <a:pPr algn="ctr"/>
-                      <a:r>
-                        <a:rPr lang="en-US" sz="2400" dirty="0" smtClean="0"/>
-                        <a:t>Least</a:t>
-                      </a:r>
-                      <a:r>
-                        <a:rPr lang="en-US" sz="2400" baseline="0" dirty="0" smtClean="0"/>
-                        <a:t> Squares</a:t>
-                      </a:r>
-                      <a:endParaRPr lang="en-US" sz="2400" dirty="0"/>
-                    </a:p>
-                  </a:txBody>
-                  <a:tcPr>
-                    <a:lnL w="12700" cmpd="sng">
-                      <a:noFill/>
-                    </a:lnL>
-                    <a:lnR w="12700" cmpd="sng">
-                      <a:noFill/>
-                    </a:lnR>
-                    <a:lnT w="12700" cmpd="sng">
-                      <a:noFill/>
-                    </a:lnT>
-                    <a:lnB w="12700" cmpd="sng">
-                      <a:noFill/>
-                    </a:lnB>
-                    <a:lnTlToBr w="12700" cmpd="sng">
-                      <a:noFill/>
-                      <a:prstDash val="solid"/>
-                    </a:lnTlToBr>
-                    <a:lnBlToTr w="12700" cmpd="sng">
-                      <a:noFill/>
-                      <a:prstDash val="solid"/>
-                    </a:lnBlToTr>
-                  </a:tcPr>
-                </a:tc>
-              </a:tr>
-              <a:tr h="152400">
-                <a:tc>
-                  <a:txBody>
-                    <a:bodyPr/>
-                    <a:lstStyle/>
-                    <a:p>
-                      <a:pPr algn="ctr"/>
-                      <a:r>
-                        <a:rPr lang="en-US" sz="2400" dirty="0" smtClean="0"/>
-                        <a:t>S</a:t>
-                      </a:r>
-                      <a:r>
-                        <a:rPr lang="en-US" sz="2800" b="1" baseline="30000" dirty="0" smtClean="0"/>
-                        <a:t>SIM</a:t>
-                      </a:r>
-                      <a:r>
-                        <a:rPr lang="en-US" sz="2400" dirty="0" smtClean="0"/>
-                        <a:t>(Q,</a:t>
-                      </a:r>
-                      <a:r>
-                        <a:rPr lang="en-US" sz="2400" dirty="0" smtClean="0">
-                          <a:sym typeface="Symbol"/>
-                        </a:rPr>
-                        <a:t></a:t>
-                      </a:r>
-                      <a:r>
-                        <a:rPr lang="en-US" sz="2400" dirty="0" smtClean="0"/>
-                        <a:t>)+Beamline</a:t>
-                      </a:r>
-                      <a:endParaRPr lang="en-US" sz="2400" dirty="0"/>
-                    </a:p>
-                  </a:txBody>
-                  <a:tcPr>
-                    <a:lnL w="12700" cmpd="sng">
-                      <a:noFill/>
-                    </a:lnL>
-                    <a:lnR w="12700" cmpd="sng">
-                      <a:noFill/>
-                    </a:lnR>
-                    <a:lnT w="12700" cmpd="sng">
-                      <a:noFill/>
-                    </a:lnT>
-                    <a:lnB w="12700" cmpd="sng">
-                      <a:noFill/>
-                    </a:lnB>
-                    <a:lnTlToBr w="12700" cmpd="sng">
-                      <a:noFill/>
-                      <a:prstDash val="solid"/>
-                    </a:lnTlToBr>
-                    <a:lnBlToTr w="12700" cmpd="sng">
-                      <a:noFill/>
-                      <a:prstDash val="solid"/>
-                    </a:lnBlToTr>
-                  </a:tcPr>
-                </a:tc>
-              </a:tr>
-              <a:tr h="152400">
-                <a:tc>
-                  <a:txBody>
-                    <a:bodyPr/>
-                    <a:lstStyle/>
-                    <a:p>
-                      <a:pPr algn="ctr"/>
-                      <a:r>
-                        <a:rPr lang="en-US" sz="2400" dirty="0" smtClean="0"/>
-                        <a:t>S</a:t>
-                      </a:r>
-                      <a:r>
-                        <a:rPr lang="en-US" sz="2800" b="1" baseline="30000" dirty="0" smtClean="0"/>
-                        <a:t>EXP</a:t>
-                      </a:r>
-                      <a:r>
-                        <a:rPr lang="en-US" sz="2400" dirty="0" smtClean="0"/>
-                        <a:t>(Q,</a:t>
-                      </a:r>
-                      <a:r>
-                        <a:rPr lang="en-US" sz="2400" dirty="0" smtClean="0">
-                          <a:sym typeface="Symbol"/>
-                        </a:rPr>
-                        <a:t>)</a:t>
-                      </a:r>
-                      <a:endParaRPr lang="en-US" sz="2400" dirty="0"/>
-                    </a:p>
-                  </a:txBody>
-                  <a:tcPr>
-                    <a:lnL w="12700" cmpd="sng">
-                      <a:noFill/>
-                    </a:lnL>
-                    <a:lnR w="12700" cmpd="sng">
-                      <a:noFill/>
-                    </a:lnR>
-                    <a:lnT w="12700" cmpd="sng">
-                      <a:noFill/>
-                    </a:lnT>
-                    <a:lnB w="12700" cmpd="sng">
-                      <a:noFill/>
-                    </a:lnB>
-                    <a:lnTlToBr w="12700" cmpd="sng">
-                      <a:noFill/>
-                      <a:prstDash val="solid"/>
-                    </a:lnTlToBr>
-                    <a:lnBlToTr w="12700" cmpd="sng">
-                      <a:noFill/>
-                      <a:prstDash val="solid"/>
-                    </a:lnBlToTr>
-                  </a:tcPr>
-                </a:tc>
-              </a:tr>
-            </a:tbl>
-          </a:graphicData>
-        </a:graphic>
-      </p:graphicFrame>
-      <p:cxnSp>
-        <p:nvCxnSpPr>
-          <p:cNvPr id="13" name="Straight Arrow Connector 12"/>
-          <p:cNvCxnSpPr/>
-          <p:nvPr/>
-        </p:nvCxnSpPr>
-        <p:spPr>
-          <a:xfrm>
-            <a:off x="3581400" y="990600"/>
-            <a:ext cx="1447800" cy="1588"/>
-          </a:xfrm>
-          <a:prstGeom prst="straightConnector1">
-            <a:avLst/>
-          </a:prstGeom>
-          <a:ln w="38100">
-            <a:tailEnd type="arrow" w="lg" len="med"/>
-          </a:ln>
-        </p:spPr>
-        <p:style>
-          <a:lnRef idx="1">
-            <a:schemeClr val="dk1"/>
-          </a:lnRef>
-          <a:fillRef idx="0">
-            <a:schemeClr val="dk1"/>
-          </a:fillRef>
-          <a:effectRef idx="0">
-            <a:schemeClr val="dk1"/>
-          </a:effectRef>
-          <a:fontRef idx="minor">
-            <a:schemeClr val="tx1"/>
-          </a:fontRef>
-        </p:style>
-      </p:cxnSp>
-      <p:cxnSp>
-        <p:nvCxnSpPr>
-          <p:cNvPr id="16" name="Straight Arrow Connector 15"/>
-          <p:cNvCxnSpPr/>
-          <p:nvPr/>
-        </p:nvCxnSpPr>
-        <p:spPr>
-          <a:xfrm>
-            <a:off x="3581400" y="1446212"/>
-            <a:ext cx="1447800" cy="1588"/>
-          </a:xfrm>
-          <a:prstGeom prst="straightConnector1">
-            <a:avLst/>
-          </a:prstGeom>
-          <a:ln w="38100">
-            <a:tailEnd type="arrow" w="lg" len="med"/>
-          </a:ln>
-        </p:spPr>
-        <p:style>
-          <a:lnRef idx="1">
-            <a:schemeClr val="dk1"/>
-          </a:lnRef>
-          <a:fillRef idx="0">
-            <a:schemeClr val="dk1"/>
-          </a:fillRef>
-          <a:effectRef idx="0">
-            <a:schemeClr val="dk1"/>
-          </a:effectRef>
-          <a:fontRef idx="minor">
-            <a:schemeClr val="tx1"/>
-          </a:fontRef>
-        </p:style>
-      </p:cxnSp>
-      <p:cxnSp>
-        <p:nvCxnSpPr>
-          <p:cNvPr id="17" name="Straight Arrow Connector 16"/>
-          <p:cNvCxnSpPr/>
-          <p:nvPr/>
-        </p:nvCxnSpPr>
-        <p:spPr>
-          <a:xfrm>
-            <a:off x="3581400" y="1903412"/>
-            <a:ext cx="1447800" cy="1588"/>
-          </a:xfrm>
-          <a:prstGeom prst="straightConnector1">
-            <a:avLst/>
-          </a:prstGeom>
-          <a:ln w="38100">
-            <a:tailEnd type="arrow" w="lg" len="med"/>
-          </a:ln>
-        </p:spPr>
-        <p:style>
-          <a:lnRef idx="1">
-            <a:schemeClr val="dk1"/>
-          </a:lnRef>
-          <a:fillRef idx="0">
-            <a:schemeClr val="dk1"/>
-          </a:fillRef>
-          <a:effectRef idx="0">
-            <a:schemeClr val="dk1"/>
-          </a:effectRef>
-          <a:fontRef idx="minor">
-            <a:schemeClr val="tx1"/>
-          </a:fontRef>
-        </p:style>
-      </p:cxnSp>
-      <p:sp>
-        <p:nvSpPr>
-          <p:cNvPr id="2" name="TextBox 1"/>
-          <p:cNvSpPr txBox="1"/>
-          <p:nvPr/>
-        </p:nvSpPr>
-        <p:spPr>
-          <a:xfrm>
-            <a:off x="3376670" y="3111156"/>
-            <a:ext cx="2076338" cy="369332"/>
-          </a:xfrm>
-          <a:prstGeom prst="rect">
-            <a:avLst/>
-          </a:prstGeom>
-          <a:noFill/>
-          <a:ln>
-            <a:solidFill>
-              <a:schemeClr val="tx1"/>
-            </a:solidFill>
-          </a:ln>
-        </p:spPr>
-        <p:txBody>
-          <a:bodyPr wrap="none" rtlCol="0">
-            <a:spAutoFit/>
-          </a:bodyPr>
-          <a:lstStyle/>
-          <a:p>
-            <a:r>
-              <a:rPr lang="en-US" dirty="0" smtClean="0"/>
-              <a:t>Dakota Client object</a:t>
-            </a:r>
-            <a:endParaRPr lang="en-US" dirty="0"/>
-          </a:p>
-        </p:txBody>
-      </p:sp>
-      <p:cxnSp>
-        <p:nvCxnSpPr>
-          <p:cNvPr id="14" name="Straight Arrow Connector 13"/>
-          <p:cNvCxnSpPr/>
-          <p:nvPr/>
-        </p:nvCxnSpPr>
-        <p:spPr>
-          <a:xfrm>
-            <a:off x="4375785" y="3511748"/>
-            <a:ext cx="0" cy="341277"/>
-          </a:xfrm>
-          <a:prstGeom prst="straightConnector1">
-            <a:avLst/>
-          </a:prstGeom>
-          <a:ln w="34925" cmpd="sng">
-            <a:solidFill>
-              <a:schemeClr val="tx1"/>
-            </a:solidFill>
-            <a:headEnd type="triangle" w="lg" len="med"/>
-            <a:tailEnd type="triangle" w="lg" len="med"/>
-          </a:ln>
-        </p:spPr>
-        <p:style>
-          <a:lnRef idx="1">
-            <a:schemeClr val="accent1"/>
-          </a:lnRef>
-          <a:fillRef idx="0">
-            <a:schemeClr val="accent1"/>
-          </a:fillRef>
-          <a:effectRef idx="0">
-            <a:schemeClr val="accent1"/>
-          </a:effectRef>
-          <a:fontRef idx="minor">
-            <a:schemeClr val="tx1"/>
-          </a:fontRef>
-        </p:style>
-      </p:cxnSp>
-      <p:sp>
-        <p:nvSpPr>
-          <p:cNvPr id="7" name="TextBox 6"/>
-          <p:cNvSpPr txBox="1"/>
-          <p:nvPr/>
-        </p:nvSpPr>
-        <p:spPr>
-          <a:xfrm>
-            <a:off x="4457368" y="3545248"/>
-            <a:ext cx="839910" cy="307777"/>
-          </a:xfrm>
-          <a:prstGeom prst="rect">
-            <a:avLst/>
-          </a:prstGeom>
-          <a:noFill/>
-        </p:spPr>
-        <p:txBody>
-          <a:bodyPr wrap="none" rtlCol="0">
-            <a:spAutoFit/>
-          </a:bodyPr>
-          <a:lstStyle/>
-          <a:p>
-            <a:r>
-              <a:rPr lang="en-US" sz="1400" dirty="0" smtClean="0"/>
-              <a:t>(</a:t>
-            </a:r>
-            <a:r>
-              <a:rPr lang="en-US" sz="1400" i="1" dirty="0" smtClean="0"/>
-              <a:t>request</a:t>
-            </a:r>
-            <a:r>
-              <a:rPr lang="en-US" sz="1400" dirty="0" smtClean="0"/>
-              <a:t>)</a:t>
-            </a:r>
-            <a:endParaRPr lang="en-US" sz="1400" dirty="0"/>
-          </a:p>
-        </p:txBody>
-      </p:sp>
-      <p:sp>
-        <p:nvSpPr>
-          <p:cNvPr id="15" name="TextBox 14"/>
-          <p:cNvSpPr txBox="1"/>
-          <p:nvPr/>
-        </p:nvSpPr>
-        <p:spPr>
-          <a:xfrm>
-            <a:off x="3345155" y="3853025"/>
-            <a:ext cx="2139368" cy="369332"/>
-          </a:xfrm>
-          <a:prstGeom prst="rect">
-            <a:avLst/>
-          </a:prstGeom>
-          <a:noFill/>
-          <a:ln>
-            <a:solidFill>
-              <a:schemeClr val="tx1"/>
-            </a:solidFill>
-          </a:ln>
-        </p:spPr>
-        <p:txBody>
-          <a:bodyPr wrap="none" rtlCol="0">
-            <a:spAutoFit/>
-          </a:bodyPr>
-          <a:lstStyle/>
-          <a:p>
-            <a:r>
-              <a:rPr lang="en-US" dirty="0" smtClean="0"/>
-              <a:t>Cost Function Object</a:t>
-            </a:r>
-            <a:endParaRPr lang="en-US" dirty="0"/>
-          </a:p>
-        </p:txBody>
-      </p:sp>
-      <p:cxnSp>
-        <p:nvCxnSpPr>
-          <p:cNvPr id="19" name="Straight Arrow Connector 18"/>
-          <p:cNvCxnSpPr/>
-          <p:nvPr/>
-        </p:nvCxnSpPr>
-        <p:spPr>
-          <a:xfrm>
-            <a:off x="4379120" y="4222357"/>
-            <a:ext cx="0" cy="341277"/>
-          </a:xfrm>
-          <a:prstGeom prst="straightConnector1">
-            <a:avLst/>
-          </a:prstGeom>
-          <a:ln w="34925" cmpd="sng">
-            <a:solidFill>
-              <a:schemeClr val="tx1"/>
-            </a:solidFill>
-            <a:headEnd type="triangle" w="lg" len="med"/>
-            <a:tailEnd type="triangle" w="lg" len="med"/>
-          </a:ln>
-        </p:spPr>
-        <p:style>
-          <a:lnRef idx="1">
-            <a:schemeClr val="accent1"/>
-          </a:lnRef>
-          <a:fillRef idx="0">
-            <a:schemeClr val="accent1"/>
-          </a:fillRef>
-          <a:effectRef idx="0">
-            <a:schemeClr val="accent1"/>
-          </a:effectRef>
-          <a:fontRef idx="minor">
-            <a:schemeClr val="tx1"/>
-          </a:fontRef>
-        </p:style>
-      </p:cxnSp>
-      <p:sp>
-        <p:nvSpPr>
-          <p:cNvPr id="21" name="TextBox 20"/>
-          <p:cNvSpPr txBox="1"/>
-          <p:nvPr/>
-        </p:nvSpPr>
-        <p:spPr>
-          <a:xfrm>
-            <a:off x="3210887" y="4577810"/>
-            <a:ext cx="2407903" cy="369332"/>
-          </a:xfrm>
-          <a:prstGeom prst="rect">
-            <a:avLst/>
-          </a:prstGeom>
-          <a:noFill/>
-          <a:ln>
-            <a:solidFill>
-              <a:schemeClr val="tx1"/>
-            </a:solidFill>
-          </a:ln>
-        </p:spPr>
-        <p:txBody>
-          <a:bodyPr wrap="none" rtlCol="0">
-            <a:spAutoFit/>
-          </a:bodyPr>
-          <a:lstStyle/>
-          <a:p>
-            <a:r>
-              <a:rPr lang="en-US" dirty="0" smtClean="0"/>
-              <a:t>Fit Model Server Object</a:t>
-            </a:r>
-            <a:endParaRPr lang="en-US" dirty="0"/>
-          </a:p>
-        </p:txBody>
-      </p:sp>
-      <p:cxnSp>
-        <p:nvCxnSpPr>
-          <p:cNvPr id="22" name="Straight Arrow Connector 21"/>
-          <p:cNvCxnSpPr/>
-          <p:nvPr/>
-        </p:nvCxnSpPr>
-        <p:spPr>
-          <a:xfrm>
-            <a:off x="5484523" y="4037691"/>
-            <a:ext cx="303719" cy="0"/>
-          </a:xfrm>
-          <a:prstGeom prst="straightConnector1">
-            <a:avLst/>
-          </a:prstGeom>
-          <a:ln w="34925" cmpd="sng">
-            <a:solidFill>
-              <a:schemeClr val="tx1"/>
-            </a:solidFill>
-            <a:headEnd type="triangle" w="lg" len="med"/>
-            <a:tailEnd type="triangle" w="lg" len="med"/>
-          </a:ln>
-        </p:spPr>
-        <p:style>
-          <a:lnRef idx="1">
-            <a:schemeClr val="accent1"/>
-          </a:lnRef>
-          <a:fillRef idx="0">
-            <a:schemeClr val="accent1"/>
-          </a:fillRef>
-          <a:effectRef idx="0">
-            <a:schemeClr val="accent1"/>
-          </a:effectRef>
-          <a:fontRef idx="minor">
-            <a:schemeClr val="tx1"/>
-          </a:fontRef>
-        </p:style>
-      </p:cxnSp>
-      <p:cxnSp>
-        <p:nvCxnSpPr>
-          <p:cNvPr id="23" name="Straight Arrow Connector 22"/>
-          <p:cNvCxnSpPr/>
-          <p:nvPr/>
-        </p:nvCxnSpPr>
-        <p:spPr>
-          <a:xfrm>
-            <a:off x="3581400" y="2362200"/>
-            <a:ext cx="1447800" cy="1588"/>
-          </a:xfrm>
-          <a:prstGeom prst="straightConnector1">
-            <a:avLst/>
-          </a:prstGeom>
-          <a:ln w="38100">
-            <a:tailEnd type="arrow" w="lg" len="med"/>
-          </a:ln>
-        </p:spPr>
-        <p:style>
-          <a:lnRef idx="1">
-            <a:schemeClr val="dk1"/>
-          </a:lnRef>
-          <a:fillRef idx="0">
-            <a:schemeClr val="dk1"/>
-          </a:fillRef>
-          <a:effectRef idx="0">
-            <a:schemeClr val="dk1"/>
-          </a:effectRef>
-          <a:fontRef idx="minor">
-            <a:schemeClr val="tx1"/>
-          </a:fontRef>
-        </p:style>
-      </p:cxnSp>
-      <p:sp>
-        <p:nvSpPr>
-          <p:cNvPr id="24" name="TextBox 23"/>
-          <p:cNvSpPr txBox="1"/>
-          <p:nvPr/>
-        </p:nvSpPr>
-        <p:spPr>
-          <a:xfrm>
-            <a:off x="5811279" y="3853025"/>
-            <a:ext cx="1908599" cy="369332"/>
-          </a:xfrm>
-          <a:prstGeom prst="rect">
-            <a:avLst/>
-          </a:prstGeom>
-          <a:noFill/>
-          <a:ln>
-            <a:solidFill>
-              <a:schemeClr val="tx1"/>
-            </a:solidFill>
-          </a:ln>
-        </p:spPr>
-        <p:txBody>
-          <a:bodyPr wrap="none" rtlCol="0">
-            <a:spAutoFit/>
-          </a:bodyPr>
-          <a:lstStyle/>
-          <a:p>
-            <a:r>
-              <a:rPr lang="en-US" dirty="0" err="1" smtClean="0"/>
-              <a:t>Exper</a:t>
-            </a:r>
-            <a:r>
-              <a:rPr lang="en-US" dirty="0" smtClean="0"/>
-              <a:t>. Data Object</a:t>
-            </a:r>
-            <a:endParaRPr lang="en-US" dirty="0"/>
-          </a:p>
-        </p:txBody>
-      </p:sp>
-    </p:spTree>
-  </p:cSld>
-  <p:clrMapOvr>
-    <a:masterClrMapping/>
-  </p:clrMapOvr>
-  <p:timing>
-    <p:tnLst>
-      <p:par>
-        <p:cTn id="1" dur="indefinite" restart="never" nodeType="tmRoot"/>
-      </p:par>
-    </p:tnLst>
-  </p:timing>
-</p:sld>
-</file>
-
-<file path=ppt/slides/slide11.xml><?xml version="1.0" encoding="utf-8"?>
 <p:sld xmlns:a="http://schemas.openxmlformats.org/drawingml/2006/main" xmlns:r="http://schemas.openxmlformats.org/officeDocument/2006/relationships" xmlns:p="http://schemas.openxmlformats.org/presentationml/2006/main">
   <p:cSld>
     <p:spTree>
@@ -4953,7 +4373,7 @@
 </p:sld>
 </file>
 
-<file path=ppt/slides/slide12.xml><?xml version="1.0" encoding="utf-8"?>
+<file path=ppt/slides/slide11.xml><?xml version="1.0" encoding="utf-8"?>
 <p:sld xmlns:a="http://schemas.openxmlformats.org/drawingml/2006/main" xmlns:r="http://schemas.openxmlformats.org/officeDocument/2006/relationships" xmlns:p="http://schemas.openxmlformats.org/presentationml/2006/main">
   <p:cSld>
     <p:spTree>
@@ -6270,7 +5690,7 @@
 </p:sld>
 </file>
 
-<file path=ppt/slides/slide13.xml><?xml version="1.0" encoding="utf-8"?>
+<file path=ppt/slides/slide12.xml><?xml version="1.0" encoding="utf-8"?>
 <p:sld xmlns:a="http://schemas.openxmlformats.org/drawingml/2006/main" xmlns:r="http://schemas.openxmlformats.org/officeDocument/2006/relationships" xmlns:p="http://schemas.openxmlformats.org/presentationml/2006/main">
   <p:cSld>
     <p:spTree>
@@ -7415,7 +6835,7 @@
 </p:sld>
 </file>
 
-<file path=ppt/slides/slide14.xml><?xml version="1.0" encoding="utf-8"?>
+<file path=ppt/slides/slide13.xml><?xml version="1.0" encoding="utf-8"?>
 <p:sld xmlns:a="http://schemas.openxmlformats.org/drawingml/2006/main" xmlns:r="http://schemas.openxmlformats.org/officeDocument/2006/relationships" xmlns:p="http://schemas.openxmlformats.org/presentationml/2006/main">
   <p:cSld>
     <p:spTree>
@@ -7892,7 +7312,7 @@
           <a:graphicData uri="http://schemas.openxmlformats.org/presentationml/2006/ole">
             <mc:AlternateContent xmlns:mc="http://schemas.openxmlformats.org/markup-compatibility/2006">
               <mc:Choice xmlns:v="urn:schemas-microsoft-com:vml" Requires="v">
-                <p:oleObj spid="_x0000_s1053" name="Equation" r:id="rId3" imgW="609480" imgH="393480" progId="Equation.DSMT4">
+                <p:oleObj spid="_x0000_s1057" name="Equation" r:id="rId3" imgW="609480" imgH="393480" progId="Equation.DSMT4">
                   <p:embed/>
                 </p:oleObj>
               </mc:Choice>
@@ -7942,7 +7362,7 @@
 </p:sld>
 </file>
 
-<file path=ppt/slides/slide15.xml><?xml version="1.0" encoding="utf-8"?>
+<file path=ppt/slides/slide14.xml><?xml version="1.0" encoding="utf-8"?>
 <p:sld xmlns:a="http://schemas.openxmlformats.org/drawingml/2006/main" xmlns:r="http://schemas.openxmlformats.org/officeDocument/2006/relationships" xmlns:p="http://schemas.openxmlformats.org/presentationml/2006/main">
   <p:cSld>
     <p:spTree>
@@ -8529,7 +7949,7 @@
 </p:sld>
 </file>
 
-<file path=ppt/slides/slide16.xml><?xml version="1.0" encoding="utf-8"?>
+<file path=ppt/slides/slide15.xml><?xml version="1.0" encoding="utf-8"?>
 <p:sld xmlns:a="http://schemas.openxmlformats.org/drawingml/2006/main" xmlns:r="http://schemas.openxmlformats.org/officeDocument/2006/relationships" xmlns:p="http://schemas.openxmlformats.org/presentationml/2006/main">
   <p:cSld>
     <p:spTree>
@@ -9146,7 +8566,7 @@
 </p:sld>
 </file>
 
-<file path=ppt/slides/slide17.xml><?xml version="1.0" encoding="utf-8"?>
+<file path=ppt/slides/slide16.xml><?xml version="1.0" encoding="utf-8"?>
 <p:sld xmlns:a="http://schemas.openxmlformats.org/drawingml/2006/main" xmlns:r="http://schemas.openxmlformats.org/officeDocument/2006/relationships" xmlns:p="http://schemas.openxmlformats.org/presentationml/2006/main">
   <p:cSld>
     <p:spTree>
@@ -9243,6 +8663,1824 @@
       </p:grpSpPr>
       <p:sp>
         <p:nvSpPr>
+          <p:cNvPr id="3" name="TextBox 2"/>
+          <p:cNvSpPr txBox="1"/>
+          <p:nvPr/>
+        </p:nvSpPr>
+        <p:spPr>
+          <a:xfrm>
+            <a:off x="228598" y="2057400"/>
+            <a:ext cx="6306535" cy="3754874"/>
+          </a:xfrm>
+          <a:prstGeom prst="rect">
+            <a:avLst/>
+          </a:prstGeom>
+          <a:noFill/>
+        </p:spPr>
+        <p:txBody>
+          <a:bodyPr wrap="none" rtlCol="0">
+            <a:spAutoFit/>
+          </a:bodyPr>
+          <a:lstStyle/>
+          <a:p>
+            <a:r>
+              <a:rPr lang="en-US" sz="1400" dirty="0">
+                <a:latin typeface="Courier New" pitchFamily="49" charset="0"/>
+                <a:cs typeface="Courier New" pitchFamily="49" charset="0"/>
+              </a:rPr>
+              <a:t>!FFPARAMS</a:t>
+            </a:r>
+          </a:p>
+          <a:p>
+            <a:r>
+              <a:rPr lang="en-US" sz="1400" dirty="0">
+                <a:latin typeface="Courier New" pitchFamily="49" charset="0"/>
+                <a:cs typeface="Courier New" pitchFamily="49" charset="0"/>
+              </a:rPr>
+              <a:t>#Force Field Parameters</a:t>
+            </a:r>
+          </a:p>
+          <a:p>
+            <a:r>
+              <a:rPr lang="en-US" sz="1400" dirty="0">
+                <a:latin typeface="Courier New" pitchFamily="49" charset="0"/>
+                <a:cs typeface="Courier New" pitchFamily="49" charset="0"/>
+              </a:rPr>
+              <a:t>FF1  # partial charge at oxygen atom in water molecule</a:t>
+            </a:r>
+          </a:p>
+          <a:p>
+            <a:r>
+              <a:rPr lang="en-US" sz="1400" dirty="0">
+                <a:latin typeface="Courier New" pitchFamily="49" charset="0"/>
+                <a:cs typeface="Courier New" pitchFamily="49" charset="0"/>
+              </a:rPr>
+              <a:t>FF2  # partial charge at hydrogen atom in water molecule</a:t>
+            </a:r>
+          </a:p>
+          <a:p>
+            <a:endParaRPr lang="en-US" sz="1400" dirty="0">
+              <a:latin typeface="Courier New" pitchFamily="49" charset="0"/>
+              <a:cs typeface="Courier New" pitchFamily="49" charset="0"/>
+            </a:endParaRPr>
+          </a:p>
+          <a:p>
+            <a:r>
+              <a:rPr lang="en-US" sz="1400" dirty="0">
+                <a:latin typeface="Courier New" pitchFamily="49" charset="0"/>
+                <a:cs typeface="Courier New" pitchFamily="49" charset="0"/>
+              </a:rPr>
+              <a:t>!FREEPARAMS</a:t>
+            </a:r>
+          </a:p>
+          <a:p>
+            <a:r>
+              <a:rPr lang="en-US" sz="1400" dirty="0">
+                <a:latin typeface="Courier New" pitchFamily="49" charset="0"/>
+                <a:cs typeface="Courier New" pitchFamily="49" charset="0"/>
+              </a:rPr>
+              <a:t>#Dakota Parameters</a:t>
+            </a:r>
+          </a:p>
+          <a:p>
+            <a:r>
+              <a:rPr lang="en-US" sz="1400" dirty="0">
+                <a:latin typeface="Courier New" pitchFamily="49" charset="0"/>
+                <a:cs typeface="Courier New" pitchFamily="49" charset="0"/>
+              </a:rPr>
+              <a:t>FF2</a:t>
+            </a:r>
+          </a:p>
+          <a:p>
+            <a:endParaRPr lang="en-US" sz="1400" dirty="0">
+              <a:latin typeface="Courier New" pitchFamily="49" charset="0"/>
+              <a:cs typeface="Courier New" pitchFamily="49" charset="0"/>
+            </a:endParaRPr>
+          </a:p>
+          <a:p>
+            <a:r>
+              <a:rPr lang="en-US" sz="1400" dirty="0">
+                <a:latin typeface="Courier New" pitchFamily="49" charset="0"/>
+                <a:cs typeface="Courier New" pitchFamily="49" charset="0"/>
+              </a:rPr>
+              <a:t>!CONSTRAINTS</a:t>
+            </a:r>
+          </a:p>
+          <a:p>
+            <a:r>
+              <a:rPr lang="en-US" sz="1400" dirty="0">
+                <a:latin typeface="Courier New" pitchFamily="49" charset="0"/>
+                <a:cs typeface="Courier New" pitchFamily="49" charset="0"/>
+              </a:rPr>
+              <a:t>#Constraints in explicit form for each non-free parameter</a:t>
+            </a:r>
+          </a:p>
+          <a:p>
+            <a:r>
+              <a:rPr lang="en-US" sz="1400" dirty="0">
+                <a:latin typeface="Courier New" pitchFamily="49" charset="0"/>
+                <a:cs typeface="Courier New" pitchFamily="49" charset="0"/>
+              </a:rPr>
+              <a:t>FF1=-2*FF2 # each water molecule is electrically neutral</a:t>
+            </a:r>
+          </a:p>
+          <a:p>
+            <a:endParaRPr lang="en-US" sz="1400" dirty="0">
+              <a:latin typeface="Courier New" pitchFamily="49" charset="0"/>
+              <a:cs typeface="Courier New" pitchFamily="49" charset="0"/>
+            </a:endParaRPr>
+          </a:p>
+          <a:p>
+            <a:r>
+              <a:rPr lang="en-US" sz="1400" dirty="0">
+                <a:latin typeface="Courier New" pitchFamily="49" charset="0"/>
+                <a:cs typeface="Courier New" pitchFamily="49" charset="0"/>
+              </a:rPr>
+              <a:t>!FFFORMAT</a:t>
+            </a:r>
+          </a:p>
+          <a:p>
+            <a:r>
+              <a:rPr lang="en-US" sz="1400" dirty="0">
+                <a:latin typeface="Courier New" pitchFamily="49" charset="0"/>
+                <a:cs typeface="Courier New" pitchFamily="49" charset="0"/>
+              </a:rPr>
+              <a:t>#Format Force Field Parameters (in C's </a:t>
+            </a:r>
+            <a:r>
+              <a:rPr lang="en-US" sz="1400" dirty="0" err="1">
+                <a:latin typeface="Courier New" pitchFamily="49" charset="0"/>
+                <a:cs typeface="Courier New" pitchFamily="49" charset="0"/>
+              </a:rPr>
+              <a:t>printf</a:t>
+            </a:r>
+            <a:r>
+              <a:rPr lang="en-US" sz="1400" dirty="0">
+                <a:latin typeface="Courier New" pitchFamily="49" charset="0"/>
+                <a:cs typeface="Courier New" pitchFamily="49" charset="0"/>
+              </a:rPr>
+              <a:t> style)</a:t>
+            </a:r>
+          </a:p>
+          <a:p>
+            <a:r>
+              <a:rPr lang="en-US" sz="1400" dirty="0">
+                <a:latin typeface="Courier New" pitchFamily="49" charset="0"/>
+                <a:cs typeface="Courier New" pitchFamily="49" charset="0"/>
+              </a:rPr>
+              <a:t>%9.3f</a:t>
+            </a:r>
+          </a:p>
+          <a:p>
+            <a:r>
+              <a:rPr lang="en-US" sz="1400" dirty="0">
+                <a:latin typeface="Courier New" pitchFamily="49" charset="0"/>
+                <a:cs typeface="Courier New" pitchFamily="49" charset="0"/>
+              </a:rPr>
+              <a:t>%9.3f</a:t>
+            </a:r>
+            <a:endParaRPr lang="en-US" sz="1400" dirty="0">
+              <a:latin typeface="Courier New" pitchFamily="49" charset="0"/>
+              <a:cs typeface="Courier New" pitchFamily="49" charset="0"/>
+            </a:endParaRPr>
+          </a:p>
+        </p:txBody>
+      </p:sp>
+      <p:sp>
+        <p:nvSpPr>
+          <p:cNvPr id="5" name="TextBox 4"/>
+          <p:cNvSpPr txBox="1"/>
+          <p:nvPr/>
+        </p:nvSpPr>
+        <p:spPr>
+          <a:xfrm>
+            <a:off x="228598" y="609600"/>
+            <a:ext cx="5321778" cy="1295868"/>
+          </a:xfrm>
+          <a:prstGeom prst="rect">
+            <a:avLst/>
+          </a:prstGeom>
+          <a:noFill/>
+        </p:spPr>
+        <p:txBody>
+          <a:bodyPr wrap="none" rtlCol="0">
+            <a:spAutoFit/>
+          </a:bodyPr>
+          <a:lstStyle/>
+          <a:p>
+            <a:pPr>
+              <a:lnSpc>
+                <a:spcPct val="150000"/>
+              </a:lnSpc>
+            </a:pPr>
+            <a:r>
+              <a:rPr lang="en-US" dirty="0" smtClean="0"/>
+              <a:t>Contents divided into:</a:t>
+            </a:r>
+          </a:p>
+          <a:p>
+            <a:pPr marL="577850" indent="-342900">
+              <a:lnSpc>
+                <a:spcPct val="150000"/>
+              </a:lnSpc>
+              <a:buFont typeface="+mj-lt"/>
+              <a:buAutoNum type="arabicPeriod"/>
+            </a:pPr>
+            <a:r>
+              <a:rPr lang="en-US" dirty="0" smtClean="0"/>
+              <a:t> a “mapping” section describing the parameters</a:t>
+            </a:r>
+          </a:p>
+          <a:p>
+            <a:pPr marL="577850" indent="-342900">
+              <a:lnSpc>
+                <a:spcPct val="150000"/>
+              </a:lnSpc>
+              <a:buFont typeface="+mj-lt"/>
+              <a:buAutoNum type="arabicPeriod"/>
+            </a:pPr>
+            <a:r>
+              <a:rPr lang="en-US" dirty="0" smtClean="0"/>
+              <a:t>the force-field where keywords substitute values</a:t>
+            </a:r>
+            <a:endParaRPr lang="en-US" dirty="0"/>
+          </a:p>
+        </p:txBody>
+      </p:sp>
+      <p:sp>
+        <p:nvSpPr>
+          <p:cNvPr id="6" name="Rectangle 5"/>
+          <p:cNvSpPr/>
+          <p:nvPr/>
+        </p:nvSpPr>
+        <p:spPr>
+          <a:xfrm>
+            <a:off x="228598" y="2057400"/>
+            <a:ext cx="6306535" cy="3754874"/>
+          </a:xfrm>
+          <a:prstGeom prst="rect">
+            <a:avLst/>
+          </a:prstGeom>
+          <a:noFill/>
+          <a:ln>
+            <a:solidFill>
+              <a:schemeClr val="tx1"/>
+            </a:solidFill>
+          </a:ln>
+        </p:spPr>
+        <p:style>
+          <a:lnRef idx="2">
+            <a:schemeClr val="accent1">
+              <a:shade val="50000"/>
+            </a:schemeClr>
+          </a:lnRef>
+          <a:fillRef idx="1">
+            <a:schemeClr val="accent1"/>
+          </a:fillRef>
+          <a:effectRef idx="0">
+            <a:schemeClr val="accent1"/>
+          </a:effectRef>
+          <a:fontRef idx="minor">
+            <a:schemeClr val="lt1"/>
+          </a:fontRef>
+        </p:style>
+        <p:txBody>
+          <a:bodyPr rtlCol="0" anchor="ctr"/>
+          <a:lstStyle/>
+          <a:p>
+            <a:pPr algn="ctr"/>
+            <a:endParaRPr lang="en-US"/>
+          </a:p>
+        </p:txBody>
+      </p:sp>
+      <p:sp>
+        <p:nvSpPr>
+          <p:cNvPr id="7" name="TextBox 6"/>
+          <p:cNvSpPr txBox="1"/>
+          <p:nvPr/>
+        </p:nvSpPr>
+        <p:spPr>
+          <a:xfrm>
+            <a:off x="0" y="0"/>
+            <a:ext cx="9144000" cy="523220"/>
+          </a:xfrm>
+          <a:prstGeom prst="rect">
+            <a:avLst/>
+          </a:prstGeom>
+          <a:noFill/>
+        </p:spPr>
+        <p:txBody>
+          <a:bodyPr wrap="square" rtlCol="0">
+            <a:spAutoFit/>
+          </a:bodyPr>
+          <a:lstStyle/>
+          <a:p>
+            <a:pPr algn="ctr"/>
+            <a:r>
+              <a:rPr lang="en-US" sz="2800" dirty="0">
+                <a:solidFill>
+                  <a:srgbClr val="005400"/>
+                </a:solidFill>
+                <a:latin typeface="Arial Black" pitchFamily="34" charset="0"/>
+              </a:rPr>
+              <a:t>Force Field Template </a:t>
+            </a:r>
+            <a:r>
+              <a:rPr lang="en-US" sz="2800" dirty="0" smtClean="0">
+                <a:solidFill>
+                  <a:srgbClr val="005400"/>
+                </a:solidFill>
+                <a:latin typeface="Arial Black" pitchFamily="34" charset="0"/>
+              </a:rPr>
+              <a:t>File</a:t>
+            </a:r>
+            <a:endParaRPr lang="en-US" sz="2800" dirty="0">
+              <a:solidFill>
+                <a:srgbClr val="005400"/>
+              </a:solidFill>
+              <a:latin typeface="Arial Black" pitchFamily="34" charset="0"/>
+            </a:endParaRPr>
+          </a:p>
+        </p:txBody>
+      </p:sp>
+    </p:spTree>
+    <p:extLst>
+      <p:ext uri="{BB962C8B-B14F-4D97-AF65-F5344CB8AC3E}">
+        <p14:creationId xmlns:p14="http://schemas.microsoft.com/office/powerpoint/2010/main" val="2861303253"/>
+      </p:ext>
+    </p:extLst>
+  </p:cSld>
+  <p:clrMapOvr>
+    <a:masterClrMapping/>
+  </p:clrMapOvr>
+  <p:timing>
+    <p:tnLst>
+      <p:par>
+        <p:cTn id="1" dur="indefinite" restart="never" nodeType="tmRoot"/>
+      </p:par>
+    </p:tnLst>
+  </p:timing>
+</p:sld>
+</file>
+
+<file path=ppt/slides/slide3.xml><?xml version="1.0" encoding="utf-8"?>
+<p:sld xmlns:a="http://schemas.openxmlformats.org/drawingml/2006/main" xmlns:r="http://schemas.openxmlformats.org/officeDocument/2006/relationships" xmlns:p="http://schemas.openxmlformats.org/presentationml/2006/main">
+  <p:cSld>
+    <p:spTree>
+      <p:nvGrpSpPr>
+        <p:cNvPr id="1" name=""/>
+        <p:cNvGrpSpPr/>
+        <p:nvPr/>
+      </p:nvGrpSpPr>
+      <p:grpSpPr>
+        <a:xfrm>
+          <a:off x="0" y="0"/>
+          <a:ext cx="0" cy="0"/>
+          <a:chOff x="0" y="0"/>
+          <a:chExt cx="0" cy="0"/>
+        </a:xfrm>
+      </p:grpSpPr>
+      <p:sp>
+        <p:nvSpPr>
+          <p:cNvPr id="4" name="TextBox 3"/>
+          <p:cNvSpPr txBox="1"/>
+          <p:nvPr/>
+        </p:nvSpPr>
+        <p:spPr>
+          <a:xfrm>
+            <a:off x="0" y="0"/>
+            <a:ext cx="9144000" cy="523220"/>
+          </a:xfrm>
+          <a:prstGeom prst="rect">
+            <a:avLst/>
+          </a:prstGeom>
+          <a:noFill/>
+        </p:spPr>
+        <p:txBody>
+          <a:bodyPr wrap="square" rtlCol="0">
+            <a:spAutoFit/>
+          </a:bodyPr>
+          <a:lstStyle/>
+          <a:p>
+            <a:pPr algn="ctr"/>
+            <a:r>
+              <a:rPr lang="en-US" sz="2800" dirty="0">
+                <a:solidFill>
+                  <a:srgbClr val="005400"/>
+                </a:solidFill>
+                <a:latin typeface="Arial Black" pitchFamily="34" charset="0"/>
+              </a:rPr>
+              <a:t>Force Field Template </a:t>
+            </a:r>
+            <a:r>
+              <a:rPr lang="en-US" sz="2800" dirty="0" smtClean="0">
+                <a:solidFill>
+                  <a:srgbClr val="005400"/>
+                </a:solidFill>
+                <a:latin typeface="Arial Black" pitchFamily="34" charset="0"/>
+              </a:rPr>
+              <a:t>File (II)</a:t>
+            </a:r>
+            <a:endParaRPr lang="en-US" sz="2800" dirty="0">
+              <a:solidFill>
+                <a:srgbClr val="005400"/>
+              </a:solidFill>
+              <a:latin typeface="Arial Black" pitchFamily="34" charset="0"/>
+            </a:endParaRPr>
+          </a:p>
+        </p:txBody>
+      </p:sp>
+      <p:sp>
+        <p:nvSpPr>
+          <p:cNvPr id="2" name="TextBox 1"/>
+          <p:cNvSpPr txBox="1"/>
+          <p:nvPr/>
+        </p:nvSpPr>
+        <p:spPr>
+          <a:xfrm>
+            <a:off x="304800" y="914400"/>
+            <a:ext cx="7595349" cy="5047536"/>
+          </a:xfrm>
+          <a:prstGeom prst="rect">
+            <a:avLst/>
+          </a:prstGeom>
+          <a:noFill/>
+        </p:spPr>
+        <p:txBody>
+          <a:bodyPr wrap="none" rtlCol="0">
+            <a:spAutoFit/>
+          </a:bodyPr>
+          <a:lstStyle/>
+          <a:p>
+            <a:r>
+              <a:rPr lang="en-US" sz="1400" dirty="0">
+                <a:latin typeface="Courier New" pitchFamily="49" charset="0"/>
+                <a:cs typeface="Courier New" pitchFamily="49" charset="0"/>
+              </a:rPr>
+              <a:t>PSF</a:t>
+            </a:r>
+          </a:p>
+          <a:p>
+            <a:endParaRPr lang="en-US" sz="1400" dirty="0">
+              <a:latin typeface="Courier New" pitchFamily="49" charset="0"/>
+              <a:cs typeface="Courier New" pitchFamily="49" charset="0"/>
+            </a:endParaRPr>
+          </a:p>
+          <a:p>
+            <a:r>
+              <a:rPr lang="en-US" sz="1400" dirty="0">
+                <a:latin typeface="Courier New" pitchFamily="49" charset="0"/>
+                <a:cs typeface="Courier New" pitchFamily="49" charset="0"/>
+              </a:rPr>
+              <a:t>       5 !NTITLE</a:t>
+            </a:r>
+          </a:p>
+          <a:p>
+            <a:r>
+              <a:rPr lang="en-US" sz="1400" dirty="0">
+                <a:latin typeface="Courier New" pitchFamily="49" charset="0"/>
+                <a:cs typeface="Courier New" pitchFamily="49" charset="0"/>
+              </a:rPr>
+              <a:t> REMARKS original generated structure x-</a:t>
+            </a:r>
+            <a:r>
+              <a:rPr lang="en-US" sz="1400" dirty="0" err="1">
+                <a:latin typeface="Courier New" pitchFamily="49" charset="0"/>
+                <a:cs typeface="Courier New" pitchFamily="49" charset="0"/>
+              </a:rPr>
+              <a:t>plor</a:t>
+            </a:r>
+            <a:r>
+              <a:rPr lang="en-US" sz="1400" dirty="0">
+                <a:latin typeface="Courier New" pitchFamily="49" charset="0"/>
+                <a:cs typeface="Courier New" pitchFamily="49" charset="0"/>
+              </a:rPr>
+              <a:t> </a:t>
+            </a:r>
+            <a:r>
+              <a:rPr lang="en-US" sz="1400" dirty="0" err="1">
+                <a:latin typeface="Courier New" pitchFamily="49" charset="0"/>
+                <a:cs typeface="Courier New" pitchFamily="49" charset="0"/>
+              </a:rPr>
+              <a:t>psf</a:t>
+            </a:r>
+            <a:r>
+              <a:rPr lang="en-US" sz="1400" dirty="0">
+                <a:latin typeface="Courier New" pitchFamily="49" charset="0"/>
+                <a:cs typeface="Courier New" pitchFamily="49" charset="0"/>
+              </a:rPr>
+              <a:t> file</a:t>
+            </a:r>
+          </a:p>
+          <a:p>
+            <a:r>
+              <a:rPr lang="en-US" sz="1400" dirty="0">
+                <a:latin typeface="Courier New" pitchFamily="49" charset="0"/>
+                <a:cs typeface="Courier New" pitchFamily="49" charset="0"/>
+              </a:rPr>
+              <a:t> REMARKS topology crd.md18_vmd_autopsf-temp.top </a:t>
+            </a:r>
+          </a:p>
+          <a:p>
+            <a:r>
+              <a:rPr lang="en-US" sz="1400" dirty="0">
+                <a:latin typeface="Courier New" pitchFamily="49" charset="0"/>
+                <a:cs typeface="Courier New" pitchFamily="49" charset="0"/>
+              </a:rPr>
+              <a:t> REMARKS segment O1 { first NONE; last NONE; auto angles dihedrals }</a:t>
+            </a:r>
+          </a:p>
+          <a:p>
+            <a:r>
+              <a:rPr lang="en-US" sz="1400" dirty="0">
+                <a:latin typeface="Courier New" pitchFamily="49" charset="0"/>
+                <a:cs typeface="Courier New" pitchFamily="49" charset="0"/>
+              </a:rPr>
+              <a:t> REMARKS segment O2 { first NONE; last NONE; auto angles dihedrals }</a:t>
+            </a:r>
+          </a:p>
+          <a:p>
+            <a:r>
+              <a:rPr lang="en-US" sz="1400" dirty="0">
+                <a:latin typeface="Courier New" pitchFamily="49" charset="0"/>
+                <a:cs typeface="Courier New" pitchFamily="49" charset="0"/>
+              </a:rPr>
+              <a:t> REMARKS segment W1 { first NONE; last NONE; auto angles dihedrals }</a:t>
+            </a:r>
+          </a:p>
+          <a:p>
+            <a:endParaRPr lang="en-US" sz="1400" dirty="0">
+              <a:latin typeface="Courier New" pitchFamily="49" charset="0"/>
+              <a:cs typeface="Courier New" pitchFamily="49" charset="0"/>
+            </a:endParaRPr>
+          </a:p>
+          <a:p>
+            <a:r>
+              <a:rPr lang="en-US" sz="1400" dirty="0" smtClean="0">
+                <a:latin typeface="Courier New" pitchFamily="49" charset="0"/>
+                <a:cs typeface="Courier New" pitchFamily="49" charset="0"/>
+              </a:rPr>
+              <a:t>3692 </a:t>
+            </a:r>
+            <a:r>
+              <a:rPr lang="en-US" sz="1400" dirty="0">
+                <a:latin typeface="Courier New" pitchFamily="49" charset="0"/>
+                <a:cs typeface="Courier New" pitchFamily="49" charset="0"/>
+              </a:rPr>
+              <a:t>!</a:t>
+            </a:r>
+            <a:r>
+              <a:rPr lang="en-US" sz="1400" dirty="0" smtClean="0">
+                <a:latin typeface="Courier New" pitchFamily="49" charset="0"/>
+                <a:cs typeface="Courier New" pitchFamily="49" charset="0"/>
+              </a:rPr>
+              <a:t>NATOM</a:t>
+            </a:r>
+          </a:p>
+          <a:p>
+            <a:r>
+              <a:rPr lang="en-US" sz="1400" dirty="0">
+                <a:latin typeface="Courier New" pitchFamily="49" charset="0"/>
+                <a:cs typeface="Courier New" pitchFamily="49" charset="0"/>
+              </a:rPr>
+              <a:t> </a:t>
+            </a:r>
+            <a:r>
+              <a:rPr lang="en-US" sz="1400" dirty="0" smtClean="0">
+                <a:latin typeface="Courier New" pitchFamily="49" charset="0"/>
+                <a:cs typeface="Courier New" pitchFamily="49" charset="0"/>
+              </a:rPr>
+              <a:t>  1 </a:t>
+            </a:r>
+            <a:r>
+              <a:rPr lang="en-US" sz="1400" dirty="0">
+                <a:latin typeface="Courier New" pitchFamily="49" charset="0"/>
+                <a:cs typeface="Courier New" pitchFamily="49" charset="0"/>
+              </a:rPr>
+              <a:t>O1 </a:t>
+            </a:r>
+            <a:r>
+              <a:rPr lang="en-US" sz="1400" dirty="0" smtClean="0">
+                <a:latin typeface="Courier New" pitchFamily="49" charset="0"/>
+                <a:cs typeface="Courier New" pitchFamily="49" charset="0"/>
+              </a:rPr>
+              <a:t>    1   LIT </a:t>
+            </a:r>
+            <a:r>
+              <a:rPr lang="en-US" sz="1400" dirty="0" err="1" smtClean="0">
+                <a:latin typeface="Courier New" pitchFamily="49" charset="0"/>
+                <a:cs typeface="Courier New" pitchFamily="49" charset="0"/>
+              </a:rPr>
+              <a:t>LIT</a:t>
+            </a:r>
+            <a:r>
+              <a:rPr lang="en-US" sz="1400" dirty="0" smtClean="0">
+                <a:latin typeface="Courier New" pitchFamily="49" charset="0"/>
+                <a:cs typeface="Courier New" pitchFamily="49" charset="0"/>
+              </a:rPr>
+              <a:t>  </a:t>
+            </a:r>
+            <a:r>
+              <a:rPr lang="en-US" sz="1400" dirty="0" err="1" smtClean="0">
+                <a:latin typeface="Courier New" pitchFamily="49" charset="0"/>
+                <a:cs typeface="Courier New" pitchFamily="49" charset="0"/>
+              </a:rPr>
+              <a:t>LIT</a:t>
+            </a:r>
+            <a:r>
+              <a:rPr lang="en-US" sz="1400" dirty="0" smtClean="0">
+                <a:latin typeface="Courier New" pitchFamily="49" charset="0"/>
+                <a:cs typeface="Courier New" pitchFamily="49" charset="0"/>
+              </a:rPr>
+              <a:t>    1.000000      </a:t>
+            </a:r>
+            <a:r>
+              <a:rPr lang="en-US" sz="1400" dirty="0">
+                <a:latin typeface="Courier New" pitchFamily="49" charset="0"/>
+                <a:cs typeface="Courier New" pitchFamily="49" charset="0"/>
+              </a:rPr>
+              <a:t>6.9410   </a:t>
+            </a:r>
+            <a:r>
+              <a:rPr lang="en-US" sz="1400" dirty="0" smtClean="0">
+                <a:latin typeface="Courier New" pitchFamily="49" charset="0"/>
+                <a:cs typeface="Courier New" pitchFamily="49" charset="0"/>
+              </a:rPr>
+              <a:t>       </a:t>
+            </a:r>
+            <a:r>
+              <a:rPr lang="en-US" sz="1400" dirty="0">
+                <a:latin typeface="Courier New" pitchFamily="49" charset="0"/>
+                <a:cs typeface="Courier New" pitchFamily="49" charset="0"/>
+              </a:rPr>
+              <a:t>0</a:t>
+            </a:r>
+          </a:p>
+          <a:p>
+            <a:r>
+              <a:rPr lang="en-US" sz="1400" dirty="0" smtClean="0">
+                <a:latin typeface="Courier New" pitchFamily="49" charset="0"/>
+                <a:cs typeface="Courier New" pitchFamily="49" charset="0"/>
+              </a:rPr>
+              <a:t>   2 </a:t>
+            </a:r>
+            <a:r>
+              <a:rPr lang="en-US" sz="1400" dirty="0">
+                <a:latin typeface="Courier New" pitchFamily="49" charset="0"/>
+                <a:cs typeface="Courier New" pitchFamily="49" charset="0"/>
+              </a:rPr>
+              <a:t>O1  </a:t>
+            </a:r>
+            <a:r>
+              <a:rPr lang="en-US" sz="1400" dirty="0" smtClean="0">
+                <a:latin typeface="Courier New" pitchFamily="49" charset="0"/>
+                <a:cs typeface="Courier New" pitchFamily="49" charset="0"/>
+              </a:rPr>
+              <a:t>   2   LIT </a:t>
+            </a:r>
+            <a:r>
+              <a:rPr lang="en-US" sz="1400" dirty="0" err="1" smtClean="0">
+                <a:latin typeface="Courier New" pitchFamily="49" charset="0"/>
+                <a:cs typeface="Courier New" pitchFamily="49" charset="0"/>
+              </a:rPr>
+              <a:t>LIT</a:t>
+            </a:r>
+            <a:r>
+              <a:rPr lang="en-US" sz="1400" dirty="0" smtClean="0">
+                <a:latin typeface="Courier New" pitchFamily="49" charset="0"/>
+                <a:cs typeface="Courier New" pitchFamily="49" charset="0"/>
+              </a:rPr>
+              <a:t>  </a:t>
+            </a:r>
+            <a:r>
+              <a:rPr lang="en-US" sz="1400" dirty="0" err="1" smtClean="0">
+                <a:latin typeface="Courier New" pitchFamily="49" charset="0"/>
+                <a:cs typeface="Courier New" pitchFamily="49" charset="0"/>
+              </a:rPr>
+              <a:t>LIT</a:t>
+            </a:r>
+            <a:r>
+              <a:rPr lang="en-US" sz="1400" dirty="0" smtClean="0">
+                <a:latin typeface="Courier New" pitchFamily="49" charset="0"/>
+                <a:cs typeface="Courier New" pitchFamily="49" charset="0"/>
+              </a:rPr>
+              <a:t>    1.000000      </a:t>
+            </a:r>
+            <a:r>
+              <a:rPr lang="en-US" sz="1400" dirty="0">
+                <a:latin typeface="Courier New" pitchFamily="49" charset="0"/>
+                <a:cs typeface="Courier New" pitchFamily="49" charset="0"/>
+              </a:rPr>
+              <a:t>6.9410   </a:t>
+            </a:r>
+            <a:r>
+              <a:rPr lang="en-US" sz="1400" dirty="0" smtClean="0">
+                <a:latin typeface="Courier New" pitchFamily="49" charset="0"/>
+                <a:cs typeface="Courier New" pitchFamily="49" charset="0"/>
+              </a:rPr>
+              <a:t>       0</a:t>
+            </a:r>
+          </a:p>
+          <a:p>
+            <a:r>
+              <a:rPr lang="en-US" sz="1400" dirty="0" smtClean="0">
+                <a:latin typeface="Courier New" pitchFamily="49" charset="0"/>
+                <a:cs typeface="Courier New" pitchFamily="49" charset="0"/>
+              </a:rPr>
+              <a:t>……</a:t>
+            </a:r>
+          </a:p>
+          <a:p>
+            <a:r>
+              <a:rPr lang="en-US" sz="1400" dirty="0">
+                <a:latin typeface="Courier New" pitchFamily="49" charset="0"/>
+                <a:cs typeface="Courier New" pitchFamily="49" charset="0"/>
+              </a:rPr>
+              <a:t> 307 O2   307 </a:t>
+            </a:r>
+            <a:r>
+              <a:rPr lang="en-US" sz="1400" dirty="0" smtClean="0">
+                <a:latin typeface="Courier New" pitchFamily="49" charset="0"/>
+                <a:cs typeface="Courier New" pitchFamily="49" charset="0"/>
+              </a:rPr>
+              <a:t>  </a:t>
+            </a:r>
+            <a:r>
+              <a:rPr lang="en-US" sz="1400" dirty="0">
+                <a:latin typeface="Courier New" pitchFamily="49" charset="0"/>
+                <a:cs typeface="Courier New" pitchFamily="49" charset="0"/>
+              </a:rPr>
+              <a:t>CLA </a:t>
+            </a:r>
+            <a:r>
+              <a:rPr lang="en-US" sz="1400" dirty="0" err="1" smtClean="0">
+                <a:latin typeface="Courier New" pitchFamily="49" charset="0"/>
+                <a:cs typeface="Courier New" pitchFamily="49" charset="0"/>
+              </a:rPr>
+              <a:t>CLA</a:t>
+            </a:r>
+            <a:r>
+              <a:rPr lang="en-US" sz="1400" dirty="0" smtClean="0">
+                <a:latin typeface="Courier New" pitchFamily="49" charset="0"/>
+                <a:cs typeface="Courier New" pitchFamily="49" charset="0"/>
+              </a:rPr>
+              <a:t>  </a:t>
+            </a:r>
+            <a:r>
+              <a:rPr lang="en-US" sz="1400" dirty="0" err="1">
+                <a:latin typeface="Courier New" pitchFamily="49" charset="0"/>
+                <a:cs typeface="Courier New" pitchFamily="49" charset="0"/>
+              </a:rPr>
+              <a:t>CLA</a:t>
+            </a:r>
+            <a:r>
+              <a:rPr lang="en-US" sz="1400" dirty="0">
+                <a:latin typeface="Courier New" pitchFamily="49" charset="0"/>
+                <a:cs typeface="Courier New" pitchFamily="49" charset="0"/>
+              </a:rPr>
+              <a:t>   -1.000000   </a:t>
+            </a:r>
+            <a:r>
+              <a:rPr lang="en-US" sz="1400" dirty="0" smtClean="0">
+                <a:latin typeface="Courier New" pitchFamily="49" charset="0"/>
+                <a:cs typeface="Courier New" pitchFamily="49" charset="0"/>
+              </a:rPr>
+              <a:t>  </a:t>
+            </a:r>
+            <a:r>
+              <a:rPr lang="en-US" sz="1400" dirty="0">
+                <a:latin typeface="Courier New" pitchFamily="49" charset="0"/>
+                <a:cs typeface="Courier New" pitchFamily="49" charset="0"/>
+              </a:rPr>
+              <a:t>35.4500       </a:t>
+            </a:r>
+            <a:r>
+              <a:rPr lang="en-US" sz="1400" dirty="0" smtClean="0">
+                <a:latin typeface="Courier New" pitchFamily="49" charset="0"/>
+                <a:cs typeface="Courier New" pitchFamily="49" charset="0"/>
+              </a:rPr>
+              <a:t>   </a:t>
+            </a:r>
+            <a:r>
+              <a:rPr lang="en-US" sz="1400" dirty="0">
+                <a:latin typeface="Courier New" pitchFamily="49" charset="0"/>
+                <a:cs typeface="Courier New" pitchFamily="49" charset="0"/>
+              </a:rPr>
+              <a:t>0</a:t>
+            </a:r>
+          </a:p>
+          <a:p>
+            <a:r>
+              <a:rPr lang="en-US" sz="1400" dirty="0">
+                <a:latin typeface="Courier New" pitchFamily="49" charset="0"/>
+                <a:cs typeface="Courier New" pitchFamily="49" charset="0"/>
+              </a:rPr>
+              <a:t> </a:t>
+            </a:r>
+            <a:r>
+              <a:rPr lang="en-US" sz="1400" dirty="0" smtClean="0">
+                <a:latin typeface="Courier New" pitchFamily="49" charset="0"/>
+                <a:cs typeface="Courier New" pitchFamily="49" charset="0"/>
+              </a:rPr>
+              <a:t>308 </a:t>
+            </a:r>
+            <a:r>
+              <a:rPr lang="en-US" sz="1400" dirty="0">
+                <a:latin typeface="Courier New" pitchFamily="49" charset="0"/>
+                <a:cs typeface="Courier New" pitchFamily="49" charset="0"/>
+              </a:rPr>
+              <a:t>O2   308 </a:t>
+            </a:r>
+            <a:r>
+              <a:rPr lang="en-US" sz="1400" dirty="0" smtClean="0">
+                <a:latin typeface="Courier New" pitchFamily="49" charset="0"/>
+                <a:cs typeface="Courier New" pitchFamily="49" charset="0"/>
+              </a:rPr>
+              <a:t>  </a:t>
+            </a:r>
+            <a:r>
+              <a:rPr lang="en-US" sz="1400" dirty="0">
+                <a:latin typeface="Courier New" pitchFamily="49" charset="0"/>
+                <a:cs typeface="Courier New" pitchFamily="49" charset="0"/>
+              </a:rPr>
+              <a:t>CLA </a:t>
+            </a:r>
+            <a:r>
+              <a:rPr lang="en-US" sz="1400" dirty="0" err="1" smtClean="0">
+                <a:latin typeface="Courier New" pitchFamily="49" charset="0"/>
+                <a:cs typeface="Courier New" pitchFamily="49" charset="0"/>
+              </a:rPr>
+              <a:t>CLA</a:t>
+            </a:r>
+            <a:r>
+              <a:rPr lang="en-US" sz="1400" dirty="0" smtClean="0">
+                <a:latin typeface="Courier New" pitchFamily="49" charset="0"/>
+                <a:cs typeface="Courier New" pitchFamily="49" charset="0"/>
+              </a:rPr>
+              <a:t>  </a:t>
+            </a:r>
+            <a:r>
+              <a:rPr lang="en-US" sz="1400" dirty="0" err="1">
+                <a:latin typeface="Courier New" pitchFamily="49" charset="0"/>
+                <a:cs typeface="Courier New" pitchFamily="49" charset="0"/>
+              </a:rPr>
+              <a:t>CLA</a:t>
+            </a:r>
+            <a:r>
+              <a:rPr lang="en-US" sz="1400" dirty="0">
+                <a:latin typeface="Courier New" pitchFamily="49" charset="0"/>
+                <a:cs typeface="Courier New" pitchFamily="49" charset="0"/>
+              </a:rPr>
+              <a:t>   -1.000000     </a:t>
+            </a:r>
+            <a:r>
+              <a:rPr lang="en-US" sz="1400" dirty="0" smtClean="0">
+                <a:latin typeface="Courier New" pitchFamily="49" charset="0"/>
+                <a:cs typeface="Courier New" pitchFamily="49" charset="0"/>
+              </a:rPr>
+              <a:t>35.4500          </a:t>
+            </a:r>
+            <a:r>
+              <a:rPr lang="en-US" sz="1400" dirty="0">
+                <a:latin typeface="Courier New" pitchFamily="49" charset="0"/>
+                <a:cs typeface="Courier New" pitchFamily="49" charset="0"/>
+              </a:rPr>
+              <a:t>0</a:t>
+            </a:r>
+          </a:p>
+          <a:p>
+            <a:r>
+              <a:rPr lang="en-US" sz="1400" dirty="0" smtClean="0">
+                <a:latin typeface="Courier New" pitchFamily="49" charset="0"/>
+                <a:cs typeface="Courier New" pitchFamily="49" charset="0"/>
+              </a:rPr>
+              <a:t> </a:t>
+            </a:r>
+            <a:r>
+              <a:rPr lang="pl-PL" sz="1400" dirty="0" smtClean="0">
+                <a:latin typeface="Courier New" pitchFamily="49" charset="0"/>
+                <a:cs typeface="Courier New" pitchFamily="49" charset="0"/>
+              </a:rPr>
+              <a:t>309 </a:t>
+            </a:r>
+            <a:r>
+              <a:rPr lang="pl-PL" sz="1400" dirty="0">
+                <a:latin typeface="Courier New" pitchFamily="49" charset="0"/>
+                <a:cs typeface="Courier New" pitchFamily="49" charset="0"/>
+              </a:rPr>
+              <a:t>W1   309  TIP3 OH2  </a:t>
+            </a:r>
+            <a:r>
+              <a:rPr lang="en-US" sz="1400" dirty="0" smtClean="0">
+                <a:latin typeface="Courier New" pitchFamily="49" charset="0"/>
+                <a:cs typeface="Courier New" pitchFamily="49" charset="0"/>
+              </a:rPr>
+              <a:t> </a:t>
+            </a:r>
+            <a:r>
+              <a:rPr lang="pl-PL" sz="1400" dirty="0" smtClean="0">
+                <a:latin typeface="Courier New" pitchFamily="49" charset="0"/>
+                <a:cs typeface="Courier New" pitchFamily="49" charset="0"/>
+              </a:rPr>
+              <a:t>OT   </a:t>
+            </a:r>
+            <a:r>
+              <a:rPr lang="pl-PL" sz="1400" dirty="0">
+                <a:latin typeface="Courier New" pitchFamily="49" charset="0"/>
+                <a:cs typeface="Courier New" pitchFamily="49" charset="0"/>
+              </a:rPr>
+              <a:t>_FF1_____  </a:t>
+            </a:r>
+            <a:r>
+              <a:rPr lang="pl-PL" sz="1400" dirty="0" smtClean="0">
+                <a:latin typeface="Courier New" pitchFamily="49" charset="0"/>
+                <a:cs typeface="Courier New" pitchFamily="49" charset="0"/>
+              </a:rPr>
+              <a:t>   </a:t>
+            </a:r>
+            <a:r>
+              <a:rPr lang="pl-PL" sz="1400" dirty="0">
+                <a:latin typeface="Courier New" pitchFamily="49" charset="0"/>
+                <a:cs typeface="Courier New" pitchFamily="49" charset="0"/>
+              </a:rPr>
+              <a:t>15.9994   </a:t>
+            </a:r>
+            <a:r>
+              <a:rPr lang="pl-PL" sz="1400" dirty="0" smtClean="0">
+                <a:latin typeface="Courier New" pitchFamily="49" charset="0"/>
+                <a:cs typeface="Courier New" pitchFamily="49" charset="0"/>
+              </a:rPr>
+              <a:t>   </a:t>
+            </a:r>
+            <a:r>
+              <a:rPr lang="en-US" sz="1400" dirty="0" smtClean="0">
+                <a:latin typeface="Courier New" pitchFamily="49" charset="0"/>
+                <a:cs typeface="Courier New" pitchFamily="49" charset="0"/>
+              </a:rPr>
+              <a:t> </a:t>
+            </a:r>
+            <a:r>
+              <a:rPr lang="pl-PL" sz="1400" dirty="0" smtClean="0">
+                <a:latin typeface="Courier New" pitchFamily="49" charset="0"/>
+                <a:cs typeface="Courier New" pitchFamily="49" charset="0"/>
+              </a:rPr>
+              <a:t>   </a:t>
+            </a:r>
+            <a:r>
+              <a:rPr lang="pl-PL" sz="1400" dirty="0">
+                <a:latin typeface="Courier New" pitchFamily="49" charset="0"/>
+                <a:cs typeface="Courier New" pitchFamily="49" charset="0"/>
+              </a:rPr>
+              <a:t>0</a:t>
+            </a:r>
+          </a:p>
+          <a:p>
+            <a:r>
+              <a:rPr lang="en-US" sz="1400" dirty="0">
+                <a:latin typeface="Courier New" pitchFamily="49" charset="0"/>
+                <a:cs typeface="Courier New" pitchFamily="49" charset="0"/>
+              </a:rPr>
+              <a:t> </a:t>
+            </a:r>
+            <a:r>
+              <a:rPr lang="en-US" sz="1400" dirty="0" smtClean="0">
+                <a:latin typeface="Courier New" pitchFamily="49" charset="0"/>
+                <a:cs typeface="Courier New" pitchFamily="49" charset="0"/>
+              </a:rPr>
+              <a:t>310 </a:t>
+            </a:r>
+            <a:r>
+              <a:rPr lang="en-US" sz="1400" dirty="0">
+                <a:latin typeface="Courier New" pitchFamily="49" charset="0"/>
+                <a:cs typeface="Courier New" pitchFamily="49" charset="0"/>
+              </a:rPr>
+              <a:t>W1   309  TIP3 </a:t>
+            </a:r>
+            <a:r>
+              <a:rPr lang="en-US" sz="1400" dirty="0" smtClean="0">
+                <a:latin typeface="Courier New" pitchFamily="49" charset="0"/>
+                <a:cs typeface="Courier New" pitchFamily="49" charset="0"/>
+              </a:rPr>
+              <a:t> H1   </a:t>
+            </a:r>
+            <a:r>
+              <a:rPr lang="en-US" sz="1400" dirty="0">
+                <a:latin typeface="Courier New" pitchFamily="49" charset="0"/>
+                <a:cs typeface="Courier New" pitchFamily="49" charset="0"/>
+              </a:rPr>
+              <a:t>HT </a:t>
+            </a:r>
+            <a:r>
+              <a:rPr lang="en-US" sz="1400" dirty="0" smtClean="0">
+                <a:latin typeface="Courier New" pitchFamily="49" charset="0"/>
+                <a:cs typeface="Courier New" pitchFamily="49" charset="0"/>
+              </a:rPr>
+              <a:t>  </a:t>
+            </a:r>
+            <a:r>
+              <a:rPr lang="en-US" sz="1400" dirty="0">
+                <a:latin typeface="Courier New" pitchFamily="49" charset="0"/>
+                <a:cs typeface="Courier New" pitchFamily="49" charset="0"/>
+              </a:rPr>
+              <a:t>_FF2</a:t>
+            </a:r>
+            <a:r>
+              <a:rPr lang="en-US" sz="1400" dirty="0" smtClean="0">
+                <a:latin typeface="Courier New" pitchFamily="49" charset="0"/>
+                <a:cs typeface="Courier New" pitchFamily="49" charset="0"/>
+              </a:rPr>
+              <a:t>_____      </a:t>
+            </a:r>
+            <a:r>
+              <a:rPr lang="en-US" sz="1400" dirty="0">
+                <a:latin typeface="Courier New" pitchFamily="49" charset="0"/>
+                <a:cs typeface="Courier New" pitchFamily="49" charset="0"/>
+              </a:rPr>
+              <a:t>1.0080   </a:t>
+            </a:r>
+            <a:r>
+              <a:rPr lang="en-US" sz="1400" dirty="0" smtClean="0">
+                <a:latin typeface="Courier New" pitchFamily="49" charset="0"/>
+                <a:cs typeface="Courier New" pitchFamily="49" charset="0"/>
+              </a:rPr>
+              <a:t>       </a:t>
+            </a:r>
+            <a:r>
+              <a:rPr lang="en-US" sz="1400" dirty="0">
+                <a:latin typeface="Courier New" pitchFamily="49" charset="0"/>
+                <a:cs typeface="Courier New" pitchFamily="49" charset="0"/>
+              </a:rPr>
+              <a:t>0</a:t>
+            </a:r>
+          </a:p>
+          <a:p>
+            <a:r>
+              <a:rPr lang="en-US" sz="1400" dirty="0">
+                <a:latin typeface="Courier New" pitchFamily="49" charset="0"/>
+                <a:cs typeface="Courier New" pitchFamily="49" charset="0"/>
+              </a:rPr>
+              <a:t> </a:t>
+            </a:r>
+            <a:r>
+              <a:rPr lang="en-US" sz="1400" dirty="0" smtClean="0">
+                <a:latin typeface="Courier New" pitchFamily="49" charset="0"/>
+                <a:cs typeface="Courier New" pitchFamily="49" charset="0"/>
+              </a:rPr>
+              <a:t>311 </a:t>
+            </a:r>
+            <a:r>
+              <a:rPr lang="en-US" sz="1400" dirty="0">
+                <a:latin typeface="Courier New" pitchFamily="49" charset="0"/>
+                <a:cs typeface="Courier New" pitchFamily="49" charset="0"/>
+              </a:rPr>
+              <a:t>W1   309  TIP3 </a:t>
+            </a:r>
+            <a:r>
+              <a:rPr lang="en-US" sz="1400" dirty="0" smtClean="0">
+                <a:latin typeface="Courier New" pitchFamily="49" charset="0"/>
+                <a:cs typeface="Courier New" pitchFamily="49" charset="0"/>
+              </a:rPr>
+              <a:t> H2   HT   </a:t>
+            </a:r>
+            <a:r>
+              <a:rPr lang="en-US" sz="1400" dirty="0">
+                <a:latin typeface="Courier New" pitchFamily="49" charset="0"/>
+                <a:cs typeface="Courier New" pitchFamily="49" charset="0"/>
+              </a:rPr>
+              <a:t>_FF2</a:t>
+            </a:r>
+            <a:r>
+              <a:rPr lang="en-US" sz="1400" dirty="0" smtClean="0">
+                <a:latin typeface="Courier New" pitchFamily="49" charset="0"/>
+                <a:cs typeface="Courier New" pitchFamily="49" charset="0"/>
+              </a:rPr>
+              <a:t>_____      </a:t>
+            </a:r>
+            <a:r>
+              <a:rPr lang="en-US" sz="1400" dirty="0">
+                <a:latin typeface="Courier New" pitchFamily="49" charset="0"/>
+                <a:cs typeface="Courier New" pitchFamily="49" charset="0"/>
+              </a:rPr>
+              <a:t>1.0080   </a:t>
+            </a:r>
+            <a:r>
+              <a:rPr lang="en-US" sz="1400" dirty="0" smtClean="0">
+                <a:latin typeface="Courier New" pitchFamily="49" charset="0"/>
+                <a:cs typeface="Courier New" pitchFamily="49" charset="0"/>
+              </a:rPr>
+              <a:t>       </a:t>
+            </a:r>
+            <a:r>
+              <a:rPr lang="en-US" sz="1400" dirty="0">
+                <a:latin typeface="Courier New" pitchFamily="49" charset="0"/>
+                <a:cs typeface="Courier New" pitchFamily="49" charset="0"/>
+              </a:rPr>
+              <a:t>0</a:t>
+            </a:r>
+          </a:p>
+          <a:p>
+            <a:r>
+              <a:rPr lang="pl-PL" sz="1400" dirty="0">
+                <a:latin typeface="Courier New" pitchFamily="49" charset="0"/>
+                <a:cs typeface="Courier New" pitchFamily="49" charset="0"/>
+              </a:rPr>
+              <a:t> </a:t>
+            </a:r>
+            <a:r>
+              <a:rPr lang="pl-PL" sz="1400" dirty="0" smtClean="0">
+                <a:latin typeface="Courier New" pitchFamily="49" charset="0"/>
+                <a:cs typeface="Courier New" pitchFamily="49" charset="0"/>
+              </a:rPr>
+              <a:t>312 </a:t>
+            </a:r>
+            <a:r>
+              <a:rPr lang="pl-PL" sz="1400" dirty="0">
+                <a:latin typeface="Courier New" pitchFamily="49" charset="0"/>
+                <a:cs typeface="Courier New" pitchFamily="49" charset="0"/>
+              </a:rPr>
+              <a:t>W1   310  TIP3 OH2 </a:t>
+            </a:r>
+            <a:r>
+              <a:rPr lang="en-US" sz="1400" dirty="0" smtClean="0">
+                <a:latin typeface="Courier New" pitchFamily="49" charset="0"/>
+                <a:cs typeface="Courier New" pitchFamily="49" charset="0"/>
+              </a:rPr>
+              <a:t> </a:t>
+            </a:r>
+            <a:r>
+              <a:rPr lang="pl-PL" sz="1400" dirty="0" smtClean="0">
+                <a:latin typeface="Courier New" pitchFamily="49" charset="0"/>
+                <a:cs typeface="Courier New" pitchFamily="49" charset="0"/>
+              </a:rPr>
+              <a:t> OT   </a:t>
+            </a:r>
+            <a:r>
+              <a:rPr lang="pl-PL" sz="1400" dirty="0">
+                <a:latin typeface="Courier New" pitchFamily="49" charset="0"/>
+                <a:cs typeface="Courier New" pitchFamily="49" charset="0"/>
+              </a:rPr>
+              <a:t>_FF1_____    </a:t>
+            </a:r>
+            <a:r>
+              <a:rPr lang="pl-PL" sz="1400" dirty="0" smtClean="0">
+                <a:latin typeface="Courier New" pitchFamily="49" charset="0"/>
+                <a:cs typeface="Courier New" pitchFamily="49" charset="0"/>
+              </a:rPr>
+              <a:t> </a:t>
+            </a:r>
+            <a:r>
+              <a:rPr lang="pl-PL" sz="1400" dirty="0">
+                <a:latin typeface="Courier New" pitchFamily="49" charset="0"/>
+                <a:cs typeface="Courier New" pitchFamily="49" charset="0"/>
+              </a:rPr>
+              <a:t>15.9994   </a:t>
+            </a:r>
+            <a:r>
+              <a:rPr lang="pl-PL" sz="1400" dirty="0" smtClean="0">
+                <a:latin typeface="Courier New" pitchFamily="49" charset="0"/>
+                <a:cs typeface="Courier New" pitchFamily="49" charset="0"/>
+              </a:rPr>
+              <a:t>       </a:t>
+            </a:r>
+            <a:r>
+              <a:rPr lang="pl-PL" sz="1400" dirty="0">
+                <a:latin typeface="Courier New" pitchFamily="49" charset="0"/>
+                <a:cs typeface="Courier New" pitchFamily="49" charset="0"/>
+              </a:rPr>
+              <a:t>0</a:t>
+            </a:r>
+          </a:p>
+          <a:p>
+            <a:r>
+              <a:rPr lang="en-US" sz="1400" dirty="0">
+                <a:latin typeface="Courier New" pitchFamily="49" charset="0"/>
+                <a:cs typeface="Courier New" pitchFamily="49" charset="0"/>
+              </a:rPr>
+              <a:t> </a:t>
+            </a:r>
+            <a:r>
+              <a:rPr lang="en-US" sz="1400" dirty="0" smtClean="0">
+                <a:latin typeface="Courier New" pitchFamily="49" charset="0"/>
+                <a:cs typeface="Courier New" pitchFamily="49" charset="0"/>
+              </a:rPr>
+              <a:t>313 </a:t>
+            </a:r>
+            <a:r>
+              <a:rPr lang="en-US" sz="1400" dirty="0">
+                <a:latin typeface="Courier New" pitchFamily="49" charset="0"/>
+                <a:cs typeface="Courier New" pitchFamily="49" charset="0"/>
+              </a:rPr>
+              <a:t>W1   310  TIP3 </a:t>
+            </a:r>
+            <a:r>
+              <a:rPr lang="en-US" sz="1400" dirty="0" smtClean="0">
+                <a:latin typeface="Courier New" pitchFamily="49" charset="0"/>
+                <a:cs typeface="Courier New" pitchFamily="49" charset="0"/>
+              </a:rPr>
+              <a:t> H1   HT   </a:t>
+            </a:r>
+            <a:r>
+              <a:rPr lang="en-US" sz="1400" dirty="0">
+                <a:latin typeface="Courier New" pitchFamily="49" charset="0"/>
+                <a:cs typeface="Courier New" pitchFamily="49" charset="0"/>
+              </a:rPr>
+              <a:t>_FF2</a:t>
+            </a:r>
+            <a:r>
+              <a:rPr lang="en-US" sz="1400" dirty="0" smtClean="0">
+                <a:latin typeface="Courier New" pitchFamily="49" charset="0"/>
+                <a:cs typeface="Courier New" pitchFamily="49" charset="0"/>
+              </a:rPr>
+              <a:t>_____      </a:t>
+            </a:r>
+            <a:r>
+              <a:rPr lang="en-US" sz="1400" dirty="0">
+                <a:latin typeface="Courier New" pitchFamily="49" charset="0"/>
+                <a:cs typeface="Courier New" pitchFamily="49" charset="0"/>
+              </a:rPr>
+              <a:t>1.0080   </a:t>
+            </a:r>
+            <a:r>
+              <a:rPr lang="en-US" sz="1400" dirty="0" smtClean="0">
+                <a:latin typeface="Courier New" pitchFamily="49" charset="0"/>
+                <a:cs typeface="Courier New" pitchFamily="49" charset="0"/>
+              </a:rPr>
+              <a:t>       </a:t>
+            </a:r>
+            <a:r>
+              <a:rPr lang="en-US" sz="1400" dirty="0">
+                <a:latin typeface="Courier New" pitchFamily="49" charset="0"/>
+                <a:cs typeface="Courier New" pitchFamily="49" charset="0"/>
+              </a:rPr>
+              <a:t>0</a:t>
+            </a:r>
+          </a:p>
+          <a:p>
+            <a:r>
+              <a:rPr lang="en-US" sz="1400" dirty="0">
+                <a:latin typeface="Courier New" pitchFamily="49" charset="0"/>
+                <a:cs typeface="Courier New" pitchFamily="49" charset="0"/>
+              </a:rPr>
+              <a:t> </a:t>
+            </a:r>
+            <a:r>
+              <a:rPr lang="en-US" sz="1400" dirty="0" smtClean="0">
+                <a:latin typeface="Courier New" pitchFamily="49" charset="0"/>
+                <a:cs typeface="Courier New" pitchFamily="49" charset="0"/>
+              </a:rPr>
+              <a:t>314 </a:t>
+            </a:r>
+            <a:r>
+              <a:rPr lang="en-US" sz="1400" dirty="0">
+                <a:latin typeface="Courier New" pitchFamily="49" charset="0"/>
+                <a:cs typeface="Courier New" pitchFamily="49" charset="0"/>
+              </a:rPr>
+              <a:t>W1   310  </a:t>
+            </a:r>
+            <a:r>
+              <a:rPr lang="en-US" sz="1400" dirty="0" smtClean="0">
+                <a:latin typeface="Courier New" pitchFamily="49" charset="0"/>
+                <a:cs typeface="Courier New" pitchFamily="49" charset="0"/>
+              </a:rPr>
+              <a:t>TIP3  H2   HT   </a:t>
+            </a:r>
+            <a:r>
+              <a:rPr lang="en-US" sz="1400" dirty="0">
+                <a:latin typeface="Courier New" pitchFamily="49" charset="0"/>
+                <a:cs typeface="Courier New" pitchFamily="49" charset="0"/>
+              </a:rPr>
+              <a:t>_FF2</a:t>
+            </a:r>
+            <a:r>
+              <a:rPr lang="en-US" sz="1400" dirty="0" smtClean="0">
+                <a:latin typeface="Courier New" pitchFamily="49" charset="0"/>
+                <a:cs typeface="Courier New" pitchFamily="49" charset="0"/>
+              </a:rPr>
+              <a:t>_____      </a:t>
+            </a:r>
+            <a:r>
+              <a:rPr lang="en-US" sz="1400" dirty="0">
+                <a:latin typeface="Courier New" pitchFamily="49" charset="0"/>
+                <a:cs typeface="Courier New" pitchFamily="49" charset="0"/>
+              </a:rPr>
+              <a:t>1.0080   </a:t>
+            </a:r>
+            <a:r>
+              <a:rPr lang="en-US" sz="1400" dirty="0" smtClean="0">
+                <a:latin typeface="Courier New" pitchFamily="49" charset="0"/>
+                <a:cs typeface="Courier New" pitchFamily="49" charset="0"/>
+              </a:rPr>
+              <a:t>       </a:t>
+            </a:r>
+            <a:r>
+              <a:rPr lang="en-US" sz="1400" dirty="0">
+                <a:latin typeface="Courier New" pitchFamily="49" charset="0"/>
+                <a:cs typeface="Courier New" pitchFamily="49" charset="0"/>
+              </a:rPr>
+              <a:t>0</a:t>
+            </a:r>
+          </a:p>
+          <a:p>
+            <a:r>
+              <a:rPr lang="pl-PL" sz="1400" dirty="0">
+                <a:latin typeface="Courier New" pitchFamily="49" charset="0"/>
+                <a:cs typeface="Courier New" pitchFamily="49" charset="0"/>
+              </a:rPr>
+              <a:t> </a:t>
+            </a:r>
+            <a:r>
+              <a:rPr lang="pl-PL" sz="1400" dirty="0" smtClean="0">
+                <a:latin typeface="Courier New" pitchFamily="49" charset="0"/>
+                <a:cs typeface="Courier New" pitchFamily="49" charset="0"/>
+              </a:rPr>
+              <a:t>315 </a:t>
+            </a:r>
+            <a:r>
+              <a:rPr lang="pl-PL" sz="1400" dirty="0">
+                <a:latin typeface="Courier New" pitchFamily="49" charset="0"/>
+                <a:cs typeface="Courier New" pitchFamily="49" charset="0"/>
+              </a:rPr>
+              <a:t>W1   311  TIP3 OH2  </a:t>
+            </a:r>
+            <a:r>
+              <a:rPr lang="en-US" sz="1400" dirty="0" smtClean="0">
+                <a:latin typeface="Courier New" pitchFamily="49" charset="0"/>
+                <a:cs typeface="Courier New" pitchFamily="49" charset="0"/>
+              </a:rPr>
+              <a:t> </a:t>
+            </a:r>
+            <a:r>
+              <a:rPr lang="pl-PL" sz="1400" dirty="0" smtClean="0">
+                <a:latin typeface="Courier New" pitchFamily="49" charset="0"/>
+                <a:cs typeface="Courier New" pitchFamily="49" charset="0"/>
+              </a:rPr>
+              <a:t>OT   </a:t>
+            </a:r>
+            <a:r>
+              <a:rPr lang="pl-PL" sz="1400" dirty="0">
+                <a:latin typeface="Courier New" pitchFamily="49" charset="0"/>
+                <a:cs typeface="Courier New" pitchFamily="49" charset="0"/>
+              </a:rPr>
+              <a:t>_FF1_____    </a:t>
+            </a:r>
+            <a:r>
+              <a:rPr lang="pl-PL" sz="1400" dirty="0" smtClean="0">
+                <a:latin typeface="Courier New" pitchFamily="49" charset="0"/>
+                <a:cs typeface="Courier New" pitchFamily="49" charset="0"/>
+              </a:rPr>
+              <a:t> </a:t>
+            </a:r>
+            <a:r>
+              <a:rPr lang="pl-PL" sz="1400" dirty="0">
+                <a:latin typeface="Courier New" pitchFamily="49" charset="0"/>
+                <a:cs typeface="Courier New" pitchFamily="49" charset="0"/>
+              </a:rPr>
+              <a:t>15.9994   </a:t>
+            </a:r>
+            <a:r>
+              <a:rPr lang="pl-PL" sz="1400" dirty="0" smtClean="0">
+                <a:latin typeface="Courier New" pitchFamily="49" charset="0"/>
+                <a:cs typeface="Courier New" pitchFamily="49" charset="0"/>
+              </a:rPr>
+              <a:t>       0</a:t>
+            </a:r>
+            <a:endParaRPr lang="en-US" sz="1400" dirty="0" smtClean="0">
+              <a:latin typeface="Courier New" pitchFamily="49" charset="0"/>
+              <a:cs typeface="Courier New" pitchFamily="49" charset="0"/>
+            </a:endParaRPr>
+          </a:p>
+          <a:p>
+            <a:r>
+              <a:rPr lang="en-US" sz="1400" dirty="0" smtClean="0">
+                <a:latin typeface="Courier New" pitchFamily="49" charset="0"/>
+                <a:cs typeface="Courier New" pitchFamily="49" charset="0"/>
+              </a:rPr>
+              <a:t>…..</a:t>
+            </a:r>
+            <a:endParaRPr lang="en-US" sz="1400" dirty="0">
+              <a:latin typeface="Courier New" pitchFamily="49" charset="0"/>
+              <a:cs typeface="Courier New" pitchFamily="49" charset="0"/>
+            </a:endParaRPr>
+          </a:p>
+        </p:txBody>
+      </p:sp>
+      <p:sp>
+        <p:nvSpPr>
+          <p:cNvPr id="3" name="Rectangle 2"/>
+          <p:cNvSpPr/>
+          <p:nvPr/>
+        </p:nvSpPr>
+        <p:spPr>
+          <a:xfrm>
+            <a:off x="304800" y="914400"/>
+            <a:ext cx="7467600" cy="5181600"/>
+          </a:xfrm>
+          <a:prstGeom prst="rect">
+            <a:avLst/>
+          </a:prstGeom>
+          <a:noFill/>
+          <a:ln>
+            <a:solidFill>
+              <a:schemeClr val="tx1"/>
+            </a:solidFill>
+          </a:ln>
+        </p:spPr>
+        <p:style>
+          <a:lnRef idx="2">
+            <a:schemeClr val="accent1">
+              <a:shade val="50000"/>
+            </a:schemeClr>
+          </a:lnRef>
+          <a:fillRef idx="1">
+            <a:schemeClr val="accent1"/>
+          </a:fillRef>
+          <a:effectRef idx="0">
+            <a:schemeClr val="accent1"/>
+          </a:effectRef>
+          <a:fontRef idx="minor">
+            <a:schemeClr val="lt1"/>
+          </a:fontRef>
+        </p:style>
+        <p:txBody>
+          <a:bodyPr rtlCol="0" anchor="ctr"/>
+          <a:lstStyle/>
+          <a:p>
+            <a:pPr algn="ctr"/>
+            <a:endParaRPr lang="en-US"/>
+          </a:p>
+        </p:txBody>
+      </p:sp>
+    </p:spTree>
+    <p:extLst>
+      <p:ext uri="{BB962C8B-B14F-4D97-AF65-F5344CB8AC3E}">
+        <p14:creationId xmlns:p14="http://schemas.microsoft.com/office/powerpoint/2010/main" val="3944127936"/>
+      </p:ext>
+    </p:extLst>
+  </p:cSld>
+  <p:clrMapOvr>
+    <a:masterClrMapping/>
+  </p:clrMapOvr>
+  <p:timing>
+    <p:tnLst>
+      <p:par>
+        <p:cTn id="1" dur="indefinite" restart="never" nodeType="tmRoot"/>
+      </p:par>
+    </p:tnLst>
+  </p:timing>
+</p:sld>
+</file>
+
+<file path=ppt/slides/slide4.xml><?xml version="1.0" encoding="utf-8"?>
+<p:sld xmlns:a="http://schemas.openxmlformats.org/drawingml/2006/main" xmlns:r="http://schemas.openxmlformats.org/officeDocument/2006/relationships" xmlns:p="http://schemas.openxmlformats.org/presentationml/2006/main">
+  <p:cSld>
+    <p:spTree>
+      <p:nvGrpSpPr>
+        <p:cNvPr id="1" name=""/>
+        <p:cNvGrpSpPr/>
+        <p:nvPr/>
+      </p:nvGrpSpPr>
+      <p:grpSpPr>
+        <a:xfrm>
+          <a:off x="0" y="0"/>
+          <a:ext cx="0" cy="0"/>
+          <a:chOff x="0" y="0"/>
+          <a:chExt cx="0" cy="0"/>
+        </a:xfrm>
+      </p:grpSpPr>
+      <p:sp>
+        <p:nvSpPr>
+          <p:cNvPr id="4" name="TextBox 3"/>
+          <p:cNvSpPr txBox="1"/>
+          <p:nvPr/>
+        </p:nvSpPr>
+        <p:spPr>
+          <a:xfrm>
+            <a:off x="0" y="0"/>
+            <a:ext cx="9144000" cy="523220"/>
+          </a:xfrm>
+          <a:prstGeom prst="rect">
+            <a:avLst/>
+          </a:prstGeom>
+          <a:noFill/>
+        </p:spPr>
+        <p:txBody>
+          <a:bodyPr wrap="square" rtlCol="0">
+            <a:spAutoFit/>
+          </a:bodyPr>
+          <a:lstStyle/>
+          <a:p>
+            <a:pPr algn="ctr"/>
+            <a:r>
+              <a:rPr lang="en-US" sz="2800" dirty="0" smtClean="0">
+                <a:solidFill>
+                  <a:srgbClr val="005400"/>
+                </a:solidFill>
+                <a:latin typeface="Arial Black" pitchFamily="34" charset="0"/>
+              </a:rPr>
+              <a:t>Minimization Workflow</a:t>
+            </a:r>
+            <a:endParaRPr lang="en-US" sz="2800" dirty="0">
+              <a:solidFill>
+                <a:srgbClr val="007000"/>
+              </a:solidFill>
+              <a:latin typeface="Arial Black" pitchFamily="34" charset="0"/>
+            </a:endParaRPr>
+          </a:p>
+        </p:txBody>
+      </p:sp>
+      <p:sp>
+        <p:nvSpPr>
+          <p:cNvPr id="7" name="Right Brace 6"/>
+          <p:cNvSpPr/>
+          <p:nvPr/>
+        </p:nvSpPr>
+        <p:spPr>
+          <a:xfrm>
+            <a:off x="5105400" y="2057400"/>
+            <a:ext cx="426719" cy="1828800"/>
+          </a:xfrm>
+          <a:prstGeom prst="rightBrace">
+            <a:avLst/>
+          </a:prstGeom>
+        </p:spPr>
+        <p:style>
+          <a:lnRef idx="1">
+            <a:schemeClr val="accent2"/>
+          </a:lnRef>
+          <a:fillRef idx="0">
+            <a:schemeClr val="accent2"/>
+          </a:fillRef>
+          <a:effectRef idx="0">
+            <a:schemeClr val="accent2"/>
+          </a:effectRef>
+          <a:fontRef idx="minor">
+            <a:schemeClr val="tx1"/>
+          </a:fontRef>
+        </p:style>
+        <p:txBody>
+          <a:bodyPr rtlCol="0" anchor="ctr"/>
+          <a:lstStyle/>
+          <a:p>
+            <a:pPr algn="ctr"/>
+            <a:endParaRPr lang="en-US"/>
+          </a:p>
+        </p:txBody>
+      </p:sp>
+      <p:sp>
+        <p:nvSpPr>
+          <p:cNvPr id="8" name="TextBox 7"/>
+          <p:cNvSpPr txBox="1"/>
+          <p:nvPr/>
+        </p:nvSpPr>
+        <p:spPr>
+          <a:xfrm>
+            <a:off x="5486400" y="2667000"/>
+            <a:ext cx="719043" cy="646331"/>
+          </a:xfrm>
+          <a:prstGeom prst="rect">
+            <a:avLst/>
+          </a:prstGeom>
+          <a:noFill/>
+        </p:spPr>
+        <p:txBody>
+          <a:bodyPr wrap="none" rtlCol="0">
+            <a:spAutoFit/>
+          </a:bodyPr>
+          <a:lstStyle/>
+          <a:p>
+            <a:pPr algn="ctr"/>
+            <a:r>
+              <a:rPr lang="en-US" dirty="0" smtClean="0"/>
+              <a:t>Intel </a:t>
+            </a:r>
+          </a:p>
+          <a:p>
+            <a:pPr algn="ctr"/>
+            <a:r>
+              <a:rPr lang="en-US" dirty="0" smtClean="0"/>
+              <a:t>Script</a:t>
+            </a:r>
+            <a:endParaRPr lang="en-US" dirty="0"/>
+          </a:p>
+        </p:txBody>
+      </p:sp>
+      <p:sp>
+        <p:nvSpPr>
+          <p:cNvPr id="10" name="Right Brace 9"/>
+          <p:cNvSpPr/>
+          <p:nvPr/>
+        </p:nvSpPr>
+        <p:spPr>
+          <a:xfrm flipH="1">
+            <a:off x="2133600" y="838200"/>
+            <a:ext cx="640081" cy="5614811"/>
+          </a:xfrm>
+          <a:prstGeom prst="rightBrace">
+            <a:avLst/>
+          </a:prstGeom>
+        </p:spPr>
+        <p:style>
+          <a:lnRef idx="1">
+            <a:schemeClr val="accent2"/>
+          </a:lnRef>
+          <a:fillRef idx="0">
+            <a:schemeClr val="accent2"/>
+          </a:fillRef>
+          <a:effectRef idx="0">
+            <a:schemeClr val="accent2"/>
+          </a:effectRef>
+          <a:fontRef idx="minor">
+            <a:schemeClr val="tx1"/>
+          </a:fontRef>
+        </p:style>
+        <p:txBody>
+          <a:bodyPr rtlCol="0" anchor="ctr"/>
+          <a:lstStyle/>
+          <a:p>
+            <a:pPr algn="ctr"/>
+            <a:endParaRPr lang="en-US"/>
+          </a:p>
+        </p:txBody>
+      </p:sp>
+      <p:sp>
+        <p:nvSpPr>
+          <p:cNvPr id="11" name="TextBox 10"/>
+          <p:cNvSpPr txBox="1"/>
+          <p:nvPr/>
+        </p:nvSpPr>
+        <p:spPr>
+          <a:xfrm>
+            <a:off x="1255436" y="3276600"/>
+            <a:ext cx="954364" cy="646331"/>
+          </a:xfrm>
+          <a:prstGeom prst="rect">
+            <a:avLst/>
+          </a:prstGeom>
+          <a:noFill/>
+        </p:spPr>
+        <p:txBody>
+          <a:bodyPr wrap="none" rtlCol="0">
+            <a:spAutoFit/>
+          </a:bodyPr>
+          <a:lstStyle/>
+          <a:p>
+            <a:pPr algn="ctr"/>
+            <a:r>
+              <a:rPr lang="en-US" dirty="0" smtClean="0"/>
+              <a:t>Strategy</a:t>
+            </a:r>
+          </a:p>
+          <a:p>
+            <a:pPr algn="ctr"/>
+            <a:r>
+              <a:rPr lang="en-US" dirty="0" smtClean="0"/>
+              <a:t>Script</a:t>
+            </a:r>
+            <a:endParaRPr lang="en-US" dirty="0"/>
+          </a:p>
+        </p:txBody>
+      </p:sp>
+      <p:grpSp>
+        <p:nvGrpSpPr>
+          <p:cNvPr id="12" name="Group 11"/>
+          <p:cNvGrpSpPr/>
+          <p:nvPr/>
+        </p:nvGrpSpPr>
+        <p:grpSpPr>
+          <a:xfrm>
+            <a:off x="2895600" y="523220"/>
+            <a:ext cx="3072809" cy="6049925"/>
+            <a:chOff x="2895600" y="523220"/>
+            <a:chExt cx="3072809" cy="6049925"/>
+          </a:xfrm>
+        </p:grpSpPr>
+        <p:pic>
+          <p:nvPicPr>
+            <p:cNvPr id="6" name="Picture 2" descr="C:\Documents and Settings\Jose Borreguero\My Documents\projects\development\CAMM\github\documents\Jose\MinimizationWorkflow.jpeg"/>
+            <p:cNvPicPr>
+              <a:picLocks noChangeAspect="1" noChangeArrowheads="1"/>
+            </p:cNvPicPr>
+            <p:nvPr/>
+          </p:nvPicPr>
+          <p:blipFill rotWithShape="1">
+            <a:blip r:embed="rId2" cstate="print">
+              <a:extLst>
+                <a:ext uri="{28A0092B-C50C-407E-A947-70E740481C1C}">
+                  <a14:useLocalDpi xmlns:a14="http://schemas.microsoft.com/office/drawing/2010/main" val="0"/>
+                </a:ext>
+              </a:extLst>
+            </a:blip>
+            <a:srcRect l="12429" t="7421" r="31563" b="7669"/>
+            <a:stretch/>
+          </p:blipFill>
+          <p:spPr bwMode="auto">
+            <a:xfrm>
+              <a:off x="2895600" y="544485"/>
+              <a:ext cx="3072809" cy="6028660"/>
+            </a:xfrm>
+            <a:prstGeom prst="rect">
+              <a:avLst/>
+            </a:prstGeom>
+            <a:noFill/>
+            <a:extLst>
+              <a:ext uri="{909E8E84-426E-40DD-AFC4-6F175D3DCCD1}">
+                <a14:hiddenFill xmlns:a14="http://schemas.microsoft.com/office/drawing/2010/main">
+                  <a:solidFill>
+                    <a:srgbClr val="FFFFFF"/>
+                  </a:solidFill>
+                </a14:hiddenFill>
+              </a:ext>
+            </a:extLst>
+          </p:spPr>
+        </p:pic>
+        <p:sp>
+          <p:nvSpPr>
+            <p:cNvPr id="9" name="Rectangle 8"/>
+            <p:cNvSpPr/>
+            <p:nvPr/>
+          </p:nvSpPr>
+          <p:spPr>
+            <a:xfrm>
+              <a:off x="3581400" y="523220"/>
+              <a:ext cx="1219200" cy="314980"/>
+            </a:xfrm>
+            <a:prstGeom prst="rect">
+              <a:avLst/>
+            </a:prstGeom>
+            <a:solidFill>
+              <a:schemeClr val="bg1"/>
+            </a:solidFill>
+            <a:ln>
+              <a:solidFill>
+                <a:schemeClr val="bg1"/>
+              </a:solidFill>
+            </a:ln>
+          </p:spPr>
+          <p:style>
+            <a:lnRef idx="2">
+              <a:schemeClr val="accent1">
+                <a:shade val="50000"/>
+              </a:schemeClr>
+            </a:lnRef>
+            <a:fillRef idx="1">
+              <a:schemeClr val="accent1"/>
+            </a:fillRef>
+            <a:effectRef idx="0">
+              <a:schemeClr val="accent1"/>
+            </a:effectRef>
+            <a:fontRef idx="minor">
+              <a:schemeClr val="lt1"/>
+            </a:fontRef>
+          </p:style>
+          <p:txBody>
+            <a:bodyPr rtlCol="0" anchor="ctr"/>
+            <a:lstStyle/>
+            <a:p>
+              <a:pPr algn="ctr"/>
+              <a:endParaRPr lang="en-US"/>
+            </a:p>
+          </p:txBody>
+        </p:sp>
+      </p:grpSp>
+    </p:spTree>
+    <p:extLst>
+      <p:ext uri="{BB962C8B-B14F-4D97-AF65-F5344CB8AC3E}">
+        <p14:creationId xmlns:p14="http://schemas.microsoft.com/office/powerpoint/2010/main" val="2545757735"/>
+      </p:ext>
+    </p:extLst>
+  </p:cSld>
+  <p:clrMapOvr>
+    <a:masterClrMapping/>
+  </p:clrMapOvr>
+  <p:timing>
+    <p:tnLst>
+      <p:par>
+        <p:cTn id="1" dur="indefinite" restart="never" nodeType="tmRoot"/>
+      </p:par>
+    </p:tnLst>
+  </p:timing>
+</p:sld>
+</file>
+
+<file path=ppt/slides/slide5.xml><?xml version="1.0" encoding="utf-8"?>
+<p:sld xmlns:a="http://schemas.openxmlformats.org/drawingml/2006/main" xmlns:r="http://schemas.openxmlformats.org/officeDocument/2006/relationships" xmlns:p="http://schemas.openxmlformats.org/presentationml/2006/main">
+  <p:cSld>
+    <p:spTree>
+      <p:nvGrpSpPr>
+        <p:cNvPr id="1" name=""/>
+        <p:cNvGrpSpPr/>
+        <p:nvPr/>
+      </p:nvGrpSpPr>
+      <p:grpSpPr>
+        <a:xfrm>
+          <a:off x="0" y="0"/>
+          <a:ext cx="0" cy="0"/>
+          <a:chOff x="0" y="0"/>
+          <a:chExt cx="0" cy="0"/>
+        </a:xfrm>
+      </p:grpSpPr>
+      <p:sp>
+        <p:nvSpPr>
           <p:cNvPr id="4" name="TextBox 3"/>
           <p:cNvSpPr txBox="1"/>
           <p:nvPr/>
@@ -9341,7 +10579,7 @@
 </p:sld>
 </file>
 
-<file path=ppt/slides/slide3.xml><?xml version="1.0" encoding="utf-8"?>
+<file path=ppt/slides/slide6.xml><?xml version="1.0" encoding="utf-8"?>
 <p:sld xmlns:a="http://schemas.openxmlformats.org/drawingml/2006/main" xmlns:r="http://schemas.openxmlformats.org/officeDocument/2006/relationships" xmlns:p="http://schemas.openxmlformats.org/presentationml/2006/main">
   <p:cSld>
     <p:spTree>
@@ -9619,7 +10857,7 @@
 </p:sld>
 </file>
 
-<file path=ppt/slides/slide4.xml><?xml version="1.0" encoding="utf-8"?>
+<file path=ppt/slides/slide7.xml><?xml version="1.0" encoding="utf-8"?>
 <p:sld xmlns:a="http://schemas.openxmlformats.org/drawingml/2006/main" xmlns:r="http://schemas.openxmlformats.org/officeDocument/2006/relationships" xmlns:p="http://schemas.openxmlformats.org/presentationml/2006/main">
   <p:cSld>
     <p:spTree>
@@ -10597,240 +11835,6 @@
 </p:sld>
 </file>
 
-<file path=ppt/slides/slide5.xml><?xml version="1.0" encoding="utf-8"?>
-<p:sld xmlns:a="http://schemas.openxmlformats.org/drawingml/2006/main" xmlns:r="http://schemas.openxmlformats.org/officeDocument/2006/relationships" xmlns:p="http://schemas.openxmlformats.org/presentationml/2006/main">
-  <p:cSld>
-    <p:spTree>
-      <p:nvGrpSpPr>
-        <p:cNvPr id="1" name=""/>
-        <p:cNvGrpSpPr/>
-        <p:nvPr/>
-      </p:nvGrpSpPr>
-      <p:grpSpPr>
-        <a:xfrm>
-          <a:off x="0" y="0"/>
-          <a:ext cx="0" cy="0"/>
-          <a:chOff x="0" y="0"/>
-          <a:chExt cx="0" cy="0"/>
-        </a:xfrm>
-      </p:grpSpPr>
-      <p:sp>
-        <p:nvSpPr>
-          <p:cNvPr id="4" name="TextBox 3"/>
-          <p:cNvSpPr txBox="1"/>
-          <p:nvPr/>
-        </p:nvSpPr>
-        <p:spPr>
-          <a:xfrm>
-            <a:off x="0" y="0"/>
-            <a:ext cx="9144000" cy="523220"/>
-          </a:xfrm>
-          <a:prstGeom prst="rect">
-            <a:avLst/>
-          </a:prstGeom>
-          <a:noFill/>
-        </p:spPr>
-        <p:txBody>
-          <a:bodyPr wrap="square" rtlCol="0">
-            <a:spAutoFit/>
-          </a:bodyPr>
-          <a:lstStyle/>
-          <a:p>
-            <a:pPr algn="ctr"/>
-            <a:r>
-              <a:rPr lang="en-US" sz="2800" dirty="0" smtClean="0">
-                <a:solidFill>
-                  <a:srgbClr val="005400"/>
-                </a:solidFill>
-                <a:latin typeface="Arial Black" pitchFamily="34" charset="0"/>
-              </a:rPr>
-              <a:t>Dakota Strategy Input File</a:t>
-            </a:r>
-            <a:endParaRPr lang="en-US" sz="2800" dirty="0">
-              <a:solidFill>
-                <a:srgbClr val="005400"/>
-              </a:solidFill>
-              <a:latin typeface="Arial Black" pitchFamily="34" charset="0"/>
-            </a:endParaRPr>
-          </a:p>
-        </p:txBody>
-      </p:sp>
-    </p:spTree>
-    <p:extLst>
-      <p:ext uri="{BB962C8B-B14F-4D97-AF65-F5344CB8AC3E}">
-        <p14:creationId xmlns:p14="http://schemas.microsoft.com/office/powerpoint/2010/main" val="3989820275"/>
-      </p:ext>
-    </p:extLst>
-  </p:cSld>
-  <p:clrMapOvr>
-    <a:masterClrMapping/>
-  </p:clrMapOvr>
-  <p:timing>
-    <p:tnLst>
-      <p:par>
-        <p:cTn id="1" dur="indefinite" restart="never" nodeType="tmRoot"/>
-      </p:par>
-    </p:tnLst>
-  </p:timing>
-</p:sld>
-</file>
-
-<file path=ppt/slides/slide6.xml><?xml version="1.0" encoding="utf-8"?>
-<p:sld xmlns:a="http://schemas.openxmlformats.org/drawingml/2006/main" xmlns:r="http://schemas.openxmlformats.org/officeDocument/2006/relationships" xmlns:p="http://schemas.openxmlformats.org/presentationml/2006/main">
-  <p:cSld>
-    <p:spTree>
-      <p:nvGrpSpPr>
-        <p:cNvPr id="1" name=""/>
-        <p:cNvGrpSpPr/>
-        <p:nvPr/>
-      </p:nvGrpSpPr>
-      <p:grpSpPr>
-        <a:xfrm>
-          <a:off x="0" y="0"/>
-          <a:ext cx="0" cy="0"/>
-          <a:chOff x="0" y="0"/>
-          <a:chExt cx="0" cy="0"/>
-        </a:xfrm>
-      </p:grpSpPr>
-      <p:sp>
-        <p:nvSpPr>
-          <p:cNvPr id="4" name="TextBox 3"/>
-          <p:cNvSpPr txBox="1"/>
-          <p:nvPr/>
-        </p:nvSpPr>
-        <p:spPr>
-          <a:xfrm>
-            <a:off x="0" y="0"/>
-            <a:ext cx="9144000" cy="523220"/>
-          </a:xfrm>
-          <a:prstGeom prst="rect">
-            <a:avLst/>
-          </a:prstGeom>
-          <a:noFill/>
-        </p:spPr>
-        <p:txBody>
-          <a:bodyPr wrap="square" rtlCol="0">
-            <a:spAutoFit/>
-          </a:bodyPr>
-          <a:lstStyle/>
-          <a:p>
-            <a:pPr algn="ctr"/>
-            <a:r>
-              <a:rPr lang="en-US" sz="2800" dirty="0" smtClean="0">
-                <a:solidFill>
-                  <a:srgbClr val="005400"/>
-                </a:solidFill>
-                <a:latin typeface="Arial Black" pitchFamily="34" charset="0"/>
-              </a:rPr>
-              <a:t>Title</a:t>
-            </a:r>
-            <a:endParaRPr lang="en-US" sz="2800" dirty="0">
-              <a:solidFill>
-                <a:srgbClr val="005400"/>
-              </a:solidFill>
-              <a:latin typeface="Arial Black" pitchFamily="34" charset="0"/>
-            </a:endParaRPr>
-          </a:p>
-        </p:txBody>
-      </p:sp>
-    </p:spTree>
-    <p:extLst>
-      <p:ext uri="{BB962C8B-B14F-4D97-AF65-F5344CB8AC3E}">
-        <p14:creationId xmlns:p14="http://schemas.microsoft.com/office/powerpoint/2010/main" val="3312729281"/>
-      </p:ext>
-    </p:extLst>
-  </p:cSld>
-  <p:clrMapOvr>
-    <a:masterClrMapping/>
-  </p:clrMapOvr>
-  <p:timing>
-    <p:tnLst>
-      <p:par>
-        <p:cTn id="1" dur="indefinite" restart="never" nodeType="tmRoot"/>
-      </p:par>
-    </p:tnLst>
-  </p:timing>
-</p:sld>
-</file>
-
-<file path=ppt/slides/slide7.xml><?xml version="1.0" encoding="utf-8"?>
-<p:sld xmlns:a="http://schemas.openxmlformats.org/drawingml/2006/main" xmlns:r="http://schemas.openxmlformats.org/officeDocument/2006/relationships" xmlns:p="http://schemas.openxmlformats.org/presentationml/2006/main">
-  <p:cSld>
-    <p:spTree>
-      <p:nvGrpSpPr>
-        <p:cNvPr id="1" name=""/>
-        <p:cNvGrpSpPr/>
-        <p:nvPr/>
-      </p:nvGrpSpPr>
-      <p:grpSpPr>
-        <a:xfrm>
-          <a:off x="0" y="0"/>
-          <a:ext cx="0" cy="0"/>
-          <a:chOff x="0" y="0"/>
-          <a:chExt cx="0" cy="0"/>
-        </a:xfrm>
-      </p:grpSpPr>
-      <p:sp>
-        <p:nvSpPr>
-          <p:cNvPr id="4" name="TextBox 3"/>
-          <p:cNvSpPr txBox="1"/>
-          <p:nvPr/>
-        </p:nvSpPr>
-        <p:spPr>
-          <a:xfrm>
-            <a:off x="0" y="0"/>
-            <a:ext cx="9144000" cy="523220"/>
-          </a:xfrm>
-          <a:prstGeom prst="rect">
-            <a:avLst/>
-          </a:prstGeom>
-          <a:noFill/>
-        </p:spPr>
-        <p:txBody>
-          <a:bodyPr wrap="square" rtlCol="0">
-            <a:spAutoFit/>
-          </a:bodyPr>
-          <a:lstStyle/>
-          <a:p>
-            <a:pPr algn="ctr"/>
-            <a:r>
-              <a:rPr lang="en-US" sz="2800" dirty="0" smtClean="0">
-                <a:solidFill>
-                  <a:srgbClr val="005400"/>
-                </a:solidFill>
-                <a:latin typeface="Arial Black" pitchFamily="34" charset="0"/>
-              </a:rPr>
-              <a:t>Title</a:t>
-            </a:r>
-            <a:endParaRPr lang="en-US" sz="2800" dirty="0">
-              <a:solidFill>
-                <a:srgbClr val="005400"/>
-              </a:solidFill>
-              <a:latin typeface="Arial Black" pitchFamily="34" charset="0"/>
-            </a:endParaRPr>
-          </a:p>
-        </p:txBody>
-      </p:sp>
-    </p:spTree>
-    <p:extLst>
-      <p:ext uri="{BB962C8B-B14F-4D97-AF65-F5344CB8AC3E}">
-        <p14:creationId xmlns:p14="http://schemas.microsoft.com/office/powerpoint/2010/main" val="3312729281"/>
-      </p:ext>
-    </p:extLst>
-  </p:cSld>
-  <p:clrMapOvr>
-    <a:masterClrMapping/>
-  </p:clrMapOvr>
-  <p:timing>
-    <p:tnLst>
-      <p:par>
-        <p:cTn id="1" dur="indefinite" restart="never" nodeType="tmRoot"/>
-      </p:par>
-    </p:tnLst>
-  </p:timing>
-</p:sld>
-</file>
-
 <file path=ppt/slides/slide8.xml><?xml version="1.0" encoding="utf-8"?>
 <p:sld xmlns:a="http://schemas.openxmlformats.org/drawingml/2006/main" xmlns:r="http://schemas.openxmlformats.org/officeDocument/2006/relationships" xmlns:p="http://schemas.openxmlformats.org/presentationml/2006/main">
   <p:cSld>
@@ -10956,7 +11960,7 @@
                 </a:solidFill>
                 <a:latin typeface="Arial Black" pitchFamily="34" charset="0"/>
               </a:rPr>
-              <a:t>Title</a:t>
+              <a:t>Minimization Components</a:t>
             </a:r>
             <a:endParaRPr lang="en-US" sz="2800" dirty="0">
               <a:solidFill>
@@ -10967,12 +11971,834 @@
           </a:p>
         </p:txBody>
       </p:sp>
+      <p:graphicFrame>
+        <p:nvGraphicFramePr>
+          <p:cNvPr id="10" name="Table 9"/>
+          <p:cNvGraphicFramePr>
+            <a:graphicFrameLocks noGrp="1"/>
+          </p:cNvGraphicFramePr>
+          <p:nvPr>
+            <p:extLst>
+              <p:ext uri="{D42A27DB-BD31-4B8C-83A1-F6EECF244321}">
+                <p14:modId xmlns:p14="http://schemas.microsoft.com/office/powerpoint/2010/main" val="3170678568"/>
+              </p:ext>
+            </p:extLst>
+          </p:nvPr>
+        </p:nvGraphicFramePr>
+        <p:xfrm>
+          <a:off x="304800" y="762000"/>
+          <a:ext cx="3327400" cy="1828800"/>
+        </p:xfrm>
+        <a:graphic>
+          <a:graphicData uri="http://schemas.openxmlformats.org/drawingml/2006/table">
+            <a:tbl>
+              <a:tblPr firstRow="1" bandRow="1">
+                <a:tableStyleId>{5940675A-B579-460E-94D1-54222C63F5DA}</a:tableStyleId>
+              </a:tblPr>
+              <a:tblGrid>
+                <a:gridCol w="3327400"/>
+              </a:tblGrid>
+              <a:tr h="370840">
+                <a:tc>
+                  <a:txBody>
+                    <a:bodyPr/>
+                    <a:lstStyle/>
+                    <a:p>
+                      <a:pPr algn="ctr"/>
+                      <a:r>
+                        <a:rPr lang="en-US" sz="2400" dirty="0" smtClean="0"/>
+                        <a:t>Minimizer Algorithm</a:t>
+                      </a:r>
+                      <a:endParaRPr lang="en-US" sz="2400" dirty="0"/>
+                    </a:p>
+                  </a:txBody>
+                  <a:tcPr>
+                    <a:lnL w="12700" cmpd="sng">
+                      <a:noFill/>
+                    </a:lnL>
+                    <a:lnR w="12700" cmpd="sng">
+                      <a:noFill/>
+                    </a:lnR>
+                    <a:lnT w="12700" cmpd="sng">
+                      <a:noFill/>
+                    </a:lnT>
+                    <a:lnB w="12700" cmpd="sng">
+                      <a:noFill/>
+                    </a:lnB>
+                    <a:lnTlToBr w="12700" cmpd="sng">
+                      <a:noFill/>
+                      <a:prstDash val="solid"/>
+                    </a:lnTlToBr>
+                    <a:lnBlToTr w="12700" cmpd="sng">
+                      <a:noFill/>
+                      <a:prstDash val="solid"/>
+                    </a:lnBlToTr>
+                  </a:tcPr>
+                </a:tc>
+              </a:tr>
+              <a:tr h="370840">
+                <a:tc>
+                  <a:txBody>
+                    <a:bodyPr/>
+                    <a:lstStyle/>
+                    <a:p>
+                      <a:pPr algn="ctr"/>
+                      <a:r>
+                        <a:rPr lang="en-US" sz="2400" dirty="0" smtClean="0"/>
+                        <a:t>Cost Function</a:t>
+                      </a:r>
+                      <a:endParaRPr lang="en-US" sz="2400" dirty="0"/>
+                    </a:p>
+                  </a:txBody>
+                  <a:tcPr>
+                    <a:lnL w="12700" cmpd="sng">
+                      <a:noFill/>
+                    </a:lnL>
+                    <a:lnR w="12700" cmpd="sng">
+                      <a:noFill/>
+                    </a:lnR>
+                    <a:lnT w="12700" cmpd="sng">
+                      <a:noFill/>
+                    </a:lnT>
+                    <a:lnB w="12700" cmpd="sng">
+                      <a:noFill/>
+                    </a:lnB>
+                    <a:lnTlToBr w="12700" cmpd="sng">
+                      <a:noFill/>
+                      <a:prstDash val="solid"/>
+                    </a:lnTlToBr>
+                    <a:lnBlToTr w="12700" cmpd="sng">
+                      <a:noFill/>
+                      <a:prstDash val="solid"/>
+                    </a:lnBlToTr>
+                  </a:tcPr>
+                </a:tc>
+              </a:tr>
+              <a:tr h="375920">
+                <a:tc>
+                  <a:txBody>
+                    <a:bodyPr/>
+                    <a:lstStyle/>
+                    <a:p>
+                      <a:pPr algn="ctr"/>
+                      <a:r>
+                        <a:rPr lang="en-US" sz="2400" dirty="0" smtClean="0"/>
+                        <a:t>Fit Model</a:t>
+                      </a:r>
+                      <a:endParaRPr lang="en-US" sz="2400" dirty="0"/>
+                    </a:p>
+                  </a:txBody>
+                  <a:tcPr>
+                    <a:lnL w="12700" cmpd="sng">
+                      <a:noFill/>
+                    </a:lnL>
+                    <a:lnR w="12700" cmpd="sng">
+                      <a:noFill/>
+                    </a:lnR>
+                    <a:lnT w="12700" cmpd="sng">
+                      <a:noFill/>
+                    </a:lnT>
+                    <a:lnB w="12700" cmpd="sng">
+                      <a:noFill/>
+                    </a:lnB>
+                    <a:lnTlToBr w="12700" cmpd="sng">
+                      <a:noFill/>
+                      <a:prstDash val="solid"/>
+                    </a:lnTlToBr>
+                    <a:lnBlToTr w="12700" cmpd="sng">
+                      <a:noFill/>
+                      <a:prstDash val="solid"/>
+                    </a:lnBlToTr>
+                  </a:tcPr>
+                </a:tc>
+              </a:tr>
+              <a:tr h="375920">
+                <a:tc>
+                  <a:txBody>
+                    <a:bodyPr/>
+                    <a:lstStyle/>
+                    <a:p>
+                      <a:pPr algn="ctr"/>
+                      <a:r>
+                        <a:rPr lang="en-US" sz="2400" dirty="0" smtClean="0"/>
+                        <a:t>Experimental Data</a:t>
+                      </a:r>
+                      <a:endParaRPr lang="en-US" sz="2400" dirty="0"/>
+                    </a:p>
+                  </a:txBody>
+                  <a:tcPr>
+                    <a:lnL w="12700" cmpd="sng">
+                      <a:noFill/>
+                    </a:lnL>
+                    <a:lnR w="12700" cmpd="sng">
+                      <a:noFill/>
+                    </a:lnR>
+                    <a:lnT w="12700" cmpd="sng">
+                      <a:noFill/>
+                    </a:lnT>
+                    <a:lnB w="12700" cmpd="sng">
+                      <a:noFill/>
+                    </a:lnB>
+                    <a:lnTlToBr w="12700" cmpd="sng">
+                      <a:noFill/>
+                      <a:prstDash val="solid"/>
+                    </a:lnTlToBr>
+                    <a:lnBlToTr w="12700" cmpd="sng">
+                      <a:noFill/>
+                      <a:prstDash val="solid"/>
+                    </a:lnBlToTr>
+                  </a:tcPr>
+                </a:tc>
+              </a:tr>
+            </a:tbl>
+          </a:graphicData>
+        </a:graphic>
+      </p:graphicFrame>
+      <p:graphicFrame>
+        <p:nvGraphicFramePr>
+          <p:cNvPr id="11" name="Table 10"/>
+          <p:cNvGraphicFramePr>
+            <a:graphicFrameLocks noGrp="1"/>
+          </p:cNvGraphicFramePr>
+          <p:nvPr>
+            <p:extLst>
+              <p:ext uri="{D42A27DB-BD31-4B8C-83A1-F6EECF244321}">
+                <p14:modId xmlns:p14="http://schemas.microsoft.com/office/powerpoint/2010/main" val="2843984528"/>
+              </p:ext>
+            </p:extLst>
+          </p:nvPr>
+        </p:nvGraphicFramePr>
+        <p:xfrm>
+          <a:off x="4800600" y="760412"/>
+          <a:ext cx="4191000" cy="1828800"/>
+        </p:xfrm>
+        <a:graphic>
+          <a:graphicData uri="http://schemas.openxmlformats.org/drawingml/2006/table">
+            <a:tbl>
+              <a:tblPr firstRow="1" bandRow="1">
+                <a:tableStyleId>{5940675A-B579-460E-94D1-54222C63F5DA}</a:tableStyleId>
+              </a:tblPr>
+              <a:tblGrid>
+                <a:gridCol w="4191000"/>
+              </a:tblGrid>
+              <a:tr h="370840">
+                <a:tc>
+                  <a:txBody>
+                    <a:bodyPr/>
+                    <a:lstStyle/>
+                    <a:p>
+                      <a:pPr algn="ctr"/>
+                      <a:r>
+                        <a:rPr lang="en-US" sz="2400" dirty="0" smtClean="0"/>
+                        <a:t>Dakota Minimizer</a:t>
+                      </a:r>
+                      <a:endParaRPr lang="en-US" sz="2400" dirty="0"/>
+                    </a:p>
+                  </a:txBody>
+                  <a:tcPr>
+                    <a:lnL w="12700" cmpd="sng">
+                      <a:noFill/>
+                    </a:lnL>
+                    <a:lnR w="12700" cmpd="sng">
+                      <a:noFill/>
+                    </a:lnR>
+                    <a:lnT w="12700" cmpd="sng">
+                      <a:noFill/>
+                    </a:lnT>
+                    <a:lnB w="12700" cmpd="sng">
+                      <a:noFill/>
+                    </a:lnB>
+                    <a:lnTlToBr w="12700" cmpd="sng">
+                      <a:noFill/>
+                      <a:prstDash val="solid"/>
+                    </a:lnTlToBr>
+                    <a:lnBlToTr w="12700" cmpd="sng">
+                      <a:noFill/>
+                      <a:prstDash val="solid"/>
+                    </a:lnBlToTr>
+                  </a:tcPr>
+                </a:tc>
+              </a:tr>
+              <a:tr h="370840">
+                <a:tc>
+                  <a:txBody>
+                    <a:bodyPr/>
+                    <a:lstStyle/>
+                    <a:p>
+                      <a:pPr algn="ctr"/>
+                      <a:r>
+                        <a:rPr lang="en-US" sz="2400" dirty="0" smtClean="0"/>
+                        <a:t>Least</a:t>
+                      </a:r>
+                      <a:r>
+                        <a:rPr lang="en-US" sz="2400" baseline="0" dirty="0" smtClean="0"/>
+                        <a:t> Squares</a:t>
+                      </a:r>
+                      <a:endParaRPr lang="en-US" sz="2400" dirty="0"/>
+                    </a:p>
+                  </a:txBody>
+                  <a:tcPr>
+                    <a:lnL w="12700" cmpd="sng">
+                      <a:noFill/>
+                    </a:lnL>
+                    <a:lnR w="12700" cmpd="sng">
+                      <a:noFill/>
+                    </a:lnR>
+                    <a:lnT w="12700" cmpd="sng">
+                      <a:noFill/>
+                    </a:lnT>
+                    <a:lnB w="12700" cmpd="sng">
+                      <a:noFill/>
+                    </a:lnB>
+                    <a:lnTlToBr w="12700" cmpd="sng">
+                      <a:noFill/>
+                      <a:prstDash val="solid"/>
+                    </a:lnTlToBr>
+                    <a:lnBlToTr w="12700" cmpd="sng">
+                      <a:noFill/>
+                      <a:prstDash val="solid"/>
+                    </a:lnBlToTr>
+                  </a:tcPr>
+                </a:tc>
+              </a:tr>
+              <a:tr h="152400">
+                <a:tc>
+                  <a:txBody>
+                    <a:bodyPr/>
+                    <a:lstStyle/>
+                    <a:p>
+                      <a:pPr algn="ctr"/>
+                      <a:r>
+                        <a:rPr lang="en-US" sz="2400" dirty="0" smtClean="0"/>
+                        <a:t>S</a:t>
+                      </a:r>
+                      <a:r>
+                        <a:rPr lang="en-US" sz="2800" b="1" baseline="30000" dirty="0" smtClean="0"/>
+                        <a:t>SIM</a:t>
+                      </a:r>
+                      <a:r>
+                        <a:rPr lang="en-US" sz="2400" dirty="0" smtClean="0"/>
+                        <a:t>(Q,</a:t>
+                      </a:r>
+                      <a:r>
+                        <a:rPr lang="en-US" sz="2400" dirty="0" smtClean="0">
+                          <a:sym typeface="Symbol"/>
+                        </a:rPr>
+                        <a:t></a:t>
+                      </a:r>
+                      <a:r>
+                        <a:rPr lang="en-US" sz="2400" dirty="0" smtClean="0"/>
+                        <a:t>)+Beamline</a:t>
+                      </a:r>
+                      <a:endParaRPr lang="en-US" sz="2400" dirty="0"/>
+                    </a:p>
+                  </a:txBody>
+                  <a:tcPr>
+                    <a:lnL w="12700" cmpd="sng">
+                      <a:noFill/>
+                    </a:lnL>
+                    <a:lnR w="12700" cmpd="sng">
+                      <a:noFill/>
+                    </a:lnR>
+                    <a:lnT w="12700" cmpd="sng">
+                      <a:noFill/>
+                    </a:lnT>
+                    <a:lnB w="12700" cmpd="sng">
+                      <a:noFill/>
+                    </a:lnB>
+                    <a:lnTlToBr w="12700" cmpd="sng">
+                      <a:noFill/>
+                      <a:prstDash val="solid"/>
+                    </a:lnTlToBr>
+                    <a:lnBlToTr w="12700" cmpd="sng">
+                      <a:noFill/>
+                      <a:prstDash val="solid"/>
+                    </a:lnBlToTr>
+                  </a:tcPr>
+                </a:tc>
+              </a:tr>
+              <a:tr h="152400">
+                <a:tc>
+                  <a:txBody>
+                    <a:bodyPr/>
+                    <a:lstStyle/>
+                    <a:p>
+                      <a:pPr algn="ctr"/>
+                      <a:r>
+                        <a:rPr lang="en-US" sz="2400" dirty="0" smtClean="0"/>
+                        <a:t>S</a:t>
+                      </a:r>
+                      <a:r>
+                        <a:rPr lang="en-US" sz="2800" b="1" baseline="30000" dirty="0" smtClean="0"/>
+                        <a:t>EXP</a:t>
+                      </a:r>
+                      <a:r>
+                        <a:rPr lang="en-US" sz="2400" dirty="0" smtClean="0"/>
+                        <a:t>(Q,</a:t>
+                      </a:r>
+                      <a:r>
+                        <a:rPr lang="en-US" sz="2400" dirty="0" smtClean="0">
+                          <a:sym typeface="Symbol"/>
+                        </a:rPr>
+                        <a:t>)</a:t>
+                      </a:r>
+                      <a:endParaRPr lang="en-US" sz="2400" dirty="0"/>
+                    </a:p>
+                  </a:txBody>
+                  <a:tcPr>
+                    <a:lnL w="12700" cmpd="sng">
+                      <a:noFill/>
+                    </a:lnL>
+                    <a:lnR w="12700" cmpd="sng">
+                      <a:noFill/>
+                    </a:lnR>
+                    <a:lnT w="12700" cmpd="sng">
+                      <a:noFill/>
+                    </a:lnT>
+                    <a:lnB w="12700" cmpd="sng">
+                      <a:noFill/>
+                    </a:lnB>
+                    <a:lnTlToBr w="12700" cmpd="sng">
+                      <a:noFill/>
+                      <a:prstDash val="solid"/>
+                    </a:lnTlToBr>
+                    <a:lnBlToTr w="12700" cmpd="sng">
+                      <a:noFill/>
+                      <a:prstDash val="solid"/>
+                    </a:lnBlToTr>
+                  </a:tcPr>
+                </a:tc>
+              </a:tr>
+            </a:tbl>
+          </a:graphicData>
+        </a:graphic>
+      </p:graphicFrame>
+      <p:cxnSp>
+        <p:nvCxnSpPr>
+          <p:cNvPr id="13" name="Straight Arrow Connector 12"/>
+          <p:cNvCxnSpPr/>
+          <p:nvPr/>
+        </p:nvCxnSpPr>
+        <p:spPr>
+          <a:xfrm>
+            <a:off x="3581400" y="990600"/>
+            <a:ext cx="1447800" cy="1588"/>
+          </a:xfrm>
+          <a:prstGeom prst="straightConnector1">
+            <a:avLst/>
+          </a:prstGeom>
+          <a:ln w="38100">
+            <a:tailEnd type="arrow" w="lg" len="med"/>
+          </a:ln>
+        </p:spPr>
+        <p:style>
+          <a:lnRef idx="1">
+            <a:schemeClr val="dk1"/>
+          </a:lnRef>
+          <a:fillRef idx="0">
+            <a:schemeClr val="dk1"/>
+          </a:fillRef>
+          <a:effectRef idx="0">
+            <a:schemeClr val="dk1"/>
+          </a:effectRef>
+          <a:fontRef idx="minor">
+            <a:schemeClr val="tx1"/>
+          </a:fontRef>
+        </p:style>
+      </p:cxnSp>
+      <p:cxnSp>
+        <p:nvCxnSpPr>
+          <p:cNvPr id="16" name="Straight Arrow Connector 15"/>
+          <p:cNvCxnSpPr/>
+          <p:nvPr/>
+        </p:nvCxnSpPr>
+        <p:spPr>
+          <a:xfrm>
+            <a:off x="3581400" y="1446212"/>
+            <a:ext cx="1447800" cy="1588"/>
+          </a:xfrm>
+          <a:prstGeom prst="straightConnector1">
+            <a:avLst/>
+          </a:prstGeom>
+          <a:ln w="38100">
+            <a:tailEnd type="arrow" w="lg" len="med"/>
+          </a:ln>
+        </p:spPr>
+        <p:style>
+          <a:lnRef idx="1">
+            <a:schemeClr val="dk1"/>
+          </a:lnRef>
+          <a:fillRef idx="0">
+            <a:schemeClr val="dk1"/>
+          </a:fillRef>
+          <a:effectRef idx="0">
+            <a:schemeClr val="dk1"/>
+          </a:effectRef>
+          <a:fontRef idx="minor">
+            <a:schemeClr val="tx1"/>
+          </a:fontRef>
+        </p:style>
+      </p:cxnSp>
+      <p:cxnSp>
+        <p:nvCxnSpPr>
+          <p:cNvPr id="17" name="Straight Arrow Connector 16"/>
+          <p:cNvCxnSpPr/>
+          <p:nvPr/>
+        </p:nvCxnSpPr>
+        <p:spPr>
+          <a:xfrm>
+            <a:off x="3581400" y="1903412"/>
+            <a:ext cx="1447800" cy="1588"/>
+          </a:xfrm>
+          <a:prstGeom prst="straightConnector1">
+            <a:avLst/>
+          </a:prstGeom>
+          <a:ln w="38100">
+            <a:tailEnd type="arrow" w="lg" len="med"/>
+          </a:ln>
+        </p:spPr>
+        <p:style>
+          <a:lnRef idx="1">
+            <a:schemeClr val="dk1"/>
+          </a:lnRef>
+          <a:fillRef idx="0">
+            <a:schemeClr val="dk1"/>
+          </a:fillRef>
+          <a:effectRef idx="0">
+            <a:schemeClr val="dk1"/>
+          </a:effectRef>
+          <a:fontRef idx="minor">
+            <a:schemeClr val="tx1"/>
+          </a:fontRef>
+        </p:style>
+      </p:cxnSp>
+      <p:sp>
+        <p:nvSpPr>
+          <p:cNvPr id="2" name="TextBox 1"/>
+          <p:cNvSpPr txBox="1"/>
+          <p:nvPr/>
+        </p:nvSpPr>
+        <p:spPr>
+          <a:xfrm>
+            <a:off x="3376670" y="3111156"/>
+            <a:ext cx="2076338" cy="369332"/>
+          </a:xfrm>
+          <a:prstGeom prst="rect">
+            <a:avLst/>
+          </a:prstGeom>
+          <a:noFill/>
+          <a:ln>
+            <a:solidFill>
+              <a:schemeClr val="tx1"/>
+            </a:solidFill>
+          </a:ln>
+        </p:spPr>
+        <p:txBody>
+          <a:bodyPr wrap="none" rtlCol="0">
+            <a:spAutoFit/>
+          </a:bodyPr>
+          <a:lstStyle/>
+          <a:p>
+            <a:r>
+              <a:rPr lang="en-US" dirty="0" smtClean="0"/>
+              <a:t>Dakota Client object</a:t>
+            </a:r>
+            <a:endParaRPr lang="en-US" dirty="0"/>
+          </a:p>
+        </p:txBody>
+      </p:sp>
+      <p:cxnSp>
+        <p:nvCxnSpPr>
+          <p:cNvPr id="14" name="Straight Arrow Connector 13"/>
+          <p:cNvCxnSpPr/>
+          <p:nvPr/>
+        </p:nvCxnSpPr>
+        <p:spPr>
+          <a:xfrm>
+            <a:off x="4375785" y="3511748"/>
+            <a:ext cx="0" cy="341277"/>
+          </a:xfrm>
+          <a:prstGeom prst="straightConnector1">
+            <a:avLst/>
+          </a:prstGeom>
+          <a:ln w="34925" cmpd="sng">
+            <a:solidFill>
+              <a:schemeClr val="tx1"/>
+            </a:solidFill>
+            <a:headEnd type="triangle" w="lg" len="med"/>
+            <a:tailEnd type="triangle" w="lg" len="med"/>
+          </a:ln>
+        </p:spPr>
+        <p:style>
+          <a:lnRef idx="1">
+            <a:schemeClr val="accent1"/>
+          </a:lnRef>
+          <a:fillRef idx="0">
+            <a:schemeClr val="accent1"/>
+          </a:fillRef>
+          <a:effectRef idx="0">
+            <a:schemeClr val="accent1"/>
+          </a:effectRef>
+          <a:fontRef idx="minor">
+            <a:schemeClr val="tx1"/>
+          </a:fontRef>
+        </p:style>
+      </p:cxnSp>
+      <p:sp>
+        <p:nvSpPr>
+          <p:cNvPr id="7" name="TextBox 6"/>
+          <p:cNvSpPr txBox="1"/>
+          <p:nvPr/>
+        </p:nvSpPr>
+        <p:spPr>
+          <a:xfrm>
+            <a:off x="4457368" y="3545248"/>
+            <a:ext cx="839910" cy="307777"/>
+          </a:xfrm>
+          <a:prstGeom prst="rect">
+            <a:avLst/>
+          </a:prstGeom>
+          <a:noFill/>
+        </p:spPr>
+        <p:txBody>
+          <a:bodyPr wrap="none" rtlCol="0">
+            <a:spAutoFit/>
+          </a:bodyPr>
+          <a:lstStyle/>
+          <a:p>
+            <a:r>
+              <a:rPr lang="en-US" sz="1400" dirty="0" smtClean="0"/>
+              <a:t>(</a:t>
+            </a:r>
+            <a:r>
+              <a:rPr lang="en-US" sz="1400" i="1" dirty="0" smtClean="0"/>
+              <a:t>request</a:t>
+            </a:r>
+            <a:r>
+              <a:rPr lang="en-US" sz="1400" dirty="0" smtClean="0"/>
+              <a:t>)</a:t>
+            </a:r>
+            <a:endParaRPr lang="en-US" sz="1400" dirty="0"/>
+          </a:p>
+        </p:txBody>
+      </p:sp>
+      <p:sp>
+        <p:nvSpPr>
+          <p:cNvPr id="15" name="TextBox 14"/>
+          <p:cNvSpPr txBox="1"/>
+          <p:nvPr/>
+        </p:nvSpPr>
+        <p:spPr>
+          <a:xfrm>
+            <a:off x="3345155" y="3853025"/>
+            <a:ext cx="2139368" cy="369332"/>
+          </a:xfrm>
+          <a:prstGeom prst="rect">
+            <a:avLst/>
+          </a:prstGeom>
+          <a:noFill/>
+          <a:ln>
+            <a:solidFill>
+              <a:schemeClr val="tx1"/>
+            </a:solidFill>
+          </a:ln>
+        </p:spPr>
+        <p:txBody>
+          <a:bodyPr wrap="none" rtlCol="0">
+            <a:spAutoFit/>
+          </a:bodyPr>
+          <a:lstStyle/>
+          <a:p>
+            <a:r>
+              <a:rPr lang="en-US" dirty="0" smtClean="0"/>
+              <a:t>Cost Function Object</a:t>
+            </a:r>
+            <a:endParaRPr lang="en-US" dirty="0"/>
+          </a:p>
+        </p:txBody>
+      </p:sp>
+      <p:cxnSp>
+        <p:nvCxnSpPr>
+          <p:cNvPr id="19" name="Straight Arrow Connector 18"/>
+          <p:cNvCxnSpPr/>
+          <p:nvPr/>
+        </p:nvCxnSpPr>
+        <p:spPr>
+          <a:xfrm>
+            <a:off x="4379120" y="4222357"/>
+            <a:ext cx="0" cy="341277"/>
+          </a:xfrm>
+          <a:prstGeom prst="straightConnector1">
+            <a:avLst/>
+          </a:prstGeom>
+          <a:ln w="34925" cmpd="sng">
+            <a:solidFill>
+              <a:schemeClr val="tx1"/>
+            </a:solidFill>
+            <a:headEnd type="triangle" w="lg" len="med"/>
+            <a:tailEnd type="triangle" w="lg" len="med"/>
+          </a:ln>
+        </p:spPr>
+        <p:style>
+          <a:lnRef idx="1">
+            <a:schemeClr val="accent1"/>
+          </a:lnRef>
+          <a:fillRef idx="0">
+            <a:schemeClr val="accent1"/>
+          </a:fillRef>
+          <a:effectRef idx="0">
+            <a:schemeClr val="accent1"/>
+          </a:effectRef>
+          <a:fontRef idx="minor">
+            <a:schemeClr val="tx1"/>
+          </a:fontRef>
+        </p:style>
+      </p:cxnSp>
+      <p:sp>
+        <p:nvSpPr>
+          <p:cNvPr id="21" name="TextBox 20"/>
+          <p:cNvSpPr txBox="1"/>
+          <p:nvPr/>
+        </p:nvSpPr>
+        <p:spPr>
+          <a:xfrm>
+            <a:off x="3210887" y="4577810"/>
+            <a:ext cx="2407903" cy="369332"/>
+          </a:xfrm>
+          <a:prstGeom prst="rect">
+            <a:avLst/>
+          </a:prstGeom>
+          <a:noFill/>
+          <a:ln>
+            <a:solidFill>
+              <a:schemeClr val="tx1"/>
+            </a:solidFill>
+          </a:ln>
+        </p:spPr>
+        <p:txBody>
+          <a:bodyPr wrap="none" rtlCol="0">
+            <a:spAutoFit/>
+          </a:bodyPr>
+          <a:lstStyle/>
+          <a:p>
+            <a:r>
+              <a:rPr lang="en-US" dirty="0" smtClean="0"/>
+              <a:t>Fit Model Server Object</a:t>
+            </a:r>
+            <a:endParaRPr lang="en-US" dirty="0"/>
+          </a:p>
+        </p:txBody>
+      </p:sp>
+      <p:cxnSp>
+        <p:nvCxnSpPr>
+          <p:cNvPr id="22" name="Straight Arrow Connector 21"/>
+          <p:cNvCxnSpPr/>
+          <p:nvPr/>
+        </p:nvCxnSpPr>
+        <p:spPr>
+          <a:xfrm>
+            <a:off x="5484523" y="4037691"/>
+            <a:ext cx="303719" cy="0"/>
+          </a:xfrm>
+          <a:prstGeom prst="straightConnector1">
+            <a:avLst/>
+          </a:prstGeom>
+          <a:ln w="34925" cmpd="sng">
+            <a:solidFill>
+              <a:schemeClr val="tx1"/>
+            </a:solidFill>
+            <a:headEnd type="triangle" w="lg" len="med"/>
+            <a:tailEnd type="triangle" w="lg" len="med"/>
+          </a:ln>
+        </p:spPr>
+        <p:style>
+          <a:lnRef idx="1">
+            <a:schemeClr val="accent1"/>
+          </a:lnRef>
+          <a:fillRef idx="0">
+            <a:schemeClr val="accent1"/>
+          </a:fillRef>
+          <a:effectRef idx="0">
+            <a:schemeClr val="accent1"/>
+          </a:effectRef>
+          <a:fontRef idx="minor">
+            <a:schemeClr val="tx1"/>
+          </a:fontRef>
+        </p:style>
+      </p:cxnSp>
+      <p:cxnSp>
+        <p:nvCxnSpPr>
+          <p:cNvPr id="23" name="Straight Arrow Connector 22"/>
+          <p:cNvCxnSpPr/>
+          <p:nvPr/>
+        </p:nvCxnSpPr>
+        <p:spPr>
+          <a:xfrm>
+            <a:off x="3581400" y="2362200"/>
+            <a:ext cx="1447800" cy="1588"/>
+          </a:xfrm>
+          <a:prstGeom prst="straightConnector1">
+            <a:avLst/>
+          </a:prstGeom>
+          <a:ln w="38100">
+            <a:tailEnd type="arrow" w="lg" len="med"/>
+          </a:ln>
+        </p:spPr>
+        <p:style>
+          <a:lnRef idx="1">
+            <a:schemeClr val="dk1"/>
+          </a:lnRef>
+          <a:fillRef idx="0">
+            <a:schemeClr val="dk1"/>
+          </a:fillRef>
+          <a:effectRef idx="0">
+            <a:schemeClr val="dk1"/>
+          </a:effectRef>
+          <a:fontRef idx="minor">
+            <a:schemeClr val="tx1"/>
+          </a:fontRef>
+        </p:style>
+      </p:cxnSp>
+      <p:sp>
+        <p:nvSpPr>
+          <p:cNvPr id="24" name="TextBox 23"/>
+          <p:cNvSpPr txBox="1"/>
+          <p:nvPr/>
+        </p:nvSpPr>
+        <p:spPr>
+          <a:xfrm>
+            <a:off x="5811279" y="3853025"/>
+            <a:ext cx="1908599" cy="369332"/>
+          </a:xfrm>
+          <a:prstGeom prst="rect">
+            <a:avLst/>
+          </a:prstGeom>
+          <a:noFill/>
+          <a:ln>
+            <a:solidFill>
+              <a:schemeClr val="tx1"/>
+            </a:solidFill>
+          </a:ln>
+        </p:spPr>
+        <p:txBody>
+          <a:bodyPr wrap="none" rtlCol="0">
+            <a:spAutoFit/>
+          </a:bodyPr>
+          <a:lstStyle/>
+          <a:p>
+            <a:r>
+              <a:rPr lang="en-US" dirty="0" err="1" smtClean="0"/>
+              <a:t>Exper</a:t>
+            </a:r>
+            <a:r>
+              <a:rPr lang="en-US" dirty="0" smtClean="0"/>
+              <a:t>. Data Object</a:t>
+            </a:r>
+            <a:endParaRPr lang="en-US" dirty="0"/>
+          </a:p>
+        </p:txBody>
+      </p:sp>
     </p:spTree>
-    <p:extLst>
-      <p:ext uri="{BB962C8B-B14F-4D97-AF65-F5344CB8AC3E}">
-        <p14:creationId xmlns:p14="http://schemas.microsoft.com/office/powerpoint/2010/main" val="3312729281"/>
-      </p:ext>
-    </p:extLst>
   </p:cSld>
   <p:clrMapOvr>
     <a:masterClrMapping/>

</xml_diff>

<commit_message>
add dakota input file generator slide
</commit_message>
<xml_diff>
--- a/Jose/minimization_design.pptx
+++ b/Jose/minimization_design.pptx
@@ -7,23 +7,24 @@
   <p:sldIdLst>
     <p:sldId id="289" r:id="rId2"/>
     <p:sldId id="282" r:id="rId3"/>
-    <p:sldId id="290" r:id="rId4"/>
-    <p:sldId id="291" r:id="rId5"/>
-    <p:sldId id="286" r:id="rId6"/>
-    <p:sldId id="287" r:id="rId7"/>
-    <p:sldId id="277" r:id="rId8"/>
-    <p:sldId id="278" r:id="rId9"/>
-    <p:sldId id="279" r:id="rId10"/>
-    <p:sldId id="280" r:id="rId11"/>
-    <p:sldId id="288" r:id="rId12"/>
-    <p:sldId id="263" r:id="rId13"/>
-    <p:sldId id="265" r:id="rId14"/>
-    <p:sldId id="266" r:id="rId15"/>
-    <p:sldId id="267" r:id="rId16"/>
-    <p:sldId id="268" r:id="rId17"/>
-    <p:sldId id="269" r:id="rId18"/>
-    <p:sldId id="271" r:id="rId19"/>
-    <p:sldId id="276" r:id="rId20"/>
+    <p:sldId id="292" r:id="rId4"/>
+    <p:sldId id="290" r:id="rId5"/>
+    <p:sldId id="291" r:id="rId6"/>
+    <p:sldId id="286" r:id="rId7"/>
+    <p:sldId id="287" r:id="rId8"/>
+    <p:sldId id="277" r:id="rId9"/>
+    <p:sldId id="278" r:id="rId10"/>
+    <p:sldId id="279" r:id="rId11"/>
+    <p:sldId id="280" r:id="rId12"/>
+    <p:sldId id="288" r:id="rId13"/>
+    <p:sldId id="263" r:id="rId14"/>
+    <p:sldId id="265" r:id="rId15"/>
+    <p:sldId id="266" r:id="rId16"/>
+    <p:sldId id="267" r:id="rId17"/>
+    <p:sldId id="268" r:id="rId18"/>
+    <p:sldId id="269" r:id="rId19"/>
+    <p:sldId id="271" r:id="rId20"/>
+    <p:sldId id="276" r:id="rId21"/>
   </p:sldIdLst>
   <p:sldSz cx="9144000" cy="6858000" type="screen4x3"/>
   <p:notesSz cx="6858000" cy="9144000"/>
@@ -306,7 +307,7 @@
           <a:p>
             <a:fld id="{07BBF333-9989-4654-BFDE-F9E26C4E79EF}" type="datetimeFigureOut">
               <a:rPr lang="en-US" smtClean="0"/>
-              <a:t>12/24/2012</a:t>
+              <a:t>12/26/2012</a:t>
             </a:fld>
             <a:endParaRPr lang="en-US"/>
           </a:p>
@@ -471,7 +472,7 @@
           <a:p>
             <a:fld id="{07BBF333-9989-4654-BFDE-F9E26C4E79EF}" type="datetimeFigureOut">
               <a:rPr lang="en-US" smtClean="0"/>
-              <a:t>12/24/2012</a:t>
+              <a:t>12/26/2012</a:t>
             </a:fld>
             <a:endParaRPr lang="en-US"/>
           </a:p>
@@ -646,7 +647,7 @@
           <a:p>
             <a:fld id="{07BBF333-9989-4654-BFDE-F9E26C4E79EF}" type="datetimeFigureOut">
               <a:rPr lang="en-US" smtClean="0"/>
-              <a:t>12/24/2012</a:t>
+              <a:t>12/26/2012</a:t>
             </a:fld>
             <a:endParaRPr lang="en-US"/>
           </a:p>
@@ -811,7 +812,7 @@
           <a:p>
             <a:fld id="{07BBF333-9989-4654-BFDE-F9E26C4E79EF}" type="datetimeFigureOut">
               <a:rPr lang="en-US" smtClean="0"/>
-              <a:t>12/24/2012</a:t>
+              <a:t>12/26/2012</a:t>
             </a:fld>
             <a:endParaRPr lang="en-US"/>
           </a:p>
@@ -1052,7 +1053,7 @@
           <a:p>
             <a:fld id="{07BBF333-9989-4654-BFDE-F9E26C4E79EF}" type="datetimeFigureOut">
               <a:rPr lang="en-US" smtClean="0"/>
-              <a:t>12/24/2012</a:t>
+              <a:t>12/26/2012</a:t>
             </a:fld>
             <a:endParaRPr lang="en-US"/>
           </a:p>
@@ -1335,7 +1336,7 @@
           <a:p>
             <a:fld id="{07BBF333-9989-4654-BFDE-F9E26C4E79EF}" type="datetimeFigureOut">
               <a:rPr lang="en-US" smtClean="0"/>
-              <a:t>12/24/2012</a:t>
+              <a:t>12/26/2012</a:t>
             </a:fld>
             <a:endParaRPr lang="en-US"/>
           </a:p>
@@ -1752,7 +1753,7 @@
           <a:p>
             <a:fld id="{07BBF333-9989-4654-BFDE-F9E26C4E79EF}" type="datetimeFigureOut">
               <a:rPr lang="en-US" smtClean="0"/>
-              <a:t>12/24/2012</a:t>
+              <a:t>12/26/2012</a:t>
             </a:fld>
             <a:endParaRPr lang="en-US"/>
           </a:p>
@@ -1865,7 +1866,7 @@
           <a:p>
             <a:fld id="{07BBF333-9989-4654-BFDE-F9E26C4E79EF}" type="datetimeFigureOut">
               <a:rPr lang="en-US" smtClean="0"/>
-              <a:t>12/24/2012</a:t>
+              <a:t>12/26/2012</a:t>
             </a:fld>
             <a:endParaRPr lang="en-US"/>
           </a:p>
@@ -1955,7 +1956,7 @@
           <a:p>
             <a:fld id="{07BBF333-9989-4654-BFDE-F9E26C4E79EF}" type="datetimeFigureOut">
               <a:rPr lang="en-US" smtClean="0"/>
-              <a:t>12/24/2012</a:t>
+              <a:t>12/26/2012</a:t>
             </a:fld>
             <a:endParaRPr lang="en-US"/>
           </a:p>
@@ -2227,7 +2228,7 @@
           <a:p>
             <a:fld id="{07BBF333-9989-4654-BFDE-F9E26C4E79EF}" type="datetimeFigureOut">
               <a:rPr lang="en-US" smtClean="0"/>
-              <a:t>12/24/2012</a:t>
+              <a:t>12/26/2012</a:t>
             </a:fld>
             <a:endParaRPr lang="en-US"/>
           </a:p>
@@ -2475,7 +2476,7 @@
           <a:p>
             <a:fld id="{07BBF333-9989-4654-BFDE-F9E26C4E79EF}" type="datetimeFigureOut">
               <a:rPr lang="en-US" smtClean="0"/>
-              <a:t>12/24/2012</a:t>
+              <a:t>12/26/2012</a:t>
             </a:fld>
             <a:endParaRPr lang="en-US"/>
           </a:p>
@@ -2683,7 +2684,7 @@
           <a:p>
             <a:fld id="{07BBF333-9989-4654-BFDE-F9E26C4E79EF}" type="datetimeFigureOut">
               <a:rPr lang="en-US" smtClean="0"/>
-              <a:t>12/24/2012</a:t>
+              <a:t>12/26/2012</a:t>
             </a:fld>
             <a:endParaRPr lang="en-US"/>
           </a:p>
@@ -3137,7 +3138,7 @@
           <a:lstStyle/>
           <a:p>
             <a:pPr algn="ctr"/>
-            <a:endParaRPr lang="en-US"/>
+            <a:endParaRPr lang="en-US" dirty="0"/>
           </a:p>
         </p:txBody>
       </p:sp>
@@ -3186,7 +3187,7 @@
           <a:lstStyle/>
           <a:p>
             <a:pPr algn="ctr"/>
-            <a:endParaRPr lang="en-US"/>
+            <a:endParaRPr lang="en-US" dirty="0"/>
           </a:p>
         </p:txBody>
       </p:sp>
@@ -3313,21 +3314,7 @@
                 <a:latin typeface="Courier New" pitchFamily="49" charset="0"/>
                 <a:cs typeface="Courier New" pitchFamily="49" charset="0"/>
               </a:rPr>
-              <a:t>&lt;</a:t>
-            </a:r>
-            <a:r>
-              <a:rPr lang="en-US" sz="1200" dirty="0" err="1">
-                <a:latin typeface="Courier New" pitchFamily="49" charset="0"/>
-                <a:cs typeface="Courier New" pitchFamily="49" charset="0"/>
-              </a:rPr>
-              <a:t>FFParams</a:t>
-            </a:r>
-            <a:r>
-              <a:rPr lang="en-US" sz="1200" dirty="0">
-                <a:latin typeface="Courier New" pitchFamily="49" charset="0"/>
-                <a:cs typeface="Courier New" pitchFamily="49" charset="0"/>
-              </a:rPr>
-              <a:t>&gt; </a:t>
+              <a:t>&lt;FFParams&gt; </a:t>
             </a:r>
             <a:endParaRPr lang="en-US" sz="1200" dirty="0" smtClean="0">
               <a:latin typeface="Courier New" pitchFamily="49" charset="0"/>
@@ -3347,58 +3334,30 @@
                 <a:latin typeface="Courier New" pitchFamily="49" charset="0"/>
                 <a:cs typeface="Courier New" pitchFamily="49" charset="0"/>
               </a:rPr>
-              <a:t>&lt;</a:t>
-            </a:r>
-            <a:r>
-              <a:rPr lang="en-US" sz="1200" dirty="0" err="1">
-                <a:latin typeface="Courier New" pitchFamily="49" charset="0"/>
-                <a:cs typeface="Courier New" pitchFamily="49" charset="0"/>
-              </a:rPr>
-              <a:t>FFParam</a:t>
+              <a:t>&lt;FFParam constraint="-2*FF1" name="FF2</a:t>
+            </a:r>
+            <a:r>
+              <a:rPr lang="en-US" sz="1200" dirty="0" smtClean="0">
+                <a:latin typeface="Courier New" pitchFamily="49" charset="0"/>
+                <a:cs typeface="Courier New" pitchFamily="49" charset="0"/>
+              </a:rPr>
+              <a:t>"/&gt;</a:t>
+            </a:r>
+          </a:p>
+          <a:p>
+            <a:r>
+              <a:rPr lang="en-US" sz="1200" dirty="0" smtClean="0">
+                <a:latin typeface="Courier New" pitchFamily="49" charset="0"/>
+                <a:cs typeface="Courier New" pitchFamily="49" charset="0"/>
+              </a:rPr>
+              <a:t>    </a:t>
             </a:r>
             <a:r>
               <a:rPr lang="en-US" sz="1200" dirty="0">
                 <a:latin typeface="Courier New" pitchFamily="49" charset="0"/>
                 <a:cs typeface="Courier New" pitchFamily="49" charset="0"/>
               </a:rPr>
-              <a:t> constraint="-2*FF1" name="FF2</a:t>
-            </a:r>
-            <a:r>
-              <a:rPr lang="en-US" sz="1200" dirty="0" smtClean="0">
-                <a:latin typeface="Courier New" pitchFamily="49" charset="0"/>
-                <a:cs typeface="Courier New" pitchFamily="49" charset="0"/>
-              </a:rPr>
-              <a:t>"/&gt;</a:t>
-            </a:r>
-          </a:p>
-          <a:p>
-            <a:r>
-              <a:rPr lang="en-US" sz="1200" dirty="0" smtClean="0">
-                <a:latin typeface="Courier New" pitchFamily="49" charset="0"/>
-                <a:cs typeface="Courier New" pitchFamily="49" charset="0"/>
-              </a:rPr>
-              <a:t>    </a:t>
-            </a:r>
-            <a:r>
-              <a:rPr lang="en-US" sz="1200" dirty="0">
-                <a:latin typeface="Courier New" pitchFamily="49" charset="0"/>
-                <a:cs typeface="Courier New" pitchFamily="49" charset="0"/>
-              </a:rPr>
-              <a:t>&lt;</a:t>
-            </a:r>
-            <a:r>
-              <a:rPr lang="en-US" sz="1200" dirty="0" err="1">
-                <a:latin typeface="Courier New" pitchFamily="49" charset="0"/>
-                <a:cs typeface="Courier New" pitchFamily="49" charset="0"/>
-              </a:rPr>
-              <a:t>FFParam</a:t>
-            </a:r>
-            <a:r>
-              <a:rPr lang="en-US" sz="1200" dirty="0">
-                <a:latin typeface="Courier New" pitchFamily="49" charset="0"/>
-                <a:cs typeface="Courier New" pitchFamily="49" charset="0"/>
-              </a:rPr>
-              <a:t> initial="0.45" maximum="0.6" minimum="0.3" name="FF1" tolerance="0.01"/&gt; </a:t>
+              <a:t>&lt;FFParam initial="0.45" maximum="0.6" minimum="0.3" name="FF1" tolerance="0.01"/&gt; </a:t>
             </a:r>
             <a:endParaRPr lang="en-US" sz="1200" dirty="0" smtClean="0">
               <a:latin typeface="Courier New" pitchFamily="49" charset="0"/>
@@ -3418,14 +3377,7 @@
                 <a:latin typeface="Courier New" pitchFamily="49" charset="0"/>
                 <a:cs typeface="Courier New" pitchFamily="49" charset="0"/>
               </a:rPr>
-              <a:t>&lt;/</a:t>
-            </a:r>
-            <a:r>
-              <a:rPr lang="en-US" sz="1200" dirty="0" err="1">
-                <a:latin typeface="Courier New" pitchFamily="49" charset="0"/>
-                <a:cs typeface="Courier New" pitchFamily="49" charset="0"/>
-              </a:rPr>
-              <a:t>FFParams</a:t>
+              <a:t>&lt;/FFParams</a:t>
             </a:r>
             <a:r>
               <a:rPr lang="en-US" sz="1200" dirty="0" smtClean="0">
@@ -3441,88 +3393,60 @@
                 <a:latin typeface="Courier New" pitchFamily="49" charset="0"/>
                 <a:cs typeface="Courier New" pitchFamily="49" charset="0"/>
               </a:rPr>
-              <a:t> &lt;</a:t>
-            </a:r>
-            <a:r>
-              <a:rPr lang="en-US" sz="1200" dirty="0" err="1" smtClean="0">
-                <a:latin typeface="Courier New" pitchFamily="49" charset="0"/>
-                <a:cs typeface="Courier New" pitchFamily="49" charset="0"/>
-              </a:rPr>
-              <a:t>FFTemplate</a:t>
-            </a:r>
+              <a:t> &lt;FFTemplate&gt;PSF</a:t>
+            </a:r>
+          </a:p>
+          <a:p>
             <a:r>
               <a:rPr lang="en-US" sz="1200" dirty="0" smtClean="0">
                 <a:latin typeface="Courier New" pitchFamily="49" charset="0"/>
                 <a:cs typeface="Courier New" pitchFamily="49" charset="0"/>
               </a:rPr>
-              <a:t>&gt;PSF</a:t>
-            </a:r>
-          </a:p>
-          <a:p>
+              <a:t>       </a:t>
+            </a:r>
+            <a:r>
+              <a:rPr lang="en-US" sz="1200" dirty="0">
+                <a:latin typeface="Courier New" pitchFamily="49" charset="0"/>
+                <a:cs typeface="Courier New" pitchFamily="49" charset="0"/>
+              </a:rPr>
+              <a:t>5 !</a:t>
+            </a:r>
             <a:r>
               <a:rPr lang="en-US" sz="1200" dirty="0" smtClean="0">
                 <a:latin typeface="Courier New" pitchFamily="49" charset="0"/>
                 <a:cs typeface="Courier New" pitchFamily="49" charset="0"/>
               </a:rPr>
-              <a:t>       </a:t>
+              <a:t>NTITLE</a:t>
+            </a:r>
+          </a:p>
+          <a:p>
+            <a:r>
+              <a:rPr lang="en-US" sz="1200" dirty="0" smtClean="0">
+                <a:latin typeface="Courier New" pitchFamily="49" charset="0"/>
+                <a:cs typeface="Courier New" pitchFamily="49" charset="0"/>
+              </a:rPr>
+              <a:t> </a:t>
             </a:r>
             <a:r>
               <a:rPr lang="en-US" sz="1200" dirty="0">
                 <a:latin typeface="Courier New" pitchFamily="49" charset="0"/>
                 <a:cs typeface="Courier New" pitchFamily="49" charset="0"/>
               </a:rPr>
-              <a:t>5 !</a:t>
+              <a:t>REMARKS original generated structure </a:t>
             </a:r>
             <a:r>
               <a:rPr lang="en-US" sz="1200" dirty="0" smtClean="0">
                 <a:latin typeface="Courier New" pitchFamily="49" charset="0"/>
                 <a:cs typeface="Courier New" pitchFamily="49" charset="0"/>
               </a:rPr>
-              <a:t>NTITLE</a:t>
-            </a:r>
-          </a:p>
-          <a:p>
-            <a:r>
-              <a:rPr lang="en-US" sz="1200" dirty="0" smtClean="0">
-                <a:latin typeface="Courier New" pitchFamily="49" charset="0"/>
-                <a:cs typeface="Courier New" pitchFamily="49" charset="0"/>
-              </a:rPr>
-              <a:t> </a:t>
+              <a:t>x-plor </a:t>
             </a:r>
             <a:r>
               <a:rPr lang="en-US" sz="1200" dirty="0">
                 <a:latin typeface="Courier New" pitchFamily="49" charset="0"/>
                 <a:cs typeface="Courier New" pitchFamily="49" charset="0"/>
               </a:rPr>
-              <a:t>REMARKS original generated structure x-</a:t>
-            </a:r>
-            <a:r>
-              <a:rPr lang="en-US" sz="1200" dirty="0" err="1">
-                <a:latin typeface="Courier New" pitchFamily="49" charset="0"/>
-                <a:cs typeface="Courier New" pitchFamily="49" charset="0"/>
-              </a:rPr>
-              <a:t>plor</a:t>
-            </a:r>
-            <a:r>
-              <a:rPr lang="en-US" sz="1200" dirty="0">
-                <a:latin typeface="Courier New" pitchFamily="49" charset="0"/>
-                <a:cs typeface="Courier New" pitchFamily="49" charset="0"/>
-              </a:rPr>
-              <a:t> </a:t>
-            </a:r>
-            <a:r>
-              <a:rPr lang="en-US" sz="1200" dirty="0" err="1">
-                <a:latin typeface="Courier New" pitchFamily="49" charset="0"/>
-                <a:cs typeface="Courier New" pitchFamily="49" charset="0"/>
-              </a:rPr>
-              <a:t>psf</a:t>
-            </a:r>
-            <a:r>
-              <a:rPr lang="en-US" sz="1200" dirty="0">
-                <a:latin typeface="Courier New" pitchFamily="49" charset="0"/>
-                <a:cs typeface="Courier New" pitchFamily="49" charset="0"/>
-              </a:rPr>
-              <a:t> </a:t>
+              <a:t>psf </a:t>
             </a:r>
             <a:r>
               <a:rPr lang="en-US" sz="1200" dirty="0" smtClean="0">
@@ -4033,6 +3957,284 @@
 </file>
 
 <file path=ppt/slides/slide10.xml><?xml version="1.0" encoding="utf-8"?>
+<p:sld xmlns:a="http://schemas.openxmlformats.org/drawingml/2006/main" xmlns:r="http://schemas.openxmlformats.org/officeDocument/2006/relationships" xmlns:p="http://schemas.openxmlformats.org/presentationml/2006/main">
+  <p:cSld>
+    <p:spTree>
+      <p:nvGrpSpPr>
+        <p:cNvPr id="1" name=""/>
+        <p:cNvGrpSpPr/>
+        <p:nvPr/>
+      </p:nvGrpSpPr>
+      <p:grpSpPr>
+        <a:xfrm>
+          <a:off x="0" y="0"/>
+          <a:ext cx="0" cy="0"/>
+          <a:chOff x="0" y="0"/>
+          <a:chExt cx="0" cy="0"/>
+        </a:xfrm>
+      </p:grpSpPr>
+      <p:sp>
+        <p:nvSpPr>
+          <p:cNvPr id="4" name="TextBox 3"/>
+          <p:cNvSpPr txBox="1"/>
+          <p:nvPr/>
+        </p:nvSpPr>
+        <p:spPr>
+          <a:xfrm>
+            <a:off x="0" y="0"/>
+            <a:ext cx="9144000" cy="523220"/>
+          </a:xfrm>
+          <a:prstGeom prst="rect">
+            <a:avLst/>
+          </a:prstGeom>
+          <a:noFill/>
+        </p:spPr>
+        <p:txBody>
+          <a:bodyPr wrap="square" rtlCol="0">
+            <a:spAutoFit/>
+          </a:bodyPr>
+          <a:lstStyle/>
+          <a:p>
+            <a:pPr algn="ctr"/>
+            <a:r>
+              <a:rPr lang="en-US" sz="2800" dirty="0" smtClean="0">
+                <a:solidFill>
+                  <a:srgbClr val="005400"/>
+                </a:solidFill>
+                <a:latin typeface="Arial Black" pitchFamily="34" charset="0"/>
+              </a:rPr>
+              <a:t>Dakota Input File Structure</a:t>
+            </a:r>
+            <a:endParaRPr lang="en-US" sz="2800" dirty="0">
+              <a:solidFill>
+                <a:srgbClr val="005400"/>
+              </a:solidFill>
+              <a:latin typeface="Arial Black" pitchFamily="34" charset="0"/>
+            </a:endParaRPr>
+          </a:p>
+        </p:txBody>
+      </p:sp>
+      <p:grpSp>
+        <p:nvGrpSpPr>
+          <p:cNvPr id="6" name="Group 5"/>
+          <p:cNvGrpSpPr/>
+          <p:nvPr/>
+        </p:nvGrpSpPr>
+        <p:grpSpPr>
+          <a:xfrm>
+            <a:off x="2971075" y="381000"/>
+            <a:ext cx="2743925" cy="6170162"/>
+            <a:chOff x="3428275" y="381000"/>
+            <a:chExt cx="2743925" cy="6170162"/>
+          </a:xfrm>
+        </p:grpSpPr>
+        <p:pic>
+          <p:nvPicPr>
+            <p:cNvPr id="3074" name="Picture 2" descr="C:\Documents and Settings\Jose Borreguero\My Documents\projects\development\CAMM\github\documents\Jose\DakotaNestedInputFile.jpeg"/>
+            <p:cNvPicPr>
+              <a:picLocks noChangeAspect="1" noChangeArrowheads="1"/>
+            </p:cNvPicPr>
+            <p:nvPr/>
+          </p:nvPicPr>
+          <p:blipFill rotWithShape="1">
+            <a:blip r:embed="rId2" cstate="print">
+              <a:extLst>
+                <a:ext uri="{28A0092B-C50C-407E-A947-70E740481C1C}">
+                  <a14:useLocalDpi xmlns:a14="http://schemas.microsoft.com/office/drawing/2010/main" val="0"/>
+                </a:ext>
+              </a:extLst>
+            </a:blip>
+            <a:srcRect l="8716" t="11568" r="54870" b="25159"/>
+            <a:stretch/>
+          </p:blipFill>
+          <p:spPr bwMode="auto">
+            <a:xfrm>
+              <a:off x="3428275" y="381000"/>
+              <a:ext cx="2743925" cy="6170162"/>
+            </a:xfrm>
+            <a:prstGeom prst="rect">
+              <a:avLst/>
+            </a:prstGeom>
+            <a:noFill/>
+            <a:extLst>
+              <a:ext uri="{909E8E84-426E-40DD-AFC4-6F175D3DCCD1}">
+                <a14:hiddenFill xmlns:a14="http://schemas.microsoft.com/office/drawing/2010/main">
+                  <a:solidFill>
+                    <a:srgbClr val="FFFFFF"/>
+                  </a:solidFill>
+                </a14:hiddenFill>
+              </a:ext>
+            </a:extLst>
+          </p:spPr>
+        </p:pic>
+        <p:sp>
+          <p:nvSpPr>
+            <p:cNvPr id="5" name="Rectangle 4"/>
+            <p:cNvSpPr/>
+            <p:nvPr/>
+          </p:nvSpPr>
+          <p:spPr>
+            <a:xfrm>
+              <a:off x="3657600" y="3200400"/>
+              <a:ext cx="2362200" cy="265681"/>
+            </a:xfrm>
+            <a:prstGeom prst="rect">
+              <a:avLst/>
+            </a:prstGeom>
+            <a:solidFill>
+              <a:schemeClr val="bg1"/>
+            </a:solidFill>
+            <a:ln>
+              <a:solidFill>
+                <a:schemeClr val="bg1"/>
+              </a:solidFill>
+            </a:ln>
+          </p:spPr>
+          <p:style>
+            <a:lnRef idx="2">
+              <a:schemeClr val="accent1">
+                <a:shade val="50000"/>
+              </a:schemeClr>
+            </a:lnRef>
+            <a:fillRef idx="1">
+              <a:schemeClr val="accent1"/>
+            </a:fillRef>
+            <a:effectRef idx="0">
+              <a:schemeClr val="accent1"/>
+            </a:effectRef>
+            <a:fontRef idx="minor">
+              <a:schemeClr val="lt1"/>
+            </a:fontRef>
+          </p:style>
+          <p:txBody>
+            <a:bodyPr rtlCol="0" anchor="ctr"/>
+            <a:lstStyle/>
+            <a:p>
+              <a:pPr algn="ctr"/>
+              <a:endParaRPr lang="en-US"/>
+            </a:p>
+          </p:txBody>
+        </p:sp>
+      </p:grpSp>
+      <p:sp>
+        <p:nvSpPr>
+          <p:cNvPr id="2" name="Rounded Rectangle 1"/>
+          <p:cNvSpPr/>
+          <p:nvPr/>
+        </p:nvSpPr>
+        <p:spPr>
+          <a:xfrm>
+            <a:off x="3048000" y="457200"/>
+            <a:ext cx="2667725" cy="2296180"/>
+          </a:xfrm>
+          <a:prstGeom prst="roundRect">
+            <a:avLst>
+              <a:gd name="adj" fmla="val 7406"/>
+            </a:avLst>
+          </a:prstGeom>
+          <a:solidFill>
+            <a:schemeClr val="accent1">
+              <a:alpha val="23000"/>
+            </a:schemeClr>
+          </a:solidFill>
+          <a:ln>
+            <a:noFill/>
+          </a:ln>
+        </p:spPr>
+        <p:style>
+          <a:lnRef idx="2">
+            <a:schemeClr val="accent1">
+              <a:shade val="50000"/>
+            </a:schemeClr>
+          </a:lnRef>
+          <a:fillRef idx="1">
+            <a:schemeClr val="accent1"/>
+          </a:fillRef>
+          <a:effectRef idx="0">
+            <a:schemeClr val="accent1"/>
+          </a:effectRef>
+          <a:fontRef idx="minor">
+            <a:schemeClr val="lt1"/>
+          </a:fontRef>
+        </p:style>
+        <p:txBody>
+          <a:bodyPr rtlCol="0" anchor="ctr"/>
+          <a:lstStyle/>
+          <a:p>
+            <a:pPr algn="ctr"/>
+            <a:endParaRPr lang="en-US"/>
+          </a:p>
+        </p:txBody>
+      </p:sp>
+      <p:sp>
+        <p:nvSpPr>
+          <p:cNvPr id="3" name="Rounded Rectangle 2"/>
+          <p:cNvSpPr/>
+          <p:nvPr/>
+        </p:nvSpPr>
+        <p:spPr>
+          <a:xfrm>
+            <a:off x="3048000" y="3333240"/>
+            <a:ext cx="2743925" cy="3296160"/>
+          </a:xfrm>
+          <a:prstGeom prst="roundRect">
+            <a:avLst>
+              <a:gd name="adj" fmla="val 6205"/>
+            </a:avLst>
+          </a:prstGeom>
+          <a:noFill/>
+          <a:ln>
+            <a:solidFill>
+              <a:srgbClr val="FF0000"/>
+            </a:solidFill>
+          </a:ln>
+        </p:spPr>
+        <p:style>
+          <a:lnRef idx="2">
+            <a:schemeClr val="accent1">
+              <a:shade val="50000"/>
+            </a:schemeClr>
+          </a:lnRef>
+          <a:fillRef idx="1">
+            <a:schemeClr val="accent1"/>
+          </a:fillRef>
+          <a:effectRef idx="0">
+            <a:schemeClr val="accent1"/>
+          </a:effectRef>
+          <a:fontRef idx="minor">
+            <a:schemeClr val="lt1"/>
+          </a:fontRef>
+        </p:style>
+        <p:txBody>
+          <a:bodyPr rtlCol="0" anchor="ctr"/>
+          <a:lstStyle/>
+          <a:p>
+            <a:pPr algn="ctr"/>
+            <a:endParaRPr lang="en-US"/>
+          </a:p>
+        </p:txBody>
+      </p:sp>
+    </p:spTree>
+    <p:extLst>
+      <p:ext uri="{BB962C8B-B14F-4D97-AF65-F5344CB8AC3E}">
+        <p14:creationId xmlns:p14="http://schemas.microsoft.com/office/powerpoint/2010/main" val="547979724"/>
+      </p:ext>
+    </p:extLst>
+  </p:cSld>
+  <p:clrMapOvr>
+    <a:masterClrMapping/>
+  </p:clrMapOvr>
+  <p:timing>
+    <p:tnLst>
+      <p:par>
+        <p:cTn id="1" dur="indefinite" restart="never" nodeType="tmRoot"/>
+      </p:par>
+    </p:tnLst>
+  </p:timing>
+</p:sld>
+</file>
+
+<file path=ppt/slides/slide11.xml><?xml version="1.0" encoding="utf-8"?>
 <p:sld xmlns:a="http://schemas.openxmlformats.org/drawingml/2006/main" xmlns:r="http://schemas.openxmlformats.org/officeDocument/2006/relationships" xmlns:p="http://schemas.openxmlformats.org/presentationml/2006/main">
   <p:cSld>
     <p:spTree>
@@ -5010,7 +5212,7 @@
 </p:sld>
 </file>
 
-<file path=ppt/slides/slide11.xml><?xml version="1.0" encoding="utf-8"?>
+<file path=ppt/slides/slide12.xml><?xml version="1.0" encoding="utf-8"?>
 <p:sld xmlns:a="http://schemas.openxmlformats.org/drawingml/2006/main" xmlns:r="http://schemas.openxmlformats.org/officeDocument/2006/relationships" xmlns:p="http://schemas.openxmlformats.org/presentationml/2006/main">
   <p:cSld>
     <p:spTree>
@@ -5088,7 +5290,7 @@
 </p:sld>
 </file>
 
-<file path=ppt/slides/slide12.xml><?xml version="1.0" encoding="utf-8"?>
+<file path=ppt/slides/slide13.xml><?xml version="1.0" encoding="utf-8"?>
 <p:sld xmlns:a="http://schemas.openxmlformats.org/drawingml/2006/main" xmlns:r="http://schemas.openxmlformats.org/officeDocument/2006/relationships" xmlns:p="http://schemas.openxmlformats.org/presentationml/2006/main">
   <p:cSld>
     <p:spTree>
@@ -5988,7 +6190,7 @@
 </p:sld>
 </file>
 
-<file path=ppt/slides/slide13.xml><?xml version="1.0" encoding="utf-8"?>
+<file path=ppt/slides/slide14.xml><?xml version="1.0" encoding="utf-8"?>
 <p:sld xmlns:a="http://schemas.openxmlformats.org/drawingml/2006/main" xmlns:r="http://schemas.openxmlformats.org/officeDocument/2006/relationships" xmlns:p="http://schemas.openxmlformats.org/presentationml/2006/main">
   <p:cSld>
     <p:spTree>
@@ -6666,7 +6868,7 @@
 </p:sld>
 </file>
 
-<file path=ppt/slides/slide14.xml><?xml version="1.0" encoding="utf-8"?>
+<file path=ppt/slides/slide15.xml><?xml version="1.0" encoding="utf-8"?>
 <p:sld xmlns:a="http://schemas.openxmlformats.org/drawingml/2006/main" xmlns:r="http://schemas.openxmlformats.org/officeDocument/2006/relationships" xmlns:p="http://schemas.openxmlformats.org/presentationml/2006/main">
   <p:cSld>
     <p:spTree>
@@ -7983,7 +8185,7 @@
 </p:sld>
 </file>
 
-<file path=ppt/slides/slide15.xml><?xml version="1.0" encoding="utf-8"?>
+<file path=ppt/slides/slide16.xml><?xml version="1.0" encoding="utf-8"?>
 <p:sld xmlns:a="http://schemas.openxmlformats.org/drawingml/2006/main" xmlns:r="http://schemas.openxmlformats.org/officeDocument/2006/relationships" xmlns:p="http://schemas.openxmlformats.org/presentationml/2006/main">
   <p:cSld>
     <p:spTree>
@@ -9128,7 +9330,7 @@
 </p:sld>
 </file>
 
-<file path=ppt/slides/slide16.xml><?xml version="1.0" encoding="utf-8"?>
+<file path=ppt/slides/slide17.xml><?xml version="1.0" encoding="utf-8"?>
 <p:sld xmlns:a="http://schemas.openxmlformats.org/drawingml/2006/main" xmlns:r="http://schemas.openxmlformats.org/officeDocument/2006/relationships" xmlns:p="http://schemas.openxmlformats.org/presentationml/2006/main">
   <p:cSld>
     <p:spTree>
@@ -9605,7 +9807,7 @@
           <a:graphicData uri="http://schemas.openxmlformats.org/presentationml/2006/ole">
             <mc:AlternateContent xmlns:mc="http://schemas.openxmlformats.org/markup-compatibility/2006">
               <mc:Choice xmlns:v="urn:schemas-microsoft-com:vml" Requires="v">
-                <p:oleObj spid="_x0000_s1065" name="Equation" r:id="rId3" imgW="609480" imgH="393480" progId="Equation.DSMT4">
+                <p:oleObj spid="_x0000_s1071" name="Equation" r:id="rId3" imgW="609480" imgH="393480" progId="Equation.DSMT4">
                   <p:embed/>
                 </p:oleObj>
               </mc:Choice>
@@ -9655,7 +9857,7 @@
 </p:sld>
 </file>
 
-<file path=ppt/slides/slide17.xml><?xml version="1.0" encoding="utf-8"?>
+<file path=ppt/slides/slide18.xml><?xml version="1.0" encoding="utf-8"?>
 <p:sld xmlns:a="http://schemas.openxmlformats.org/drawingml/2006/main" xmlns:r="http://schemas.openxmlformats.org/officeDocument/2006/relationships" xmlns:p="http://schemas.openxmlformats.org/presentationml/2006/main">
   <p:cSld>
     <p:spTree>
@@ -10242,7 +10444,7 @@
 </p:sld>
 </file>
 
-<file path=ppt/slides/slide18.xml><?xml version="1.0" encoding="utf-8"?>
+<file path=ppt/slides/slide19.xml><?xml version="1.0" encoding="utf-8"?>
 <p:sld xmlns:a="http://schemas.openxmlformats.org/drawingml/2006/main" xmlns:r="http://schemas.openxmlformats.org/officeDocument/2006/relationships" xmlns:p="http://schemas.openxmlformats.org/presentationml/2006/main">
   <p:cSld>
     <p:spTree>
@@ -10845,84 +11047,6 @@
         </p:txBody>
       </p:sp>
     </p:spTree>
-  </p:cSld>
-  <p:clrMapOvr>
-    <a:masterClrMapping/>
-  </p:clrMapOvr>
-  <p:timing>
-    <p:tnLst>
-      <p:par>
-        <p:cTn id="1" dur="indefinite" restart="never" nodeType="tmRoot"/>
-      </p:par>
-    </p:tnLst>
-  </p:timing>
-</p:sld>
-</file>
-
-<file path=ppt/slides/slide19.xml><?xml version="1.0" encoding="utf-8"?>
-<p:sld xmlns:a="http://schemas.openxmlformats.org/drawingml/2006/main" xmlns:r="http://schemas.openxmlformats.org/officeDocument/2006/relationships" xmlns:p="http://schemas.openxmlformats.org/presentationml/2006/main">
-  <p:cSld>
-    <p:spTree>
-      <p:nvGrpSpPr>
-        <p:cNvPr id="1" name=""/>
-        <p:cNvGrpSpPr/>
-        <p:nvPr/>
-      </p:nvGrpSpPr>
-      <p:grpSpPr>
-        <a:xfrm>
-          <a:off x="0" y="0"/>
-          <a:ext cx="0" cy="0"/>
-          <a:chOff x="0" y="0"/>
-          <a:chExt cx="0" cy="0"/>
-        </a:xfrm>
-      </p:grpSpPr>
-      <p:sp>
-        <p:nvSpPr>
-          <p:cNvPr id="4" name="TextBox 3"/>
-          <p:cNvSpPr txBox="1"/>
-          <p:nvPr/>
-        </p:nvSpPr>
-        <p:spPr>
-          <a:xfrm>
-            <a:off x="0" y="0"/>
-            <a:ext cx="9144000" cy="523220"/>
-          </a:xfrm>
-          <a:prstGeom prst="rect">
-            <a:avLst/>
-          </a:prstGeom>
-          <a:noFill/>
-        </p:spPr>
-        <p:txBody>
-          <a:bodyPr wrap="square" rtlCol="0">
-            <a:spAutoFit/>
-          </a:bodyPr>
-          <a:lstStyle/>
-          <a:p>
-            <a:pPr algn="ctr"/>
-            <a:r>
-              <a:rPr lang="en-US" sz="2800" dirty="0" smtClean="0">
-                <a:solidFill>
-                  <a:srgbClr val="005400"/>
-                </a:solidFill>
-                <a:latin typeface="Arial Black" pitchFamily="34" charset="0"/>
-              </a:rPr>
-              <a:t>Title</a:t>
-            </a:r>
-            <a:endParaRPr lang="en-US" sz="2800" dirty="0">
-              <a:solidFill>
-                <a:srgbClr val="005400"/>
-              </a:solidFill>
-              <a:latin typeface="Arial Black" pitchFamily="34" charset="0"/>
-            </a:endParaRPr>
-          </a:p>
-        </p:txBody>
-      </p:sp>
-    </p:spTree>
-    <p:extLst>
-      <p:ext uri="{BB962C8B-B14F-4D97-AF65-F5344CB8AC3E}">
-        <p14:creationId xmlns:p14="http://schemas.microsoft.com/office/powerpoint/2010/main" val="2308549334"/>
-      </p:ext>
-    </p:extLst>
   </p:cSld>
   <p:clrMapOvr>
     <a:masterClrMapping/>
@@ -10984,16 +11108,7 @@
                 </a:solidFill>
                 <a:latin typeface="Arial Black" pitchFamily="34" charset="0"/>
               </a:rPr>
-              <a:t>Force Field Template </a:t>
-            </a:r>
-            <a:r>
-              <a:rPr lang="en-US" sz="2800" dirty="0" smtClean="0">
-                <a:solidFill>
-                  <a:srgbClr val="005400"/>
-                </a:solidFill>
-                <a:latin typeface="Arial Black" pitchFamily="34" charset="0"/>
-              </a:rPr>
-              <a:t>Creator (II)</a:t>
+              <a:t>Force Field Template Creator (II)</a:t>
             </a:r>
             <a:endParaRPr lang="en-US" sz="2800" dirty="0">
               <a:solidFill>
@@ -11667,7 +11782,7 @@
 </p:sld>
 </file>
 
-<file path=ppt/slides/slide3.xml><?xml version="1.0" encoding="utf-8"?>
+<file path=ppt/slides/slide20.xml><?xml version="1.0" encoding="utf-8"?>
 <p:sld xmlns:a="http://schemas.openxmlformats.org/drawingml/2006/main" xmlns:r="http://schemas.openxmlformats.org/officeDocument/2006/relationships" xmlns:p="http://schemas.openxmlformats.org/presentationml/2006/main">
   <p:cSld>
     <p:spTree>
@@ -11714,7 +11829,7 @@
                 </a:solidFill>
                 <a:latin typeface="Arial Black" pitchFamily="34" charset="0"/>
               </a:rPr>
-              <a:t>Force Field Update Script</a:t>
+              <a:t>Title</a:t>
             </a:r>
             <a:endParaRPr lang="en-US" sz="2800" dirty="0">
               <a:solidFill>
@@ -11725,9 +11840,136 @@
           </a:p>
         </p:txBody>
       </p:sp>
+    </p:spTree>
+    <p:extLst>
+      <p:ext uri="{BB962C8B-B14F-4D97-AF65-F5344CB8AC3E}">
+        <p14:creationId xmlns:p14="http://schemas.microsoft.com/office/powerpoint/2010/main" val="2308549334"/>
+      </p:ext>
+    </p:extLst>
+  </p:cSld>
+  <p:clrMapOvr>
+    <a:masterClrMapping/>
+  </p:clrMapOvr>
+  <p:timing>
+    <p:tnLst>
+      <p:par>
+        <p:cTn id="1" dur="indefinite" restart="never" nodeType="tmRoot"/>
+      </p:par>
+    </p:tnLst>
+  </p:timing>
+</p:sld>
+</file>
+
+<file path=ppt/slides/slide3.xml><?xml version="1.0" encoding="utf-8"?>
+<p:sld xmlns:a="http://schemas.openxmlformats.org/drawingml/2006/main" xmlns:r="http://schemas.openxmlformats.org/officeDocument/2006/relationships" xmlns:p="http://schemas.openxmlformats.org/presentationml/2006/main">
+  <p:cSld>
+    <p:spTree>
+      <p:nvGrpSpPr>
+        <p:cNvPr id="1" name=""/>
+        <p:cNvGrpSpPr/>
+        <p:nvPr/>
+      </p:nvGrpSpPr>
+      <p:grpSpPr>
+        <a:xfrm>
+          <a:off x="0" y="0"/>
+          <a:ext cx="0" cy="0"/>
+          <a:chOff x="0" y="0"/>
+          <a:chExt cx="0" cy="0"/>
+        </a:xfrm>
+      </p:grpSpPr>
+      <p:sp>
+        <p:nvSpPr>
+          <p:cNvPr id="18" name="Rectangle 17"/>
+          <p:cNvSpPr/>
+          <p:nvPr/>
+        </p:nvSpPr>
+        <p:spPr>
+          <a:xfrm>
+            <a:off x="6096000" y="3657600"/>
+            <a:ext cx="2743200" cy="1143000"/>
+          </a:xfrm>
+          <a:prstGeom prst="rect">
+            <a:avLst/>
+          </a:prstGeom>
+          <a:solidFill>
+            <a:schemeClr val="accent6">
+              <a:lumMod val="20000"/>
+              <a:lumOff val="80000"/>
+            </a:schemeClr>
+          </a:solidFill>
+          <a:ln>
+            <a:noFill/>
+          </a:ln>
+        </p:spPr>
+        <p:style>
+          <a:lnRef idx="2">
+            <a:schemeClr val="accent1">
+              <a:shade val="50000"/>
+            </a:schemeClr>
+          </a:lnRef>
+          <a:fillRef idx="1">
+            <a:schemeClr val="accent1"/>
+          </a:fillRef>
+          <a:effectRef idx="0">
+            <a:schemeClr val="accent1"/>
+          </a:effectRef>
+          <a:fontRef idx="minor">
+            <a:schemeClr val="lt1"/>
+          </a:fontRef>
+        </p:style>
+        <p:txBody>
+          <a:bodyPr rtlCol="0" anchor="ctr"/>
+          <a:lstStyle/>
+          <a:p>
+            <a:pPr algn="ctr"/>
+            <a:endParaRPr lang="en-US"/>
+          </a:p>
+        </p:txBody>
+      </p:sp>
+      <p:sp>
+        <p:nvSpPr>
+          <p:cNvPr id="4" name="TextBox 3"/>
+          <p:cNvSpPr txBox="1"/>
+          <p:nvPr/>
+        </p:nvSpPr>
+        <p:spPr>
+          <a:xfrm>
+            <a:off x="0" y="0"/>
+            <a:ext cx="9144000" cy="523220"/>
+          </a:xfrm>
+          <a:prstGeom prst="rect">
+            <a:avLst/>
+          </a:prstGeom>
+          <a:noFill/>
+        </p:spPr>
+        <p:txBody>
+          <a:bodyPr wrap="square" rtlCol="0">
+            <a:spAutoFit/>
+          </a:bodyPr>
+          <a:lstStyle/>
+          <a:p>
+            <a:pPr algn="ctr"/>
+            <a:r>
+              <a:rPr lang="en-US" sz="2800" dirty="0" smtClean="0">
+                <a:solidFill>
+                  <a:srgbClr val="005400"/>
+                </a:solidFill>
+                <a:latin typeface="Arial Black" pitchFamily="34" charset="0"/>
+              </a:rPr>
+              <a:t>Dakota Input File Generator</a:t>
+            </a:r>
+            <a:endParaRPr lang="en-US" sz="2800" dirty="0">
+              <a:solidFill>
+                <a:srgbClr val="005400"/>
+              </a:solidFill>
+              <a:latin typeface="Arial Black" pitchFamily="34" charset="0"/>
+            </a:endParaRPr>
+          </a:p>
+        </p:txBody>
+      </p:sp>
       <p:pic>
         <p:nvPicPr>
-          <p:cNvPr id="5122" name="Picture 2" descr="C:\Documents and Settings\Jose Borreguero\My Documents\projects\development\CAMM\github\documents\Jose\ForceFieldUpdater.png"/>
+          <p:cNvPr id="2050" name="Picture 2" descr="C:\Documents and Settings\Jose Borreguero\My Documents\projects\development\CAMM\github\documents\Jose\DakotaInputFileGenerator.png"/>
           <p:cNvPicPr>
             <a:picLocks noChangeAspect="1" noChangeArrowheads="1"/>
           </p:cNvPicPr>
@@ -11741,13 +11983,13 @@
               </a:ext>
             </a:extLst>
           </a:blip>
-          <a:srcRect l="13078" t="9785" r="52349" b="74530"/>
+          <a:srcRect l="6875" t="11839" r="52620" b="74525"/>
           <a:stretch/>
         </p:blipFill>
         <p:spPr bwMode="auto">
           <a:xfrm>
-            <a:off x="1676400" y="838200"/>
-            <a:ext cx="5310258" cy="3117774"/>
+            <a:off x="3352800" y="514360"/>
+            <a:ext cx="5486400" cy="2390225"/>
           </a:xfrm>
           <a:prstGeom prst="rect">
             <a:avLst/>
@@ -11764,10 +12006,746 @@
           </a:extLst>
         </p:spPr>
       </p:pic>
+      <p:grpSp>
+        <p:nvGrpSpPr>
+          <p:cNvPr id="2" name="Group 1"/>
+          <p:cNvGrpSpPr/>
+          <p:nvPr/>
+        </p:nvGrpSpPr>
+        <p:grpSpPr>
+          <a:xfrm>
+            <a:off x="103245" y="5132942"/>
+            <a:ext cx="8180445" cy="1569660"/>
+            <a:chOff x="582555" y="2934206"/>
+            <a:chExt cx="8180445" cy="1569660"/>
+          </a:xfrm>
+        </p:grpSpPr>
+        <p:sp>
+          <p:nvSpPr>
+            <p:cNvPr id="6" name="Rectangle 5"/>
+            <p:cNvSpPr/>
+            <p:nvPr/>
+          </p:nvSpPr>
+          <p:spPr>
+            <a:xfrm>
+              <a:off x="685800" y="3352800"/>
+              <a:ext cx="7772400" cy="914400"/>
+            </a:xfrm>
+            <a:prstGeom prst="rect">
+              <a:avLst/>
+            </a:prstGeom>
+            <a:solidFill>
+              <a:schemeClr val="accent2">
+                <a:lumMod val="20000"/>
+                <a:lumOff val="80000"/>
+              </a:schemeClr>
+            </a:solidFill>
+            <a:ln>
+              <a:noFill/>
+            </a:ln>
+          </p:spPr>
+          <p:style>
+            <a:lnRef idx="2">
+              <a:schemeClr val="accent1">
+                <a:shade val="50000"/>
+              </a:schemeClr>
+            </a:lnRef>
+            <a:fillRef idx="1">
+              <a:schemeClr val="accent1"/>
+            </a:fillRef>
+            <a:effectRef idx="0">
+              <a:schemeClr val="accent1"/>
+            </a:effectRef>
+            <a:fontRef idx="minor">
+              <a:schemeClr val="lt1"/>
+            </a:fontRef>
+          </p:style>
+          <p:txBody>
+            <a:bodyPr rtlCol="0" anchor="ctr"/>
+            <a:lstStyle/>
+            <a:p>
+              <a:pPr algn="ctr"/>
+              <a:endParaRPr lang="en-US"/>
+            </a:p>
+          </p:txBody>
+        </p:sp>
+        <p:sp>
+          <p:nvSpPr>
+            <p:cNvPr id="7" name="TextBox 6"/>
+            <p:cNvSpPr txBox="1"/>
+            <p:nvPr/>
+          </p:nvSpPr>
+          <p:spPr>
+            <a:xfrm>
+              <a:off x="582555" y="2934206"/>
+              <a:ext cx="8180445" cy="1569660"/>
+            </a:xfrm>
+            <a:prstGeom prst="rect">
+              <a:avLst/>
+            </a:prstGeom>
+            <a:noFill/>
+          </p:spPr>
+          <p:txBody>
+            <a:bodyPr wrap="none" rtlCol="0">
+              <a:spAutoFit/>
+            </a:bodyPr>
+            <a:lstStyle/>
+            <a:p>
+              <a:r>
+                <a:rPr lang="en-US" sz="1200" dirty="0">
+                  <a:latin typeface="Courier New" pitchFamily="49" charset="0"/>
+                  <a:cs typeface="Courier New" pitchFamily="49" charset="0"/>
+                </a:rPr>
+                <a:t>&lt;?xml version="1.0" ?&gt;&lt;root</a:t>
+              </a:r>
+              <a:r>
+                <a:rPr lang="en-US" sz="1200" dirty="0" smtClean="0">
+                  <a:latin typeface="Courier New" pitchFamily="49" charset="0"/>
+                  <a:cs typeface="Courier New" pitchFamily="49" charset="0"/>
+                </a:rPr>
+                <a:t>&gt;</a:t>
+              </a:r>
+            </a:p>
+            <a:p>
+              <a:r>
+                <a:rPr lang="en-US" sz="1200" dirty="0" smtClean="0">
+                  <a:latin typeface="Courier New" pitchFamily="49" charset="0"/>
+                  <a:cs typeface="Courier New" pitchFamily="49" charset="0"/>
+                </a:rPr>
+                <a:t> </a:t>
+              </a:r>
+              <a:r>
+                <a:rPr lang="en-US" sz="1200" dirty="0">
+                  <a:latin typeface="Courier New" pitchFamily="49" charset="0"/>
+                  <a:cs typeface="Courier New" pitchFamily="49" charset="0"/>
+                </a:rPr>
+                <a:t>&lt;!--Force field template file-</a:t>
+              </a:r>
+              <a:r>
+                <a:rPr lang="en-US" sz="1200" dirty="0" smtClean="0">
+                  <a:latin typeface="Courier New" pitchFamily="49" charset="0"/>
+                  <a:cs typeface="Courier New" pitchFamily="49" charset="0"/>
+                </a:rPr>
+                <a:t>-&gt;</a:t>
+              </a:r>
+            </a:p>
+            <a:p>
+              <a:r>
+                <a:rPr lang="en-US" sz="1200" dirty="0" smtClean="0">
+                  <a:latin typeface="Courier New" pitchFamily="49" charset="0"/>
+                  <a:cs typeface="Courier New" pitchFamily="49" charset="0"/>
+                </a:rPr>
+                <a:t> </a:t>
+              </a:r>
+              <a:r>
+                <a:rPr lang="en-US" sz="1200" dirty="0">
+                  <a:latin typeface="Courier New" pitchFamily="49" charset="0"/>
+                  <a:cs typeface="Courier New" pitchFamily="49" charset="0"/>
+                </a:rPr>
+                <a:t>&lt;FFParams&gt; </a:t>
+              </a:r>
+              <a:endParaRPr lang="en-US" sz="1200" dirty="0" smtClean="0">
+                <a:latin typeface="Courier New" pitchFamily="49" charset="0"/>
+                <a:cs typeface="Courier New" pitchFamily="49" charset="0"/>
+              </a:endParaRPr>
+            </a:p>
+            <a:p>
+              <a:r>
+                <a:rPr lang="en-US" sz="1200" dirty="0" smtClean="0">
+                  <a:latin typeface="Courier New" pitchFamily="49" charset="0"/>
+                  <a:cs typeface="Courier New" pitchFamily="49" charset="0"/>
+                </a:rPr>
+                <a:t>   </a:t>
+              </a:r>
+              <a:r>
+                <a:rPr lang="en-US" sz="1200" dirty="0">
+                  <a:latin typeface="Courier New" pitchFamily="49" charset="0"/>
+                  <a:cs typeface="Courier New" pitchFamily="49" charset="0"/>
+                </a:rPr>
+                <a:t>&lt;FFParam constraint="-2*FF1" name="FF2</a:t>
+              </a:r>
+              <a:r>
+                <a:rPr lang="en-US" sz="1200" dirty="0" smtClean="0">
+                  <a:latin typeface="Courier New" pitchFamily="49" charset="0"/>
+                  <a:cs typeface="Courier New" pitchFamily="49" charset="0"/>
+                </a:rPr>
+                <a:t>"/&gt;</a:t>
+              </a:r>
+            </a:p>
+            <a:p>
+              <a:r>
+                <a:rPr lang="en-US" sz="1200" dirty="0" smtClean="0">
+                  <a:latin typeface="Courier New" pitchFamily="49" charset="0"/>
+                  <a:cs typeface="Courier New" pitchFamily="49" charset="0"/>
+                </a:rPr>
+                <a:t>    </a:t>
+              </a:r>
+              <a:r>
+                <a:rPr lang="en-US" sz="1200" dirty="0">
+                  <a:latin typeface="Courier New" pitchFamily="49" charset="0"/>
+                  <a:cs typeface="Courier New" pitchFamily="49" charset="0"/>
+                </a:rPr>
+                <a:t>&lt;FFParam initial="0.45" maximum="0.6" minimum="0.3" name="FF1" tolerance="0.01"/&gt; </a:t>
+              </a:r>
+              <a:endParaRPr lang="en-US" sz="1200" dirty="0" smtClean="0">
+                <a:latin typeface="Courier New" pitchFamily="49" charset="0"/>
+                <a:cs typeface="Courier New" pitchFamily="49" charset="0"/>
+              </a:endParaRPr>
+            </a:p>
+            <a:p>
+              <a:r>
+                <a:rPr lang="en-US" sz="1200" dirty="0" smtClean="0">
+                  <a:latin typeface="Courier New" pitchFamily="49" charset="0"/>
+                  <a:cs typeface="Courier New" pitchFamily="49" charset="0"/>
+                </a:rPr>
+                <a:t> </a:t>
+              </a:r>
+              <a:r>
+                <a:rPr lang="en-US" sz="1200" dirty="0">
+                  <a:latin typeface="Courier New" pitchFamily="49" charset="0"/>
+                  <a:cs typeface="Courier New" pitchFamily="49" charset="0"/>
+                </a:rPr>
+                <a:t>&lt;/FFParams</a:t>
+              </a:r>
+              <a:r>
+                <a:rPr lang="en-US" sz="1200" dirty="0" smtClean="0">
+                  <a:latin typeface="Courier New" pitchFamily="49" charset="0"/>
+                  <a:cs typeface="Courier New" pitchFamily="49" charset="0"/>
+                </a:rPr>
+                <a:t>&gt;</a:t>
+              </a:r>
+            </a:p>
+            <a:p>
+              <a:r>
+                <a:rPr lang="en-US" sz="1200" dirty="0" smtClean="0">
+                  <a:latin typeface="Courier New" pitchFamily="49" charset="0"/>
+                  <a:cs typeface="Courier New" pitchFamily="49" charset="0"/>
+                </a:rPr>
+                <a:t> &lt;</a:t>
+              </a:r>
+              <a:r>
+                <a:rPr lang="en-US" sz="1200" dirty="0" err="1" smtClean="0">
+                  <a:latin typeface="Courier New" pitchFamily="49" charset="0"/>
+                  <a:cs typeface="Courier New" pitchFamily="49" charset="0"/>
+                </a:rPr>
+                <a:t>FFTemplate</a:t>
+              </a:r>
+              <a:r>
+                <a:rPr lang="en-US" sz="1200" dirty="0" smtClean="0">
+                  <a:latin typeface="Courier New" pitchFamily="49" charset="0"/>
+                  <a:cs typeface="Courier New" pitchFamily="49" charset="0"/>
+                </a:rPr>
+                <a:t>&gt;PSF</a:t>
+              </a:r>
+            </a:p>
+            <a:p>
+              <a:endParaRPr lang="en-US" sz="1200" dirty="0">
+                <a:latin typeface="Courier New" pitchFamily="49" charset="0"/>
+                <a:cs typeface="Courier New" pitchFamily="49" charset="0"/>
+              </a:endParaRPr>
+            </a:p>
+          </p:txBody>
+        </p:sp>
+      </p:grpSp>
+      <p:cxnSp>
+        <p:nvCxnSpPr>
+          <p:cNvPr id="9" name="Straight Arrow Connector 8"/>
+          <p:cNvCxnSpPr/>
+          <p:nvPr/>
+        </p:nvCxnSpPr>
+        <p:spPr>
+          <a:xfrm flipV="1">
+            <a:off x="1828800" y="2514600"/>
+            <a:ext cx="1752600" cy="2514600"/>
+          </a:xfrm>
+          <a:prstGeom prst="straightConnector1">
+            <a:avLst/>
+          </a:prstGeom>
+          <a:ln w="19050">
+            <a:tailEnd type="arrow"/>
+          </a:ln>
+        </p:spPr>
+        <p:style>
+          <a:lnRef idx="1">
+            <a:schemeClr val="dk1"/>
+          </a:lnRef>
+          <a:fillRef idx="0">
+            <a:schemeClr val="dk1"/>
+          </a:fillRef>
+          <a:effectRef idx="0">
+            <a:schemeClr val="dk1"/>
+          </a:effectRef>
+          <a:fontRef idx="minor">
+            <a:schemeClr val="tx1"/>
+          </a:fontRef>
+        </p:style>
+      </p:cxnSp>
+      <p:sp>
+        <p:nvSpPr>
+          <p:cNvPr id="11" name="TextBox 10"/>
+          <p:cNvSpPr txBox="1"/>
+          <p:nvPr/>
+        </p:nvSpPr>
+        <p:spPr>
+          <a:xfrm>
+            <a:off x="81981" y="1066800"/>
+            <a:ext cx="3270820" cy="830997"/>
+          </a:xfrm>
+          <a:prstGeom prst="rect">
+            <a:avLst/>
+          </a:prstGeom>
+          <a:noFill/>
+        </p:spPr>
+        <p:txBody>
+          <a:bodyPr wrap="square" rtlCol="0">
+            <a:spAutoFit/>
+          </a:bodyPr>
+          <a:lstStyle/>
+          <a:p>
+            <a:pPr marL="115888" indent="-115888">
+              <a:buFont typeface="Arial" pitchFamily="34" charset="0"/>
+              <a:buChar char="•"/>
+            </a:pPr>
+            <a:r>
+              <a:rPr lang="en-US" sz="1600" dirty="0" smtClean="0"/>
+              <a:t>Offer a limited library of template user files to the user</a:t>
+            </a:r>
+          </a:p>
+          <a:p>
+            <a:pPr marL="115888" indent="-115888">
+              <a:buFont typeface="Arial" pitchFamily="34" charset="0"/>
+              <a:buChar char="•"/>
+            </a:pPr>
+            <a:r>
+              <a:rPr lang="en-US" sz="1600" dirty="0" smtClean="0"/>
+              <a:t>Allow user to pass its own template</a:t>
+            </a:r>
+            <a:endParaRPr lang="en-US" sz="1600" dirty="0"/>
+          </a:p>
+        </p:txBody>
+      </p:sp>
+      <p:sp>
+        <p:nvSpPr>
+          <p:cNvPr id="12" name="Right Brace 11"/>
+          <p:cNvSpPr/>
+          <p:nvPr/>
+        </p:nvSpPr>
+        <p:spPr>
+          <a:xfrm>
+            <a:off x="3124200" y="1066800"/>
+            <a:ext cx="228600" cy="830997"/>
+          </a:xfrm>
+          <a:prstGeom prst="rightBrace">
+            <a:avLst/>
+          </a:prstGeom>
+          <a:ln w="19050"/>
+        </p:spPr>
+        <p:style>
+          <a:lnRef idx="1">
+            <a:schemeClr val="dk1"/>
+          </a:lnRef>
+          <a:fillRef idx="0">
+            <a:schemeClr val="dk1"/>
+          </a:fillRef>
+          <a:effectRef idx="0">
+            <a:schemeClr val="dk1"/>
+          </a:effectRef>
+          <a:fontRef idx="minor">
+            <a:schemeClr val="tx1"/>
+          </a:fontRef>
+        </p:style>
+        <p:txBody>
+          <a:bodyPr rtlCol="0" anchor="ctr"/>
+          <a:lstStyle/>
+          <a:p>
+            <a:pPr algn="ctr"/>
+            <a:endParaRPr lang="en-US"/>
+          </a:p>
+        </p:txBody>
+      </p:sp>
+      <p:sp>
+        <p:nvSpPr>
+          <p:cNvPr id="13" name="TextBox 12"/>
+          <p:cNvSpPr txBox="1"/>
+          <p:nvPr/>
+        </p:nvSpPr>
+        <p:spPr>
+          <a:xfrm>
+            <a:off x="6154757" y="2362200"/>
+            <a:ext cx="2654894" cy="3108543"/>
+          </a:xfrm>
+          <a:prstGeom prst="rect">
+            <a:avLst/>
+          </a:prstGeom>
+          <a:noFill/>
+        </p:spPr>
+        <p:txBody>
+          <a:bodyPr wrap="none" rtlCol="0">
+            <a:spAutoFit/>
+          </a:bodyPr>
+          <a:lstStyle/>
+          <a:p>
+            <a:r>
+              <a:rPr lang="en-US" sz="1400" dirty="0" smtClean="0">
+                <a:latin typeface="Courier New" pitchFamily="49" charset="0"/>
+                <a:cs typeface="Courier New" pitchFamily="49" charset="0"/>
+              </a:rPr>
+              <a:t>...</a:t>
+            </a:r>
+          </a:p>
+          <a:p>
+            <a:r>
+              <a:rPr lang="fr-FR" sz="1400" dirty="0">
+                <a:latin typeface="Courier New" pitchFamily="49" charset="0"/>
+                <a:cs typeface="Courier New" pitchFamily="49" charset="0"/>
+              </a:rPr>
+              <a:t>method</a:t>
+            </a:r>
+            <a:r>
+              <a:rPr lang="fr-FR" sz="1400" dirty="0" smtClean="0">
+                <a:latin typeface="Courier New" pitchFamily="49" charset="0"/>
+                <a:cs typeface="Courier New" pitchFamily="49" charset="0"/>
+              </a:rPr>
+              <a:t>,</a:t>
+            </a:r>
+          </a:p>
+          <a:p>
+            <a:r>
+              <a:rPr lang="fr-FR" sz="1400" dirty="0" smtClean="0">
+                <a:latin typeface="Courier New" pitchFamily="49" charset="0"/>
+                <a:cs typeface="Courier New" pitchFamily="49" charset="0"/>
+              </a:rPr>
+              <a:t>  dot_mmfd,</a:t>
+            </a:r>
+          </a:p>
+          <a:p>
+            <a:r>
+              <a:rPr lang="fr-FR" sz="1400" dirty="0" smtClean="0">
+                <a:latin typeface="Courier New" pitchFamily="49" charset="0"/>
+                <a:cs typeface="Courier New" pitchFamily="49" charset="0"/>
+              </a:rPr>
+              <a:t>  </a:t>
+            </a:r>
+            <a:r>
+              <a:rPr lang="fr-FR" sz="1400" dirty="0">
+                <a:latin typeface="Courier New" pitchFamily="49" charset="0"/>
+                <a:cs typeface="Courier New" pitchFamily="49" charset="0"/>
+              </a:rPr>
+              <a:t>max_iterations = </a:t>
+            </a:r>
+            <a:r>
+              <a:rPr lang="fr-FR" sz="1400" dirty="0" smtClean="0">
+                <a:latin typeface="Courier New" pitchFamily="49" charset="0"/>
+                <a:cs typeface="Courier New" pitchFamily="49" charset="0"/>
+              </a:rPr>
+              <a:t>20</a:t>
+            </a:r>
+            <a:endParaRPr lang="en-US" sz="1400" dirty="0" smtClean="0">
+              <a:latin typeface="Courier New" pitchFamily="49" charset="0"/>
+              <a:cs typeface="Courier New" pitchFamily="49" charset="0"/>
+            </a:endParaRPr>
+          </a:p>
+          <a:p>
+            <a:r>
+              <a:rPr lang="en-US" sz="1400" dirty="0" smtClean="0">
+                <a:latin typeface="Courier New" pitchFamily="49" charset="0"/>
+                <a:cs typeface="Courier New" pitchFamily="49" charset="0"/>
+              </a:rPr>
+              <a:t>variables,</a:t>
+            </a:r>
+          </a:p>
+          <a:p>
+            <a:r>
+              <a:rPr lang="en-US" sz="1400" dirty="0" smtClean="0">
+                <a:latin typeface="Courier New" pitchFamily="49" charset="0"/>
+                <a:cs typeface="Courier New" pitchFamily="49" charset="0"/>
+              </a:rPr>
+              <a:t>  </a:t>
+            </a:r>
+            <a:r>
+              <a:rPr lang="en-US" sz="1400" dirty="0">
+                <a:latin typeface="Courier New" pitchFamily="49" charset="0"/>
+                <a:cs typeface="Courier New" pitchFamily="49" charset="0"/>
+              </a:rPr>
+              <a:t>continuous_design = </a:t>
+            </a:r>
+            <a:r>
+              <a:rPr lang="en-US" sz="1400" dirty="0" smtClean="0">
+                <a:latin typeface="Courier New" pitchFamily="49" charset="0"/>
+                <a:cs typeface="Courier New" pitchFamily="49" charset="0"/>
+              </a:rPr>
+              <a:t>2</a:t>
+            </a:r>
+          </a:p>
+          <a:p>
+            <a:r>
+              <a:rPr lang="en-US" sz="1400" dirty="0" smtClean="0">
+                <a:latin typeface="Courier New" pitchFamily="49" charset="0"/>
+                <a:cs typeface="Courier New" pitchFamily="49" charset="0"/>
+              </a:rPr>
+              <a:t>  </a:t>
+            </a:r>
+            <a:r>
+              <a:rPr lang="en-US" sz="1400" dirty="0">
+                <a:latin typeface="Courier New" pitchFamily="49" charset="0"/>
+                <a:cs typeface="Courier New" pitchFamily="49" charset="0"/>
+              </a:rPr>
+              <a:t>descriptors	</a:t>
+            </a:r>
+            <a:r>
+              <a:rPr lang="en-US" sz="1400" dirty="0" smtClean="0">
+                <a:latin typeface="Courier New" pitchFamily="49" charset="0"/>
+                <a:cs typeface="Courier New" pitchFamily="49" charset="0"/>
+              </a:rPr>
+              <a:t>FF1</a:t>
+            </a:r>
+          </a:p>
+          <a:p>
+            <a:r>
+              <a:rPr lang="en-US" sz="1400" dirty="0">
+                <a:latin typeface="Courier New" pitchFamily="49" charset="0"/>
+                <a:cs typeface="Courier New" pitchFamily="49" charset="0"/>
+              </a:rPr>
+              <a:t> </a:t>
+            </a:r>
+            <a:r>
+              <a:rPr lang="en-US" sz="1400" dirty="0" smtClean="0">
+                <a:latin typeface="Courier New" pitchFamily="49" charset="0"/>
+                <a:cs typeface="Courier New" pitchFamily="49" charset="0"/>
+              </a:rPr>
+              <a:t> initial_point</a:t>
+            </a:r>
+            <a:r>
+              <a:rPr lang="en-US" sz="1400" dirty="0">
+                <a:latin typeface="Courier New" pitchFamily="49" charset="0"/>
+                <a:cs typeface="Courier New" pitchFamily="49" charset="0"/>
+              </a:rPr>
+              <a:t>	</a:t>
+            </a:r>
+            <a:r>
+              <a:rPr lang="en-US" sz="1400" dirty="0" smtClean="0">
+                <a:latin typeface="Courier New" pitchFamily="49" charset="0"/>
+                <a:cs typeface="Courier New" pitchFamily="49" charset="0"/>
+              </a:rPr>
+              <a:t>0.45</a:t>
+            </a:r>
+          </a:p>
+          <a:p>
+            <a:r>
+              <a:rPr lang="en-US" sz="1400" dirty="0">
+                <a:latin typeface="Courier New" pitchFamily="49" charset="0"/>
+                <a:cs typeface="Courier New" pitchFamily="49" charset="0"/>
+              </a:rPr>
+              <a:t> </a:t>
+            </a:r>
+            <a:r>
+              <a:rPr lang="en-US" sz="1400" dirty="0" smtClean="0">
+                <a:latin typeface="Courier New" pitchFamily="49" charset="0"/>
+                <a:cs typeface="Courier New" pitchFamily="49" charset="0"/>
+              </a:rPr>
+              <a:t> lower_bounds</a:t>
+            </a:r>
+            <a:r>
+              <a:rPr lang="en-US" sz="1400" dirty="0">
+                <a:latin typeface="Courier New" pitchFamily="49" charset="0"/>
+                <a:cs typeface="Courier New" pitchFamily="49" charset="0"/>
+              </a:rPr>
+              <a:t>	</a:t>
+            </a:r>
+            <a:r>
+              <a:rPr lang="en-US" sz="1400" dirty="0" smtClean="0">
+                <a:latin typeface="Courier New" pitchFamily="49" charset="0"/>
+                <a:cs typeface="Courier New" pitchFamily="49" charset="0"/>
+              </a:rPr>
+              <a:t>0.3</a:t>
+            </a:r>
+          </a:p>
+          <a:p>
+            <a:r>
+              <a:rPr lang="en-US" sz="1400" dirty="0">
+                <a:latin typeface="Courier New" pitchFamily="49" charset="0"/>
+                <a:cs typeface="Courier New" pitchFamily="49" charset="0"/>
+              </a:rPr>
+              <a:t> </a:t>
+            </a:r>
+            <a:r>
+              <a:rPr lang="en-US" sz="1400" dirty="0" smtClean="0">
+                <a:latin typeface="Courier New" pitchFamily="49" charset="0"/>
+                <a:cs typeface="Courier New" pitchFamily="49" charset="0"/>
+              </a:rPr>
+              <a:t> upper_bounds</a:t>
+            </a:r>
+            <a:r>
+              <a:rPr lang="en-US" sz="1400" dirty="0">
+                <a:latin typeface="Courier New" pitchFamily="49" charset="0"/>
+                <a:cs typeface="Courier New" pitchFamily="49" charset="0"/>
+              </a:rPr>
+              <a:t>	</a:t>
+            </a:r>
+            <a:r>
+              <a:rPr lang="en-US" sz="1400" dirty="0" smtClean="0">
+                <a:latin typeface="Courier New" pitchFamily="49" charset="0"/>
+                <a:cs typeface="Courier New" pitchFamily="49" charset="0"/>
+              </a:rPr>
+              <a:t>0.6</a:t>
+            </a:r>
+          </a:p>
+          <a:p>
+            <a:r>
+              <a:rPr lang="en-US" sz="1400" dirty="0">
+                <a:latin typeface="Courier New" pitchFamily="49" charset="0"/>
+                <a:cs typeface="Courier New" pitchFamily="49" charset="0"/>
+              </a:rPr>
+              <a:t> </a:t>
+            </a:r>
+            <a:r>
+              <a:rPr lang="en-US" sz="1400" dirty="0" smtClean="0">
+                <a:latin typeface="Courier New" pitchFamily="49" charset="0"/>
+                <a:cs typeface="Courier New" pitchFamily="49" charset="0"/>
+              </a:rPr>
+              <a:t> max_step</a:t>
+            </a:r>
+            <a:r>
+              <a:rPr lang="en-US" sz="1400" dirty="0">
+                <a:latin typeface="Courier New" pitchFamily="49" charset="0"/>
+                <a:cs typeface="Courier New" pitchFamily="49" charset="0"/>
+              </a:rPr>
+              <a:t>	</a:t>
+            </a:r>
+            <a:r>
+              <a:rPr lang="en-US" sz="1400" dirty="0" smtClean="0">
+                <a:latin typeface="Courier New" pitchFamily="49" charset="0"/>
+                <a:cs typeface="Courier New" pitchFamily="49" charset="0"/>
+              </a:rPr>
+              <a:t>0.01</a:t>
+            </a:r>
+          </a:p>
+          <a:p>
+            <a:r>
+              <a:rPr lang="en-US" sz="1400" dirty="0">
+                <a:latin typeface="Courier New" pitchFamily="49" charset="0"/>
+                <a:cs typeface="Courier New" pitchFamily="49" charset="0"/>
+              </a:rPr>
+              <a:t>interface</a:t>
+            </a:r>
+            <a:r>
+              <a:rPr lang="en-US" sz="1400" dirty="0" smtClean="0">
+                <a:latin typeface="Courier New" pitchFamily="49" charset="0"/>
+                <a:cs typeface="Courier New" pitchFamily="49" charset="0"/>
+              </a:rPr>
+              <a:t>,</a:t>
+            </a:r>
+          </a:p>
+          <a:p>
+            <a:r>
+              <a:rPr lang="en-US" sz="1400" dirty="0" smtClean="0">
+                <a:latin typeface="Courier New" pitchFamily="49" charset="0"/>
+                <a:cs typeface="Courier New" pitchFamily="49" charset="0"/>
+              </a:rPr>
+              <a:t>  fork</a:t>
+            </a:r>
+          </a:p>
+          <a:p>
+            <a:r>
+              <a:rPr lang="en-US" sz="1400" dirty="0" smtClean="0">
+                <a:latin typeface="Courier New" pitchFamily="49" charset="0"/>
+                <a:cs typeface="Courier New" pitchFamily="49" charset="0"/>
+              </a:rPr>
+              <a:t>...</a:t>
+            </a:r>
+            <a:endParaRPr lang="en-US" sz="1400" dirty="0">
+              <a:latin typeface="Courier New" pitchFamily="49" charset="0"/>
+              <a:cs typeface="Courier New" pitchFamily="49" charset="0"/>
+            </a:endParaRPr>
+          </a:p>
+        </p:txBody>
+      </p:sp>
+      <p:sp>
+        <p:nvSpPr>
+          <p:cNvPr id="15" name="Rectangle 14"/>
+          <p:cNvSpPr/>
+          <p:nvPr/>
+        </p:nvSpPr>
+        <p:spPr>
+          <a:xfrm>
+            <a:off x="6096000" y="2362200"/>
+            <a:ext cx="2743200" cy="3108543"/>
+          </a:xfrm>
+          <a:prstGeom prst="rect">
+            <a:avLst/>
+          </a:prstGeom>
+          <a:noFill/>
+          <a:ln>
+            <a:solidFill>
+              <a:schemeClr val="tx1"/>
+            </a:solidFill>
+          </a:ln>
+        </p:spPr>
+        <p:style>
+          <a:lnRef idx="2">
+            <a:schemeClr val="accent1">
+              <a:shade val="50000"/>
+            </a:schemeClr>
+          </a:lnRef>
+          <a:fillRef idx="1">
+            <a:schemeClr val="accent1"/>
+          </a:fillRef>
+          <a:effectRef idx="0">
+            <a:schemeClr val="accent1"/>
+          </a:effectRef>
+          <a:fontRef idx="minor">
+            <a:schemeClr val="lt1"/>
+          </a:fontRef>
+        </p:style>
+        <p:txBody>
+          <a:bodyPr rtlCol="0" anchor="ctr"/>
+          <a:lstStyle/>
+          <a:p>
+            <a:pPr algn="ctr"/>
+            <a:endParaRPr lang="en-US"/>
+          </a:p>
+        </p:txBody>
+      </p:sp>
+      <p:cxnSp>
+        <p:nvCxnSpPr>
+          <p:cNvPr id="17" name="Straight Arrow Connector 16"/>
+          <p:cNvCxnSpPr/>
+          <p:nvPr/>
+        </p:nvCxnSpPr>
+        <p:spPr>
+          <a:xfrm flipV="1">
+            <a:off x="7239000" y="2133600"/>
+            <a:ext cx="228600" cy="228600"/>
+          </a:xfrm>
+          <a:prstGeom prst="straightConnector1">
+            <a:avLst/>
+          </a:prstGeom>
+          <a:ln w="19050">
+            <a:solidFill>
+              <a:schemeClr val="tx1"/>
+            </a:solidFill>
+            <a:tailEnd type="arrow"/>
+          </a:ln>
+        </p:spPr>
+        <p:style>
+          <a:lnRef idx="1">
+            <a:schemeClr val="accent1"/>
+          </a:lnRef>
+          <a:fillRef idx="0">
+            <a:schemeClr val="accent1"/>
+          </a:fillRef>
+          <a:effectRef idx="0">
+            <a:schemeClr val="accent1"/>
+          </a:effectRef>
+          <a:fontRef idx="minor">
+            <a:schemeClr val="tx1"/>
+          </a:fontRef>
+        </p:style>
+      </p:cxnSp>
     </p:spTree>
     <p:extLst>
       <p:ext uri="{BB962C8B-B14F-4D97-AF65-F5344CB8AC3E}">
-        <p14:creationId xmlns:p14="http://schemas.microsoft.com/office/powerpoint/2010/main" val="3030567081"/>
+        <p14:creationId xmlns:p14="http://schemas.microsoft.com/office/powerpoint/2010/main" val="2592251411"/>
       </p:ext>
     </p:extLst>
   </p:cSld>
@@ -11831,7 +12809,7 @@
                 </a:solidFill>
                 <a:latin typeface="Arial Black" pitchFamily="34" charset="0"/>
               </a:rPr>
-              <a:t>Title</a:t>
+              <a:t>Force Field Update Script</a:t>
             </a:r>
             <a:endParaRPr lang="en-US" sz="2800" dirty="0">
               <a:solidFill>
@@ -11842,6 +12820,45 @@
           </a:p>
         </p:txBody>
       </p:sp>
+      <p:pic>
+        <p:nvPicPr>
+          <p:cNvPr id="5122" name="Picture 2" descr="C:\Documents and Settings\Jose Borreguero\My Documents\projects\development\CAMM\github\documents\Jose\ForceFieldUpdater.png"/>
+          <p:cNvPicPr>
+            <a:picLocks noChangeAspect="1" noChangeArrowheads="1"/>
+          </p:cNvPicPr>
+          <p:nvPr/>
+        </p:nvPicPr>
+        <p:blipFill rotWithShape="1">
+          <a:blip r:embed="rId2">
+            <a:extLst>
+              <a:ext uri="{28A0092B-C50C-407E-A947-70E740481C1C}">
+                <a14:useLocalDpi xmlns:a14="http://schemas.microsoft.com/office/drawing/2010/main" val="0"/>
+              </a:ext>
+            </a:extLst>
+          </a:blip>
+          <a:srcRect l="13078" t="9785" r="52349" b="74530"/>
+          <a:stretch/>
+        </p:blipFill>
+        <p:spPr bwMode="auto">
+          <a:xfrm>
+            <a:off x="1676400" y="838200"/>
+            <a:ext cx="5310258" cy="3117774"/>
+          </a:xfrm>
+          <a:prstGeom prst="rect">
+            <a:avLst/>
+          </a:prstGeom>
+          <a:noFill/>
+          <a:extLst>
+            <a:ext uri="{909E8E84-426E-40DD-AFC4-6F175D3DCCD1}">
+              <a14:hiddenFill xmlns:a14="http://schemas.microsoft.com/office/drawing/2010/main">
+                <a:solidFill>
+                  <a:srgbClr val="FFFFFF"/>
+                </a:solidFill>
+              </a14:hiddenFill>
+            </a:ext>
+          </a:extLst>
+        </p:spPr>
+      </p:pic>
     </p:spTree>
     <p:extLst>
       <p:ext uri="{BB962C8B-B14F-4D97-AF65-F5344CB8AC3E}">
@@ -11881,295 +12898,7 @@
       </p:grpSpPr>
       <p:sp>
         <p:nvSpPr>
-          <p:cNvPr id="3" name="TextBox 2"/>
-          <p:cNvSpPr txBox="1"/>
-          <p:nvPr/>
-        </p:nvSpPr>
-        <p:spPr>
-          <a:xfrm>
-            <a:off x="228598" y="2057400"/>
-            <a:ext cx="6306535" cy="3754874"/>
-          </a:xfrm>
-          <a:prstGeom prst="rect">
-            <a:avLst/>
-          </a:prstGeom>
-          <a:noFill/>
-        </p:spPr>
-        <p:txBody>
-          <a:bodyPr wrap="none" rtlCol="0">
-            <a:spAutoFit/>
-          </a:bodyPr>
-          <a:lstStyle/>
-          <a:p>
-            <a:r>
-              <a:rPr lang="en-US" sz="1400" dirty="0">
-                <a:latin typeface="Courier New" pitchFamily="49" charset="0"/>
-                <a:cs typeface="Courier New" pitchFamily="49" charset="0"/>
-              </a:rPr>
-              <a:t>!FFPARAMS</a:t>
-            </a:r>
-          </a:p>
-          <a:p>
-            <a:r>
-              <a:rPr lang="en-US" sz="1400" dirty="0">
-                <a:latin typeface="Courier New" pitchFamily="49" charset="0"/>
-                <a:cs typeface="Courier New" pitchFamily="49" charset="0"/>
-              </a:rPr>
-              <a:t>#Force Field Parameters</a:t>
-            </a:r>
-          </a:p>
-          <a:p>
-            <a:r>
-              <a:rPr lang="en-US" sz="1400" dirty="0">
-                <a:latin typeface="Courier New" pitchFamily="49" charset="0"/>
-                <a:cs typeface="Courier New" pitchFamily="49" charset="0"/>
-              </a:rPr>
-              <a:t>FF1  # partial charge at oxygen atom in water molecule</a:t>
-            </a:r>
-          </a:p>
-          <a:p>
-            <a:r>
-              <a:rPr lang="en-US" sz="1400" dirty="0">
-                <a:latin typeface="Courier New" pitchFamily="49" charset="0"/>
-                <a:cs typeface="Courier New" pitchFamily="49" charset="0"/>
-              </a:rPr>
-              <a:t>FF2  # partial charge at hydrogen atom in water molecule</a:t>
-            </a:r>
-          </a:p>
-          <a:p>
-            <a:endParaRPr lang="en-US" sz="1400" dirty="0">
-              <a:latin typeface="Courier New" pitchFamily="49" charset="0"/>
-              <a:cs typeface="Courier New" pitchFamily="49" charset="0"/>
-            </a:endParaRPr>
-          </a:p>
-          <a:p>
-            <a:r>
-              <a:rPr lang="en-US" sz="1400" dirty="0">
-                <a:latin typeface="Courier New" pitchFamily="49" charset="0"/>
-                <a:cs typeface="Courier New" pitchFamily="49" charset="0"/>
-              </a:rPr>
-              <a:t>!FREEPARAMS</a:t>
-            </a:r>
-          </a:p>
-          <a:p>
-            <a:r>
-              <a:rPr lang="en-US" sz="1400" dirty="0">
-                <a:latin typeface="Courier New" pitchFamily="49" charset="0"/>
-                <a:cs typeface="Courier New" pitchFamily="49" charset="0"/>
-              </a:rPr>
-              <a:t>#Dakota Parameters</a:t>
-            </a:r>
-          </a:p>
-          <a:p>
-            <a:r>
-              <a:rPr lang="en-US" sz="1400" dirty="0">
-                <a:latin typeface="Courier New" pitchFamily="49" charset="0"/>
-                <a:cs typeface="Courier New" pitchFamily="49" charset="0"/>
-              </a:rPr>
-              <a:t>FF2</a:t>
-            </a:r>
-          </a:p>
-          <a:p>
-            <a:endParaRPr lang="en-US" sz="1400" dirty="0">
-              <a:latin typeface="Courier New" pitchFamily="49" charset="0"/>
-              <a:cs typeface="Courier New" pitchFamily="49" charset="0"/>
-            </a:endParaRPr>
-          </a:p>
-          <a:p>
-            <a:r>
-              <a:rPr lang="en-US" sz="1400" dirty="0">
-                <a:latin typeface="Courier New" pitchFamily="49" charset="0"/>
-                <a:cs typeface="Courier New" pitchFamily="49" charset="0"/>
-              </a:rPr>
-              <a:t>!CONSTRAINTS</a:t>
-            </a:r>
-          </a:p>
-          <a:p>
-            <a:r>
-              <a:rPr lang="en-US" sz="1400" dirty="0">
-                <a:latin typeface="Courier New" pitchFamily="49" charset="0"/>
-                <a:cs typeface="Courier New" pitchFamily="49" charset="0"/>
-              </a:rPr>
-              <a:t>#Constraints in explicit form for each non-free parameter</a:t>
-            </a:r>
-          </a:p>
-          <a:p>
-            <a:r>
-              <a:rPr lang="en-US" sz="1400" dirty="0">
-                <a:latin typeface="Courier New" pitchFamily="49" charset="0"/>
-                <a:cs typeface="Courier New" pitchFamily="49" charset="0"/>
-              </a:rPr>
-              <a:t>FF1=-2*FF2 # each water molecule is electrically neutral</a:t>
-            </a:r>
-          </a:p>
-          <a:p>
-            <a:endParaRPr lang="en-US" sz="1400" dirty="0">
-              <a:latin typeface="Courier New" pitchFamily="49" charset="0"/>
-              <a:cs typeface="Courier New" pitchFamily="49" charset="0"/>
-            </a:endParaRPr>
-          </a:p>
-          <a:p>
-            <a:r>
-              <a:rPr lang="en-US" sz="1400" dirty="0">
-                <a:latin typeface="Courier New" pitchFamily="49" charset="0"/>
-                <a:cs typeface="Courier New" pitchFamily="49" charset="0"/>
-              </a:rPr>
-              <a:t>!FFFORMAT</a:t>
-            </a:r>
-          </a:p>
-          <a:p>
-            <a:r>
-              <a:rPr lang="en-US" sz="1400" dirty="0">
-                <a:latin typeface="Courier New" pitchFamily="49" charset="0"/>
-                <a:cs typeface="Courier New" pitchFamily="49" charset="0"/>
-              </a:rPr>
-              <a:t>#Format Force Field Parameters (in C's </a:t>
-            </a:r>
-            <a:r>
-              <a:rPr lang="en-US" sz="1400" dirty="0" err="1">
-                <a:latin typeface="Courier New" pitchFamily="49" charset="0"/>
-                <a:cs typeface="Courier New" pitchFamily="49" charset="0"/>
-              </a:rPr>
-              <a:t>printf</a:t>
-            </a:r>
-            <a:r>
-              <a:rPr lang="en-US" sz="1400" dirty="0">
-                <a:latin typeface="Courier New" pitchFamily="49" charset="0"/>
-                <a:cs typeface="Courier New" pitchFamily="49" charset="0"/>
-              </a:rPr>
-              <a:t> style)</a:t>
-            </a:r>
-          </a:p>
-          <a:p>
-            <a:r>
-              <a:rPr lang="en-US" sz="1400" dirty="0">
-                <a:latin typeface="Courier New" pitchFamily="49" charset="0"/>
-                <a:cs typeface="Courier New" pitchFamily="49" charset="0"/>
-              </a:rPr>
-              <a:t>%9.3f</a:t>
-            </a:r>
-          </a:p>
-          <a:p>
-            <a:r>
-              <a:rPr lang="en-US" sz="1400" dirty="0">
-                <a:latin typeface="Courier New" pitchFamily="49" charset="0"/>
-                <a:cs typeface="Courier New" pitchFamily="49" charset="0"/>
-              </a:rPr>
-              <a:t>%9.3f</a:t>
-            </a:r>
-          </a:p>
-        </p:txBody>
-      </p:sp>
-      <p:sp>
-        <p:nvSpPr>
-          <p:cNvPr id="5" name="TextBox 4"/>
-          <p:cNvSpPr txBox="1"/>
-          <p:nvPr/>
-        </p:nvSpPr>
-        <p:spPr>
-          <a:xfrm>
-            <a:off x="228598" y="609600"/>
-            <a:ext cx="5321778" cy="1295868"/>
-          </a:xfrm>
-          <a:prstGeom prst="rect">
-            <a:avLst/>
-          </a:prstGeom>
-          <a:noFill/>
-        </p:spPr>
-        <p:txBody>
-          <a:bodyPr wrap="none" rtlCol="0">
-            <a:spAutoFit/>
-          </a:bodyPr>
-          <a:lstStyle/>
-          <a:p>
-            <a:pPr>
-              <a:lnSpc>
-                <a:spcPct val="150000"/>
-              </a:lnSpc>
-            </a:pPr>
-            <a:r>
-              <a:rPr lang="en-US" dirty="0" smtClean="0"/>
-              <a:t>Contents divided into:</a:t>
-            </a:r>
-          </a:p>
-          <a:p>
-            <a:pPr marL="577850" indent="-342900">
-              <a:lnSpc>
-                <a:spcPct val="150000"/>
-              </a:lnSpc>
-              <a:buFont typeface="+mj-lt"/>
-              <a:buAutoNum type="arabicPeriod"/>
-            </a:pPr>
-            <a:r>
-              <a:rPr lang="en-US" dirty="0" smtClean="0"/>
-              <a:t> a “mapping” section describing the parameters</a:t>
-            </a:r>
-          </a:p>
-          <a:p>
-            <a:pPr marL="577850" indent="-342900">
-              <a:lnSpc>
-                <a:spcPct val="150000"/>
-              </a:lnSpc>
-              <a:buFont typeface="+mj-lt"/>
-              <a:buAutoNum type="arabicPeriod"/>
-            </a:pPr>
-            <a:r>
-              <a:rPr lang="en-US" dirty="0" smtClean="0"/>
-              <a:t>the force-field where keywords substitute values</a:t>
-            </a:r>
-            <a:endParaRPr lang="en-US" dirty="0"/>
-          </a:p>
-        </p:txBody>
-      </p:sp>
-      <p:sp>
-        <p:nvSpPr>
-          <p:cNvPr id="6" name="Rectangle 5"/>
-          <p:cNvSpPr/>
-          <p:nvPr/>
-        </p:nvSpPr>
-        <p:spPr>
-          <a:xfrm>
-            <a:off x="228598" y="2057400"/>
-            <a:ext cx="6306535" cy="3754874"/>
-          </a:xfrm>
-          <a:prstGeom prst="rect">
-            <a:avLst/>
-          </a:prstGeom>
-          <a:noFill/>
-          <a:ln>
-            <a:solidFill>
-              <a:schemeClr val="tx1"/>
-            </a:solidFill>
-          </a:ln>
-        </p:spPr>
-        <p:style>
-          <a:lnRef idx="2">
-            <a:schemeClr val="accent1">
-              <a:shade val="50000"/>
-            </a:schemeClr>
-          </a:lnRef>
-          <a:fillRef idx="1">
-            <a:schemeClr val="accent1"/>
-          </a:fillRef>
-          <a:effectRef idx="0">
-            <a:schemeClr val="accent1"/>
-          </a:effectRef>
-          <a:fontRef idx="minor">
-            <a:schemeClr val="lt1"/>
-          </a:fontRef>
-        </p:style>
-        <p:txBody>
-          <a:bodyPr rtlCol="0" anchor="ctr"/>
-          <a:lstStyle/>
-          <a:p>
-            <a:pPr algn="ctr"/>
-            <a:endParaRPr lang="en-US"/>
-          </a:p>
-        </p:txBody>
-      </p:sp>
-      <p:sp>
-        <p:nvSpPr>
-          <p:cNvPr id="7" name="TextBox 6"/>
+          <p:cNvPr id="4" name="TextBox 3"/>
           <p:cNvSpPr txBox="1"/>
           <p:nvPr/>
         </p:nvSpPr>
@@ -12191,22 +12920,13 @@
           <a:p>
             <a:pPr algn="ctr"/>
             <a:r>
-              <a:rPr lang="en-US" sz="2800" dirty="0">
-                <a:solidFill>
-                  <a:srgbClr val="005400"/>
-                </a:solidFill>
-                <a:latin typeface="Arial Black" pitchFamily="34" charset="0"/>
-              </a:rPr>
-              <a:t>Force Field Template </a:t>
-            </a:r>
-            <a:r>
               <a:rPr lang="en-US" sz="2800" dirty="0" smtClean="0">
                 <a:solidFill>
                   <a:srgbClr val="005400"/>
                 </a:solidFill>
                 <a:latin typeface="Arial Black" pitchFamily="34" charset="0"/>
               </a:rPr>
-              <a:t>File</a:t>
+              <a:t>Title</a:t>
             </a:r>
             <a:endParaRPr lang="en-US" sz="2800" dirty="0">
               <a:solidFill>
@@ -12220,7 +12940,7 @@
     </p:spTree>
     <p:extLst>
       <p:ext uri="{BB962C8B-B14F-4D97-AF65-F5344CB8AC3E}">
-        <p14:creationId xmlns:p14="http://schemas.microsoft.com/office/powerpoint/2010/main" val="2861303253"/>
+        <p14:creationId xmlns:p14="http://schemas.microsoft.com/office/powerpoint/2010/main" val="3030567081"/>
       </p:ext>
     </p:extLst>
   </p:cSld>
@@ -12256,64 +12976,14 @@
       </p:grpSpPr>
       <p:sp>
         <p:nvSpPr>
-          <p:cNvPr id="4" name="TextBox 3"/>
+          <p:cNvPr id="3" name="TextBox 2"/>
           <p:cNvSpPr txBox="1"/>
           <p:nvPr/>
         </p:nvSpPr>
         <p:spPr>
           <a:xfrm>
-            <a:off x="0" y="0"/>
-            <a:ext cx="9144000" cy="523220"/>
-          </a:xfrm>
-          <a:prstGeom prst="rect">
-            <a:avLst/>
-          </a:prstGeom>
-          <a:noFill/>
-        </p:spPr>
-        <p:txBody>
-          <a:bodyPr wrap="square" rtlCol="0">
-            <a:spAutoFit/>
-          </a:bodyPr>
-          <a:lstStyle/>
-          <a:p>
-            <a:pPr algn="ctr"/>
-            <a:r>
-              <a:rPr lang="en-US" sz="2800" dirty="0">
-                <a:solidFill>
-                  <a:srgbClr val="005400"/>
-                </a:solidFill>
-                <a:latin typeface="Arial Black" pitchFamily="34" charset="0"/>
-              </a:rPr>
-              <a:t>Force Field Template </a:t>
-            </a:r>
-            <a:r>
-              <a:rPr lang="en-US" sz="2800" dirty="0" smtClean="0">
-                <a:solidFill>
-                  <a:srgbClr val="005400"/>
-                </a:solidFill>
-                <a:latin typeface="Arial Black" pitchFamily="34" charset="0"/>
-              </a:rPr>
-              <a:t>File (II)</a:t>
-            </a:r>
-            <a:endParaRPr lang="en-US" sz="2800" dirty="0">
-              <a:solidFill>
-                <a:srgbClr val="005400"/>
-              </a:solidFill>
-              <a:latin typeface="Arial Black" pitchFamily="34" charset="0"/>
-            </a:endParaRPr>
-          </a:p>
-        </p:txBody>
-      </p:sp>
-      <p:sp>
-        <p:nvSpPr>
-          <p:cNvPr id="2" name="TextBox 1"/>
-          <p:cNvSpPr txBox="1"/>
-          <p:nvPr/>
-        </p:nvSpPr>
-        <p:spPr>
-          <a:xfrm>
-            <a:off x="304800" y="914400"/>
-            <a:ext cx="7595349" cy="5047536"/>
+            <a:off x="228598" y="2057400"/>
+            <a:ext cx="6306535" cy="3754874"/>
           </a:xfrm>
           <a:prstGeom prst="rect">
             <a:avLst/>
@@ -12331,7 +13001,34 @@
                 <a:latin typeface="Courier New" pitchFamily="49" charset="0"/>
                 <a:cs typeface="Courier New" pitchFamily="49" charset="0"/>
               </a:rPr>
-              <a:t>PSF</a:t>
+              <a:t>!FFPARAMS</a:t>
+            </a:r>
+          </a:p>
+          <a:p>
+            <a:r>
+              <a:rPr lang="en-US" sz="1400" dirty="0">
+                <a:latin typeface="Courier New" pitchFamily="49" charset="0"/>
+                <a:cs typeface="Courier New" pitchFamily="49" charset="0"/>
+              </a:rPr>
+              <a:t>#Force Field Parameters</a:t>
+            </a:r>
+          </a:p>
+          <a:p>
+            <a:r>
+              <a:rPr lang="en-US" sz="1400" dirty="0">
+                <a:latin typeface="Courier New" pitchFamily="49" charset="0"/>
+                <a:cs typeface="Courier New" pitchFamily="49" charset="0"/>
+              </a:rPr>
+              <a:t>FF1  # partial charge at oxygen atom in water molecule</a:t>
+            </a:r>
+          </a:p>
+          <a:p>
+            <a:r>
+              <a:rPr lang="en-US" sz="1400" dirty="0">
+                <a:latin typeface="Courier New" pitchFamily="49" charset="0"/>
+                <a:cs typeface="Courier New" pitchFamily="49" charset="0"/>
+              </a:rPr>
+              <a:t>FF2  # partial charge at hydrogen atom in water molecule</a:t>
             </a:r>
           </a:p>
           <a:p>
@@ -12346,7 +13043,7 @@
                 <a:latin typeface="Courier New" pitchFamily="49" charset="0"/>
                 <a:cs typeface="Courier New" pitchFamily="49" charset="0"/>
               </a:rPr>
-              <a:t>       5 !NTITLE</a:t>
+              <a:t>!FREEPARAMS</a:t>
             </a:r>
           </a:p>
           <a:p>
@@ -12355,71 +13052,16 @@
                 <a:latin typeface="Courier New" pitchFamily="49" charset="0"/>
                 <a:cs typeface="Courier New" pitchFamily="49" charset="0"/>
               </a:rPr>
-              <a:t> REMARKS original generated structure x-</a:t>
-            </a:r>
-            <a:r>
-              <a:rPr lang="en-US" sz="1400" dirty="0" err="1">
-                <a:latin typeface="Courier New" pitchFamily="49" charset="0"/>
-                <a:cs typeface="Courier New" pitchFamily="49" charset="0"/>
-              </a:rPr>
-              <a:t>plor</a:t>
-            </a:r>
+              <a:t>#Dakota Parameters</a:t>
+            </a:r>
+          </a:p>
+          <a:p>
             <a:r>
               <a:rPr lang="en-US" sz="1400" dirty="0">
                 <a:latin typeface="Courier New" pitchFamily="49" charset="0"/>
                 <a:cs typeface="Courier New" pitchFamily="49" charset="0"/>
               </a:rPr>
-              <a:t> </a:t>
-            </a:r>
-            <a:r>
-              <a:rPr lang="en-US" sz="1400" dirty="0" err="1">
-                <a:latin typeface="Courier New" pitchFamily="49" charset="0"/>
-                <a:cs typeface="Courier New" pitchFamily="49" charset="0"/>
-              </a:rPr>
-              <a:t>psf</a:t>
-            </a:r>
-            <a:r>
-              <a:rPr lang="en-US" sz="1400" dirty="0">
-                <a:latin typeface="Courier New" pitchFamily="49" charset="0"/>
-                <a:cs typeface="Courier New" pitchFamily="49" charset="0"/>
-              </a:rPr>
-              <a:t> file</a:t>
-            </a:r>
-          </a:p>
-          <a:p>
-            <a:r>
-              <a:rPr lang="en-US" sz="1400" dirty="0">
-                <a:latin typeface="Courier New" pitchFamily="49" charset="0"/>
-                <a:cs typeface="Courier New" pitchFamily="49" charset="0"/>
-              </a:rPr>
-              <a:t> REMARKS topology crd.md18_vmd_autopsf-temp.top </a:t>
-            </a:r>
-          </a:p>
-          <a:p>
-            <a:r>
-              <a:rPr lang="en-US" sz="1400" dirty="0">
-                <a:latin typeface="Courier New" pitchFamily="49" charset="0"/>
-                <a:cs typeface="Courier New" pitchFamily="49" charset="0"/>
-              </a:rPr>
-              <a:t> REMARKS segment O1 { first NONE; last NONE; auto angles dihedrals }</a:t>
-            </a:r>
-          </a:p>
-          <a:p>
-            <a:r>
-              <a:rPr lang="en-US" sz="1400" dirty="0">
-                <a:latin typeface="Courier New" pitchFamily="49" charset="0"/>
-                <a:cs typeface="Courier New" pitchFamily="49" charset="0"/>
-              </a:rPr>
-              <a:t> REMARKS segment O2 { first NONE; last NONE; auto angles dihedrals }</a:t>
-            </a:r>
-          </a:p>
-          <a:p>
-            <a:r>
-              <a:rPr lang="en-US" sz="1400" dirty="0">
-                <a:latin typeface="Courier New" pitchFamily="49" charset="0"/>
-                <a:cs typeface="Courier New" pitchFamily="49" charset="0"/>
-              </a:rPr>
-              <a:t> REMARKS segment W1 { first NONE; last NONE; auto angles dihedrals }</a:t>
+              <a:t>FF2</a:t>
             </a:r>
           </a:p>
           <a:p>
@@ -12430,25 +13072,11 @@
           </a:p>
           <a:p>
             <a:r>
-              <a:rPr lang="en-US" sz="1400" dirty="0" smtClean="0">
-                <a:latin typeface="Courier New" pitchFamily="49" charset="0"/>
-                <a:cs typeface="Courier New" pitchFamily="49" charset="0"/>
-              </a:rPr>
-              <a:t>3692 </a:t>
-            </a:r>
-            <a:r>
               <a:rPr lang="en-US" sz="1400" dirty="0">
                 <a:latin typeface="Courier New" pitchFamily="49" charset="0"/>
                 <a:cs typeface="Courier New" pitchFamily="49" charset="0"/>
               </a:rPr>
-              <a:t>!</a:t>
-            </a:r>
-            <a:r>
-              <a:rPr lang="en-US" sz="1400" dirty="0" smtClean="0">
-                <a:latin typeface="Courier New" pitchFamily="49" charset="0"/>
-                <a:cs typeface="Courier New" pitchFamily="49" charset="0"/>
-              </a:rPr>
-              <a:t>NATOM</a:t>
+              <a:t>!CONSTRAINTS</a:t>
             </a:r>
           </a:p>
           <a:p>
@@ -12457,837 +13085,147 @@
                 <a:latin typeface="Courier New" pitchFamily="49" charset="0"/>
                 <a:cs typeface="Courier New" pitchFamily="49" charset="0"/>
               </a:rPr>
-              <a:t> </a:t>
-            </a:r>
-            <a:r>
-              <a:rPr lang="en-US" sz="1400" dirty="0" smtClean="0">
-                <a:latin typeface="Courier New" pitchFamily="49" charset="0"/>
-                <a:cs typeface="Courier New" pitchFamily="49" charset="0"/>
-              </a:rPr>
-              <a:t>  1 </a:t>
-            </a:r>
+              <a:t>#Constraints in explicit form for each non-free parameter</a:t>
+            </a:r>
+          </a:p>
+          <a:p>
             <a:r>
               <a:rPr lang="en-US" sz="1400" dirty="0">
                 <a:latin typeface="Courier New" pitchFamily="49" charset="0"/>
                 <a:cs typeface="Courier New" pitchFamily="49" charset="0"/>
               </a:rPr>
-              <a:t>O1 </a:t>
-            </a:r>
-            <a:r>
-              <a:rPr lang="en-US" sz="1400" dirty="0" smtClean="0">
-                <a:latin typeface="Courier New" pitchFamily="49" charset="0"/>
-                <a:cs typeface="Courier New" pitchFamily="49" charset="0"/>
-              </a:rPr>
-              <a:t>    1   LIT </a:t>
-            </a:r>
-            <a:r>
-              <a:rPr lang="en-US" sz="1400" dirty="0" err="1" smtClean="0">
-                <a:latin typeface="Courier New" pitchFamily="49" charset="0"/>
-                <a:cs typeface="Courier New" pitchFamily="49" charset="0"/>
-              </a:rPr>
-              <a:t>LIT</a:t>
-            </a:r>
-            <a:r>
-              <a:rPr lang="en-US" sz="1400" dirty="0" smtClean="0">
-                <a:latin typeface="Courier New" pitchFamily="49" charset="0"/>
-                <a:cs typeface="Courier New" pitchFamily="49" charset="0"/>
-              </a:rPr>
-              <a:t>  </a:t>
-            </a:r>
-            <a:r>
-              <a:rPr lang="en-US" sz="1400" dirty="0" err="1" smtClean="0">
-                <a:latin typeface="Courier New" pitchFamily="49" charset="0"/>
-                <a:cs typeface="Courier New" pitchFamily="49" charset="0"/>
-              </a:rPr>
-              <a:t>LIT</a:t>
-            </a:r>
-            <a:r>
-              <a:rPr lang="en-US" sz="1400" dirty="0" smtClean="0">
-                <a:latin typeface="Courier New" pitchFamily="49" charset="0"/>
-                <a:cs typeface="Courier New" pitchFamily="49" charset="0"/>
-              </a:rPr>
-              <a:t>    1.000000      </a:t>
-            </a:r>
-            <a:r>
-              <a:rPr lang="en-US" sz="1400" dirty="0">
-                <a:latin typeface="Courier New" pitchFamily="49" charset="0"/>
-                <a:cs typeface="Courier New" pitchFamily="49" charset="0"/>
-              </a:rPr>
-              <a:t>6.9410   </a:t>
-            </a:r>
-            <a:r>
-              <a:rPr lang="en-US" sz="1400" dirty="0" smtClean="0">
-                <a:latin typeface="Courier New" pitchFamily="49" charset="0"/>
-                <a:cs typeface="Courier New" pitchFamily="49" charset="0"/>
-              </a:rPr>
-              <a:t>       </a:t>
-            </a:r>
-            <a:r>
-              <a:rPr lang="en-US" sz="1400" dirty="0">
-                <a:latin typeface="Courier New" pitchFamily="49" charset="0"/>
-                <a:cs typeface="Courier New" pitchFamily="49" charset="0"/>
-              </a:rPr>
-              <a:t>0</a:t>
-            </a:r>
-          </a:p>
-          <a:p>
-            <a:r>
-              <a:rPr lang="en-US" sz="1400" dirty="0" smtClean="0">
-                <a:latin typeface="Courier New" pitchFamily="49" charset="0"/>
-                <a:cs typeface="Courier New" pitchFamily="49" charset="0"/>
-              </a:rPr>
-              <a:t>   2 </a:t>
-            </a:r>
-            <a:r>
-              <a:rPr lang="en-US" sz="1400" dirty="0">
-                <a:latin typeface="Courier New" pitchFamily="49" charset="0"/>
-                <a:cs typeface="Courier New" pitchFamily="49" charset="0"/>
-              </a:rPr>
-              <a:t>O1  </a:t>
-            </a:r>
-            <a:r>
-              <a:rPr lang="en-US" sz="1400" dirty="0" smtClean="0">
-                <a:latin typeface="Courier New" pitchFamily="49" charset="0"/>
-                <a:cs typeface="Courier New" pitchFamily="49" charset="0"/>
-              </a:rPr>
-              <a:t>   2   LIT </a:t>
-            </a:r>
-            <a:r>
-              <a:rPr lang="en-US" sz="1400" dirty="0" err="1" smtClean="0">
-                <a:latin typeface="Courier New" pitchFamily="49" charset="0"/>
-                <a:cs typeface="Courier New" pitchFamily="49" charset="0"/>
-              </a:rPr>
-              <a:t>LIT</a:t>
-            </a:r>
-            <a:r>
-              <a:rPr lang="en-US" sz="1400" dirty="0" smtClean="0">
-                <a:latin typeface="Courier New" pitchFamily="49" charset="0"/>
-                <a:cs typeface="Courier New" pitchFamily="49" charset="0"/>
-              </a:rPr>
-              <a:t>  </a:t>
-            </a:r>
-            <a:r>
-              <a:rPr lang="en-US" sz="1400" dirty="0" err="1" smtClean="0">
-                <a:latin typeface="Courier New" pitchFamily="49" charset="0"/>
-                <a:cs typeface="Courier New" pitchFamily="49" charset="0"/>
-              </a:rPr>
-              <a:t>LIT</a:t>
-            </a:r>
-            <a:r>
-              <a:rPr lang="en-US" sz="1400" dirty="0" smtClean="0">
-                <a:latin typeface="Courier New" pitchFamily="49" charset="0"/>
-                <a:cs typeface="Courier New" pitchFamily="49" charset="0"/>
-              </a:rPr>
-              <a:t>    1.000000      </a:t>
-            </a:r>
-            <a:r>
-              <a:rPr lang="en-US" sz="1400" dirty="0">
-                <a:latin typeface="Courier New" pitchFamily="49" charset="0"/>
-                <a:cs typeface="Courier New" pitchFamily="49" charset="0"/>
-              </a:rPr>
-              <a:t>6.9410   </a:t>
-            </a:r>
-            <a:r>
-              <a:rPr lang="en-US" sz="1400" dirty="0" smtClean="0">
-                <a:latin typeface="Courier New" pitchFamily="49" charset="0"/>
-                <a:cs typeface="Courier New" pitchFamily="49" charset="0"/>
-              </a:rPr>
-              <a:t>       0</a:t>
-            </a:r>
-          </a:p>
-          <a:p>
-            <a:r>
-              <a:rPr lang="en-US" sz="1400" dirty="0" smtClean="0">
-                <a:latin typeface="Courier New" pitchFamily="49" charset="0"/>
-                <a:cs typeface="Courier New" pitchFamily="49" charset="0"/>
-              </a:rPr>
-              <a:t>……</a:t>
-            </a:r>
-          </a:p>
-          <a:p>
-            <a:r>
-              <a:rPr lang="en-US" sz="1400" dirty="0">
-                <a:latin typeface="Courier New" pitchFamily="49" charset="0"/>
-                <a:cs typeface="Courier New" pitchFamily="49" charset="0"/>
-              </a:rPr>
-              <a:t> 307 O2   307 </a:t>
-            </a:r>
-            <a:r>
-              <a:rPr lang="en-US" sz="1400" dirty="0" smtClean="0">
-                <a:latin typeface="Courier New" pitchFamily="49" charset="0"/>
-                <a:cs typeface="Courier New" pitchFamily="49" charset="0"/>
-              </a:rPr>
-              <a:t>  </a:t>
-            </a:r>
-            <a:r>
-              <a:rPr lang="en-US" sz="1400" dirty="0">
-                <a:latin typeface="Courier New" pitchFamily="49" charset="0"/>
-                <a:cs typeface="Courier New" pitchFamily="49" charset="0"/>
-              </a:rPr>
-              <a:t>CLA </a:t>
-            </a:r>
-            <a:r>
-              <a:rPr lang="en-US" sz="1400" dirty="0" err="1" smtClean="0">
-                <a:latin typeface="Courier New" pitchFamily="49" charset="0"/>
-                <a:cs typeface="Courier New" pitchFamily="49" charset="0"/>
-              </a:rPr>
-              <a:t>CLA</a:t>
-            </a:r>
-            <a:r>
-              <a:rPr lang="en-US" sz="1400" dirty="0" smtClean="0">
-                <a:latin typeface="Courier New" pitchFamily="49" charset="0"/>
-                <a:cs typeface="Courier New" pitchFamily="49" charset="0"/>
-              </a:rPr>
-              <a:t>  </a:t>
-            </a:r>
-            <a:r>
-              <a:rPr lang="en-US" sz="1400" dirty="0" err="1">
-                <a:latin typeface="Courier New" pitchFamily="49" charset="0"/>
-                <a:cs typeface="Courier New" pitchFamily="49" charset="0"/>
-              </a:rPr>
-              <a:t>CLA</a:t>
-            </a:r>
-            <a:r>
-              <a:rPr lang="en-US" sz="1400" dirty="0">
-                <a:latin typeface="Courier New" pitchFamily="49" charset="0"/>
-                <a:cs typeface="Courier New" pitchFamily="49" charset="0"/>
-              </a:rPr>
-              <a:t>   -1.000000   </a:t>
-            </a:r>
-            <a:r>
-              <a:rPr lang="en-US" sz="1400" dirty="0" smtClean="0">
-                <a:latin typeface="Courier New" pitchFamily="49" charset="0"/>
-                <a:cs typeface="Courier New" pitchFamily="49" charset="0"/>
-              </a:rPr>
-              <a:t>  </a:t>
-            </a:r>
-            <a:r>
-              <a:rPr lang="en-US" sz="1400" dirty="0">
-                <a:latin typeface="Courier New" pitchFamily="49" charset="0"/>
-                <a:cs typeface="Courier New" pitchFamily="49" charset="0"/>
-              </a:rPr>
-              <a:t>35.4500       </a:t>
-            </a:r>
-            <a:r>
-              <a:rPr lang="en-US" sz="1400" dirty="0" smtClean="0">
-                <a:latin typeface="Courier New" pitchFamily="49" charset="0"/>
-                <a:cs typeface="Courier New" pitchFamily="49" charset="0"/>
-              </a:rPr>
-              <a:t>   </a:t>
-            </a:r>
-            <a:r>
-              <a:rPr lang="en-US" sz="1400" dirty="0">
-                <a:latin typeface="Courier New" pitchFamily="49" charset="0"/>
-                <a:cs typeface="Courier New" pitchFamily="49" charset="0"/>
-              </a:rPr>
-              <a:t>0</a:t>
-            </a:r>
-          </a:p>
-          <a:p>
-            <a:r>
-              <a:rPr lang="en-US" sz="1400" dirty="0">
-                <a:latin typeface="Courier New" pitchFamily="49" charset="0"/>
-                <a:cs typeface="Courier New" pitchFamily="49" charset="0"/>
-              </a:rPr>
-              <a:t> </a:t>
-            </a:r>
-            <a:r>
-              <a:rPr lang="en-US" sz="1400" dirty="0" smtClean="0">
-                <a:latin typeface="Courier New" pitchFamily="49" charset="0"/>
-                <a:cs typeface="Courier New" pitchFamily="49" charset="0"/>
-              </a:rPr>
-              <a:t>308 </a:t>
-            </a:r>
-            <a:r>
-              <a:rPr lang="en-US" sz="1400" dirty="0">
-                <a:latin typeface="Courier New" pitchFamily="49" charset="0"/>
-                <a:cs typeface="Courier New" pitchFamily="49" charset="0"/>
-              </a:rPr>
-              <a:t>O2   308 </a:t>
-            </a:r>
-            <a:r>
-              <a:rPr lang="en-US" sz="1400" dirty="0" smtClean="0">
-                <a:latin typeface="Courier New" pitchFamily="49" charset="0"/>
-                <a:cs typeface="Courier New" pitchFamily="49" charset="0"/>
-              </a:rPr>
-              <a:t>  </a:t>
-            </a:r>
-            <a:r>
-              <a:rPr lang="en-US" sz="1400" dirty="0">
-                <a:latin typeface="Courier New" pitchFamily="49" charset="0"/>
-                <a:cs typeface="Courier New" pitchFamily="49" charset="0"/>
-              </a:rPr>
-              <a:t>CLA </a:t>
-            </a:r>
-            <a:r>
-              <a:rPr lang="en-US" sz="1400" dirty="0" err="1" smtClean="0">
-                <a:latin typeface="Courier New" pitchFamily="49" charset="0"/>
-                <a:cs typeface="Courier New" pitchFamily="49" charset="0"/>
-              </a:rPr>
-              <a:t>CLA</a:t>
-            </a:r>
-            <a:r>
-              <a:rPr lang="en-US" sz="1400" dirty="0" smtClean="0">
-                <a:latin typeface="Courier New" pitchFamily="49" charset="0"/>
-                <a:cs typeface="Courier New" pitchFamily="49" charset="0"/>
-              </a:rPr>
-              <a:t>  </a:t>
-            </a:r>
-            <a:r>
-              <a:rPr lang="en-US" sz="1400" dirty="0" err="1">
-                <a:latin typeface="Courier New" pitchFamily="49" charset="0"/>
-                <a:cs typeface="Courier New" pitchFamily="49" charset="0"/>
-              </a:rPr>
-              <a:t>CLA</a:t>
-            </a:r>
-            <a:r>
-              <a:rPr lang="en-US" sz="1400" dirty="0">
-                <a:latin typeface="Courier New" pitchFamily="49" charset="0"/>
-                <a:cs typeface="Courier New" pitchFamily="49" charset="0"/>
-              </a:rPr>
-              <a:t>   -1.000000     </a:t>
-            </a:r>
-            <a:r>
-              <a:rPr lang="en-US" sz="1400" dirty="0" smtClean="0">
-                <a:latin typeface="Courier New" pitchFamily="49" charset="0"/>
-                <a:cs typeface="Courier New" pitchFamily="49" charset="0"/>
-              </a:rPr>
-              <a:t>35.4500          </a:t>
-            </a:r>
-            <a:r>
-              <a:rPr lang="en-US" sz="1400" dirty="0">
-                <a:latin typeface="Courier New" pitchFamily="49" charset="0"/>
-                <a:cs typeface="Courier New" pitchFamily="49" charset="0"/>
-              </a:rPr>
-              <a:t>0</a:t>
-            </a:r>
-          </a:p>
-          <a:p>
-            <a:r>
-              <a:rPr lang="en-US" sz="1400" dirty="0" smtClean="0">
-                <a:latin typeface="Courier New" pitchFamily="49" charset="0"/>
-                <a:cs typeface="Courier New" pitchFamily="49" charset="0"/>
-              </a:rPr>
-              <a:t> </a:t>
-            </a:r>
-            <a:r>
-              <a:rPr lang="pl-PL" sz="1400" dirty="0" smtClean="0">
-                <a:latin typeface="Courier New" pitchFamily="49" charset="0"/>
-                <a:cs typeface="Courier New" pitchFamily="49" charset="0"/>
-              </a:rPr>
-              <a:t>309 </a:t>
-            </a:r>
-            <a:r>
-              <a:rPr lang="pl-PL" sz="1400" dirty="0">
-                <a:latin typeface="Courier New" pitchFamily="49" charset="0"/>
-                <a:cs typeface="Courier New" pitchFamily="49" charset="0"/>
-              </a:rPr>
-              <a:t>W1   309  TIP3 OH2  </a:t>
-            </a:r>
-            <a:r>
-              <a:rPr lang="en-US" sz="1400" dirty="0" smtClean="0">
-                <a:latin typeface="Courier New" pitchFamily="49" charset="0"/>
-                <a:cs typeface="Courier New" pitchFamily="49" charset="0"/>
-              </a:rPr>
-              <a:t> </a:t>
-            </a:r>
-            <a:r>
-              <a:rPr lang="pl-PL" sz="1400" dirty="0" smtClean="0">
-                <a:latin typeface="Courier New" pitchFamily="49" charset="0"/>
-                <a:cs typeface="Courier New" pitchFamily="49" charset="0"/>
-              </a:rPr>
-              <a:t>OT   </a:t>
-            </a:r>
-            <a:r>
-              <a:rPr lang="pl-PL" sz="1400" dirty="0">
-                <a:latin typeface="Courier New" pitchFamily="49" charset="0"/>
-                <a:cs typeface="Courier New" pitchFamily="49" charset="0"/>
-              </a:rPr>
-              <a:t>_FF1_____  </a:t>
-            </a:r>
-            <a:r>
-              <a:rPr lang="pl-PL" sz="1400" dirty="0" smtClean="0">
-                <a:latin typeface="Courier New" pitchFamily="49" charset="0"/>
-                <a:cs typeface="Courier New" pitchFamily="49" charset="0"/>
-              </a:rPr>
-              <a:t>   </a:t>
-            </a:r>
-            <a:r>
-              <a:rPr lang="pl-PL" sz="1400" dirty="0">
-                <a:latin typeface="Courier New" pitchFamily="49" charset="0"/>
-                <a:cs typeface="Courier New" pitchFamily="49" charset="0"/>
-              </a:rPr>
-              <a:t>15.9994   </a:t>
-            </a:r>
-            <a:r>
-              <a:rPr lang="pl-PL" sz="1400" dirty="0" smtClean="0">
-                <a:latin typeface="Courier New" pitchFamily="49" charset="0"/>
-                <a:cs typeface="Courier New" pitchFamily="49" charset="0"/>
-              </a:rPr>
-              <a:t>   </a:t>
-            </a:r>
-            <a:r>
-              <a:rPr lang="en-US" sz="1400" dirty="0" smtClean="0">
-                <a:latin typeface="Courier New" pitchFamily="49" charset="0"/>
-                <a:cs typeface="Courier New" pitchFamily="49" charset="0"/>
-              </a:rPr>
-              <a:t> </a:t>
-            </a:r>
-            <a:r>
-              <a:rPr lang="pl-PL" sz="1400" dirty="0" smtClean="0">
-                <a:latin typeface="Courier New" pitchFamily="49" charset="0"/>
-                <a:cs typeface="Courier New" pitchFamily="49" charset="0"/>
-              </a:rPr>
-              <a:t>   </a:t>
-            </a:r>
-            <a:r>
-              <a:rPr lang="pl-PL" sz="1400" dirty="0">
-                <a:latin typeface="Courier New" pitchFamily="49" charset="0"/>
-                <a:cs typeface="Courier New" pitchFamily="49" charset="0"/>
-              </a:rPr>
-              <a:t>0</a:t>
-            </a:r>
-          </a:p>
-          <a:p>
-            <a:r>
-              <a:rPr lang="en-US" sz="1400" dirty="0">
-                <a:latin typeface="Courier New" pitchFamily="49" charset="0"/>
-                <a:cs typeface="Courier New" pitchFamily="49" charset="0"/>
-              </a:rPr>
-              <a:t> </a:t>
-            </a:r>
-            <a:r>
-              <a:rPr lang="en-US" sz="1400" dirty="0" smtClean="0">
-                <a:latin typeface="Courier New" pitchFamily="49" charset="0"/>
-                <a:cs typeface="Courier New" pitchFamily="49" charset="0"/>
-              </a:rPr>
-              <a:t>310 </a:t>
-            </a:r>
-            <a:r>
-              <a:rPr lang="en-US" sz="1400" dirty="0">
-                <a:latin typeface="Courier New" pitchFamily="49" charset="0"/>
-                <a:cs typeface="Courier New" pitchFamily="49" charset="0"/>
-              </a:rPr>
-              <a:t>W1   309  TIP3 </a:t>
-            </a:r>
-            <a:r>
-              <a:rPr lang="en-US" sz="1400" dirty="0" smtClean="0">
-                <a:latin typeface="Courier New" pitchFamily="49" charset="0"/>
-                <a:cs typeface="Courier New" pitchFamily="49" charset="0"/>
-              </a:rPr>
-              <a:t> H1   </a:t>
-            </a:r>
-            <a:r>
-              <a:rPr lang="en-US" sz="1400" dirty="0">
-                <a:latin typeface="Courier New" pitchFamily="49" charset="0"/>
-                <a:cs typeface="Courier New" pitchFamily="49" charset="0"/>
-              </a:rPr>
-              <a:t>HT </a:t>
-            </a:r>
-            <a:r>
-              <a:rPr lang="en-US" sz="1400" dirty="0" smtClean="0">
-                <a:latin typeface="Courier New" pitchFamily="49" charset="0"/>
-                <a:cs typeface="Courier New" pitchFamily="49" charset="0"/>
-              </a:rPr>
-              <a:t>  </a:t>
-            </a:r>
-            <a:r>
-              <a:rPr lang="en-US" sz="1400" dirty="0">
-                <a:latin typeface="Courier New" pitchFamily="49" charset="0"/>
-                <a:cs typeface="Courier New" pitchFamily="49" charset="0"/>
-              </a:rPr>
-              <a:t>_FF2</a:t>
-            </a:r>
-            <a:r>
-              <a:rPr lang="en-US" sz="1400" dirty="0" smtClean="0">
-                <a:latin typeface="Courier New" pitchFamily="49" charset="0"/>
-                <a:cs typeface="Courier New" pitchFamily="49" charset="0"/>
-              </a:rPr>
-              <a:t>_____      </a:t>
-            </a:r>
-            <a:r>
-              <a:rPr lang="en-US" sz="1400" dirty="0">
-                <a:latin typeface="Courier New" pitchFamily="49" charset="0"/>
-                <a:cs typeface="Courier New" pitchFamily="49" charset="0"/>
-              </a:rPr>
-              <a:t>1.0080   </a:t>
-            </a:r>
-            <a:r>
-              <a:rPr lang="en-US" sz="1400" dirty="0" smtClean="0">
-                <a:latin typeface="Courier New" pitchFamily="49" charset="0"/>
-                <a:cs typeface="Courier New" pitchFamily="49" charset="0"/>
-              </a:rPr>
-              <a:t>       </a:t>
-            </a:r>
-            <a:r>
-              <a:rPr lang="en-US" sz="1400" dirty="0">
-                <a:latin typeface="Courier New" pitchFamily="49" charset="0"/>
-                <a:cs typeface="Courier New" pitchFamily="49" charset="0"/>
-              </a:rPr>
-              <a:t>0</a:t>
-            </a:r>
-          </a:p>
-          <a:p>
-            <a:r>
-              <a:rPr lang="en-US" sz="1400" dirty="0">
-                <a:latin typeface="Courier New" pitchFamily="49" charset="0"/>
-                <a:cs typeface="Courier New" pitchFamily="49" charset="0"/>
-              </a:rPr>
-              <a:t> </a:t>
-            </a:r>
-            <a:r>
-              <a:rPr lang="en-US" sz="1400" dirty="0" smtClean="0">
-                <a:latin typeface="Courier New" pitchFamily="49" charset="0"/>
-                <a:cs typeface="Courier New" pitchFamily="49" charset="0"/>
-              </a:rPr>
-              <a:t>311 </a:t>
-            </a:r>
-            <a:r>
-              <a:rPr lang="en-US" sz="1400" dirty="0">
-                <a:latin typeface="Courier New" pitchFamily="49" charset="0"/>
-                <a:cs typeface="Courier New" pitchFamily="49" charset="0"/>
-              </a:rPr>
-              <a:t>W1   309  TIP3 </a:t>
-            </a:r>
-            <a:r>
-              <a:rPr lang="en-US" sz="1400" dirty="0" smtClean="0">
-                <a:latin typeface="Courier New" pitchFamily="49" charset="0"/>
-                <a:cs typeface="Courier New" pitchFamily="49" charset="0"/>
-              </a:rPr>
-              <a:t> H2   HT   </a:t>
-            </a:r>
-            <a:r>
-              <a:rPr lang="en-US" sz="1400" dirty="0">
-                <a:latin typeface="Courier New" pitchFamily="49" charset="0"/>
-                <a:cs typeface="Courier New" pitchFamily="49" charset="0"/>
-              </a:rPr>
-              <a:t>_FF2</a:t>
-            </a:r>
-            <a:r>
-              <a:rPr lang="en-US" sz="1400" dirty="0" smtClean="0">
-                <a:latin typeface="Courier New" pitchFamily="49" charset="0"/>
-                <a:cs typeface="Courier New" pitchFamily="49" charset="0"/>
-              </a:rPr>
-              <a:t>_____      </a:t>
-            </a:r>
-            <a:r>
-              <a:rPr lang="en-US" sz="1400" dirty="0">
-                <a:latin typeface="Courier New" pitchFamily="49" charset="0"/>
-                <a:cs typeface="Courier New" pitchFamily="49" charset="0"/>
-              </a:rPr>
-              <a:t>1.0080   </a:t>
-            </a:r>
-            <a:r>
-              <a:rPr lang="en-US" sz="1400" dirty="0" smtClean="0">
-                <a:latin typeface="Courier New" pitchFamily="49" charset="0"/>
-                <a:cs typeface="Courier New" pitchFamily="49" charset="0"/>
-              </a:rPr>
-              <a:t>       </a:t>
-            </a:r>
-            <a:r>
-              <a:rPr lang="en-US" sz="1400" dirty="0">
-                <a:latin typeface="Courier New" pitchFamily="49" charset="0"/>
-                <a:cs typeface="Courier New" pitchFamily="49" charset="0"/>
-              </a:rPr>
-              <a:t>0</a:t>
-            </a:r>
-          </a:p>
-          <a:p>
-            <a:r>
-              <a:rPr lang="pl-PL" sz="1400" dirty="0">
-                <a:latin typeface="Courier New" pitchFamily="49" charset="0"/>
-                <a:cs typeface="Courier New" pitchFamily="49" charset="0"/>
-              </a:rPr>
-              <a:t> </a:t>
-            </a:r>
-            <a:r>
-              <a:rPr lang="pl-PL" sz="1400" dirty="0" smtClean="0">
-                <a:latin typeface="Courier New" pitchFamily="49" charset="0"/>
-                <a:cs typeface="Courier New" pitchFamily="49" charset="0"/>
-              </a:rPr>
-              <a:t>312 </a:t>
-            </a:r>
-            <a:r>
-              <a:rPr lang="pl-PL" sz="1400" dirty="0">
-                <a:latin typeface="Courier New" pitchFamily="49" charset="0"/>
-                <a:cs typeface="Courier New" pitchFamily="49" charset="0"/>
-              </a:rPr>
-              <a:t>W1   310  TIP3 OH2 </a:t>
-            </a:r>
-            <a:r>
-              <a:rPr lang="en-US" sz="1400" dirty="0" smtClean="0">
-                <a:latin typeface="Courier New" pitchFamily="49" charset="0"/>
-                <a:cs typeface="Courier New" pitchFamily="49" charset="0"/>
-              </a:rPr>
-              <a:t> </a:t>
-            </a:r>
-            <a:r>
-              <a:rPr lang="pl-PL" sz="1400" dirty="0" smtClean="0">
-                <a:latin typeface="Courier New" pitchFamily="49" charset="0"/>
-                <a:cs typeface="Courier New" pitchFamily="49" charset="0"/>
-              </a:rPr>
-              <a:t> OT   </a:t>
-            </a:r>
-            <a:r>
-              <a:rPr lang="pl-PL" sz="1400" dirty="0">
-                <a:latin typeface="Courier New" pitchFamily="49" charset="0"/>
-                <a:cs typeface="Courier New" pitchFamily="49" charset="0"/>
-              </a:rPr>
-              <a:t>_FF1_____    </a:t>
-            </a:r>
-            <a:r>
-              <a:rPr lang="pl-PL" sz="1400" dirty="0" smtClean="0">
-                <a:latin typeface="Courier New" pitchFamily="49" charset="0"/>
-                <a:cs typeface="Courier New" pitchFamily="49" charset="0"/>
-              </a:rPr>
-              <a:t> </a:t>
-            </a:r>
-            <a:r>
-              <a:rPr lang="pl-PL" sz="1400" dirty="0">
-                <a:latin typeface="Courier New" pitchFamily="49" charset="0"/>
-                <a:cs typeface="Courier New" pitchFamily="49" charset="0"/>
-              </a:rPr>
-              <a:t>15.9994   </a:t>
-            </a:r>
-            <a:r>
-              <a:rPr lang="pl-PL" sz="1400" dirty="0" smtClean="0">
-                <a:latin typeface="Courier New" pitchFamily="49" charset="0"/>
-                <a:cs typeface="Courier New" pitchFamily="49" charset="0"/>
-              </a:rPr>
-              <a:t>       </a:t>
-            </a:r>
-            <a:r>
-              <a:rPr lang="pl-PL" sz="1400" dirty="0">
-                <a:latin typeface="Courier New" pitchFamily="49" charset="0"/>
-                <a:cs typeface="Courier New" pitchFamily="49" charset="0"/>
-              </a:rPr>
-              <a:t>0</a:t>
-            </a:r>
-          </a:p>
-          <a:p>
-            <a:r>
-              <a:rPr lang="en-US" sz="1400" dirty="0">
-                <a:latin typeface="Courier New" pitchFamily="49" charset="0"/>
-                <a:cs typeface="Courier New" pitchFamily="49" charset="0"/>
-              </a:rPr>
-              <a:t> </a:t>
-            </a:r>
-            <a:r>
-              <a:rPr lang="en-US" sz="1400" dirty="0" smtClean="0">
-                <a:latin typeface="Courier New" pitchFamily="49" charset="0"/>
-                <a:cs typeface="Courier New" pitchFamily="49" charset="0"/>
-              </a:rPr>
-              <a:t>313 </a:t>
-            </a:r>
-            <a:r>
-              <a:rPr lang="en-US" sz="1400" dirty="0">
-                <a:latin typeface="Courier New" pitchFamily="49" charset="0"/>
-                <a:cs typeface="Courier New" pitchFamily="49" charset="0"/>
-              </a:rPr>
-              <a:t>W1   310  TIP3 </a:t>
-            </a:r>
-            <a:r>
-              <a:rPr lang="en-US" sz="1400" dirty="0" smtClean="0">
-                <a:latin typeface="Courier New" pitchFamily="49" charset="0"/>
-                <a:cs typeface="Courier New" pitchFamily="49" charset="0"/>
-              </a:rPr>
-              <a:t> H1   HT   </a:t>
-            </a:r>
-            <a:r>
-              <a:rPr lang="en-US" sz="1400" dirty="0">
-                <a:latin typeface="Courier New" pitchFamily="49" charset="0"/>
-                <a:cs typeface="Courier New" pitchFamily="49" charset="0"/>
-              </a:rPr>
-              <a:t>_FF2</a:t>
-            </a:r>
-            <a:r>
-              <a:rPr lang="en-US" sz="1400" dirty="0" smtClean="0">
-                <a:latin typeface="Courier New" pitchFamily="49" charset="0"/>
-                <a:cs typeface="Courier New" pitchFamily="49" charset="0"/>
-              </a:rPr>
-              <a:t>_____      </a:t>
-            </a:r>
-            <a:r>
-              <a:rPr lang="en-US" sz="1400" dirty="0">
-                <a:latin typeface="Courier New" pitchFamily="49" charset="0"/>
-                <a:cs typeface="Courier New" pitchFamily="49" charset="0"/>
-              </a:rPr>
-              <a:t>1.0080   </a:t>
-            </a:r>
-            <a:r>
-              <a:rPr lang="en-US" sz="1400" dirty="0" smtClean="0">
-                <a:latin typeface="Courier New" pitchFamily="49" charset="0"/>
-                <a:cs typeface="Courier New" pitchFamily="49" charset="0"/>
-              </a:rPr>
-              <a:t>       </a:t>
-            </a:r>
-            <a:r>
-              <a:rPr lang="en-US" sz="1400" dirty="0">
-                <a:latin typeface="Courier New" pitchFamily="49" charset="0"/>
-                <a:cs typeface="Courier New" pitchFamily="49" charset="0"/>
-              </a:rPr>
-              <a:t>0</a:t>
-            </a:r>
-          </a:p>
-          <a:p>
-            <a:r>
-              <a:rPr lang="en-US" sz="1400" dirty="0">
-                <a:latin typeface="Courier New" pitchFamily="49" charset="0"/>
-                <a:cs typeface="Courier New" pitchFamily="49" charset="0"/>
-              </a:rPr>
-              <a:t> </a:t>
-            </a:r>
-            <a:r>
-              <a:rPr lang="en-US" sz="1400" dirty="0" smtClean="0">
-                <a:latin typeface="Courier New" pitchFamily="49" charset="0"/>
-                <a:cs typeface="Courier New" pitchFamily="49" charset="0"/>
-              </a:rPr>
-              <a:t>314 </a:t>
-            </a:r>
-            <a:r>
-              <a:rPr lang="en-US" sz="1400" dirty="0">
-                <a:latin typeface="Courier New" pitchFamily="49" charset="0"/>
-                <a:cs typeface="Courier New" pitchFamily="49" charset="0"/>
-              </a:rPr>
-              <a:t>W1   310  </a:t>
-            </a:r>
-            <a:r>
-              <a:rPr lang="en-US" sz="1400" dirty="0" smtClean="0">
-                <a:latin typeface="Courier New" pitchFamily="49" charset="0"/>
-                <a:cs typeface="Courier New" pitchFamily="49" charset="0"/>
-              </a:rPr>
-              <a:t>TIP3  H2   HT   </a:t>
-            </a:r>
-            <a:r>
-              <a:rPr lang="en-US" sz="1400" dirty="0">
-                <a:latin typeface="Courier New" pitchFamily="49" charset="0"/>
-                <a:cs typeface="Courier New" pitchFamily="49" charset="0"/>
-              </a:rPr>
-              <a:t>_FF2</a:t>
-            </a:r>
-            <a:r>
-              <a:rPr lang="en-US" sz="1400" dirty="0" smtClean="0">
-                <a:latin typeface="Courier New" pitchFamily="49" charset="0"/>
-                <a:cs typeface="Courier New" pitchFamily="49" charset="0"/>
-              </a:rPr>
-              <a:t>_____      </a:t>
-            </a:r>
-            <a:r>
-              <a:rPr lang="en-US" sz="1400" dirty="0">
-                <a:latin typeface="Courier New" pitchFamily="49" charset="0"/>
-                <a:cs typeface="Courier New" pitchFamily="49" charset="0"/>
-              </a:rPr>
-              <a:t>1.0080   </a:t>
-            </a:r>
-            <a:r>
-              <a:rPr lang="en-US" sz="1400" dirty="0" smtClean="0">
-                <a:latin typeface="Courier New" pitchFamily="49" charset="0"/>
-                <a:cs typeface="Courier New" pitchFamily="49" charset="0"/>
-              </a:rPr>
-              <a:t>       </a:t>
-            </a:r>
-            <a:r>
-              <a:rPr lang="en-US" sz="1400" dirty="0">
-                <a:latin typeface="Courier New" pitchFamily="49" charset="0"/>
-                <a:cs typeface="Courier New" pitchFamily="49" charset="0"/>
-              </a:rPr>
-              <a:t>0</a:t>
-            </a:r>
-          </a:p>
-          <a:p>
-            <a:r>
-              <a:rPr lang="pl-PL" sz="1400" dirty="0">
-                <a:latin typeface="Courier New" pitchFamily="49" charset="0"/>
-                <a:cs typeface="Courier New" pitchFamily="49" charset="0"/>
-              </a:rPr>
-              <a:t> </a:t>
-            </a:r>
-            <a:r>
-              <a:rPr lang="pl-PL" sz="1400" dirty="0" smtClean="0">
-                <a:latin typeface="Courier New" pitchFamily="49" charset="0"/>
-                <a:cs typeface="Courier New" pitchFamily="49" charset="0"/>
-              </a:rPr>
-              <a:t>315 </a:t>
-            </a:r>
-            <a:r>
-              <a:rPr lang="pl-PL" sz="1400" dirty="0">
-                <a:latin typeface="Courier New" pitchFamily="49" charset="0"/>
-                <a:cs typeface="Courier New" pitchFamily="49" charset="0"/>
-              </a:rPr>
-              <a:t>W1   311  TIP3 OH2  </a:t>
-            </a:r>
-            <a:r>
-              <a:rPr lang="en-US" sz="1400" dirty="0" smtClean="0">
-                <a:latin typeface="Courier New" pitchFamily="49" charset="0"/>
-                <a:cs typeface="Courier New" pitchFamily="49" charset="0"/>
-              </a:rPr>
-              <a:t> </a:t>
-            </a:r>
-            <a:r>
-              <a:rPr lang="pl-PL" sz="1400" dirty="0" smtClean="0">
-                <a:latin typeface="Courier New" pitchFamily="49" charset="0"/>
-                <a:cs typeface="Courier New" pitchFamily="49" charset="0"/>
-              </a:rPr>
-              <a:t>OT   </a:t>
-            </a:r>
-            <a:r>
-              <a:rPr lang="pl-PL" sz="1400" dirty="0">
-                <a:latin typeface="Courier New" pitchFamily="49" charset="0"/>
-                <a:cs typeface="Courier New" pitchFamily="49" charset="0"/>
-              </a:rPr>
-              <a:t>_FF1_____    </a:t>
-            </a:r>
-            <a:r>
-              <a:rPr lang="pl-PL" sz="1400" dirty="0" smtClean="0">
-                <a:latin typeface="Courier New" pitchFamily="49" charset="0"/>
-                <a:cs typeface="Courier New" pitchFamily="49" charset="0"/>
-              </a:rPr>
-              <a:t> </a:t>
-            </a:r>
-            <a:r>
-              <a:rPr lang="pl-PL" sz="1400" dirty="0">
-                <a:latin typeface="Courier New" pitchFamily="49" charset="0"/>
-                <a:cs typeface="Courier New" pitchFamily="49" charset="0"/>
-              </a:rPr>
-              <a:t>15.9994   </a:t>
-            </a:r>
-            <a:r>
-              <a:rPr lang="pl-PL" sz="1400" dirty="0" smtClean="0">
-                <a:latin typeface="Courier New" pitchFamily="49" charset="0"/>
-                <a:cs typeface="Courier New" pitchFamily="49" charset="0"/>
-              </a:rPr>
-              <a:t>       0</a:t>
-            </a:r>
-            <a:endParaRPr lang="en-US" sz="1400" dirty="0" smtClean="0">
-              <a:latin typeface="Courier New" pitchFamily="49" charset="0"/>
-              <a:cs typeface="Courier New" pitchFamily="49" charset="0"/>
-            </a:endParaRPr>
-          </a:p>
-          <a:p>
-            <a:r>
-              <a:rPr lang="en-US" sz="1400" dirty="0" smtClean="0">
-                <a:latin typeface="Courier New" pitchFamily="49" charset="0"/>
-                <a:cs typeface="Courier New" pitchFamily="49" charset="0"/>
-              </a:rPr>
-              <a:t>…..</a:t>
-            </a:r>
+              <a:t>FF1=-2*FF2 # each water molecule is electrically neutral</a:t>
+            </a:r>
+          </a:p>
+          <a:p>
             <a:endParaRPr lang="en-US" sz="1400" dirty="0">
               <a:latin typeface="Courier New" pitchFamily="49" charset="0"/>
               <a:cs typeface="Courier New" pitchFamily="49" charset="0"/>
             </a:endParaRPr>
           </a:p>
+          <a:p>
+            <a:r>
+              <a:rPr lang="en-US" sz="1400" dirty="0">
+                <a:latin typeface="Courier New" pitchFamily="49" charset="0"/>
+                <a:cs typeface="Courier New" pitchFamily="49" charset="0"/>
+              </a:rPr>
+              <a:t>!FFFORMAT</a:t>
+            </a:r>
+          </a:p>
+          <a:p>
+            <a:r>
+              <a:rPr lang="en-US" sz="1400" dirty="0">
+                <a:latin typeface="Courier New" pitchFamily="49" charset="0"/>
+                <a:cs typeface="Courier New" pitchFamily="49" charset="0"/>
+              </a:rPr>
+              <a:t>#Format Force Field Parameters (in C's </a:t>
+            </a:r>
+            <a:r>
+              <a:rPr lang="en-US" sz="1400" dirty="0" err="1">
+                <a:latin typeface="Courier New" pitchFamily="49" charset="0"/>
+                <a:cs typeface="Courier New" pitchFamily="49" charset="0"/>
+              </a:rPr>
+              <a:t>printf</a:t>
+            </a:r>
+            <a:r>
+              <a:rPr lang="en-US" sz="1400" dirty="0">
+                <a:latin typeface="Courier New" pitchFamily="49" charset="0"/>
+                <a:cs typeface="Courier New" pitchFamily="49" charset="0"/>
+              </a:rPr>
+              <a:t> style)</a:t>
+            </a:r>
+          </a:p>
+          <a:p>
+            <a:r>
+              <a:rPr lang="en-US" sz="1400" dirty="0">
+                <a:latin typeface="Courier New" pitchFamily="49" charset="0"/>
+                <a:cs typeface="Courier New" pitchFamily="49" charset="0"/>
+              </a:rPr>
+              <a:t>%9.3f</a:t>
+            </a:r>
+          </a:p>
+          <a:p>
+            <a:r>
+              <a:rPr lang="en-US" sz="1400" dirty="0">
+                <a:latin typeface="Courier New" pitchFamily="49" charset="0"/>
+                <a:cs typeface="Courier New" pitchFamily="49" charset="0"/>
+              </a:rPr>
+              <a:t>%9.3f</a:t>
+            </a:r>
+          </a:p>
         </p:txBody>
       </p:sp>
       <p:sp>
         <p:nvSpPr>
-          <p:cNvPr id="3" name="Rectangle 2"/>
+          <p:cNvPr id="5" name="TextBox 4"/>
+          <p:cNvSpPr txBox="1"/>
+          <p:nvPr/>
+        </p:nvSpPr>
+        <p:spPr>
+          <a:xfrm>
+            <a:off x="228598" y="609600"/>
+            <a:ext cx="5321778" cy="1295868"/>
+          </a:xfrm>
+          <a:prstGeom prst="rect">
+            <a:avLst/>
+          </a:prstGeom>
+          <a:noFill/>
+        </p:spPr>
+        <p:txBody>
+          <a:bodyPr wrap="none" rtlCol="0">
+            <a:spAutoFit/>
+          </a:bodyPr>
+          <a:lstStyle/>
+          <a:p>
+            <a:pPr>
+              <a:lnSpc>
+                <a:spcPct val="150000"/>
+              </a:lnSpc>
+            </a:pPr>
+            <a:r>
+              <a:rPr lang="en-US" dirty="0" smtClean="0"/>
+              <a:t>Contents divided into:</a:t>
+            </a:r>
+          </a:p>
+          <a:p>
+            <a:pPr marL="577850" indent="-342900">
+              <a:lnSpc>
+                <a:spcPct val="150000"/>
+              </a:lnSpc>
+              <a:buFont typeface="+mj-lt"/>
+              <a:buAutoNum type="arabicPeriod"/>
+            </a:pPr>
+            <a:r>
+              <a:rPr lang="en-US" dirty="0" smtClean="0"/>
+              <a:t> a “mapping” section describing the parameters</a:t>
+            </a:r>
+          </a:p>
+          <a:p>
+            <a:pPr marL="577850" indent="-342900">
+              <a:lnSpc>
+                <a:spcPct val="150000"/>
+              </a:lnSpc>
+              <a:buFont typeface="+mj-lt"/>
+              <a:buAutoNum type="arabicPeriod"/>
+            </a:pPr>
+            <a:r>
+              <a:rPr lang="en-US" dirty="0" smtClean="0"/>
+              <a:t>the force-field where keywords substitute values</a:t>
+            </a:r>
+            <a:endParaRPr lang="en-US" dirty="0"/>
+          </a:p>
+        </p:txBody>
+      </p:sp>
+      <p:sp>
+        <p:nvSpPr>
+          <p:cNvPr id="6" name="Rectangle 5"/>
           <p:cNvSpPr/>
           <p:nvPr/>
         </p:nvSpPr>
         <p:spPr>
           <a:xfrm>
-            <a:off x="304800" y="914400"/>
-            <a:ext cx="7467600" cy="5181600"/>
+            <a:off x="228598" y="2057400"/>
+            <a:ext cx="6306535" cy="3754874"/>
           </a:xfrm>
           <a:prstGeom prst="rect">
             <a:avLst/>
@@ -13324,6 +13262,1149 @@
           </a:p>
         </p:txBody>
       </p:sp>
+      <p:sp>
+        <p:nvSpPr>
+          <p:cNvPr id="7" name="TextBox 6"/>
+          <p:cNvSpPr txBox="1"/>
+          <p:nvPr/>
+        </p:nvSpPr>
+        <p:spPr>
+          <a:xfrm>
+            <a:off x="0" y="0"/>
+            <a:ext cx="9144000" cy="523220"/>
+          </a:xfrm>
+          <a:prstGeom prst="rect">
+            <a:avLst/>
+          </a:prstGeom>
+          <a:noFill/>
+        </p:spPr>
+        <p:txBody>
+          <a:bodyPr wrap="square" rtlCol="0">
+            <a:spAutoFit/>
+          </a:bodyPr>
+          <a:lstStyle/>
+          <a:p>
+            <a:pPr algn="ctr"/>
+            <a:r>
+              <a:rPr lang="en-US" sz="2800" dirty="0">
+                <a:solidFill>
+                  <a:srgbClr val="005400"/>
+                </a:solidFill>
+                <a:latin typeface="Arial Black" pitchFamily="34" charset="0"/>
+              </a:rPr>
+              <a:t>Force Field Template </a:t>
+            </a:r>
+            <a:r>
+              <a:rPr lang="en-US" sz="2800" dirty="0" smtClean="0">
+                <a:solidFill>
+                  <a:srgbClr val="005400"/>
+                </a:solidFill>
+                <a:latin typeface="Arial Black" pitchFamily="34" charset="0"/>
+              </a:rPr>
+              <a:t>File</a:t>
+            </a:r>
+            <a:endParaRPr lang="en-US" sz="2800" dirty="0">
+              <a:solidFill>
+                <a:srgbClr val="005400"/>
+              </a:solidFill>
+              <a:latin typeface="Arial Black" pitchFamily="34" charset="0"/>
+            </a:endParaRPr>
+          </a:p>
+        </p:txBody>
+      </p:sp>
+    </p:spTree>
+    <p:extLst>
+      <p:ext uri="{BB962C8B-B14F-4D97-AF65-F5344CB8AC3E}">
+        <p14:creationId xmlns:p14="http://schemas.microsoft.com/office/powerpoint/2010/main" val="2861303253"/>
+      </p:ext>
+    </p:extLst>
+  </p:cSld>
+  <p:clrMapOvr>
+    <a:masterClrMapping/>
+  </p:clrMapOvr>
+  <p:timing>
+    <p:tnLst>
+      <p:par>
+        <p:cTn id="1" dur="indefinite" restart="never" nodeType="tmRoot"/>
+      </p:par>
+    </p:tnLst>
+  </p:timing>
+</p:sld>
+</file>
+
+<file path=ppt/slides/slide7.xml><?xml version="1.0" encoding="utf-8"?>
+<p:sld xmlns:a="http://schemas.openxmlformats.org/drawingml/2006/main" xmlns:r="http://schemas.openxmlformats.org/officeDocument/2006/relationships" xmlns:p="http://schemas.openxmlformats.org/presentationml/2006/main">
+  <p:cSld>
+    <p:spTree>
+      <p:nvGrpSpPr>
+        <p:cNvPr id="1" name=""/>
+        <p:cNvGrpSpPr/>
+        <p:nvPr/>
+      </p:nvGrpSpPr>
+      <p:grpSpPr>
+        <a:xfrm>
+          <a:off x="0" y="0"/>
+          <a:ext cx="0" cy="0"/>
+          <a:chOff x="0" y="0"/>
+          <a:chExt cx="0" cy="0"/>
+        </a:xfrm>
+      </p:grpSpPr>
+      <p:sp>
+        <p:nvSpPr>
+          <p:cNvPr id="4" name="TextBox 3"/>
+          <p:cNvSpPr txBox="1"/>
+          <p:nvPr/>
+        </p:nvSpPr>
+        <p:spPr>
+          <a:xfrm>
+            <a:off x="0" y="0"/>
+            <a:ext cx="9144000" cy="523220"/>
+          </a:xfrm>
+          <a:prstGeom prst="rect">
+            <a:avLst/>
+          </a:prstGeom>
+          <a:noFill/>
+        </p:spPr>
+        <p:txBody>
+          <a:bodyPr wrap="square" rtlCol="0">
+            <a:spAutoFit/>
+          </a:bodyPr>
+          <a:lstStyle/>
+          <a:p>
+            <a:pPr algn="ctr"/>
+            <a:r>
+              <a:rPr lang="en-US" sz="2800" dirty="0">
+                <a:solidFill>
+                  <a:srgbClr val="005400"/>
+                </a:solidFill>
+                <a:latin typeface="Arial Black" pitchFamily="34" charset="0"/>
+              </a:rPr>
+              <a:t>Force Field Template </a:t>
+            </a:r>
+            <a:r>
+              <a:rPr lang="en-US" sz="2800" dirty="0" smtClean="0">
+                <a:solidFill>
+                  <a:srgbClr val="005400"/>
+                </a:solidFill>
+                <a:latin typeface="Arial Black" pitchFamily="34" charset="0"/>
+              </a:rPr>
+              <a:t>File (II)</a:t>
+            </a:r>
+            <a:endParaRPr lang="en-US" sz="2800" dirty="0">
+              <a:solidFill>
+                <a:srgbClr val="005400"/>
+              </a:solidFill>
+              <a:latin typeface="Arial Black" pitchFamily="34" charset="0"/>
+            </a:endParaRPr>
+          </a:p>
+        </p:txBody>
+      </p:sp>
+      <p:sp>
+        <p:nvSpPr>
+          <p:cNvPr id="2" name="TextBox 1"/>
+          <p:cNvSpPr txBox="1"/>
+          <p:nvPr/>
+        </p:nvSpPr>
+        <p:spPr>
+          <a:xfrm>
+            <a:off x="304800" y="914400"/>
+            <a:ext cx="7595349" cy="5047536"/>
+          </a:xfrm>
+          <a:prstGeom prst="rect">
+            <a:avLst/>
+          </a:prstGeom>
+          <a:noFill/>
+        </p:spPr>
+        <p:txBody>
+          <a:bodyPr wrap="none" rtlCol="0">
+            <a:spAutoFit/>
+          </a:bodyPr>
+          <a:lstStyle/>
+          <a:p>
+            <a:r>
+              <a:rPr lang="en-US" sz="1400" dirty="0">
+                <a:latin typeface="Courier New" pitchFamily="49" charset="0"/>
+                <a:cs typeface="Courier New" pitchFamily="49" charset="0"/>
+              </a:rPr>
+              <a:t>PSF</a:t>
+            </a:r>
+          </a:p>
+          <a:p>
+            <a:endParaRPr lang="en-US" sz="1400" dirty="0">
+              <a:latin typeface="Courier New" pitchFamily="49" charset="0"/>
+              <a:cs typeface="Courier New" pitchFamily="49" charset="0"/>
+            </a:endParaRPr>
+          </a:p>
+          <a:p>
+            <a:r>
+              <a:rPr lang="en-US" sz="1400" dirty="0">
+                <a:latin typeface="Courier New" pitchFamily="49" charset="0"/>
+                <a:cs typeface="Courier New" pitchFamily="49" charset="0"/>
+              </a:rPr>
+              <a:t>       5 !NTITLE</a:t>
+            </a:r>
+          </a:p>
+          <a:p>
+            <a:r>
+              <a:rPr lang="en-US" sz="1400" dirty="0">
+                <a:latin typeface="Courier New" pitchFamily="49" charset="0"/>
+                <a:cs typeface="Courier New" pitchFamily="49" charset="0"/>
+              </a:rPr>
+              <a:t> REMARKS original generated structure x-</a:t>
+            </a:r>
+            <a:r>
+              <a:rPr lang="en-US" sz="1400" dirty="0" err="1">
+                <a:latin typeface="Courier New" pitchFamily="49" charset="0"/>
+                <a:cs typeface="Courier New" pitchFamily="49" charset="0"/>
+              </a:rPr>
+              <a:t>plor</a:t>
+            </a:r>
+            <a:r>
+              <a:rPr lang="en-US" sz="1400" dirty="0">
+                <a:latin typeface="Courier New" pitchFamily="49" charset="0"/>
+                <a:cs typeface="Courier New" pitchFamily="49" charset="0"/>
+              </a:rPr>
+              <a:t> psf file</a:t>
+            </a:r>
+          </a:p>
+          <a:p>
+            <a:r>
+              <a:rPr lang="en-US" sz="1400" dirty="0">
+                <a:latin typeface="Courier New" pitchFamily="49" charset="0"/>
+                <a:cs typeface="Courier New" pitchFamily="49" charset="0"/>
+              </a:rPr>
+              <a:t> REMARKS topology crd.md18_vmd_autopsf-temp.top </a:t>
+            </a:r>
+          </a:p>
+          <a:p>
+            <a:r>
+              <a:rPr lang="en-US" sz="1400" dirty="0">
+                <a:latin typeface="Courier New" pitchFamily="49" charset="0"/>
+                <a:cs typeface="Courier New" pitchFamily="49" charset="0"/>
+              </a:rPr>
+              <a:t> REMARKS segment O1 { first NONE; last NONE; auto angles dihedrals }</a:t>
+            </a:r>
+          </a:p>
+          <a:p>
+            <a:r>
+              <a:rPr lang="en-US" sz="1400" dirty="0">
+                <a:latin typeface="Courier New" pitchFamily="49" charset="0"/>
+                <a:cs typeface="Courier New" pitchFamily="49" charset="0"/>
+              </a:rPr>
+              <a:t> REMARKS segment O2 { first NONE; last NONE; auto angles dihedrals }</a:t>
+            </a:r>
+          </a:p>
+          <a:p>
+            <a:r>
+              <a:rPr lang="en-US" sz="1400" dirty="0">
+                <a:latin typeface="Courier New" pitchFamily="49" charset="0"/>
+                <a:cs typeface="Courier New" pitchFamily="49" charset="0"/>
+              </a:rPr>
+              <a:t> REMARKS segment W1 { first NONE; last NONE; auto angles dihedrals }</a:t>
+            </a:r>
+          </a:p>
+          <a:p>
+            <a:endParaRPr lang="en-US" sz="1400" dirty="0">
+              <a:latin typeface="Courier New" pitchFamily="49" charset="0"/>
+              <a:cs typeface="Courier New" pitchFamily="49" charset="0"/>
+            </a:endParaRPr>
+          </a:p>
+          <a:p>
+            <a:r>
+              <a:rPr lang="en-US" sz="1400" dirty="0" smtClean="0">
+                <a:latin typeface="Courier New" pitchFamily="49" charset="0"/>
+                <a:cs typeface="Courier New" pitchFamily="49" charset="0"/>
+              </a:rPr>
+              <a:t>3692 </a:t>
+            </a:r>
+            <a:r>
+              <a:rPr lang="en-US" sz="1400" dirty="0">
+                <a:latin typeface="Courier New" pitchFamily="49" charset="0"/>
+                <a:cs typeface="Courier New" pitchFamily="49" charset="0"/>
+              </a:rPr>
+              <a:t>!</a:t>
+            </a:r>
+            <a:r>
+              <a:rPr lang="en-US" sz="1400" dirty="0" smtClean="0">
+                <a:latin typeface="Courier New" pitchFamily="49" charset="0"/>
+                <a:cs typeface="Courier New" pitchFamily="49" charset="0"/>
+              </a:rPr>
+              <a:t>NATOM</a:t>
+            </a:r>
+          </a:p>
+          <a:p>
+            <a:r>
+              <a:rPr lang="en-US" sz="1400" dirty="0">
+                <a:latin typeface="Courier New" pitchFamily="49" charset="0"/>
+                <a:cs typeface="Courier New" pitchFamily="49" charset="0"/>
+              </a:rPr>
+              <a:t> </a:t>
+            </a:r>
+            <a:r>
+              <a:rPr lang="en-US" sz="1400" dirty="0" smtClean="0">
+                <a:latin typeface="Courier New" pitchFamily="49" charset="0"/>
+                <a:cs typeface="Courier New" pitchFamily="49" charset="0"/>
+              </a:rPr>
+              <a:t>  1 </a:t>
+            </a:r>
+            <a:r>
+              <a:rPr lang="en-US" sz="1400" dirty="0">
+                <a:latin typeface="Courier New" pitchFamily="49" charset="0"/>
+                <a:cs typeface="Courier New" pitchFamily="49" charset="0"/>
+              </a:rPr>
+              <a:t>O1 </a:t>
+            </a:r>
+            <a:r>
+              <a:rPr lang="en-US" sz="1400" dirty="0" smtClean="0">
+                <a:latin typeface="Courier New" pitchFamily="49" charset="0"/>
+                <a:cs typeface="Courier New" pitchFamily="49" charset="0"/>
+              </a:rPr>
+              <a:t>    1   LIT </a:t>
+            </a:r>
+            <a:r>
+              <a:rPr lang="en-US" sz="1400" dirty="0" err="1" smtClean="0">
+                <a:latin typeface="Courier New" pitchFamily="49" charset="0"/>
+                <a:cs typeface="Courier New" pitchFamily="49" charset="0"/>
+              </a:rPr>
+              <a:t>LIT</a:t>
+            </a:r>
+            <a:r>
+              <a:rPr lang="en-US" sz="1400" dirty="0" smtClean="0">
+                <a:latin typeface="Courier New" pitchFamily="49" charset="0"/>
+                <a:cs typeface="Courier New" pitchFamily="49" charset="0"/>
+              </a:rPr>
+              <a:t>  </a:t>
+            </a:r>
+            <a:r>
+              <a:rPr lang="en-US" sz="1400" dirty="0" err="1" smtClean="0">
+                <a:latin typeface="Courier New" pitchFamily="49" charset="0"/>
+                <a:cs typeface="Courier New" pitchFamily="49" charset="0"/>
+              </a:rPr>
+              <a:t>LIT</a:t>
+            </a:r>
+            <a:r>
+              <a:rPr lang="en-US" sz="1400" dirty="0" smtClean="0">
+                <a:latin typeface="Courier New" pitchFamily="49" charset="0"/>
+                <a:cs typeface="Courier New" pitchFamily="49" charset="0"/>
+              </a:rPr>
+              <a:t>    1.000000      </a:t>
+            </a:r>
+            <a:r>
+              <a:rPr lang="en-US" sz="1400" dirty="0">
+                <a:latin typeface="Courier New" pitchFamily="49" charset="0"/>
+                <a:cs typeface="Courier New" pitchFamily="49" charset="0"/>
+              </a:rPr>
+              <a:t>6.9410   </a:t>
+            </a:r>
+            <a:r>
+              <a:rPr lang="en-US" sz="1400" dirty="0" smtClean="0">
+                <a:latin typeface="Courier New" pitchFamily="49" charset="0"/>
+                <a:cs typeface="Courier New" pitchFamily="49" charset="0"/>
+              </a:rPr>
+              <a:t>       </a:t>
+            </a:r>
+            <a:r>
+              <a:rPr lang="en-US" sz="1400" dirty="0">
+                <a:latin typeface="Courier New" pitchFamily="49" charset="0"/>
+                <a:cs typeface="Courier New" pitchFamily="49" charset="0"/>
+              </a:rPr>
+              <a:t>0</a:t>
+            </a:r>
+          </a:p>
+          <a:p>
+            <a:r>
+              <a:rPr lang="en-US" sz="1400" dirty="0" smtClean="0">
+                <a:latin typeface="Courier New" pitchFamily="49" charset="0"/>
+                <a:cs typeface="Courier New" pitchFamily="49" charset="0"/>
+              </a:rPr>
+              <a:t>   2 </a:t>
+            </a:r>
+            <a:r>
+              <a:rPr lang="en-US" sz="1400" dirty="0">
+                <a:latin typeface="Courier New" pitchFamily="49" charset="0"/>
+                <a:cs typeface="Courier New" pitchFamily="49" charset="0"/>
+              </a:rPr>
+              <a:t>O1  </a:t>
+            </a:r>
+            <a:r>
+              <a:rPr lang="en-US" sz="1400" dirty="0" smtClean="0">
+                <a:latin typeface="Courier New" pitchFamily="49" charset="0"/>
+                <a:cs typeface="Courier New" pitchFamily="49" charset="0"/>
+              </a:rPr>
+              <a:t>   2   LIT </a:t>
+            </a:r>
+            <a:r>
+              <a:rPr lang="en-US" sz="1400" dirty="0" err="1" smtClean="0">
+                <a:latin typeface="Courier New" pitchFamily="49" charset="0"/>
+                <a:cs typeface="Courier New" pitchFamily="49" charset="0"/>
+              </a:rPr>
+              <a:t>LIT</a:t>
+            </a:r>
+            <a:r>
+              <a:rPr lang="en-US" sz="1400" dirty="0" smtClean="0">
+                <a:latin typeface="Courier New" pitchFamily="49" charset="0"/>
+                <a:cs typeface="Courier New" pitchFamily="49" charset="0"/>
+              </a:rPr>
+              <a:t>  </a:t>
+            </a:r>
+            <a:r>
+              <a:rPr lang="en-US" sz="1400" dirty="0" err="1" smtClean="0">
+                <a:latin typeface="Courier New" pitchFamily="49" charset="0"/>
+                <a:cs typeface="Courier New" pitchFamily="49" charset="0"/>
+              </a:rPr>
+              <a:t>LIT</a:t>
+            </a:r>
+            <a:r>
+              <a:rPr lang="en-US" sz="1400" dirty="0" smtClean="0">
+                <a:latin typeface="Courier New" pitchFamily="49" charset="0"/>
+                <a:cs typeface="Courier New" pitchFamily="49" charset="0"/>
+              </a:rPr>
+              <a:t>    1.000000      </a:t>
+            </a:r>
+            <a:r>
+              <a:rPr lang="en-US" sz="1400" dirty="0">
+                <a:latin typeface="Courier New" pitchFamily="49" charset="0"/>
+                <a:cs typeface="Courier New" pitchFamily="49" charset="0"/>
+              </a:rPr>
+              <a:t>6.9410   </a:t>
+            </a:r>
+            <a:r>
+              <a:rPr lang="en-US" sz="1400" dirty="0" smtClean="0">
+                <a:latin typeface="Courier New" pitchFamily="49" charset="0"/>
+                <a:cs typeface="Courier New" pitchFamily="49" charset="0"/>
+              </a:rPr>
+              <a:t>       0</a:t>
+            </a:r>
+          </a:p>
+          <a:p>
+            <a:r>
+              <a:rPr lang="en-US" sz="1400" dirty="0" smtClean="0">
+                <a:latin typeface="Courier New" pitchFamily="49" charset="0"/>
+                <a:cs typeface="Courier New" pitchFamily="49" charset="0"/>
+              </a:rPr>
+              <a:t>……</a:t>
+            </a:r>
+          </a:p>
+          <a:p>
+            <a:r>
+              <a:rPr lang="en-US" sz="1400" dirty="0">
+                <a:latin typeface="Courier New" pitchFamily="49" charset="0"/>
+                <a:cs typeface="Courier New" pitchFamily="49" charset="0"/>
+              </a:rPr>
+              <a:t> 307 O2   307 </a:t>
+            </a:r>
+            <a:r>
+              <a:rPr lang="en-US" sz="1400" dirty="0" smtClean="0">
+                <a:latin typeface="Courier New" pitchFamily="49" charset="0"/>
+                <a:cs typeface="Courier New" pitchFamily="49" charset="0"/>
+              </a:rPr>
+              <a:t>  </a:t>
+            </a:r>
+            <a:r>
+              <a:rPr lang="en-US" sz="1400" dirty="0">
+                <a:latin typeface="Courier New" pitchFamily="49" charset="0"/>
+                <a:cs typeface="Courier New" pitchFamily="49" charset="0"/>
+              </a:rPr>
+              <a:t>CLA </a:t>
+            </a:r>
+            <a:r>
+              <a:rPr lang="en-US" sz="1400" dirty="0" err="1" smtClean="0">
+                <a:latin typeface="Courier New" pitchFamily="49" charset="0"/>
+                <a:cs typeface="Courier New" pitchFamily="49" charset="0"/>
+              </a:rPr>
+              <a:t>CLA</a:t>
+            </a:r>
+            <a:r>
+              <a:rPr lang="en-US" sz="1400" dirty="0" smtClean="0">
+                <a:latin typeface="Courier New" pitchFamily="49" charset="0"/>
+                <a:cs typeface="Courier New" pitchFamily="49" charset="0"/>
+              </a:rPr>
+              <a:t>  </a:t>
+            </a:r>
+            <a:r>
+              <a:rPr lang="en-US" sz="1400" dirty="0" err="1">
+                <a:latin typeface="Courier New" pitchFamily="49" charset="0"/>
+                <a:cs typeface="Courier New" pitchFamily="49" charset="0"/>
+              </a:rPr>
+              <a:t>CLA</a:t>
+            </a:r>
+            <a:r>
+              <a:rPr lang="en-US" sz="1400" dirty="0">
+                <a:latin typeface="Courier New" pitchFamily="49" charset="0"/>
+                <a:cs typeface="Courier New" pitchFamily="49" charset="0"/>
+              </a:rPr>
+              <a:t>   -1.000000   </a:t>
+            </a:r>
+            <a:r>
+              <a:rPr lang="en-US" sz="1400" dirty="0" smtClean="0">
+                <a:latin typeface="Courier New" pitchFamily="49" charset="0"/>
+                <a:cs typeface="Courier New" pitchFamily="49" charset="0"/>
+              </a:rPr>
+              <a:t>  </a:t>
+            </a:r>
+            <a:r>
+              <a:rPr lang="en-US" sz="1400" dirty="0">
+                <a:latin typeface="Courier New" pitchFamily="49" charset="0"/>
+                <a:cs typeface="Courier New" pitchFamily="49" charset="0"/>
+              </a:rPr>
+              <a:t>35.4500       </a:t>
+            </a:r>
+            <a:r>
+              <a:rPr lang="en-US" sz="1400" dirty="0" smtClean="0">
+                <a:latin typeface="Courier New" pitchFamily="49" charset="0"/>
+                <a:cs typeface="Courier New" pitchFamily="49" charset="0"/>
+              </a:rPr>
+              <a:t>   </a:t>
+            </a:r>
+            <a:r>
+              <a:rPr lang="en-US" sz="1400" dirty="0">
+                <a:latin typeface="Courier New" pitchFamily="49" charset="0"/>
+                <a:cs typeface="Courier New" pitchFamily="49" charset="0"/>
+              </a:rPr>
+              <a:t>0</a:t>
+            </a:r>
+          </a:p>
+          <a:p>
+            <a:r>
+              <a:rPr lang="en-US" sz="1400" dirty="0">
+                <a:latin typeface="Courier New" pitchFamily="49" charset="0"/>
+                <a:cs typeface="Courier New" pitchFamily="49" charset="0"/>
+              </a:rPr>
+              <a:t> </a:t>
+            </a:r>
+            <a:r>
+              <a:rPr lang="en-US" sz="1400" dirty="0" smtClean="0">
+                <a:latin typeface="Courier New" pitchFamily="49" charset="0"/>
+                <a:cs typeface="Courier New" pitchFamily="49" charset="0"/>
+              </a:rPr>
+              <a:t>308 </a:t>
+            </a:r>
+            <a:r>
+              <a:rPr lang="en-US" sz="1400" dirty="0">
+                <a:latin typeface="Courier New" pitchFamily="49" charset="0"/>
+                <a:cs typeface="Courier New" pitchFamily="49" charset="0"/>
+              </a:rPr>
+              <a:t>O2   308 </a:t>
+            </a:r>
+            <a:r>
+              <a:rPr lang="en-US" sz="1400" dirty="0" smtClean="0">
+                <a:latin typeface="Courier New" pitchFamily="49" charset="0"/>
+                <a:cs typeface="Courier New" pitchFamily="49" charset="0"/>
+              </a:rPr>
+              <a:t>  </a:t>
+            </a:r>
+            <a:r>
+              <a:rPr lang="en-US" sz="1400" dirty="0">
+                <a:latin typeface="Courier New" pitchFamily="49" charset="0"/>
+                <a:cs typeface="Courier New" pitchFamily="49" charset="0"/>
+              </a:rPr>
+              <a:t>CLA </a:t>
+            </a:r>
+            <a:r>
+              <a:rPr lang="en-US" sz="1400" dirty="0" err="1" smtClean="0">
+                <a:latin typeface="Courier New" pitchFamily="49" charset="0"/>
+                <a:cs typeface="Courier New" pitchFamily="49" charset="0"/>
+              </a:rPr>
+              <a:t>CLA</a:t>
+            </a:r>
+            <a:r>
+              <a:rPr lang="en-US" sz="1400" dirty="0" smtClean="0">
+                <a:latin typeface="Courier New" pitchFamily="49" charset="0"/>
+                <a:cs typeface="Courier New" pitchFamily="49" charset="0"/>
+              </a:rPr>
+              <a:t>  </a:t>
+            </a:r>
+            <a:r>
+              <a:rPr lang="en-US" sz="1400" dirty="0" err="1">
+                <a:latin typeface="Courier New" pitchFamily="49" charset="0"/>
+                <a:cs typeface="Courier New" pitchFamily="49" charset="0"/>
+              </a:rPr>
+              <a:t>CLA</a:t>
+            </a:r>
+            <a:r>
+              <a:rPr lang="en-US" sz="1400" dirty="0">
+                <a:latin typeface="Courier New" pitchFamily="49" charset="0"/>
+                <a:cs typeface="Courier New" pitchFamily="49" charset="0"/>
+              </a:rPr>
+              <a:t>   -1.000000     </a:t>
+            </a:r>
+            <a:r>
+              <a:rPr lang="en-US" sz="1400" dirty="0" smtClean="0">
+                <a:latin typeface="Courier New" pitchFamily="49" charset="0"/>
+                <a:cs typeface="Courier New" pitchFamily="49" charset="0"/>
+              </a:rPr>
+              <a:t>35.4500          </a:t>
+            </a:r>
+            <a:r>
+              <a:rPr lang="en-US" sz="1400" dirty="0">
+                <a:latin typeface="Courier New" pitchFamily="49" charset="0"/>
+                <a:cs typeface="Courier New" pitchFamily="49" charset="0"/>
+              </a:rPr>
+              <a:t>0</a:t>
+            </a:r>
+          </a:p>
+          <a:p>
+            <a:r>
+              <a:rPr lang="en-US" sz="1400" dirty="0" smtClean="0">
+                <a:latin typeface="Courier New" pitchFamily="49" charset="0"/>
+                <a:cs typeface="Courier New" pitchFamily="49" charset="0"/>
+              </a:rPr>
+              <a:t> </a:t>
+            </a:r>
+            <a:r>
+              <a:rPr lang="pl-PL" sz="1400" dirty="0" smtClean="0">
+                <a:latin typeface="Courier New" pitchFamily="49" charset="0"/>
+                <a:cs typeface="Courier New" pitchFamily="49" charset="0"/>
+              </a:rPr>
+              <a:t>309 </a:t>
+            </a:r>
+            <a:r>
+              <a:rPr lang="pl-PL" sz="1400" dirty="0">
+                <a:latin typeface="Courier New" pitchFamily="49" charset="0"/>
+                <a:cs typeface="Courier New" pitchFamily="49" charset="0"/>
+              </a:rPr>
+              <a:t>W1   309  TIP3 OH2  </a:t>
+            </a:r>
+            <a:r>
+              <a:rPr lang="en-US" sz="1400" dirty="0" smtClean="0">
+                <a:latin typeface="Courier New" pitchFamily="49" charset="0"/>
+                <a:cs typeface="Courier New" pitchFamily="49" charset="0"/>
+              </a:rPr>
+              <a:t> </a:t>
+            </a:r>
+            <a:r>
+              <a:rPr lang="pl-PL" sz="1400" dirty="0" smtClean="0">
+                <a:latin typeface="Courier New" pitchFamily="49" charset="0"/>
+                <a:cs typeface="Courier New" pitchFamily="49" charset="0"/>
+              </a:rPr>
+              <a:t>OT   </a:t>
+            </a:r>
+            <a:r>
+              <a:rPr lang="pl-PL" sz="1400" dirty="0">
+                <a:latin typeface="Courier New" pitchFamily="49" charset="0"/>
+                <a:cs typeface="Courier New" pitchFamily="49" charset="0"/>
+              </a:rPr>
+              <a:t>_FF1_____  </a:t>
+            </a:r>
+            <a:r>
+              <a:rPr lang="pl-PL" sz="1400" dirty="0" smtClean="0">
+                <a:latin typeface="Courier New" pitchFamily="49" charset="0"/>
+                <a:cs typeface="Courier New" pitchFamily="49" charset="0"/>
+              </a:rPr>
+              <a:t>   </a:t>
+            </a:r>
+            <a:r>
+              <a:rPr lang="pl-PL" sz="1400" dirty="0">
+                <a:latin typeface="Courier New" pitchFamily="49" charset="0"/>
+                <a:cs typeface="Courier New" pitchFamily="49" charset="0"/>
+              </a:rPr>
+              <a:t>15.9994   </a:t>
+            </a:r>
+            <a:r>
+              <a:rPr lang="pl-PL" sz="1400" dirty="0" smtClean="0">
+                <a:latin typeface="Courier New" pitchFamily="49" charset="0"/>
+                <a:cs typeface="Courier New" pitchFamily="49" charset="0"/>
+              </a:rPr>
+              <a:t>   </a:t>
+            </a:r>
+            <a:r>
+              <a:rPr lang="en-US" sz="1400" dirty="0" smtClean="0">
+                <a:latin typeface="Courier New" pitchFamily="49" charset="0"/>
+                <a:cs typeface="Courier New" pitchFamily="49" charset="0"/>
+              </a:rPr>
+              <a:t> </a:t>
+            </a:r>
+            <a:r>
+              <a:rPr lang="pl-PL" sz="1400" dirty="0" smtClean="0">
+                <a:latin typeface="Courier New" pitchFamily="49" charset="0"/>
+                <a:cs typeface="Courier New" pitchFamily="49" charset="0"/>
+              </a:rPr>
+              <a:t>   </a:t>
+            </a:r>
+            <a:r>
+              <a:rPr lang="pl-PL" sz="1400" dirty="0">
+                <a:latin typeface="Courier New" pitchFamily="49" charset="0"/>
+                <a:cs typeface="Courier New" pitchFamily="49" charset="0"/>
+              </a:rPr>
+              <a:t>0</a:t>
+            </a:r>
+          </a:p>
+          <a:p>
+            <a:r>
+              <a:rPr lang="en-US" sz="1400" dirty="0">
+                <a:latin typeface="Courier New" pitchFamily="49" charset="0"/>
+                <a:cs typeface="Courier New" pitchFamily="49" charset="0"/>
+              </a:rPr>
+              <a:t> </a:t>
+            </a:r>
+            <a:r>
+              <a:rPr lang="en-US" sz="1400" dirty="0" smtClean="0">
+                <a:latin typeface="Courier New" pitchFamily="49" charset="0"/>
+                <a:cs typeface="Courier New" pitchFamily="49" charset="0"/>
+              </a:rPr>
+              <a:t>310 </a:t>
+            </a:r>
+            <a:r>
+              <a:rPr lang="en-US" sz="1400" dirty="0">
+                <a:latin typeface="Courier New" pitchFamily="49" charset="0"/>
+                <a:cs typeface="Courier New" pitchFamily="49" charset="0"/>
+              </a:rPr>
+              <a:t>W1   309  TIP3 </a:t>
+            </a:r>
+            <a:r>
+              <a:rPr lang="en-US" sz="1400" dirty="0" smtClean="0">
+                <a:latin typeface="Courier New" pitchFamily="49" charset="0"/>
+                <a:cs typeface="Courier New" pitchFamily="49" charset="0"/>
+              </a:rPr>
+              <a:t> H1   </a:t>
+            </a:r>
+            <a:r>
+              <a:rPr lang="en-US" sz="1400" dirty="0">
+                <a:latin typeface="Courier New" pitchFamily="49" charset="0"/>
+                <a:cs typeface="Courier New" pitchFamily="49" charset="0"/>
+              </a:rPr>
+              <a:t>HT </a:t>
+            </a:r>
+            <a:r>
+              <a:rPr lang="en-US" sz="1400" dirty="0" smtClean="0">
+                <a:latin typeface="Courier New" pitchFamily="49" charset="0"/>
+                <a:cs typeface="Courier New" pitchFamily="49" charset="0"/>
+              </a:rPr>
+              <a:t>  </a:t>
+            </a:r>
+            <a:r>
+              <a:rPr lang="en-US" sz="1400" dirty="0">
+                <a:latin typeface="Courier New" pitchFamily="49" charset="0"/>
+                <a:cs typeface="Courier New" pitchFamily="49" charset="0"/>
+              </a:rPr>
+              <a:t>_FF2</a:t>
+            </a:r>
+            <a:r>
+              <a:rPr lang="en-US" sz="1400" dirty="0" smtClean="0">
+                <a:latin typeface="Courier New" pitchFamily="49" charset="0"/>
+                <a:cs typeface="Courier New" pitchFamily="49" charset="0"/>
+              </a:rPr>
+              <a:t>_____      </a:t>
+            </a:r>
+            <a:r>
+              <a:rPr lang="en-US" sz="1400" dirty="0">
+                <a:latin typeface="Courier New" pitchFamily="49" charset="0"/>
+                <a:cs typeface="Courier New" pitchFamily="49" charset="0"/>
+              </a:rPr>
+              <a:t>1.0080   </a:t>
+            </a:r>
+            <a:r>
+              <a:rPr lang="en-US" sz="1400" dirty="0" smtClean="0">
+                <a:latin typeface="Courier New" pitchFamily="49" charset="0"/>
+                <a:cs typeface="Courier New" pitchFamily="49" charset="0"/>
+              </a:rPr>
+              <a:t>       </a:t>
+            </a:r>
+            <a:r>
+              <a:rPr lang="en-US" sz="1400" dirty="0">
+                <a:latin typeface="Courier New" pitchFamily="49" charset="0"/>
+                <a:cs typeface="Courier New" pitchFamily="49" charset="0"/>
+              </a:rPr>
+              <a:t>0</a:t>
+            </a:r>
+          </a:p>
+          <a:p>
+            <a:r>
+              <a:rPr lang="en-US" sz="1400" dirty="0">
+                <a:latin typeface="Courier New" pitchFamily="49" charset="0"/>
+                <a:cs typeface="Courier New" pitchFamily="49" charset="0"/>
+              </a:rPr>
+              <a:t> </a:t>
+            </a:r>
+            <a:r>
+              <a:rPr lang="en-US" sz="1400" dirty="0" smtClean="0">
+                <a:latin typeface="Courier New" pitchFamily="49" charset="0"/>
+                <a:cs typeface="Courier New" pitchFamily="49" charset="0"/>
+              </a:rPr>
+              <a:t>311 </a:t>
+            </a:r>
+            <a:r>
+              <a:rPr lang="en-US" sz="1400" dirty="0">
+                <a:latin typeface="Courier New" pitchFamily="49" charset="0"/>
+                <a:cs typeface="Courier New" pitchFamily="49" charset="0"/>
+              </a:rPr>
+              <a:t>W1   309  TIP3 </a:t>
+            </a:r>
+            <a:r>
+              <a:rPr lang="en-US" sz="1400" dirty="0" smtClean="0">
+                <a:latin typeface="Courier New" pitchFamily="49" charset="0"/>
+                <a:cs typeface="Courier New" pitchFamily="49" charset="0"/>
+              </a:rPr>
+              <a:t> H2   HT   </a:t>
+            </a:r>
+            <a:r>
+              <a:rPr lang="en-US" sz="1400" dirty="0">
+                <a:latin typeface="Courier New" pitchFamily="49" charset="0"/>
+                <a:cs typeface="Courier New" pitchFamily="49" charset="0"/>
+              </a:rPr>
+              <a:t>_FF2</a:t>
+            </a:r>
+            <a:r>
+              <a:rPr lang="en-US" sz="1400" dirty="0" smtClean="0">
+                <a:latin typeface="Courier New" pitchFamily="49" charset="0"/>
+                <a:cs typeface="Courier New" pitchFamily="49" charset="0"/>
+              </a:rPr>
+              <a:t>_____      </a:t>
+            </a:r>
+            <a:r>
+              <a:rPr lang="en-US" sz="1400" dirty="0">
+                <a:latin typeface="Courier New" pitchFamily="49" charset="0"/>
+                <a:cs typeface="Courier New" pitchFamily="49" charset="0"/>
+              </a:rPr>
+              <a:t>1.0080   </a:t>
+            </a:r>
+            <a:r>
+              <a:rPr lang="en-US" sz="1400" dirty="0" smtClean="0">
+                <a:latin typeface="Courier New" pitchFamily="49" charset="0"/>
+                <a:cs typeface="Courier New" pitchFamily="49" charset="0"/>
+              </a:rPr>
+              <a:t>       </a:t>
+            </a:r>
+            <a:r>
+              <a:rPr lang="en-US" sz="1400" dirty="0">
+                <a:latin typeface="Courier New" pitchFamily="49" charset="0"/>
+                <a:cs typeface="Courier New" pitchFamily="49" charset="0"/>
+              </a:rPr>
+              <a:t>0</a:t>
+            </a:r>
+          </a:p>
+          <a:p>
+            <a:r>
+              <a:rPr lang="pl-PL" sz="1400" dirty="0">
+                <a:latin typeface="Courier New" pitchFamily="49" charset="0"/>
+                <a:cs typeface="Courier New" pitchFamily="49" charset="0"/>
+              </a:rPr>
+              <a:t> </a:t>
+            </a:r>
+            <a:r>
+              <a:rPr lang="pl-PL" sz="1400" dirty="0" smtClean="0">
+                <a:latin typeface="Courier New" pitchFamily="49" charset="0"/>
+                <a:cs typeface="Courier New" pitchFamily="49" charset="0"/>
+              </a:rPr>
+              <a:t>312 </a:t>
+            </a:r>
+            <a:r>
+              <a:rPr lang="pl-PL" sz="1400" dirty="0">
+                <a:latin typeface="Courier New" pitchFamily="49" charset="0"/>
+                <a:cs typeface="Courier New" pitchFamily="49" charset="0"/>
+              </a:rPr>
+              <a:t>W1   310  TIP3 OH2 </a:t>
+            </a:r>
+            <a:r>
+              <a:rPr lang="en-US" sz="1400" dirty="0" smtClean="0">
+                <a:latin typeface="Courier New" pitchFamily="49" charset="0"/>
+                <a:cs typeface="Courier New" pitchFamily="49" charset="0"/>
+              </a:rPr>
+              <a:t> </a:t>
+            </a:r>
+            <a:r>
+              <a:rPr lang="pl-PL" sz="1400" dirty="0" smtClean="0">
+                <a:latin typeface="Courier New" pitchFamily="49" charset="0"/>
+                <a:cs typeface="Courier New" pitchFamily="49" charset="0"/>
+              </a:rPr>
+              <a:t> OT   </a:t>
+            </a:r>
+            <a:r>
+              <a:rPr lang="pl-PL" sz="1400" dirty="0">
+                <a:latin typeface="Courier New" pitchFamily="49" charset="0"/>
+                <a:cs typeface="Courier New" pitchFamily="49" charset="0"/>
+              </a:rPr>
+              <a:t>_FF1_____    </a:t>
+            </a:r>
+            <a:r>
+              <a:rPr lang="pl-PL" sz="1400" dirty="0" smtClean="0">
+                <a:latin typeface="Courier New" pitchFamily="49" charset="0"/>
+                <a:cs typeface="Courier New" pitchFamily="49" charset="0"/>
+              </a:rPr>
+              <a:t> </a:t>
+            </a:r>
+            <a:r>
+              <a:rPr lang="pl-PL" sz="1400" dirty="0">
+                <a:latin typeface="Courier New" pitchFamily="49" charset="0"/>
+                <a:cs typeface="Courier New" pitchFamily="49" charset="0"/>
+              </a:rPr>
+              <a:t>15.9994   </a:t>
+            </a:r>
+            <a:r>
+              <a:rPr lang="pl-PL" sz="1400" dirty="0" smtClean="0">
+                <a:latin typeface="Courier New" pitchFamily="49" charset="0"/>
+                <a:cs typeface="Courier New" pitchFamily="49" charset="0"/>
+              </a:rPr>
+              <a:t>       </a:t>
+            </a:r>
+            <a:r>
+              <a:rPr lang="pl-PL" sz="1400" dirty="0">
+                <a:latin typeface="Courier New" pitchFamily="49" charset="0"/>
+                <a:cs typeface="Courier New" pitchFamily="49" charset="0"/>
+              </a:rPr>
+              <a:t>0</a:t>
+            </a:r>
+          </a:p>
+          <a:p>
+            <a:r>
+              <a:rPr lang="en-US" sz="1400" dirty="0">
+                <a:latin typeface="Courier New" pitchFamily="49" charset="0"/>
+                <a:cs typeface="Courier New" pitchFamily="49" charset="0"/>
+              </a:rPr>
+              <a:t> </a:t>
+            </a:r>
+            <a:r>
+              <a:rPr lang="en-US" sz="1400" dirty="0" smtClean="0">
+                <a:latin typeface="Courier New" pitchFamily="49" charset="0"/>
+                <a:cs typeface="Courier New" pitchFamily="49" charset="0"/>
+              </a:rPr>
+              <a:t>313 </a:t>
+            </a:r>
+            <a:r>
+              <a:rPr lang="en-US" sz="1400" dirty="0">
+                <a:latin typeface="Courier New" pitchFamily="49" charset="0"/>
+                <a:cs typeface="Courier New" pitchFamily="49" charset="0"/>
+              </a:rPr>
+              <a:t>W1   310  TIP3 </a:t>
+            </a:r>
+            <a:r>
+              <a:rPr lang="en-US" sz="1400" dirty="0" smtClean="0">
+                <a:latin typeface="Courier New" pitchFamily="49" charset="0"/>
+                <a:cs typeface="Courier New" pitchFamily="49" charset="0"/>
+              </a:rPr>
+              <a:t> H1   HT   </a:t>
+            </a:r>
+            <a:r>
+              <a:rPr lang="en-US" sz="1400" dirty="0">
+                <a:latin typeface="Courier New" pitchFamily="49" charset="0"/>
+                <a:cs typeface="Courier New" pitchFamily="49" charset="0"/>
+              </a:rPr>
+              <a:t>_FF2</a:t>
+            </a:r>
+            <a:r>
+              <a:rPr lang="en-US" sz="1400" dirty="0" smtClean="0">
+                <a:latin typeface="Courier New" pitchFamily="49" charset="0"/>
+                <a:cs typeface="Courier New" pitchFamily="49" charset="0"/>
+              </a:rPr>
+              <a:t>_____      </a:t>
+            </a:r>
+            <a:r>
+              <a:rPr lang="en-US" sz="1400" dirty="0">
+                <a:latin typeface="Courier New" pitchFamily="49" charset="0"/>
+                <a:cs typeface="Courier New" pitchFamily="49" charset="0"/>
+              </a:rPr>
+              <a:t>1.0080   </a:t>
+            </a:r>
+            <a:r>
+              <a:rPr lang="en-US" sz="1400" dirty="0" smtClean="0">
+                <a:latin typeface="Courier New" pitchFamily="49" charset="0"/>
+                <a:cs typeface="Courier New" pitchFamily="49" charset="0"/>
+              </a:rPr>
+              <a:t>       </a:t>
+            </a:r>
+            <a:r>
+              <a:rPr lang="en-US" sz="1400" dirty="0">
+                <a:latin typeface="Courier New" pitchFamily="49" charset="0"/>
+                <a:cs typeface="Courier New" pitchFamily="49" charset="0"/>
+              </a:rPr>
+              <a:t>0</a:t>
+            </a:r>
+          </a:p>
+          <a:p>
+            <a:r>
+              <a:rPr lang="en-US" sz="1400" dirty="0">
+                <a:latin typeface="Courier New" pitchFamily="49" charset="0"/>
+                <a:cs typeface="Courier New" pitchFamily="49" charset="0"/>
+              </a:rPr>
+              <a:t> </a:t>
+            </a:r>
+            <a:r>
+              <a:rPr lang="en-US" sz="1400" dirty="0" smtClean="0">
+                <a:latin typeface="Courier New" pitchFamily="49" charset="0"/>
+                <a:cs typeface="Courier New" pitchFamily="49" charset="0"/>
+              </a:rPr>
+              <a:t>314 </a:t>
+            </a:r>
+            <a:r>
+              <a:rPr lang="en-US" sz="1400" dirty="0">
+                <a:latin typeface="Courier New" pitchFamily="49" charset="0"/>
+                <a:cs typeface="Courier New" pitchFamily="49" charset="0"/>
+              </a:rPr>
+              <a:t>W1   310  </a:t>
+            </a:r>
+            <a:r>
+              <a:rPr lang="en-US" sz="1400" dirty="0" smtClean="0">
+                <a:latin typeface="Courier New" pitchFamily="49" charset="0"/>
+                <a:cs typeface="Courier New" pitchFamily="49" charset="0"/>
+              </a:rPr>
+              <a:t>TIP3  H2   HT   </a:t>
+            </a:r>
+            <a:r>
+              <a:rPr lang="en-US" sz="1400" dirty="0">
+                <a:latin typeface="Courier New" pitchFamily="49" charset="0"/>
+                <a:cs typeface="Courier New" pitchFamily="49" charset="0"/>
+              </a:rPr>
+              <a:t>_FF2</a:t>
+            </a:r>
+            <a:r>
+              <a:rPr lang="en-US" sz="1400" dirty="0" smtClean="0">
+                <a:latin typeface="Courier New" pitchFamily="49" charset="0"/>
+                <a:cs typeface="Courier New" pitchFamily="49" charset="0"/>
+              </a:rPr>
+              <a:t>_____      </a:t>
+            </a:r>
+            <a:r>
+              <a:rPr lang="en-US" sz="1400" dirty="0">
+                <a:latin typeface="Courier New" pitchFamily="49" charset="0"/>
+                <a:cs typeface="Courier New" pitchFamily="49" charset="0"/>
+              </a:rPr>
+              <a:t>1.0080   </a:t>
+            </a:r>
+            <a:r>
+              <a:rPr lang="en-US" sz="1400" dirty="0" smtClean="0">
+                <a:latin typeface="Courier New" pitchFamily="49" charset="0"/>
+                <a:cs typeface="Courier New" pitchFamily="49" charset="0"/>
+              </a:rPr>
+              <a:t>       </a:t>
+            </a:r>
+            <a:r>
+              <a:rPr lang="en-US" sz="1400" dirty="0">
+                <a:latin typeface="Courier New" pitchFamily="49" charset="0"/>
+                <a:cs typeface="Courier New" pitchFamily="49" charset="0"/>
+              </a:rPr>
+              <a:t>0</a:t>
+            </a:r>
+          </a:p>
+          <a:p>
+            <a:r>
+              <a:rPr lang="pl-PL" sz="1400" dirty="0">
+                <a:latin typeface="Courier New" pitchFamily="49" charset="0"/>
+                <a:cs typeface="Courier New" pitchFamily="49" charset="0"/>
+              </a:rPr>
+              <a:t> </a:t>
+            </a:r>
+            <a:r>
+              <a:rPr lang="pl-PL" sz="1400" dirty="0" smtClean="0">
+                <a:latin typeface="Courier New" pitchFamily="49" charset="0"/>
+                <a:cs typeface="Courier New" pitchFamily="49" charset="0"/>
+              </a:rPr>
+              <a:t>315 </a:t>
+            </a:r>
+            <a:r>
+              <a:rPr lang="pl-PL" sz="1400" dirty="0">
+                <a:latin typeface="Courier New" pitchFamily="49" charset="0"/>
+                <a:cs typeface="Courier New" pitchFamily="49" charset="0"/>
+              </a:rPr>
+              <a:t>W1   311  TIP3 OH2  </a:t>
+            </a:r>
+            <a:r>
+              <a:rPr lang="en-US" sz="1400" dirty="0" smtClean="0">
+                <a:latin typeface="Courier New" pitchFamily="49" charset="0"/>
+                <a:cs typeface="Courier New" pitchFamily="49" charset="0"/>
+              </a:rPr>
+              <a:t> </a:t>
+            </a:r>
+            <a:r>
+              <a:rPr lang="pl-PL" sz="1400" dirty="0" smtClean="0">
+                <a:latin typeface="Courier New" pitchFamily="49" charset="0"/>
+                <a:cs typeface="Courier New" pitchFamily="49" charset="0"/>
+              </a:rPr>
+              <a:t>OT   </a:t>
+            </a:r>
+            <a:r>
+              <a:rPr lang="pl-PL" sz="1400" dirty="0">
+                <a:latin typeface="Courier New" pitchFamily="49" charset="0"/>
+                <a:cs typeface="Courier New" pitchFamily="49" charset="0"/>
+              </a:rPr>
+              <a:t>_FF1_____    </a:t>
+            </a:r>
+            <a:r>
+              <a:rPr lang="pl-PL" sz="1400" dirty="0" smtClean="0">
+                <a:latin typeface="Courier New" pitchFamily="49" charset="0"/>
+                <a:cs typeface="Courier New" pitchFamily="49" charset="0"/>
+              </a:rPr>
+              <a:t> </a:t>
+            </a:r>
+            <a:r>
+              <a:rPr lang="pl-PL" sz="1400" dirty="0">
+                <a:latin typeface="Courier New" pitchFamily="49" charset="0"/>
+                <a:cs typeface="Courier New" pitchFamily="49" charset="0"/>
+              </a:rPr>
+              <a:t>15.9994   </a:t>
+            </a:r>
+            <a:r>
+              <a:rPr lang="pl-PL" sz="1400" dirty="0" smtClean="0">
+                <a:latin typeface="Courier New" pitchFamily="49" charset="0"/>
+                <a:cs typeface="Courier New" pitchFamily="49" charset="0"/>
+              </a:rPr>
+              <a:t>       0</a:t>
+            </a:r>
+            <a:endParaRPr lang="en-US" sz="1400" dirty="0" smtClean="0">
+              <a:latin typeface="Courier New" pitchFamily="49" charset="0"/>
+              <a:cs typeface="Courier New" pitchFamily="49" charset="0"/>
+            </a:endParaRPr>
+          </a:p>
+          <a:p>
+            <a:r>
+              <a:rPr lang="en-US" sz="1400" dirty="0" smtClean="0">
+                <a:latin typeface="Courier New" pitchFamily="49" charset="0"/>
+                <a:cs typeface="Courier New" pitchFamily="49" charset="0"/>
+              </a:rPr>
+              <a:t>…..</a:t>
+            </a:r>
+            <a:endParaRPr lang="en-US" sz="1400" dirty="0">
+              <a:latin typeface="Courier New" pitchFamily="49" charset="0"/>
+              <a:cs typeface="Courier New" pitchFamily="49" charset="0"/>
+            </a:endParaRPr>
+          </a:p>
+        </p:txBody>
+      </p:sp>
+      <p:sp>
+        <p:nvSpPr>
+          <p:cNvPr id="3" name="Rectangle 2"/>
+          <p:cNvSpPr/>
+          <p:nvPr/>
+        </p:nvSpPr>
+        <p:spPr>
+          <a:xfrm>
+            <a:off x="304800" y="914400"/>
+            <a:ext cx="7467600" cy="5181600"/>
+          </a:xfrm>
+          <a:prstGeom prst="rect">
+            <a:avLst/>
+          </a:prstGeom>
+          <a:noFill/>
+          <a:ln>
+            <a:solidFill>
+              <a:schemeClr val="tx1"/>
+            </a:solidFill>
+          </a:ln>
+        </p:spPr>
+        <p:style>
+          <a:lnRef idx="2">
+            <a:schemeClr val="accent1">
+              <a:shade val="50000"/>
+            </a:schemeClr>
+          </a:lnRef>
+          <a:fillRef idx="1">
+            <a:schemeClr val="accent1"/>
+          </a:fillRef>
+          <a:effectRef idx="0">
+            <a:schemeClr val="accent1"/>
+          </a:effectRef>
+          <a:fontRef idx="minor">
+            <a:schemeClr val="lt1"/>
+          </a:fontRef>
+        </p:style>
+        <p:txBody>
+          <a:bodyPr rtlCol="0" anchor="ctr"/>
+          <a:lstStyle/>
+          <a:p>
+            <a:pPr algn="ctr"/>
+            <a:endParaRPr lang="en-US"/>
+          </a:p>
+        </p:txBody>
+      </p:sp>
     </p:spTree>
     <p:extLst>
       <p:ext uri="{BB962C8B-B14F-4D97-AF65-F5344CB8AC3E}">
@@ -13344,7 +14425,7 @@
 </p:sld>
 </file>
 
-<file path=ppt/slides/slide7.xml><?xml version="1.0" encoding="utf-8"?>
+<file path=ppt/slides/slide8.xml><?xml version="1.0" encoding="utf-8"?>
 <p:sld xmlns:a="http://schemas.openxmlformats.org/drawingml/2006/main" xmlns:r="http://schemas.openxmlformats.org/officeDocument/2006/relationships" xmlns:p="http://schemas.openxmlformats.org/presentationml/2006/main">
   <p:cSld>
     <p:spTree>
@@ -13676,123 +14757,6 @@
 </p:sld>
 </file>
 
-<file path=ppt/slides/slide8.xml><?xml version="1.0" encoding="utf-8"?>
-<p:sld xmlns:a="http://schemas.openxmlformats.org/drawingml/2006/main" xmlns:r="http://schemas.openxmlformats.org/officeDocument/2006/relationships" xmlns:p="http://schemas.openxmlformats.org/presentationml/2006/main">
-  <p:cSld>
-    <p:spTree>
-      <p:nvGrpSpPr>
-        <p:cNvPr id="1" name=""/>
-        <p:cNvGrpSpPr/>
-        <p:nvPr/>
-      </p:nvGrpSpPr>
-      <p:grpSpPr>
-        <a:xfrm>
-          <a:off x="0" y="0"/>
-          <a:ext cx="0" cy="0"/>
-          <a:chOff x="0" y="0"/>
-          <a:chExt cx="0" cy="0"/>
-        </a:xfrm>
-      </p:grpSpPr>
-      <p:sp>
-        <p:nvSpPr>
-          <p:cNvPr id="4" name="TextBox 3"/>
-          <p:cNvSpPr txBox="1"/>
-          <p:nvPr/>
-        </p:nvSpPr>
-        <p:spPr>
-          <a:xfrm>
-            <a:off x="0" y="0"/>
-            <a:ext cx="9144000" cy="523220"/>
-          </a:xfrm>
-          <a:prstGeom prst="rect">
-            <a:avLst/>
-          </a:prstGeom>
-          <a:noFill/>
-        </p:spPr>
-        <p:txBody>
-          <a:bodyPr wrap="square" rtlCol="0">
-            <a:spAutoFit/>
-          </a:bodyPr>
-          <a:lstStyle/>
-          <a:p>
-            <a:pPr algn="ctr"/>
-            <a:r>
-              <a:rPr lang="en-US" sz="2800" dirty="0" smtClean="0">
-                <a:solidFill>
-                  <a:srgbClr val="005400"/>
-                </a:solidFill>
-                <a:latin typeface="Arial Black" pitchFamily="34" charset="0"/>
-              </a:rPr>
-              <a:t>Simulation Server Module</a:t>
-            </a:r>
-            <a:endParaRPr lang="en-US" sz="2800" dirty="0">
-              <a:solidFill>
-                <a:srgbClr val="005400"/>
-              </a:solidFill>
-              <a:latin typeface="Arial Black" pitchFamily="34" charset="0"/>
-            </a:endParaRPr>
-          </a:p>
-        </p:txBody>
-      </p:sp>
-      <p:pic>
-        <p:nvPicPr>
-          <p:cNvPr id="3075" name="Picture 3" descr="C:\Documents and Settings\Jose Borreguero\My Documents\projects\development\CAMM\github\documents\Jose\SimulationServerModule.jpeg"/>
-          <p:cNvPicPr>
-            <a:picLocks noChangeAspect="1" noChangeArrowheads="1"/>
-          </p:cNvPicPr>
-          <p:nvPr/>
-        </p:nvPicPr>
-        <p:blipFill rotWithShape="1">
-          <a:blip r:embed="rId2">
-            <a:extLst>
-              <a:ext uri="{28A0092B-C50C-407E-A947-70E740481C1C}">
-                <a14:useLocalDpi xmlns:a14="http://schemas.microsoft.com/office/drawing/2010/main" val="0"/>
-              </a:ext>
-            </a:extLst>
-          </a:blip>
-          <a:srcRect l="9908" t="9347" r="26783" b="38324"/>
-          <a:stretch/>
-        </p:blipFill>
-        <p:spPr bwMode="auto">
-          <a:xfrm>
-            <a:off x="2057400" y="523220"/>
-            <a:ext cx="5467350" cy="5848351"/>
-          </a:xfrm>
-          <a:prstGeom prst="rect">
-            <a:avLst/>
-          </a:prstGeom>
-          <a:noFill/>
-          <a:extLst>
-            <a:ext uri="{909E8E84-426E-40DD-AFC4-6F175D3DCCD1}">
-              <a14:hiddenFill xmlns:a14="http://schemas.microsoft.com/office/drawing/2010/main">
-                <a:solidFill>
-                  <a:srgbClr val="FFFFFF"/>
-                </a:solidFill>
-              </a14:hiddenFill>
-            </a:ext>
-          </a:extLst>
-        </p:spPr>
-      </p:pic>
-    </p:spTree>
-    <p:extLst>
-      <p:ext uri="{BB962C8B-B14F-4D97-AF65-F5344CB8AC3E}">
-        <p14:creationId xmlns:p14="http://schemas.microsoft.com/office/powerpoint/2010/main" val="2854708421"/>
-      </p:ext>
-    </p:extLst>
-  </p:cSld>
-  <p:clrMapOvr>
-    <a:masterClrMapping/>
-  </p:clrMapOvr>
-  <p:timing>
-    <p:tnLst>
-      <p:par>
-        <p:cTn id="1" dur="indefinite" restart="never" nodeType="tmRoot"/>
-      </p:par>
-    </p:tnLst>
-  </p:timing>
-</p:sld>
-</file>
-
 <file path=ppt/slides/slide9.xml><?xml version="1.0" encoding="utf-8"?>
 <p:sld xmlns:a="http://schemas.openxmlformats.org/drawingml/2006/main" xmlns:r="http://schemas.openxmlformats.org/officeDocument/2006/relationships" xmlns:p="http://schemas.openxmlformats.org/presentationml/2006/main">
   <p:cSld>
@@ -13840,7 +14804,7 @@
                 </a:solidFill>
                 <a:latin typeface="Arial Black" pitchFamily="34" charset="0"/>
               </a:rPr>
-              <a:t>Dakota Input File Structure</a:t>
+              <a:t>Simulation Server Module</a:t>
             </a:r>
             <a:endParaRPr lang="en-US" sz="2800" dirty="0">
               <a:solidFill>
@@ -13851,210 +14815,49 @@
           </a:p>
         </p:txBody>
       </p:sp>
-      <p:grpSp>
-        <p:nvGrpSpPr>
-          <p:cNvPr id="6" name="Group 5"/>
-          <p:cNvGrpSpPr/>
+      <p:pic>
+        <p:nvPicPr>
+          <p:cNvPr id="3075" name="Picture 3" descr="C:\Documents and Settings\Jose Borreguero\My Documents\projects\development\CAMM\github\documents\Jose\SimulationServerModule.jpeg"/>
+          <p:cNvPicPr>
+            <a:picLocks noChangeAspect="1" noChangeArrowheads="1"/>
+          </p:cNvPicPr>
           <p:nvPr/>
-        </p:nvGrpSpPr>
-        <p:grpSpPr>
-          <a:xfrm>
-            <a:off x="2971075" y="381000"/>
-            <a:ext cx="2743925" cy="6170162"/>
-            <a:chOff x="3428275" y="381000"/>
-            <a:chExt cx="2743925" cy="6170162"/>
-          </a:xfrm>
-        </p:grpSpPr>
-        <p:pic>
-          <p:nvPicPr>
-            <p:cNvPr id="3074" name="Picture 2" descr="C:\Documents and Settings\Jose Borreguero\My Documents\projects\development\CAMM\github\documents\Jose\DakotaNestedInputFile.jpeg"/>
-            <p:cNvPicPr>
-              <a:picLocks noChangeAspect="1" noChangeArrowheads="1"/>
-            </p:cNvPicPr>
-            <p:nvPr/>
-          </p:nvPicPr>
-          <p:blipFill rotWithShape="1">
-            <a:blip r:embed="rId2" cstate="print">
-              <a:extLst>
-                <a:ext uri="{28A0092B-C50C-407E-A947-70E740481C1C}">
-                  <a14:useLocalDpi xmlns:a14="http://schemas.microsoft.com/office/drawing/2010/main" val="0"/>
-                </a:ext>
-              </a:extLst>
-            </a:blip>
-            <a:srcRect l="8716" t="11568" r="54870" b="25159"/>
-            <a:stretch/>
-          </p:blipFill>
-          <p:spPr bwMode="auto">
-            <a:xfrm>
-              <a:off x="3428275" y="381000"/>
-              <a:ext cx="2743925" cy="6170162"/>
-            </a:xfrm>
-            <a:prstGeom prst="rect">
-              <a:avLst/>
-            </a:prstGeom>
-            <a:noFill/>
+        </p:nvPicPr>
+        <p:blipFill rotWithShape="1">
+          <a:blip r:embed="rId2">
             <a:extLst>
-              <a:ext uri="{909E8E84-426E-40DD-AFC4-6F175D3DCCD1}">
-                <a14:hiddenFill xmlns:a14="http://schemas.microsoft.com/office/drawing/2010/main">
-                  <a:solidFill>
-                    <a:srgbClr val="FFFFFF"/>
-                  </a:solidFill>
-                </a14:hiddenFill>
+              <a:ext uri="{28A0092B-C50C-407E-A947-70E740481C1C}">
+                <a14:useLocalDpi xmlns:a14="http://schemas.microsoft.com/office/drawing/2010/main" val="0"/>
               </a:ext>
             </a:extLst>
-          </p:spPr>
-        </p:pic>
-        <p:sp>
-          <p:nvSpPr>
-            <p:cNvPr id="5" name="Rectangle 4"/>
-            <p:cNvSpPr/>
-            <p:nvPr/>
-          </p:nvSpPr>
-          <p:spPr>
-            <a:xfrm>
-              <a:off x="3657600" y="3200400"/>
-              <a:ext cx="2362200" cy="265681"/>
-            </a:xfrm>
-            <a:prstGeom prst="rect">
-              <a:avLst/>
-            </a:prstGeom>
-            <a:solidFill>
-              <a:schemeClr val="bg1"/>
-            </a:solidFill>
-            <a:ln>
-              <a:solidFill>
-                <a:schemeClr val="bg1"/>
-              </a:solidFill>
-            </a:ln>
-          </p:spPr>
-          <p:style>
-            <a:lnRef idx="2">
-              <a:schemeClr val="accent1">
-                <a:shade val="50000"/>
-              </a:schemeClr>
-            </a:lnRef>
-            <a:fillRef idx="1">
-              <a:schemeClr val="accent1"/>
-            </a:fillRef>
-            <a:effectRef idx="0">
-              <a:schemeClr val="accent1"/>
-            </a:effectRef>
-            <a:fontRef idx="minor">
-              <a:schemeClr val="lt1"/>
-            </a:fontRef>
-          </p:style>
-          <p:txBody>
-            <a:bodyPr rtlCol="0" anchor="ctr"/>
-            <a:lstStyle/>
-            <a:p>
-              <a:pPr algn="ctr"/>
-              <a:endParaRPr lang="en-US"/>
-            </a:p>
-          </p:txBody>
-        </p:sp>
-      </p:grpSp>
-      <p:sp>
-        <p:nvSpPr>
-          <p:cNvPr id="2" name="Rounded Rectangle 1"/>
-          <p:cNvSpPr/>
-          <p:nvPr/>
-        </p:nvSpPr>
-        <p:spPr>
+          </a:blip>
+          <a:srcRect l="9908" t="9347" r="26783" b="38324"/>
+          <a:stretch/>
+        </p:blipFill>
+        <p:spPr bwMode="auto">
           <a:xfrm>
-            <a:off x="3048000" y="457200"/>
-            <a:ext cx="2667725" cy="2296180"/>
-          </a:xfrm>
-          <a:prstGeom prst="roundRect">
-            <a:avLst>
-              <a:gd name="adj" fmla="val 7406"/>
-            </a:avLst>
-          </a:prstGeom>
-          <a:solidFill>
-            <a:schemeClr val="accent1">
-              <a:alpha val="23000"/>
-            </a:schemeClr>
-          </a:solidFill>
-          <a:ln>
-            <a:noFill/>
-          </a:ln>
-        </p:spPr>
-        <p:style>
-          <a:lnRef idx="2">
-            <a:schemeClr val="accent1">
-              <a:shade val="50000"/>
-            </a:schemeClr>
-          </a:lnRef>
-          <a:fillRef idx="1">
-            <a:schemeClr val="accent1"/>
-          </a:fillRef>
-          <a:effectRef idx="0">
-            <a:schemeClr val="accent1"/>
-          </a:effectRef>
-          <a:fontRef idx="minor">
-            <a:schemeClr val="lt1"/>
-          </a:fontRef>
-        </p:style>
-        <p:txBody>
-          <a:bodyPr rtlCol="0" anchor="ctr"/>
-          <a:lstStyle/>
-          <a:p>
-            <a:pPr algn="ctr"/>
-            <a:endParaRPr lang="en-US"/>
-          </a:p>
-        </p:txBody>
-      </p:sp>
-      <p:sp>
-        <p:nvSpPr>
-          <p:cNvPr id="3" name="Rounded Rectangle 2"/>
-          <p:cNvSpPr/>
-          <p:nvPr/>
-        </p:nvSpPr>
-        <p:spPr>
-          <a:xfrm>
-            <a:off x="3048000" y="3333240"/>
-            <a:ext cx="2743925" cy="3296160"/>
-          </a:xfrm>
-          <a:prstGeom prst="roundRect">
-            <a:avLst>
-              <a:gd name="adj" fmla="val 6205"/>
-            </a:avLst>
+            <a:off x="2057400" y="523220"/>
+            <a:ext cx="5467350" cy="5848351"/>
+          </a:xfrm>
+          <a:prstGeom prst="rect">
+            <a:avLst/>
           </a:prstGeom>
           <a:noFill/>
-          <a:ln>
-            <a:solidFill>
-              <a:srgbClr val="FF0000"/>
-            </a:solidFill>
-          </a:ln>
+          <a:extLst>
+            <a:ext uri="{909E8E84-426E-40DD-AFC4-6F175D3DCCD1}">
+              <a14:hiddenFill xmlns:a14="http://schemas.microsoft.com/office/drawing/2010/main">
+                <a:solidFill>
+                  <a:srgbClr val="FFFFFF"/>
+                </a:solidFill>
+              </a14:hiddenFill>
+            </a:ext>
+          </a:extLst>
         </p:spPr>
-        <p:style>
-          <a:lnRef idx="2">
-            <a:schemeClr val="accent1">
-              <a:shade val="50000"/>
-            </a:schemeClr>
-          </a:lnRef>
-          <a:fillRef idx="1">
-            <a:schemeClr val="accent1"/>
-          </a:fillRef>
-          <a:effectRef idx="0">
-            <a:schemeClr val="accent1"/>
-          </a:effectRef>
-          <a:fontRef idx="minor">
-            <a:schemeClr val="lt1"/>
-          </a:fontRef>
-        </p:style>
-        <p:txBody>
-          <a:bodyPr rtlCol="0" anchor="ctr"/>
-          <a:lstStyle/>
-          <a:p>
-            <a:pPr algn="ctr"/>
-            <a:endParaRPr lang="en-US"/>
-          </a:p>
-        </p:txBody>
-      </p:sp>
+      </p:pic>
     </p:spTree>
     <p:extLst>
       <p:ext uri="{BB962C8B-B14F-4D97-AF65-F5344CB8AC3E}">
-        <p14:creationId xmlns:p14="http://schemas.microsoft.com/office/powerpoint/2010/main" val="547979724"/>
+        <p14:creationId xmlns:p14="http://schemas.microsoft.com/office/powerpoint/2010/main" val="2854708421"/>
       </p:ext>
     </p:extLst>
   </p:cSld>

</xml_diff>

<commit_message>
Added slide describing force field update
modified:   Jose/minimization_design.pptx
</commit_message>
<xml_diff>
--- a/Jose/minimization_design.pptx
+++ b/Jose/minimization_design.pptx
@@ -307,7 +307,7 @@
           <a:p>
             <a:fld id="{07BBF333-9989-4654-BFDE-F9E26C4E79EF}" type="datetimeFigureOut">
               <a:rPr lang="en-US" smtClean="0"/>
-              <a:t>12/26/2012</a:t>
+              <a:t>1/6/2013</a:t>
             </a:fld>
             <a:endParaRPr lang="en-US"/>
           </a:p>
@@ -472,7 +472,7 @@
           <a:p>
             <a:fld id="{07BBF333-9989-4654-BFDE-F9E26C4E79EF}" type="datetimeFigureOut">
               <a:rPr lang="en-US" smtClean="0"/>
-              <a:t>12/26/2012</a:t>
+              <a:t>1/6/2013</a:t>
             </a:fld>
             <a:endParaRPr lang="en-US"/>
           </a:p>
@@ -647,7 +647,7 @@
           <a:p>
             <a:fld id="{07BBF333-9989-4654-BFDE-F9E26C4E79EF}" type="datetimeFigureOut">
               <a:rPr lang="en-US" smtClean="0"/>
-              <a:t>12/26/2012</a:t>
+              <a:t>1/6/2013</a:t>
             </a:fld>
             <a:endParaRPr lang="en-US"/>
           </a:p>
@@ -812,7 +812,7 @@
           <a:p>
             <a:fld id="{07BBF333-9989-4654-BFDE-F9E26C4E79EF}" type="datetimeFigureOut">
               <a:rPr lang="en-US" smtClean="0"/>
-              <a:t>12/26/2012</a:t>
+              <a:t>1/6/2013</a:t>
             </a:fld>
             <a:endParaRPr lang="en-US"/>
           </a:p>
@@ -1053,7 +1053,7 @@
           <a:p>
             <a:fld id="{07BBF333-9989-4654-BFDE-F9E26C4E79EF}" type="datetimeFigureOut">
               <a:rPr lang="en-US" smtClean="0"/>
-              <a:t>12/26/2012</a:t>
+              <a:t>1/6/2013</a:t>
             </a:fld>
             <a:endParaRPr lang="en-US"/>
           </a:p>
@@ -1336,7 +1336,7 @@
           <a:p>
             <a:fld id="{07BBF333-9989-4654-BFDE-F9E26C4E79EF}" type="datetimeFigureOut">
               <a:rPr lang="en-US" smtClean="0"/>
-              <a:t>12/26/2012</a:t>
+              <a:t>1/6/2013</a:t>
             </a:fld>
             <a:endParaRPr lang="en-US"/>
           </a:p>
@@ -1753,7 +1753,7 @@
           <a:p>
             <a:fld id="{07BBF333-9989-4654-BFDE-F9E26C4E79EF}" type="datetimeFigureOut">
               <a:rPr lang="en-US" smtClean="0"/>
-              <a:t>12/26/2012</a:t>
+              <a:t>1/6/2013</a:t>
             </a:fld>
             <a:endParaRPr lang="en-US"/>
           </a:p>
@@ -1866,7 +1866,7 @@
           <a:p>
             <a:fld id="{07BBF333-9989-4654-BFDE-F9E26C4E79EF}" type="datetimeFigureOut">
               <a:rPr lang="en-US" smtClean="0"/>
-              <a:t>12/26/2012</a:t>
+              <a:t>1/6/2013</a:t>
             </a:fld>
             <a:endParaRPr lang="en-US"/>
           </a:p>
@@ -1956,7 +1956,7 @@
           <a:p>
             <a:fld id="{07BBF333-9989-4654-BFDE-F9E26C4E79EF}" type="datetimeFigureOut">
               <a:rPr lang="en-US" smtClean="0"/>
-              <a:t>12/26/2012</a:t>
+              <a:t>1/6/2013</a:t>
             </a:fld>
             <a:endParaRPr lang="en-US"/>
           </a:p>
@@ -2228,7 +2228,7 @@
           <a:p>
             <a:fld id="{07BBF333-9989-4654-BFDE-F9E26C4E79EF}" type="datetimeFigureOut">
               <a:rPr lang="en-US" smtClean="0"/>
-              <a:t>12/26/2012</a:t>
+              <a:t>1/6/2013</a:t>
             </a:fld>
             <a:endParaRPr lang="en-US"/>
           </a:p>
@@ -2476,7 +2476,7 @@
           <a:p>
             <a:fld id="{07BBF333-9989-4654-BFDE-F9E26C4E79EF}" type="datetimeFigureOut">
               <a:rPr lang="en-US" smtClean="0"/>
-              <a:t>12/26/2012</a:t>
+              <a:t>1/6/2013</a:t>
             </a:fld>
             <a:endParaRPr lang="en-US"/>
           </a:p>
@@ -2684,7 +2684,7 @@
           <a:p>
             <a:fld id="{07BBF333-9989-4654-BFDE-F9E26C4E79EF}" type="datetimeFigureOut">
               <a:rPr lang="en-US" smtClean="0"/>
-              <a:t>12/26/2012</a:t>
+              <a:t>1/6/2013</a:t>
             </a:fld>
             <a:endParaRPr lang="en-US"/>
           </a:p>
@@ -9807,7 +9807,7 @@
           <a:graphicData uri="http://schemas.openxmlformats.org/presentationml/2006/ole">
             <mc:AlternateContent xmlns:mc="http://schemas.openxmlformats.org/markup-compatibility/2006">
               <mc:Choice xmlns:v="urn:schemas-microsoft-com:vml" Requires="v">
-                <p:oleObj spid="_x0000_s1071" name="Equation" r:id="rId3" imgW="609480" imgH="393480" progId="Equation.DSMT4">
+                <p:oleObj spid="_x0000_s1073" name="Equation" r:id="rId3" imgW="609480" imgH="393480" progId="Equation.DSMT4">
                   <p:embed/>
                 </p:oleObj>
               </mc:Choice>
@@ -12781,6 +12781,104 @@
       </p:grpSpPr>
       <p:sp>
         <p:nvSpPr>
+          <p:cNvPr id="18" name="Rectangle 17"/>
+          <p:cNvSpPr/>
+          <p:nvPr/>
+        </p:nvSpPr>
+        <p:spPr>
+          <a:xfrm>
+            <a:off x="7391400" y="6019800"/>
+            <a:ext cx="914400" cy="696456"/>
+          </a:xfrm>
+          <a:prstGeom prst="rect">
+            <a:avLst/>
+          </a:prstGeom>
+          <a:solidFill>
+            <a:schemeClr val="accent6">
+              <a:lumMod val="20000"/>
+              <a:lumOff val="80000"/>
+            </a:schemeClr>
+          </a:solidFill>
+          <a:ln>
+            <a:noFill/>
+          </a:ln>
+        </p:spPr>
+        <p:style>
+          <a:lnRef idx="2">
+            <a:schemeClr val="accent1">
+              <a:shade val="50000"/>
+            </a:schemeClr>
+          </a:lnRef>
+          <a:fillRef idx="1">
+            <a:schemeClr val="accent1"/>
+          </a:fillRef>
+          <a:effectRef idx="0">
+            <a:schemeClr val="accent1"/>
+          </a:effectRef>
+          <a:fontRef idx="minor">
+            <a:schemeClr val="lt1"/>
+          </a:fontRef>
+        </p:style>
+        <p:txBody>
+          <a:bodyPr rtlCol="0" anchor="ctr"/>
+          <a:lstStyle/>
+          <a:p>
+            <a:pPr algn="ctr"/>
+            <a:endParaRPr lang="en-US"/>
+          </a:p>
+        </p:txBody>
+      </p:sp>
+      <p:sp>
+        <p:nvSpPr>
+          <p:cNvPr id="16" name="Rectangle 15"/>
+          <p:cNvSpPr/>
+          <p:nvPr/>
+        </p:nvSpPr>
+        <p:spPr>
+          <a:xfrm>
+            <a:off x="2819400" y="6019800"/>
+            <a:ext cx="1371600" cy="696456"/>
+          </a:xfrm>
+          <a:prstGeom prst="rect">
+            <a:avLst/>
+          </a:prstGeom>
+          <a:solidFill>
+            <a:schemeClr val="accent6">
+              <a:lumMod val="20000"/>
+              <a:lumOff val="80000"/>
+            </a:schemeClr>
+          </a:solidFill>
+          <a:ln>
+            <a:noFill/>
+          </a:ln>
+        </p:spPr>
+        <p:style>
+          <a:lnRef idx="2">
+            <a:schemeClr val="accent1">
+              <a:shade val="50000"/>
+            </a:schemeClr>
+          </a:lnRef>
+          <a:fillRef idx="1">
+            <a:schemeClr val="accent1"/>
+          </a:fillRef>
+          <a:effectRef idx="0">
+            <a:schemeClr val="accent1"/>
+          </a:effectRef>
+          <a:fontRef idx="minor">
+            <a:schemeClr val="lt1"/>
+          </a:fontRef>
+        </p:style>
+        <p:txBody>
+          <a:bodyPr rtlCol="0" anchor="ctr"/>
+          <a:lstStyle/>
+          <a:p>
+            <a:pPr algn="ctr"/>
+            <a:endParaRPr lang="en-US"/>
+          </a:p>
+        </p:txBody>
+      </p:sp>
+      <p:sp>
+        <p:nvSpPr>
           <p:cNvPr id="4" name="TextBox 3"/>
           <p:cNvSpPr txBox="1"/>
           <p:nvPr/>
@@ -12841,7 +12939,7 @@
         </p:blipFill>
         <p:spPr bwMode="auto">
           <a:xfrm>
-            <a:off x="1676400" y="838200"/>
+            <a:off x="1676400" y="533400"/>
             <a:ext cx="5310258" cy="3117774"/>
           </a:xfrm>
           <a:prstGeom prst="rect">
@@ -12859,6 +12957,841 @@
           </a:extLst>
         </p:spPr>
       </p:pic>
+      <p:sp>
+        <p:nvSpPr>
+          <p:cNvPr id="2" name="TextBox 1"/>
+          <p:cNvSpPr txBox="1"/>
+          <p:nvPr/>
+        </p:nvSpPr>
+        <p:spPr>
+          <a:xfrm>
+            <a:off x="5805394" y="1346030"/>
+            <a:ext cx="1486304" cy="646331"/>
+          </a:xfrm>
+          <a:prstGeom prst="rect">
+            <a:avLst/>
+          </a:prstGeom>
+          <a:noFill/>
+          <a:ln>
+            <a:solidFill>
+              <a:schemeClr val="tx1"/>
+            </a:solidFill>
+          </a:ln>
+        </p:spPr>
+        <p:txBody>
+          <a:bodyPr wrap="none" rtlCol="0">
+            <a:spAutoFit/>
+          </a:bodyPr>
+          <a:lstStyle/>
+          <a:p>
+            <a:r>
+              <a:rPr lang="en-US" sz="1200" dirty="0" smtClean="0">
+                <a:latin typeface="Courier New" pitchFamily="49" charset="0"/>
+                <a:cs typeface="Courier New" pitchFamily="49" charset="0"/>
+              </a:rPr>
+              <a:t>    1 variable</a:t>
+            </a:r>
+          </a:p>
+          <a:p>
+            <a:r>
+              <a:rPr lang="en-US" sz="1200" dirty="0" smtClean="0">
+                <a:latin typeface="Courier New" pitchFamily="49" charset="0"/>
+                <a:cs typeface="Courier New" pitchFamily="49" charset="0"/>
+              </a:rPr>
+              <a:t>    0.41  FF1</a:t>
+            </a:r>
+          </a:p>
+          <a:p>
+            <a:r>
+              <a:rPr lang="en-US" sz="1200" dirty="0" smtClean="0">
+                <a:latin typeface="Courier New" pitchFamily="49" charset="0"/>
+                <a:cs typeface="Courier New" pitchFamily="49" charset="0"/>
+              </a:rPr>
+              <a:t>…</a:t>
+            </a:r>
+            <a:endParaRPr lang="en-US" sz="1200" dirty="0">
+              <a:latin typeface="Courier New" pitchFamily="49" charset="0"/>
+              <a:cs typeface="Courier New" pitchFamily="49" charset="0"/>
+            </a:endParaRPr>
+          </a:p>
+        </p:txBody>
+      </p:sp>
+      <p:cxnSp>
+        <p:nvCxnSpPr>
+          <p:cNvPr id="6" name="Straight Arrow Connector 5"/>
+          <p:cNvCxnSpPr>
+            <a:stCxn id="2" idx="1"/>
+          </p:cNvCxnSpPr>
+          <p:nvPr/>
+        </p:nvCxnSpPr>
+        <p:spPr>
+          <a:xfrm flipH="1">
+            <a:off x="5029200" y="1669196"/>
+            <a:ext cx="776194" cy="184666"/>
+          </a:xfrm>
+          <a:prstGeom prst="straightConnector1">
+            <a:avLst/>
+          </a:prstGeom>
+          <a:ln>
+            <a:tailEnd type="arrow"/>
+          </a:ln>
+        </p:spPr>
+        <p:style>
+          <a:lnRef idx="1">
+            <a:schemeClr val="accent1"/>
+          </a:lnRef>
+          <a:fillRef idx="0">
+            <a:schemeClr val="accent1"/>
+          </a:fillRef>
+          <a:effectRef idx="0">
+            <a:schemeClr val="accent1"/>
+          </a:effectRef>
+          <a:fontRef idx="minor">
+            <a:schemeClr val="tx1"/>
+          </a:fontRef>
+        </p:style>
+      </p:cxnSp>
+      <p:sp>
+        <p:nvSpPr>
+          <p:cNvPr id="11" name="TextBox 10"/>
+          <p:cNvSpPr txBox="1"/>
+          <p:nvPr/>
+        </p:nvSpPr>
+        <p:spPr>
+          <a:xfrm>
+            <a:off x="30126" y="4038600"/>
+            <a:ext cx="4368504" cy="2677656"/>
+          </a:xfrm>
+          <a:prstGeom prst="rect">
+            <a:avLst/>
+          </a:prstGeom>
+          <a:noFill/>
+          <a:ln>
+            <a:solidFill>
+              <a:schemeClr val="tx1"/>
+            </a:solidFill>
+          </a:ln>
+        </p:spPr>
+        <p:txBody>
+          <a:bodyPr wrap="none" rtlCol="0">
+            <a:spAutoFit/>
+          </a:bodyPr>
+          <a:lstStyle/>
+          <a:p>
+            <a:r>
+              <a:rPr lang="en-US" sz="1200" dirty="0">
+                <a:latin typeface="Courier New" pitchFamily="49" charset="0"/>
+                <a:cs typeface="Courier New" pitchFamily="49" charset="0"/>
+              </a:rPr>
+              <a:t>&lt;?xml version="1.0" ?&gt;&lt;root</a:t>
+            </a:r>
+            <a:r>
+              <a:rPr lang="en-US" sz="1200" dirty="0" smtClean="0">
+                <a:latin typeface="Courier New" pitchFamily="49" charset="0"/>
+                <a:cs typeface="Courier New" pitchFamily="49" charset="0"/>
+              </a:rPr>
+              <a:t>&gt;</a:t>
+            </a:r>
+          </a:p>
+          <a:p>
+            <a:r>
+              <a:rPr lang="en-US" sz="1200" dirty="0" smtClean="0">
+                <a:latin typeface="Courier New" pitchFamily="49" charset="0"/>
+                <a:cs typeface="Courier New" pitchFamily="49" charset="0"/>
+              </a:rPr>
+              <a:t> </a:t>
+            </a:r>
+            <a:r>
+              <a:rPr lang="en-US" sz="1200" dirty="0">
+                <a:latin typeface="Courier New" pitchFamily="49" charset="0"/>
+                <a:cs typeface="Courier New" pitchFamily="49" charset="0"/>
+              </a:rPr>
+              <a:t>&lt;!--Force field template file-</a:t>
+            </a:r>
+            <a:r>
+              <a:rPr lang="en-US" sz="1200" dirty="0" smtClean="0">
+                <a:latin typeface="Courier New" pitchFamily="49" charset="0"/>
+                <a:cs typeface="Courier New" pitchFamily="49" charset="0"/>
+              </a:rPr>
+              <a:t>-&gt;</a:t>
+            </a:r>
+          </a:p>
+          <a:p>
+            <a:r>
+              <a:rPr lang="en-US" sz="1200" dirty="0" smtClean="0">
+                <a:latin typeface="Courier New" pitchFamily="49" charset="0"/>
+                <a:cs typeface="Courier New" pitchFamily="49" charset="0"/>
+              </a:rPr>
+              <a:t> </a:t>
+            </a:r>
+            <a:r>
+              <a:rPr lang="en-US" sz="1200" dirty="0">
+                <a:latin typeface="Courier New" pitchFamily="49" charset="0"/>
+                <a:cs typeface="Courier New" pitchFamily="49" charset="0"/>
+              </a:rPr>
+              <a:t>&lt;FFParams&gt; </a:t>
+            </a:r>
+            <a:endParaRPr lang="en-US" sz="1200" dirty="0" smtClean="0">
+              <a:latin typeface="Courier New" pitchFamily="49" charset="0"/>
+              <a:cs typeface="Courier New" pitchFamily="49" charset="0"/>
+            </a:endParaRPr>
+          </a:p>
+          <a:p>
+            <a:r>
+              <a:rPr lang="en-US" sz="1200" dirty="0" smtClean="0">
+                <a:latin typeface="Courier New" pitchFamily="49" charset="0"/>
+                <a:cs typeface="Courier New" pitchFamily="49" charset="0"/>
+              </a:rPr>
+              <a:t>   </a:t>
+            </a:r>
+            <a:r>
+              <a:rPr lang="en-US" sz="1200" dirty="0">
+                <a:latin typeface="Courier New" pitchFamily="49" charset="0"/>
+                <a:cs typeface="Courier New" pitchFamily="49" charset="0"/>
+              </a:rPr>
+              <a:t>&lt;FFParam constraint="-2*FF1" name="FF2</a:t>
+            </a:r>
+            <a:r>
+              <a:rPr lang="en-US" sz="1200" dirty="0" smtClean="0">
+                <a:latin typeface="Courier New" pitchFamily="49" charset="0"/>
+                <a:cs typeface="Courier New" pitchFamily="49" charset="0"/>
+              </a:rPr>
+              <a:t>"/&gt;</a:t>
+            </a:r>
+          </a:p>
+          <a:p>
+            <a:r>
+              <a:rPr lang="en-US" sz="1200" dirty="0" smtClean="0">
+                <a:latin typeface="Courier New" pitchFamily="49" charset="0"/>
+                <a:cs typeface="Courier New" pitchFamily="49" charset="0"/>
+              </a:rPr>
+              <a:t>    </a:t>
+            </a:r>
+            <a:r>
+              <a:rPr lang="en-US" sz="1200" dirty="0">
+                <a:latin typeface="Courier New" pitchFamily="49" charset="0"/>
+                <a:cs typeface="Courier New" pitchFamily="49" charset="0"/>
+              </a:rPr>
+              <a:t>&lt;FFParam initial="0.45" maximum="0.6</a:t>
+            </a:r>
+            <a:r>
+              <a:rPr lang="en-US" sz="1200" dirty="0" smtClean="0">
+                <a:latin typeface="Courier New" pitchFamily="49" charset="0"/>
+                <a:cs typeface="Courier New" pitchFamily="49" charset="0"/>
+              </a:rPr>
+              <a:t>"/&gt;</a:t>
+            </a:r>
+            <a:endParaRPr lang="en-US" sz="1200" dirty="0" smtClean="0">
+              <a:latin typeface="Courier New" pitchFamily="49" charset="0"/>
+              <a:cs typeface="Courier New" pitchFamily="49" charset="0"/>
+            </a:endParaRPr>
+          </a:p>
+          <a:p>
+            <a:r>
+              <a:rPr lang="en-US" sz="1200" dirty="0" smtClean="0">
+                <a:latin typeface="Courier New" pitchFamily="49" charset="0"/>
+                <a:cs typeface="Courier New" pitchFamily="49" charset="0"/>
+              </a:rPr>
+              <a:t> </a:t>
+            </a:r>
+            <a:r>
+              <a:rPr lang="en-US" sz="1200" dirty="0">
+                <a:latin typeface="Courier New" pitchFamily="49" charset="0"/>
+                <a:cs typeface="Courier New" pitchFamily="49" charset="0"/>
+              </a:rPr>
+              <a:t>&lt;/FFParams</a:t>
+            </a:r>
+            <a:r>
+              <a:rPr lang="en-US" sz="1200" dirty="0" smtClean="0">
+                <a:latin typeface="Courier New" pitchFamily="49" charset="0"/>
+                <a:cs typeface="Courier New" pitchFamily="49" charset="0"/>
+              </a:rPr>
+              <a:t>&gt;</a:t>
+            </a:r>
+          </a:p>
+          <a:p>
+            <a:r>
+              <a:rPr lang="en-US" sz="1200" dirty="0" smtClean="0">
+                <a:latin typeface="Courier New" pitchFamily="49" charset="0"/>
+                <a:cs typeface="Courier New" pitchFamily="49" charset="0"/>
+              </a:rPr>
+              <a:t> &lt;FFTemplate&gt;PSF</a:t>
+            </a:r>
+          </a:p>
+          <a:p>
+            <a:r>
+              <a:rPr lang="en-US" sz="1200" dirty="0" smtClean="0">
+                <a:latin typeface="Courier New" pitchFamily="49" charset="0"/>
+                <a:cs typeface="Courier New" pitchFamily="49" charset="0"/>
+              </a:rPr>
+              <a:t>       </a:t>
+            </a:r>
+            <a:r>
+              <a:rPr lang="en-US" sz="1200" dirty="0">
+                <a:latin typeface="Courier New" pitchFamily="49" charset="0"/>
+                <a:cs typeface="Courier New" pitchFamily="49" charset="0"/>
+              </a:rPr>
+              <a:t>5 !</a:t>
+            </a:r>
+            <a:r>
+              <a:rPr lang="en-US" sz="1200" dirty="0" smtClean="0">
+                <a:latin typeface="Courier New" pitchFamily="49" charset="0"/>
+                <a:cs typeface="Courier New" pitchFamily="49" charset="0"/>
+              </a:rPr>
+              <a:t>NTITLE</a:t>
+            </a:r>
+          </a:p>
+          <a:p>
+            <a:r>
+              <a:rPr lang="en-US" sz="1200" dirty="0" smtClean="0">
+                <a:latin typeface="Courier New" pitchFamily="49" charset="0"/>
+                <a:cs typeface="Courier New" pitchFamily="49" charset="0"/>
+              </a:rPr>
+              <a:t> 3692 </a:t>
+            </a:r>
+            <a:r>
+              <a:rPr lang="en-US" sz="1200" dirty="0">
+                <a:latin typeface="Courier New" pitchFamily="49" charset="0"/>
+                <a:cs typeface="Courier New" pitchFamily="49" charset="0"/>
+              </a:rPr>
+              <a:t>!</a:t>
+            </a:r>
+            <a:r>
+              <a:rPr lang="en-US" sz="1200" dirty="0" smtClean="0">
+                <a:latin typeface="Courier New" pitchFamily="49" charset="0"/>
+                <a:cs typeface="Courier New" pitchFamily="49" charset="0"/>
+              </a:rPr>
+              <a:t>NATOM</a:t>
+            </a:r>
+          </a:p>
+          <a:p>
+            <a:r>
+              <a:rPr lang="en-US" sz="1200" dirty="0" smtClean="0">
+                <a:latin typeface="Courier New" pitchFamily="49" charset="0"/>
+                <a:cs typeface="Courier New" pitchFamily="49" charset="0"/>
+              </a:rPr>
+              <a:t>   </a:t>
+            </a:r>
+            <a:r>
+              <a:rPr lang="en-US" sz="1200" dirty="0">
+                <a:latin typeface="Courier New" pitchFamily="49" charset="0"/>
+                <a:cs typeface="Courier New" pitchFamily="49" charset="0"/>
+              </a:rPr>
+              <a:t>1 O1   1    LIT  </a:t>
+            </a:r>
+            <a:r>
+              <a:rPr lang="en-US" sz="1200" dirty="0" err="1">
+                <a:latin typeface="Courier New" pitchFamily="49" charset="0"/>
+                <a:cs typeface="Courier New" pitchFamily="49" charset="0"/>
+              </a:rPr>
+              <a:t>LIT</a:t>
+            </a:r>
+            <a:r>
+              <a:rPr lang="en-US" sz="1200" dirty="0">
+                <a:latin typeface="Courier New" pitchFamily="49" charset="0"/>
+                <a:cs typeface="Courier New" pitchFamily="49" charset="0"/>
+              </a:rPr>
+              <a:t>  </a:t>
+            </a:r>
+            <a:r>
+              <a:rPr lang="en-US" sz="1200" dirty="0" err="1">
+                <a:latin typeface="Courier New" pitchFamily="49" charset="0"/>
+                <a:cs typeface="Courier New" pitchFamily="49" charset="0"/>
+              </a:rPr>
+              <a:t>LIT</a:t>
+            </a:r>
+            <a:r>
+              <a:rPr lang="en-US" sz="1200" dirty="0">
+                <a:latin typeface="Courier New" pitchFamily="49" charset="0"/>
+                <a:cs typeface="Courier New" pitchFamily="49" charset="0"/>
+              </a:rPr>
+              <a:t>    1.000000 </a:t>
+            </a:r>
+            <a:endParaRPr lang="en-US" sz="1200" dirty="0" smtClean="0">
+              <a:latin typeface="Courier New" pitchFamily="49" charset="0"/>
+              <a:cs typeface="Courier New" pitchFamily="49" charset="0"/>
+            </a:endParaRPr>
+          </a:p>
+          <a:p>
+            <a:r>
+              <a:rPr lang="en-US" sz="1200" dirty="0">
+                <a:latin typeface="Courier New" pitchFamily="49" charset="0"/>
+                <a:cs typeface="Courier New" pitchFamily="49" charset="0"/>
+              </a:rPr>
+              <a:t> </a:t>
+            </a:r>
+            <a:r>
+              <a:rPr lang="en-US" sz="1200" dirty="0" smtClean="0">
+                <a:latin typeface="Courier New" pitchFamily="49" charset="0"/>
+                <a:cs typeface="Courier New" pitchFamily="49" charset="0"/>
+              </a:rPr>
+              <a:t>...</a:t>
+            </a:r>
+            <a:endParaRPr lang="en-US" sz="1200" dirty="0" smtClean="0">
+              <a:latin typeface="Courier New" pitchFamily="49" charset="0"/>
+              <a:cs typeface="Courier New" pitchFamily="49" charset="0"/>
+            </a:endParaRPr>
+          </a:p>
+          <a:p>
+            <a:r>
+              <a:rPr lang="en-US" sz="1200" dirty="0">
+                <a:latin typeface="Courier New" pitchFamily="49" charset="0"/>
+                <a:cs typeface="Courier New" pitchFamily="49" charset="0"/>
+              </a:rPr>
+              <a:t> 309 W1   309  TIP3 OH2  OT   _FF2_(%-</a:t>
+            </a:r>
+            <a:r>
+              <a:rPr lang="en-US" sz="1200" dirty="0" smtClean="0">
+                <a:latin typeface="Courier New" pitchFamily="49" charset="0"/>
+                <a:cs typeface="Courier New" pitchFamily="49" charset="0"/>
+              </a:rPr>
+              <a:t>12.6f)</a:t>
+            </a:r>
+          </a:p>
+          <a:p>
+            <a:r>
+              <a:rPr lang="en-US" sz="1200" dirty="0" smtClean="0">
+                <a:latin typeface="Courier New" pitchFamily="49" charset="0"/>
+                <a:cs typeface="Courier New" pitchFamily="49" charset="0"/>
+              </a:rPr>
+              <a:t> 310 W1   309  TIP3 H1   HT   _FF1_(%-12.6f)</a:t>
+            </a:r>
+          </a:p>
+          <a:p>
+            <a:r>
+              <a:rPr lang="en-US" sz="1200" dirty="0" smtClean="0">
+                <a:latin typeface="Courier New" pitchFamily="49" charset="0"/>
+                <a:cs typeface="Courier New" pitchFamily="49" charset="0"/>
+              </a:rPr>
+              <a:t> </a:t>
+            </a:r>
+            <a:r>
+              <a:rPr lang="en-US" sz="1200" dirty="0">
+                <a:latin typeface="Courier New" pitchFamily="49" charset="0"/>
+                <a:cs typeface="Courier New" pitchFamily="49" charset="0"/>
+              </a:rPr>
+              <a:t>311 W1   309  TIP3 H2   HT   _FF1_(%-</a:t>
+            </a:r>
+            <a:r>
+              <a:rPr lang="en-US" sz="1200" dirty="0" smtClean="0">
+                <a:latin typeface="Courier New" pitchFamily="49" charset="0"/>
+                <a:cs typeface="Courier New" pitchFamily="49" charset="0"/>
+              </a:rPr>
+              <a:t>12.6f)</a:t>
+            </a:r>
+            <a:endParaRPr lang="en-US" sz="1200" dirty="0">
+              <a:latin typeface="Courier New" pitchFamily="49" charset="0"/>
+              <a:cs typeface="Courier New" pitchFamily="49" charset="0"/>
+            </a:endParaRPr>
+          </a:p>
+        </p:txBody>
+      </p:sp>
+      <p:cxnSp>
+        <p:nvCxnSpPr>
+          <p:cNvPr id="12" name="Straight Arrow Connector 11"/>
+          <p:cNvCxnSpPr>
+            <a:stCxn id="11" idx="0"/>
+          </p:cNvCxnSpPr>
+          <p:nvPr/>
+        </p:nvCxnSpPr>
+        <p:spPr>
+          <a:xfrm flipV="1">
+            <a:off x="2214378" y="3429000"/>
+            <a:ext cx="0" cy="609600"/>
+          </a:xfrm>
+          <a:prstGeom prst="straightConnector1">
+            <a:avLst/>
+          </a:prstGeom>
+          <a:ln>
+            <a:tailEnd type="arrow"/>
+          </a:ln>
+        </p:spPr>
+        <p:style>
+          <a:lnRef idx="1">
+            <a:schemeClr val="accent1"/>
+          </a:lnRef>
+          <a:fillRef idx="0">
+            <a:schemeClr val="accent1"/>
+          </a:fillRef>
+          <a:effectRef idx="0">
+            <a:schemeClr val="accent1"/>
+          </a:effectRef>
+          <a:fontRef idx="minor">
+            <a:schemeClr val="tx1"/>
+          </a:fontRef>
+        </p:style>
+      </p:cxnSp>
+      <p:sp>
+        <p:nvSpPr>
+          <p:cNvPr id="14" name="TextBox 13"/>
+          <p:cNvSpPr txBox="1"/>
+          <p:nvPr/>
+        </p:nvSpPr>
+        <p:spPr>
+          <a:xfrm>
+            <a:off x="4577316" y="4038600"/>
+            <a:ext cx="4368504" cy="2677656"/>
+          </a:xfrm>
+          <a:prstGeom prst="rect">
+            <a:avLst/>
+          </a:prstGeom>
+          <a:noFill/>
+          <a:ln>
+            <a:solidFill>
+              <a:schemeClr val="tx1"/>
+            </a:solidFill>
+          </a:ln>
+        </p:spPr>
+        <p:txBody>
+          <a:bodyPr wrap="none" rtlCol="0">
+            <a:spAutoFit/>
+          </a:bodyPr>
+          <a:lstStyle/>
+          <a:p>
+            <a:r>
+              <a:rPr lang="en-US" sz="1200" dirty="0">
+                <a:latin typeface="Courier New" pitchFamily="49" charset="0"/>
+                <a:cs typeface="Courier New" pitchFamily="49" charset="0"/>
+              </a:rPr>
+              <a:t>&lt;?xml version="1.0" ?&gt;&lt;root</a:t>
+            </a:r>
+            <a:r>
+              <a:rPr lang="en-US" sz="1200" dirty="0" smtClean="0">
+                <a:latin typeface="Courier New" pitchFamily="49" charset="0"/>
+                <a:cs typeface="Courier New" pitchFamily="49" charset="0"/>
+              </a:rPr>
+              <a:t>&gt;</a:t>
+            </a:r>
+          </a:p>
+          <a:p>
+            <a:r>
+              <a:rPr lang="en-US" sz="1200" dirty="0" smtClean="0">
+                <a:latin typeface="Courier New" pitchFamily="49" charset="0"/>
+                <a:cs typeface="Courier New" pitchFamily="49" charset="0"/>
+              </a:rPr>
+              <a:t> </a:t>
+            </a:r>
+            <a:r>
+              <a:rPr lang="en-US" sz="1200" dirty="0">
+                <a:latin typeface="Courier New" pitchFamily="49" charset="0"/>
+                <a:cs typeface="Courier New" pitchFamily="49" charset="0"/>
+              </a:rPr>
+              <a:t>&lt;!--Force field template file-</a:t>
+            </a:r>
+            <a:r>
+              <a:rPr lang="en-US" sz="1200" dirty="0" smtClean="0">
+                <a:latin typeface="Courier New" pitchFamily="49" charset="0"/>
+                <a:cs typeface="Courier New" pitchFamily="49" charset="0"/>
+              </a:rPr>
+              <a:t>-&gt;</a:t>
+            </a:r>
+          </a:p>
+          <a:p>
+            <a:r>
+              <a:rPr lang="en-US" sz="1200" dirty="0" smtClean="0">
+                <a:latin typeface="Courier New" pitchFamily="49" charset="0"/>
+                <a:cs typeface="Courier New" pitchFamily="49" charset="0"/>
+              </a:rPr>
+              <a:t> </a:t>
+            </a:r>
+            <a:r>
+              <a:rPr lang="en-US" sz="1200" dirty="0">
+                <a:latin typeface="Courier New" pitchFamily="49" charset="0"/>
+                <a:cs typeface="Courier New" pitchFamily="49" charset="0"/>
+              </a:rPr>
+              <a:t>&lt;FFParams&gt; </a:t>
+            </a:r>
+            <a:endParaRPr lang="en-US" sz="1200" dirty="0" smtClean="0">
+              <a:latin typeface="Courier New" pitchFamily="49" charset="0"/>
+              <a:cs typeface="Courier New" pitchFamily="49" charset="0"/>
+            </a:endParaRPr>
+          </a:p>
+          <a:p>
+            <a:r>
+              <a:rPr lang="en-US" sz="1200" dirty="0" smtClean="0">
+                <a:latin typeface="Courier New" pitchFamily="49" charset="0"/>
+                <a:cs typeface="Courier New" pitchFamily="49" charset="0"/>
+              </a:rPr>
+              <a:t>   </a:t>
+            </a:r>
+            <a:r>
+              <a:rPr lang="en-US" sz="1200" dirty="0">
+                <a:latin typeface="Courier New" pitchFamily="49" charset="0"/>
+                <a:cs typeface="Courier New" pitchFamily="49" charset="0"/>
+              </a:rPr>
+              <a:t>&lt;FFParam constraint="-2*FF1" name="FF2</a:t>
+            </a:r>
+            <a:r>
+              <a:rPr lang="en-US" sz="1200" dirty="0" smtClean="0">
+                <a:latin typeface="Courier New" pitchFamily="49" charset="0"/>
+                <a:cs typeface="Courier New" pitchFamily="49" charset="0"/>
+              </a:rPr>
+              <a:t>"/&gt;</a:t>
+            </a:r>
+          </a:p>
+          <a:p>
+            <a:r>
+              <a:rPr lang="en-US" sz="1200" dirty="0" smtClean="0">
+                <a:latin typeface="Courier New" pitchFamily="49" charset="0"/>
+                <a:cs typeface="Courier New" pitchFamily="49" charset="0"/>
+              </a:rPr>
+              <a:t>    </a:t>
+            </a:r>
+            <a:r>
+              <a:rPr lang="en-US" sz="1200" dirty="0">
+                <a:latin typeface="Courier New" pitchFamily="49" charset="0"/>
+                <a:cs typeface="Courier New" pitchFamily="49" charset="0"/>
+              </a:rPr>
+              <a:t>&lt;FFParam initial="0.45" maximum="0.6</a:t>
+            </a:r>
+            <a:r>
+              <a:rPr lang="en-US" sz="1200" dirty="0" smtClean="0">
+                <a:latin typeface="Courier New" pitchFamily="49" charset="0"/>
+                <a:cs typeface="Courier New" pitchFamily="49" charset="0"/>
+              </a:rPr>
+              <a:t>"/&gt;</a:t>
+            </a:r>
+            <a:endParaRPr lang="en-US" sz="1200" dirty="0" smtClean="0">
+              <a:latin typeface="Courier New" pitchFamily="49" charset="0"/>
+              <a:cs typeface="Courier New" pitchFamily="49" charset="0"/>
+            </a:endParaRPr>
+          </a:p>
+          <a:p>
+            <a:r>
+              <a:rPr lang="en-US" sz="1200" dirty="0" smtClean="0">
+                <a:latin typeface="Courier New" pitchFamily="49" charset="0"/>
+                <a:cs typeface="Courier New" pitchFamily="49" charset="0"/>
+              </a:rPr>
+              <a:t> </a:t>
+            </a:r>
+            <a:r>
+              <a:rPr lang="en-US" sz="1200" dirty="0">
+                <a:latin typeface="Courier New" pitchFamily="49" charset="0"/>
+                <a:cs typeface="Courier New" pitchFamily="49" charset="0"/>
+              </a:rPr>
+              <a:t>&lt;/FFParams</a:t>
+            </a:r>
+            <a:r>
+              <a:rPr lang="en-US" sz="1200" dirty="0" smtClean="0">
+                <a:latin typeface="Courier New" pitchFamily="49" charset="0"/>
+                <a:cs typeface="Courier New" pitchFamily="49" charset="0"/>
+              </a:rPr>
+              <a:t>&gt;</a:t>
+            </a:r>
+          </a:p>
+          <a:p>
+            <a:r>
+              <a:rPr lang="en-US" sz="1200" dirty="0" smtClean="0">
+                <a:latin typeface="Courier New" pitchFamily="49" charset="0"/>
+                <a:cs typeface="Courier New" pitchFamily="49" charset="0"/>
+              </a:rPr>
+              <a:t> &lt;FFTemplate&gt;PSF</a:t>
+            </a:r>
+          </a:p>
+          <a:p>
+            <a:r>
+              <a:rPr lang="en-US" sz="1200" dirty="0" smtClean="0">
+                <a:latin typeface="Courier New" pitchFamily="49" charset="0"/>
+                <a:cs typeface="Courier New" pitchFamily="49" charset="0"/>
+              </a:rPr>
+              <a:t>       </a:t>
+            </a:r>
+            <a:r>
+              <a:rPr lang="en-US" sz="1200" dirty="0">
+                <a:latin typeface="Courier New" pitchFamily="49" charset="0"/>
+                <a:cs typeface="Courier New" pitchFamily="49" charset="0"/>
+              </a:rPr>
+              <a:t>5 !</a:t>
+            </a:r>
+            <a:r>
+              <a:rPr lang="en-US" sz="1200" dirty="0" smtClean="0">
+                <a:latin typeface="Courier New" pitchFamily="49" charset="0"/>
+                <a:cs typeface="Courier New" pitchFamily="49" charset="0"/>
+              </a:rPr>
+              <a:t>NTITLE</a:t>
+            </a:r>
+          </a:p>
+          <a:p>
+            <a:r>
+              <a:rPr lang="en-US" sz="1200" dirty="0" smtClean="0">
+                <a:latin typeface="Courier New" pitchFamily="49" charset="0"/>
+                <a:cs typeface="Courier New" pitchFamily="49" charset="0"/>
+              </a:rPr>
+              <a:t> 3692 </a:t>
+            </a:r>
+            <a:r>
+              <a:rPr lang="en-US" sz="1200" dirty="0">
+                <a:latin typeface="Courier New" pitchFamily="49" charset="0"/>
+                <a:cs typeface="Courier New" pitchFamily="49" charset="0"/>
+              </a:rPr>
+              <a:t>!</a:t>
+            </a:r>
+            <a:r>
+              <a:rPr lang="en-US" sz="1200" dirty="0" smtClean="0">
+                <a:latin typeface="Courier New" pitchFamily="49" charset="0"/>
+                <a:cs typeface="Courier New" pitchFamily="49" charset="0"/>
+              </a:rPr>
+              <a:t>NATOM</a:t>
+            </a:r>
+          </a:p>
+          <a:p>
+            <a:r>
+              <a:rPr lang="en-US" sz="1200" dirty="0" smtClean="0">
+                <a:latin typeface="Courier New" pitchFamily="49" charset="0"/>
+                <a:cs typeface="Courier New" pitchFamily="49" charset="0"/>
+              </a:rPr>
+              <a:t>   </a:t>
+            </a:r>
+            <a:r>
+              <a:rPr lang="en-US" sz="1200" dirty="0">
+                <a:latin typeface="Courier New" pitchFamily="49" charset="0"/>
+                <a:cs typeface="Courier New" pitchFamily="49" charset="0"/>
+              </a:rPr>
+              <a:t>1 O1   1    LIT  </a:t>
+            </a:r>
+            <a:r>
+              <a:rPr lang="en-US" sz="1200" dirty="0" err="1">
+                <a:latin typeface="Courier New" pitchFamily="49" charset="0"/>
+                <a:cs typeface="Courier New" pitchFamily="49" charset="0"/>
+              </a:rPr>
+              <a:t>LIT</a:t>
+            </a:r>
+            <a:r>
+              <a:rPr lang="en-US" sz="1200" dirty="0">
+                <a:latin typeface="Courier New" pitchFamily="49" charset="0"/>
+                <a:cs typeface="Courier New" pitchFamily="49" charset="0"/>
+              </a:rPr>
+              <a:t>  </a:t>
+            </a:r>
+            <a:r>
+              <a:rPr lang="en-US" sz="1200" dirty="0" err="1">
+                <a:latin typeface="Courier New" pitchFamily="49" charset="0"/>
+                <a:cs typeface="Courier New" pitchFamily="49" charset="0"/>
+              </a:rPr>
+              <a:t>LIT</a:t>
+            </a:r>
+            <a:r>
+              <a:rPr lang="en-US" sz="1200" dirty="0">
+                <a:latin typeface="Courier New" pitchFamily="49" charset="0"/>
+                <a:cs typeface="Courier New" pitchFamily="49" charset="0"/>
+              </a:rPr>
+              <a:t>   </a:t>
+            </a:r>
+            <a:r>
+              <a:rPr lang="en-US" sz="1200" dirty="0" smtClean="0">
+                <a:latin typeface="Courier New" pitchFamily="49" charset="0"/>
+                <a:cs typeface="Courier New" pitchFamily="49" charset="0"/>
+              </a:rPr>
+              <a:t>1.000000 </a:t>
+            </a:r>
+          </a:p>
+          <a:p>
+            <a:r>
+              <a:rPr lang="en-US" sz="1200" dirty="0">
+                <a:latin typeface="Courier New" pitchFamily="49" charset="0"/>
+                <a:cs typeface="Courier New" pitchFamily="49" charset="0"/>
+              </a:rPr>
+              <a:t> </a:t>
+            </a:r>
+            <a:r>
+              <a:rPr lang="en-US" sz="1200" dirty="0" smtClean="0">
+                <a:latin typeface="Courier New" pitchFamily="49" charset="0"/>
+                <a:cs typeface="Courier New" pitchFamily="49" charset="0"/>
+              </a:rPr>
+              <a:t>...</a:t>
+            </a:r>
+            <a:endParaRPr lang="en-US" sz="1200" dirty="0" smtClean="0">
+              <a:latin typeface="Courier New" pitchFamily="49" charset="0"/>
+              <a:cs typeface="Courier New" pitchFamily="49" charset="0"/>
+            </a:endParaRPr>
+          </a:p>
+          <a:p>
+            <a:r>
+              <a:rPr lang="en-US" sz="1200" dirty="0">
+                <a:latin typeface="Courier New" pitchFamily="49" charset="0"/>
+                <a:cs typeface="Courier New" pitchFamily="49" charset="0"/>
+              </a:rPr>
+              <a:t> 309 W1   309  TIP3 OH2  </a:t>
+            </a:r>
+            <a:r>
+              <a:rPr lang="en-US" sz="1200" dirty="0" smtClean="0">
+                <a:latin typeface="Courier New" pitchFamily="49" charset="0"/>
+                <a:cs typeface="Courier New" pitchFamily="49" charset="0"/>
+              </a:rPr>
+              <a:t>OT   -0.820000</a:t>
+            </a:r>
+          </a:p>
+          <a:p>
+            <a:r>
+              <a:rPr lang="en-US" sz="1200" dirty="0" smtClean="0">
+                <a:latin typeface="Courier New" pitchFamily="49" charset="0"/>
+                <a:cs typeface="Courier New" pitchFamily="49" charset="0"/>
+              </a:rPr>
+              <a:t> 310 W1   309  TIP3 H1   HT    0.410000</a:t>
+            </a:r>
+          </a:p>
+          <a:p>
+            <a:r>
+              <a:rPr lang="en-US" sz="1200" dirty="0" smtClean="0">
+                <a:latin typeface="Courier New" pitchFamily="49" charset="0"/>
+                <a:cs typeface="Courier New" pitchFamily="49" charset="0"/>
+              </a:rPr>
+              <a:t> </a:t>
+            </a:r>
+            <a:r>
+              <a:rPr lang="en-US" sz="1200" dirty="0">
+                <a:latin typeface="Courier New" pitchFamily="49" charset="0"/>
+                <a:cs typeface="Courier New" pitchFamily="49" charset="0"/>
+              </a:rPr>
+              <a:t>311 W1   309  TIP3 H2   HT   </a:t>
+            </a:r>
+            <a:r>
+              <a:rPr lang="en-US" sz="1200" dirty="0" smtClean="0">
+                <a:latin typeface="Courier New" pitchFamily="49" charset="0"/>
+                <a:cs typeface="Courier New" pitchFamily="49" charset="0"/>
+              </a:rPr>
+              <a:t> 0.410000</a:t>
+            </a:r>
+            <a:endParaRPr lang="en-US" sz="1200" dirty="0">
+              <a:latin typeface="Courier New" pitchFamily="49" charset="0"/>
+              <a:cs typeface="Courier New" pitchFamily="49" charset="0"/>
+            </a:endParaRPr>
+          </a:p>
+        </p:txBody>
+      </p:sp>
+      <p:cxnSp>
+        <p:nvCxnSpPr>
+          <p:cNvPr id="15" name="Straight Arrow Connector 14"/>
+          <p:cNvCxnSpPr/>
+          <p:nvPr/>
+        </p:nvCxnSpPr>
+        <p:spPr>
+          <a:xfrm>
+            <a:off x="6248400" y="3429000"/>
+            <a:ext cx="0" cy="609600"/>
+          </a:xfrm>
+          <a:prstGeom prst="straightConnector1">
+            <a:avLst/>
+          </a:prstGeom>
+          <a:ln>
+            <a:tailEnd type="arrow"/>
+          </a:ln>
+        </p:spPr>
+        <p:style>
+          <a:lnRef idx="1">
+            <a:schemeClr val="accent1"/>
+          </a:lnRef>
+          <a:fillRef idx="0">
+            <a:schemeClr val="accent1"/>
+          </a:fillRef>
+          <a:effectRef idx="0">
+            <a:schemeClr val="accent1"/>
+          </a:effectRef>
+          <a:fontRef idx="minor">
+            <a:schemeClr val="tx1"/>
+          </a:fontRef>
+        </p:style>
+      </p:cxnSp>
     </p:spTree>
     <p:extLst>
       <p:ext uri="{BB962C8B-B14F-4D97-AF65-F5344CB8AC3E}">

</xml_diff>